<commit_message>
Tight coupling example added
</commit_message>
<xml_diff>
--- a/DI Course.pptx
+++ b/DI Course.pptx
@@ -5,10 +5,10 @@
     <p:sldMasterId id="2147483650" r:id="rId1"/>
   </p:sldMasterIdLst>
   <p:notesMasterIdLst>
-    <p:notesMasterId r:id="rId10"/>
+    <p:notesMasterId r:id="rId11"/>
   </p:notesMasterIdLst>
   <p:handoutMasterIdLst>
-    <p:handoutMasterId r:id="rId11"/>
+    <p:handoutMasterId r:id="rId12"/>
   </p:handoutMasterIdLst>
   <p:sldIdLst>
     <p:sldId id="256" r:id="rId2"/>
@@ -16,9 +16,10 @@
     <p:sldId id="337" r:id="rId4"/>
     <p:sldId id="338" r:id="rId5"/>
     <p:sldId id="339" r:id="rId6"/>
-    <p:sldId id="340" r:id="rId7"/>
-    <p:sldId id="327" r:id="rId8"/>
-    <p:sldId id="295" r:id="rId9"/>
+    <p:sldId id="341" r:id="rId7"/>
+    <p:sldId id="340" r:id="rId8"/>
+    <p:sldId id="327" r:id="rId9"/>
+    <p:sldId id="295" r:id="rId10"/>
   </p:sldIdLst>
   <p:sldSz cx="18291175" cy="10290175"/>
   <p:notesSz cx="6858000" cy="9144000"/>
@@ -245,7 +246,7 @@
             <a:fld id="{4D0CBB7A-33AF-434C-B8C5-B5F21D294CDF}" type="datetimeFigureOut">
               <a:rPr lang="tr-TR" smtClean="0"/>
               <a:pPr/>
-              <a:t>2.04.2017</a:t>
+              <a:t>3.04.2017</a:t>
             </a:fld>
             <a:endParaRPr lang="tr-TR"/>
           </a:p>
@@ -412,7 +413,7 @@
             <a:fld id="{6C6C1039-E6FF-4F78-9751-FFD9A3AC8099}" type="datetimeFigureOut">
               <a:rPr lang="tr-TR" smtClean="0"/>
               <a:pPr/>
-              <a:t>2.04.2017</a:t>
+              <a:t>3.04.2017</a:t>
             </a:fld>
             <a:endParaRPr lang="tr-TR"/>
           </a:p>
@@ -1181,7 +1182,7 @@
     </p:spTree>
     <p:extLst>
       <p:ext uri="{BB962C8B-B14F-4D97-AF65-F5344CB8AC3E}">
-        <p14:creationId xmlns:p14="http://schemas.microsoft.com/office/powerpoint/2010/main" val="2488509581"/>
+        <p14:creationId xmlns:p14="http://schemas.microsoft.com/office/powerpoint/2010/main" val="672112707"/>
       </p:ext>
     </p:extLst>
   </p:cSld>
@@ -1266,7 +1267,7 @@
     </p:spTree>
     <p:extLst>
       <p:ext uri="{BB962C8B-B14F-4D97-AF65-F5344CB8AC3E}">
-        <p14:creationId xmlns:p14="http://schemas.microsoft.com/office/powerpoint/2010/main" val="2338377447"/>
+        <p14:creationId xmlns:p14="http://schemas.microsoft.com/office/powerpoint/2010/main" val="2488509581"/>
       </p:ext>
     </p:extLst>
   </p:cSld>
@@ -1343,6 +1344,91 @@
               <a:rPr lang="tr-TR" smtClean="0"/>
               <a:pPr/>
               <a:t>8</a:t>
+            </a:fld>
+            <a:endParaRPr lang="tr-TR"/>
+          </a:p>
+        </p:txBody>
+      </p:sp>
+    </p:spTree>
+    <p:extLst>
+      <p:ext uri="{BB962C8B-B14F-4D97-AF65-F5344CB8AC3E}">
+        <p14:creationId xmlns:p14="http://schemas.microsoft.com/office/powerpoint/2010/main" val="2338377447"/>
+      </p:ext>
+    </p:extLst>
+  </p:cSld>
+  <p:clrMapOvr>
+    <a:masterClrMapping/>
+  </p:clrMapOvr>
+</p:notes>
+</file>
+
+<file path=ppt/notesSlides/notesSlide9.xml><?xml version="1.0" encoding="utf-8"?>
+<p:notes xmlns:a="http://schemas.openxmlformats.org/drawingml/2006/main" xmlns:r="http://schemas.openxmlformats.org/officeDocument/2006/relationships" xmlns:p="http://schemas.openxmlformats.org/presentationml/2006/main">
+  <p:cSld>
+    <p:spTree>
+      <p:nvGrpSpPr>
+        <p:cNvPr id="1" name=""/>
+        <p:cNvGrpSpPr/>
+        <p:nvPr/>
+      </p:nvGrpSpPr>
+      <p:grpSpPr>
+        <a:xfrm>
+          <a:off x="0" y="0"/>
+          <a:ext cx="0" cy="0"/>
+          <a:chOff x="0" y="0"/>
+          <a:chExt cx="0" cy="0"/>
+        </a:xfrm>
+      </p:grpSpPr>
+      <p:sp>
+        <p:nvSpPr>
+          <p:cNvPr id="2" name="Slide Image Placeholder 1"/>
+          <p:cNvSpPr>
+            <a:spLocks noGrp="1" noRot="1" noChangeAspect="1"/>
+          </p:cNvSpPr>
+          <p:nvPr>
+            <p:ph type="sldImg"/>
+          </p:nvPr>
+        </p:nvSpPr>
+        <p:spPr/>
+      </p:sp>
+      <p:sp>
+        <p:nvSpPr>
+          <p:cNvPr id="3" name="Notes Placeholder 2"/>
+          <p:cNvSpPr>
+            <a:spLocks noGrp="1"/>
+          </p:cNvSpPr>
+          <p:nvPr>
+            <p:ph type="body" idx="1"/>
+          </p:nvPr>
+        </p:nvSpPr>
+        <p:spPr/>
+        <p:txBody>
+          <a:bodyPr/>
+          <a:lstStyle/>
+          <a:p>
+            <a:endParaRPr lang="tr-TR" dirty="0"/>
+          </a:p>
+        </p:txBody>
+      </p:sp>
+      <p:sp>
+        <p:nvSpPr>
+          <p:cNvPr id="4" name="Slide Number Placeholder 3"/>
+          <p:cNvSpPr>
+            <a:spLocks noGrp="1"/>
+          </p:cNvSpPr>
+          <p:nvPr>
+            <p:ph type="sldNum" sz="quarter" idx="10"/>
+          </p:nvPr>
+        </p:nvSpPr>
+        <p:spPr/>
+        <p:txBody>
+          <a:bodyPr/>
+          <a:lstStyle/>
+          <a:p>
+            <a:fld id="{802DA432-7CF7-4A2F-BE93-45834DC6981A}" type="slidenum">
+              <a:rPr lang="tr-TR" smtClean="0"/>
+              <a:pPr/>
+              <a:t>9</a:t>
             </a:fld>
             <a:endParaRPr lang="tr-TR"/>
           </a:p>
@@ -1543,7 +1629,7 @@
             <a:fld id="{DC9C75F7-98FD-4D05-8C3F-C506B544AE03}" type="datetimeFigureOut">
               <a:rPr lang="tr-TR" smtClean="0"/>
               <a:pPr/>
-              <a:t>2.04.2017</a:t>
+              <a:t>3.04.2017</a:t>
             </a:fld>
             <a:endParaRPr lang="tr-TR"/>
           </a:p>
@@ -1727,7 +1813,7 @@
             <a:fld id="{DC9C75F7-98FD-4D05-8C3F-C506B544AE03}" type="datetimeFigureOut">
               <a:rPr lang="tr-TR" smtClean="0"/>
               <a:pPr/>
-              <a:t>2.04.2017</a:t>
+              <a:t>3.04.2017</a:t>
             </a:fld>
             <a:endParaRPr lang="tr-TR"/>
           </a:p>
@@ -1921,7 +2007,7 @@
             <a:fld id="{DC9C75F7-98FD-4D05-8C3F-C506B544AE03}" type="datetimeFigureOut">
               <a:rPr lang="tr-TR" smtClean="0"/>
               <a:pPr/>
-              <a:t>2.04.2017</a:t>
+              <a:t>3.04.2017</a:t>
             </a:fld>
             <a:endParaRPr lang="tr-TR"/>
           </a:p>
@@ -2105,7 +2191,7 @@
             <a:fld id="{DC9C75F7-98FD-4D05-8C3F-C506B544AE03}" type="datetimeFigureOut">
               <a:rPr lang="tr-TR" smtClean="0"/>
               <a:pPr/>
-              <a:t>2.04.2017</a:t>
+              <a:t>3.04.2017</a:t>
             </a:fld>
             <a:endParaRPr lang="tr-TR"/>
           </a:p>
@@ -2365,7 +2451,7 @@
             <a:fld id="{DC9C75F7-98FD-4D05-8C3F-C506B544AE03}" type="datetimeFigureOut">
               <a:rPr lang="tr-TR" smtClean="0"/>
               <a:pPr/>
-              <a:t>2.04.2017</a:t>
+              <a:t>3.04.2017</a:t>
             </a:fld>
             <a:endParaRPr lang="tr-TR"/>
           </a:p>
@@ -2667,7 +2753,7 @@
             <a:fld id="{DC9C75F7-98FD-4D05-8C3F-C506B544AE03}" type="datetimeFigureOut">
               <a:rPr lang="tr-TR" smtClean="0"/>
               <a:pPr/>
-              <a:t>2.04.2017</a:t>
+              <a:t>3.04.2017</a:t>
             </a:fld>
             <a:endParaRPr lang="tr-TR"/>
           </a:p>
@@ -3103,7 +3189,7 @@
             <a:fld id="{DC9C75F7-98FD-4D05-8C3F-C506B544AE03}" type="datetimeFigureOut">
               <a:rPr lang="tr-TR" smtClean="0"/>
               <a:pPr/>
-              <a:t>2.04.2017</a:t>
+              <a:t>3.04.2017</a:t>
             </a:fld>
             <a:endParaRPr lang="tr-TR"/>
           </a:p>
@@ -3235,7 +3321,7 @@
             <a:fld id="{DC9C75F7-98FD-4D05-8C3F-C506B544AE03}" type="datetimeFigureOut">
               <a:rPr lang="tr-TR" smtClean="0"/>
               <a:pPr/>
-              <a:t>2.04.2017</a:t>
+              <a:t>3.04.2017</a:t>
             </a:fld>
             <a:endParaRPr lang="tr-TR"/>
           </a:p>
@@ -3344,7 +3430,7 @@
             <a:fld id="{DC9C75F7-98FD-4D05-8C3F-C506B544AE03}" type="datetimeFigureOut">
               <a:rPr lang="tr-TR" smtClean="0"/>
               <a:pPr/>
-              <a:t>2.04.2017</a:t>
+              <a:t>3.04.2017</a:t>
             </a:fld>
             <a:endParaRPr lang="tr-TR"/>
           </a:p>
@@ -3635,7 +3721,7 @@
             <a:fld id="{DC9C75F7-98FD-4D05-8C3F-C506B544AE03}" type="datetimeFigureOut">
               <a:rPr lang="tr-TR" smtClean="0"/>
               <a:pPr/>
-              <a:t>2.04.2017</a:t>
+              <a:t>3.04.2017</a:t>
             </a:fld>
             <a:endParaRPr lang="tr-TR"/>
           </a:p>
@@ -3902,7 +3988,7 @@
             <a:fld id="{DC9C75F7-98FD-4D05-8C3F-C506B544AE03}" type="datetimeFigureOut">
               <a:rPr lang="tr-TR" smtClean="0"/>
               <a:pPr/>
-              <a:t>2.04.2017</a:t>
+              <a:t>3.04.2017</a:t>
             </a:fld>
             <a:endParaRPr lang="tr-TR"/>
           </a:p>
@@ -4138,7 +4224,7 @@
             <a:fld id="{DC9C75F7-98FD-4D05-8C3F-C506B544AE03}" type="datetimeFigureOut">
               <a:rPr lang="tr-TR" smtClean="0"/>
               <a:pPr/>
-              <a:t>2.04.2017</a:t>
+              <a:t>3.04.2017</a:t>
             </a:fld>
             <a:endParaRPr lang="tr-TR"/>
           </a:p>
@@ -5251,13 +5337,13 @@
   <p:clrMapOvr>
     <a:masterClrMapping/>
   </p:clrMapOvr>
-  <mc:AlternateContent xmlns:mc="http://schemas.openxmlformats.org/markup-compatibility/2006">
-    <mc:Choice xmlns:p14="http://schemas.microsoft.com/office/powerpoint/2010/main" Requires="p14">
+  <mc:AlternateContent xmlns:mc="http://schemas.openxmlformats.org/markup-compatibility/2006" xmlns:p14="http://schemas.microsoft.com/office/powerpoint/2010/main">
+    <mc:Choice Requires="p14">
       <p:transition spd="med" p14:dur="700">
         <p:fade/>
       </p:transition>
     </mc:Choice>
-    <mc:Fallback>
+    <mc:Fallback xmlns="">
       <p:transition spd="med">
         <p:fade/>
       </p:transition>
@@ -5917,13 +6003,13 @@
   <p:clrMapOvr>
     <a:masterClrMapping/>
   </p:clrMapOvr>
-  <mc:AlternateContent xmlns:mc="http://schemas.openxmlformats.org/markup-compatibility/2006">
-    <mc:Choice xmlns:p14="http://schemas.microsoft.com/office/powerpoint/2010/main" Requires="p14">
+  <mc:AlternateContent xmlns:mc="http://schemas.openxmlformats.org/markup-compatibility/2006" xmlns:p14="http://schemas.microsoft.com/office/powerpoint/2010/main">
+    <mc:Choice Requires="p14">
       <p:transition spd="med" p14:dur="700">
         <p:fade/>
       </p:transition>
     </mc:Choice>
-    <mc:Fallback>
+    <mc:Fallback xmlns="">
       <p:transition spd="med">
         <p:fade/>
       </p:transition>
@@ -6424,13 +6510,13 @@
   <p:clrMapOvr>
     <a:masterClrMapping/>
   </p:clrMapOvr>
-  <mc:AlternateContent xmlns:mc="http://schemas.openxmlformats.org/markup-compatibility/2006">
-    <mc:Choice xmlns:p14="http://schemas.microsoft.com/office/powerpoint/2010/main" Requires="p14">
+  <mc:AlternateContent xmlns:mc="http://schemas.openxmlformats.org/markup-compatibility/2006" xmlns:p14="http://schemas.microsoft.com/office/powerpoint/2010/main">
+    <mc:Choice Requires="p14">
       <p:transition spd="med" p14:dur="700">
         <p:fade/>
       </p:transition>
     </mc:Choice>
-    <mc:Fallback>
+    <mc:Fallback xmlns="">
       <p:transition spd="med">
         <p:fade/>
       </p:transition>
@@ -6829,13 +6915,13 @@
   <p:clrMapOvr>
     <a:masterClrMapping/>
   </p:clrMapOvr>
-  <mc:AlternateContent xmlns:mc="http://schemas.openxmlformats.org/markup-compatibility/2006">
-    <mc:Choice xmlns:p14="http://schemas.microsoft.com/office/powerpoint/2010/main" Requires="p14">
+  <mc:AlternateContent xmlns:mc="http://schemas.openxmlformats.org/markup-compatibility/2006" xmlns:p14="http://schemas.microsoft.com/office/powerpoint/2010/main">
+    <mc:Choice Requires="p14">
       <p:transition spd="med" p14:dur="700">
         <p:fade/>
       </p:transition>
     </mc:Choice>
-    <mc:Fallback>
+    <mc:Fallback xmlns="">
       <p:transition spd="med">
         <p:fade/>
       </p:transition>
@@ -6845,6 +6931,149 @@
 </file>
 
 <file path=ppt/slides/slide6.xml><?xml version="1.0" encoding="utf-8"?>
+<p:sld xmlns:a="http://schemas.openxmlformats.org/drawingml/2006/main" xmlns:r="http://schemas.openxmlformats.org/officeDocument/2006/relationships" xmlns:p="http://schemas.openxmlformats.org/presentationml/2006/main">
+  <p:cSld>
+    <p:spTree>
+      <p:nvGrpSpPr>
+        <p:cNvPr id="1" name=""/>
+        <p:cNvGrpSpPr/>
+        <p:nvPr/>
+      </p:nvGrpSpPr>
+      <p:grpSpPr>
+        <a:xfrm>
+          <a:off x="0" y="0"/>
+          <a:ext cx="0" cy="0"/>
+          <a:chOff x="0" y="0"/>
+          <a:chExt cx="0" cy="0"/>
+        </a:xfrm>
+      </p:grpSpPr>
+      <p:sp>
+        <p:nvSpPr>
+          <p:cNvPr id="16" name="TextBox 15"/>
+          <p:cNvSpPr txBox="1"/>
+          <p:nvPr/>
+        </p:nvSpPr>
+        <p:spPr>
+          <a:xfrm>
+            <a:off x="4969123" y="854313"/>
+            <a:ext cx="8136904" cy="830997"/>
+          </a:xfrm>
+          <a:prstGeom prst="rect">
+            <a:avLst/>
+          </a:prstGeom>
+          <a:noFill/>
+        </p:spPr>
+        <p:txBody>
+          <a:bodyPr wrap="square" rtlCol="0">
+            <a:spAutoFit/>
+          </a:bodyPr>
+          <a:lstStyle/>
+          <a:p>
+            <a:pPr algn="ctr"/>
+            <a:r>
+              <a:rPr lang="en-US" sz="4800" dirty="0">
+                <a:solidFill>
+                  <a:srgbClr val="545250"/>
+                </a:solidFill>
+                <a:latin typeface="Novecento sans wide Book" pitchFamily="50" charset="-94"/>
+              </a:rPr>
+              <a:t>Tight Coupling</a:t>
+            </a:r>
+            <a:endParaRPr lang="en-US" sz="4800" dirty="0">
+              <a:solidFill>
+                <a:srgbClr val="545250"/>
+              </a:solidFill>
+              <a:latin typeface="Novecento sans wide Book" pitchFamily="50" charset="-94"/>
+            </a:endParaRPr>
+          </a:p>
+        </p:txBody>
+      </p:sp>
+      <p:pic>
+        <p:nvPicPr>
+          <p:cNvPr id="8" name="Picture 7"/>
+          <p:cNvPicPr>
+            <a:picLocks noChangeAspect="1"/>
+          </p:cNvPicPr>
+          <p:nvPr/>
+        </p:nvPicPr>
+        <p:blipFill>
+          <a:blip r:embed="rId3">
+            <a:extLst>
+              <a:ext uri="{28A0092B-C50C-407E-A947-70E740481C1C}">
+                <a14:useLocalDpi xmlns:a14="http://schemas.microsoft.com/office/drawing/2010/main" val="0"/>
+              </a:ext>
+            </a:extLst>
+          </a:blip>
+          <a:stretch>
+            <a:fillRect/>
+          </a:stretch>
+        </p:blipFill>
+        <p:spPr>
+          <a:xfrm rot="5400000">
+            <a:off x="9100648" y="-2221597"/>
+            <a:ext cx="1168254" cy="9003175"/>
+          </a:xfrm>
+          <a:prstGeom prst="rect">
+            <a:avLst/>
+          </a:prstGeom>
+        </p:spPr>
+      </p:pic>
+      <p:pic>
+        <p:nvPicPr>
+          <p:cNvPr id="7" name="Picture 6"/>
+          <p:cNvPicPr>
+            <a:picLocks noChangeAspect="1"/>
+          </p:cNvPicPr>
+          <p:nvPr/>
+        </p:nvPicPr>
+        <p:blipFill>
+          <a:blip r:embed="rId4" cstate="print">
+            <a:extLst>
+              <a:ext uri="{28A0092B-C50C-407E-A947-70E740481C1C}">
+                <a14:useLocalDpi xmlns:a14="http://schemas.microsoft.com/office/drawing/2010/main" val="0"/>
+              </a:ext>
+            </a:extLst>
+          </a:blip>
+          <a:stretch>
+            <a:fillRect/>
+          </a:stretch>
+        </p:blipFill>
+        <p:spPr>
+          <a:xfrm>
+            <a:off x="13488987" y="9412287"/>
+            <a:ext cx="4572000" cy="646390"/>
+          </a:xfrm>
+          <a:prstGeom prst="rect">
+            <a:avLst/>
+          </a:prstGeom>
+        </p:spPr>
+      </p:pic>
+    </p:spTree>
+    <p:extLst>
+      <p:ext uri="{BB962C8B-B14F-4D97-AF65-F5344CB8AC3E}">
+        <p14:creationId xmlns:p14="http://schemas.microsoft.com/office/powerpoint/2010/main" val="2513405097"/>
+      </p:ext>
+    </p:extLst>
+  </p:cSld>
+  <p:clrMapOvr>
+    <a:masterClrMapping/>
+  </p:clrMapOvr>
+  <mc:AlternateContent xmlns:mc="http://schemas.openxmlformats.org/markup-compatibility/2006" xmlns:p14="http://schemas.microsoft.com/office/powerpoint/2010/main">
+    <mc:Choice Requires="p14">
+      <p:transition spd="med" p14:dur="700">
+        <p:fade/>
+      </p:transition>
+    </mc:Choice>
+    <mc:Fallback xmlns="">
+      <p:transition spd="med">
+        <p:fade/>
+      </p:transition>
+    </mc:Fallback>
+  </mc:AlternateContent>
+</p:sld>
+</file>
+
+<file path=ppt/slides/slide7.xml><?xml version="1.0" encoding="utf-8"?>
 <p:sld xmlns:a="http://schemas.openxmlformats.org/drawingml/2006/main" xmlns:r="http://schemas.openxmlformats.org/officeDocument/2006/relationships" xmlns:p="http://schemas.openxmlformats.org/presentationml/2006/main">
   <p:cSld>
     <p:spTree>
@@ -7062,7 +7291,6 @@
                         <a:rPr lang="sr-Latn-RS" sz="3600" dirty="0"/>
                         <a:t>When is it valuable?</a:t>
                       </a:r>
-                      <a:endParaRPr lang="sr-Latn-RS" sz="3600" dirty="0"/>
                     </a:p>
                   </a:txBody>
                   <a:tcPr/>
@@ -7131,7 +7359,6 @@
                         <a:rPr lang="sr-Latn-RS" sz="3100" dirty="0"/>
                         <a:t>Extensibility</a:t>
                       </a:r>
-                      <a:endParaRPr lang="sr-Latn-RS" sz="3100" dirty="0"/>
                     </a:p>
                   </a:txBody>
                   <a:tcPr/>
@@ -7159,7 +7386,6 @@
                         <a:rPr lang="sr-Latn-RS" sz="3100" dirty="0"/>
                         <a:t>Always valuable</a:t>
                       </a:r>
-                      <a:endParaRPr lang="sr-Latn-RS" sz="3100" dirty="0"/>
                     </a:p>
                   </a:txBody>
                   <a:tcPr/>
@@ -7180,7 +7406,6 @@
                         <a:rPr lang="sr-Latn-RS" sz="3100" dirty="0"/>
                         <a:t>Parallel development</a:t>
                       </a:r>
-                      <a:endParaRPr lang="sr-Latn-RS" sz="3100" dirty="0"/>
                     </a:p>
                   </a:txBody>
                   <a:tcPr/>
@@ -7229,7 +7454,6 @@
                         <a:rPr lang="sr-Latn-RS" sz="3100" dirty="0"/>
                         <a:t>Maintainability</a:t>
                       </a:r>
-                      <a:endParaRPr lang="sr-Latn-RS" sz="3100" dirty="0"/>
                     </a:p>
                   </a:txBody>
                   <a:tcPr/>
@@ -7257,7 +7481,6 @@
                         <a:rPr lang="sr-Latn-RS" sz="3100" dirty="0"/>
                         <a:t>Always valuable</a:t>
                       </a:r>
-                      <a:endParaRPr lang="sr-Latn-RS" sz="3100" dirty="0"/>
                     </a:p>
                   </a:txBody>
                   <a:tcPr/>
@@ -7278,7 +7501,6 @@
                         <a:rPr lang="sr-Latn-RS" sz="3100" i="0" dirty="0"/>
                         <a:t>TESTABILITY</a:t>
                       </a:r>
-                      <a:endParaRPr lang="sr-Latn-RS" sz="3100" i="0" dirty="0"/>
                     </a:p>
                   </a:txBody>
                   <a:tcPr/>
@@ -7331,13 +7553,13 @@
   <p:clrMapOvr>
     <a:masterClrMapping/>
   </p:clrMapOvr>
-  <mc:AlternateContent xmlns:mc="http://schemas.openxmlformats.org/markup-compatibility/2006">
-    <mc:Choice xmlns:p14="http://schemas.microsoft.com/office/powerpoint/2010/main" Requires="p14">
+  <mc:AlternateContent xmlns:mc="http://schemas.openxmlformats.org/markup-compatibility/2006" xmlns:p14="http://schemas.microsoft.com/office/powerpoint/2010/main">
+    <mc:Choice Requires="p14">
       <p:transition spd="med" p14:dur="700">
         <p:fade/>
       </p:transition>
     </mc:Choice>
-    <mc:Fallback>
+    <mc:Fallback xmlns="">
       <p:transition spd="med">
         <p:fade/>
       </p:transition>
@@ -7346,7 +7568,7 @@
 </p:sld>
 </file>
 
-<file path=ppt/slides/slide7.xml><?xml version="1.0" encoding="utf-8"?>
+<file path=ppt/slides/slide8.xml><?xml version="1.0" encoding="utf-8"?>
 <p:sld xmlns:a="http://schemas.openxmlformats.org/drawingml/2006/main" xmlns:r="http://schemas.openxmlformats.org/officeDocument/2006/relationships" xmlns:p="http://schemas.openxmlformats.org/presentationml/2006/main">
   <p:cSld>
     <p:spTree>
@@ -7489,7 +7711,7 @@
 </p:sld>
 </file>
 
-<file path=ppt/slides/slide8.xml><?xml version="1.0" encoding="utf-8"?>
+<file path=ppt/slides/slide9.xml><?xml version="1.0" encoding="utf-8"?>
 <p:sld xmlns:a="http://schemas.openxmlformats.org/drawingml/2006/main" xmlns:r="http://schemas.openxmlformats.org/officeDocument/2006/relationships" xmlns:p="http://schemas.openxmlformats.org/presentationml/2006/main">
   <p:cSld>
     <p:spTree>

</xml_diff>

<commit_message>
Changes on notes and pptx
</commit_message>
<xml_diff>
--- a/DI Course.pptx
+++ b/DI Course.pptx
@@ -5,10 +5,10 @@
     <p:sldMasterId id="2147483650" r:id="rId1"/>
   </p:sldMasterIdLst>
   <p:notesMasterIdLst>
-    <p:notesMasterId r:id="rId11"/>
+    <p:notesMasterId r:id="rId13"/>
   </p:notesMasterIdLst>
   <p:handoutMasterIdLst>
-    <p:handoutMasterId r:id="rId12"/>
+    <p:handoutMasterId r:id="rId14"/>
   </p:handoutMasterIdLst>
   <p:sldIdLst>
     <p:sldId id="256" r:id="rId2"/>
@@ -16,10 +16,12 @@
     <p:sldId id="337" r:id="rId4"/>
     <p:sldId id="338" r:id="rId5"/>
     <p:sldId id="339" r:id="rId6"/>
-    <p:sldId id="341" r:id="rId7"/>
-    <p:sldId id="340" r:id="rId8"/>
-    <p:sldId id="327" r:id="rId9"/>
-    <p:sldId id="295" r:id="rId10"/>
+    <p:sldId id="342" r:id="rId7"/>
+    <p:sldId id="341" r:id="rId8"/>
+    <p:sldId id="343" r:id="rId9"/>
+    <p:sldId id="340" r:id="rId10"/>
+    <p:sldId id="327" r:id="rId11"/>
+    <p:sldId id="295" r:id="rId12"/>
   </p:sldIdLst>
   <p:sldSz cx="18291175" cy="10290175"/>
   <p:notesSz cx="6858000" cy="9144000"/>
@@ -246,7 +248,7 @@
             <a:fld id="{4D0CBB7A-33AF-434C-B8C5-B5F21D294CDF}" type="datetimeFigureOut">
               <a:rPr lang="tr-TR" smtClean="0"/>
               <a:pPr/>
-              <a:t>3.04.2017</a:t>
+              <a:t>5.04.2017</a:t>
             </a:fld>
             <a:endParaRPr lang="tr-TR"/>
           </a:p>
@@ -413,7 +415,7 @@
             <a:fld id="{6C6C1039-E6FF-4F78-9751-FFD9A3AC8099}" type="datetimeFigureOut">
               <a:rPr lang="tr-TR" smtClean="0"/>
               <a:pPr/>
-              <a:t>3.04.2017</a:t>
+              <a:t>5.04.2017</a:t>
             </a:fld>
             <a:endParaRPr lang="tr-TR"/>
           </a:p>
@@ -767,6 +769,176 @@
 </p:notes>
 </file>
 
+<file path=ppt/notesSlides/notesSlide10.xml><?xml version="1.0" encoding="utf-8"?>
+<p:notes xmlns:a="http://schemas.openxmlformats.org/drawingml/2006/main" xmlns:r="http://schemas.openxmlformats.org/officeDocument/2006/relationships" xmlns:p="http://schemas.openxmlformats.org/presentationml/2006/main">
+  <p:cSld>
+    <p:spTree>
+      <p:nvGrpSpPr>
+        <p:cNvPr id="1" name=""/>
+        <p:cNvGrpSpPr/>
+        <p:nvPr/>
+      </p:nvGrpSpPr>
+      <p:grpSpPr>
+        <a:xfrm>
+          <a:off x="0" y="0"/>
+          <a:ext cx="0" cy="0"/>
+          <a:chOff x="0" y="0"/>
+          <a:chExt cx="0" cy="0"/>
+        </a:xfrm>
+      </p:grpSpPr>
+      <p:sp>
+        <p:nvSpPr>
+          <p:cNvPr id="2" name="Slide Image Placeholder 1"/>
+          <p:cNvSpPr>
+            <a:spLocks noGrp="1" noRot="1" noChangeAspect="1"/>
+          </p:cNvSpPr>
+          <p:nvPr>
+            <p:ph type="sldImg"/>
+          </p:nvPr>
+        </p:nvSpPr>
+        <p:spPr/>
+      </p:sp>
+      <p:sp>
+        <p:nvSpPr>
+          <p:cNvPr id="3" name="Notes Placeholder 2"/>
+          <p:cNvSpPr>
+            <a:spLocks noGrp="1"/>
+          </p:cNvSpPr>
+          <p:nvPr>
+            <p:ph type="body" idx="1"/>
+          </p:nvPr>
+        </p:nvSpPr>
+        <p:spPr/>
+        <p:txBody>
+          <a:bodyPr/>
+          <a:lstStyle/>
+          <a:p>
+            <a:endParaRPr lang="tr-TR" dirty="0"/>
+          </a:p>
+        </p:txBody>
+      </p:sp>
+      <p:sp>
+        <p:nvSpPr>
+          <p:cNvPr id="4" name="Slide Number Placeholder 3"/>
+          <p:cNvSpPr>
+            <a:spLocks noGrp="1"/>
+          </p:cNvSpPr>
+          <p:nvPr>
+            <p:ph type="sldNum" sz="quarter" idx="10"/>
+          </p:nvPr>
+        </p:nvSpPr>
+        <p:spPr/>
+        <p:txBody>
+          <a:bodyPr/>
+          <a:lstStyle/>
+          <a:p>
+            <a:fld id="{802DA432-7CF7-4A2F-BE93-45834DC6981A}" type="slidenum">
+              <a:rPr lang="tr-TR" smtClean="0"/>
+              <a:pPr/>
+              <a:t>10</a:t>
+            </a:fld>
+            <a:endParaRPr lang="tr-TR"/>
+          </a:p>
+        </p:txBody>
+      </p:sp>
+    </p:spTree>
+    <p:extLst>
+      <p:ext uri="{BB962C8B-B14F-4D97-AF65-F5344CB8AC3E}">
+        <p14:creationId xmlns:p14="http://schemas.microsoft.com/office/powerpoint/2010/main" val="2338377447"/>
+      </p:ext>
+    </p:extLst>
+  </p:cSld>
+  <p:clrMapOvr>
+    <a:masterClrMapping/>
+  </p:clrMapOvr>
+</p:notes>
+</file>
+
+<file path=ppt/notesSlides/notesSlide11.xml><?xml version="1.0" encoding="utf-8"?>
+<p:notes xmlns:a="http://schemas.openxmlformats.org/drawingml/2006/main" xmlns:r="http://schemas.openxmlformats.org/officeDocument/2006/relationships" xmlns:p="http://schemas.openxmlformats.org/presentationml/2006/main">
+  <p:cSld>
+    <p:spTree>
+      <p:nvGrpSpPr>
+        <p:cNvPr id="1" name=""/>
+        <p:cNvGrpSpPr/>
+        <p:nvPr/>
+      </p:nvGrpSpPr>
+      <p:grpSpPr>
+        <a:xfrm>
+          <a:off x="0" y="0"/>
+          <a:ext cx="0" cy="0"/>
+          <a:chOff x="0" y="0"/>
+          <a:chExt cx="0" cy="0"/>
+        </a:xfrm>
+      </p:grpSpPr>
+      <p:sp>
+        <p:nvSpPr>
+          <p:cNvPr id="2" name="Slide Image Placeholder 1"/>
+          <p:cNvSpPr>
+            <a:spLocks noGrp="1" noRot="1" noChangeAspect="1"/>
+          </p:cNvSpPr>
+          <p:nvPr>
+            <p:ph type="sldImg"/>
+          </p:nvPr>
+        </p:nvSpPr>
+        <p:spPr/>
+      </p:sp>
+      <p:sp>
+        <p:nvSpPr>
+          <p:cNvPr id="3" name="Notes Placeholder 2"/>
+          <p:cNvSpPr>
+            <a:spLocks noGrp="1"/>
+          </p:cNvSpPr>
+          <p:nvPr>
+            <p:ph type="body" idx="1"/>
+          </p:nvPr>
+        </p:nvSpPr>
+        <p:spPr/>
+        <p:txBody>
+          <a:bodyPr/>
+          <a:lstStyle/>
+          <a:p>
+            <a:endParaRPr lang="tr-TR" dirty="0"/>
+          </a:p>
+        </p:txBody>
+      </p:sp>
+      <p:sp>
+        <p:nvSpPr>
+          <p:cNvPr id="4" name="Slide Number Placeholder 3"/>
+          <p:cNvSpPr>
+            <a:spLocks noGrp="1"/>
+          </p:cNvSpPr>
+          <p:nvPr>
+            <p:ph type="sldNum" sz="quarter" idx="10"/>
+          </p:nvPr>
+        </p:nvSpPr>
+        <p:spPr/>
+        <p:txBody>
+          <a:bodyPr/>
+          <a:lstStyle/>
+          <a:p>
+            <a:fld id="{802DA432-7CF7-4A2F-BE93-45834DC6981A}" type="slidenum">
+              <a:rPr lang="tr-TR" smtClean="0"/>
+              <a:pPr/>
+              <a:t>11</a:t>
+            </a:fld>
+            <a:endParaRPr lang="tr-TR"/>
+          </a:p>
+        </p:txBody>
+      </p:sp>
+    </p:spTree>
+    <p:extLst>
+      <p:ext uri="{BB962C8B-B14F-4D97-AF65-F5344CB8AC3E}">
+        <p14:creationId xmlns:p14="http://schemas.microsoft.com/office/powerpoint/2010/main" val="605137192"/>
+      </p:ext>
+    </p:extLst>
+  </p:cSld>
+  <p:clrMapOvr>
+    <a:masterClrMapping/>
+  </p:clrMapOvr>
+</p:notes>
+</file>
+
 <file path=ppt/notesSlides/notesSlide2.xml><?xml version="1.0" encoding="utf-8"?>
 <p:notes xmlns:a="http://schemas.openxmlformats.org/drawingml/2006/main" xmlns:r="http://schemas.openxmlformats.org/officeDocument/2006/relationships" xmlns:p="http://schemas.openxmlformats.org/presentationml/2006/main">
   <p:cSld>
@@ -1182,7 +1354,7 @@
     </p:spTree>
     <p:extLst>
       <p:ext uri="{BB962C8B-B14F-4D97-AF65-F5344CB8AC3E}">
-        <p14:creationId xmlns:p14="http://schemas.microsoft.com/office/powerpoint/2010/main" val="672112707"/>
+        <p14:creationId xmlns:p14="http://schemas.microsoft.com/office/powerpoint/2010/main" val="2089622372"/>
       </p:ext>
     </p:extLst>
   </p:cSld>
@@ -1267,7 +1439,7 @@
     </p:spTree>
     <p:extLst>
       <p:ext uri="{BB962C8B-B14F-4D97-AF65-F5344CB8AC3E}">
-        <p14:creationId xmlns:p14="http://schemas.microsoft.com/office/powerpoint/2010/main" val="2488509581"/>
+        <p14:creationId xmlns:p14="http://schemas.microsoft.com/office/powerpoint/2010/main" val="672112707"/>
       </p:ext>
     </p:extLst>
   </p:cSld>
@@ -1352,7 +1524,7 @@
     </p:spTree>
     <p:extLst>
       <p:ext uri="{BB962C8B-B14F-4D97-AF65-F5344CB8AC3E}">
-        <p14:creationId xmlns:p14="http://schemas.microsoft.com/office/powerpoint/2010/main" val="2338377447"/>
+        <p14:creationId xmlns:p14="http://schemas.microsoft.com/office/powerpoint/2010/main" val="3640256835"/>
       </p:ext>
     </p:extLst>
   </p:cSld>
@@ -1437,7 +1609,7 @@
     </p:spTree>
     <p:extLst>
       <p:ext uri="{BB962C8B-B14F-4D97-AF65-F5344CB8AC3E}">
-        <p14:creationId xmlns:p14="http://schemas.microsoft.com/office/powerpoint/2010/main" val="605137192"/>
+        <p14:creationId xmlns:p14="http://schemas.microsoft.com/office/powerpoint/2010/main" val="2488509581"/>
       </p:ext>
     </p:extLst>
   </p:cSld>
@@ -1629,7 +1801,7 @@
             <a:fld id="{DC9C75F7-98FD-4D05-8C3F-C506B544AE03}" type="datetimeFigureOut">
               <a:rPr lang="tr-TR" smtClean="0"/>
               <a:pPr/>
-              <a:t>3.04.2017</a:t>
+              <a:t>5.04.2017</a:t>
             </a:fld>
             <a:endParaRPr lang="tr-TR"/>
           </a:p>
@@ -1813,7 +1985,7 @@
             <a:fld id="{DC9C75F7-98FD-4D05-8C3F-C506B544AE03}" type="datetimeFigureOut">
               <a:rPr lang="tr-TR" smtClean="0"/>
               <a:pPr/>
-              <a:t>3.04.2017</a:t>
+              <a:t>5.04.2017</a:t>
             </a:fld>
             <a:endParaRPr lang="tr-TR"/>
           </a:p>
@@ -2007,7 +2179,7 @@
             <a:fld id="{DC9C75F7-98FD-4D05-8C3F-C506B544AE03}" type="datetimeFigureOut">
               <a:rPr lang="tr-TR" smtClean="0"/>
               <a:pPr/>
-              <a:t>3.04.2017</a:t>
+              <a:t>5.04.2017</a:t>
             </a:fld>
             <a:endParaRPr lang="tr-TR"/>
           </a:p>
@@ -2191,7 +2363,7 @@
             <a:fld id="{DC9C75F7-98FD-4D05-8C3F-C506B544AE03}" type="datetimeFigureOut">
               <a:rPr lang="tr-TR" smtClean="0"/>
               <a:pPr/>
-              <a:t>3.04.2017</a:t>
+              <a:t>5.04.2017</a:t>
             </a:fld>
             <a:endParaRPr lang="tr-TR"/>
           </a:p>
@@ -2451,7 +2623,7 @@
             <a:fld id="{DC9C75F7-98FD-4D05-8C3F-C506B544AE03}" type="datetimeFigureOut">
               <a:rPr lang="tr-TR" smtClean="0"/>
               <a:pPr/>
-              <a:t>3.04.2017</a:t>
+              <a:t>5.04.2017</a:t>
             </a:fld>
             <a:endParaRPr lang="tr-TR"/>
           </a:p>
@@ -2753,7 +2925,7 @@
             <a:fld id="{DC9C75F7-98FD-4D05-8C3F-C506B544AE03}" type="datetimeFigureOut">
               <a:rPr lang="tr-TR" smtClean="0"/>
               <a:pPr/>
-              <a:t>3.04.2017</a:t>
+              <a:t>5.04.2017</a:t>
             </a:fld>
             <a:endParaRPr lang="tr-TR"/>
           </a:p>
@@ -3189,7 +3361,7 @@
             <a:fld id="{DC9C75F7-98FD-4D05-8C3F-C506B544AE03}" type="datetimeFigureOut">
               <a:rPr lang="tr-TR" smtClean="0"/>
               <a:pPr/>
-              <a:t>3.04.2017</a:t>
+              <a:t>5.04.2017</a:t>
             </a:fld>
             <a:endParaRPr lang="tr-TR"/>
           </a:p>
@@ -3321,7 +3493,7 @@
             <a:fld id="{DC9C75F7-98FD-4D05-8C3F-C506B544AE03}" type="datetimeFigureOut">
               <a:rPr lang="tr-TR" smtClean="0"/>
               <a:pPr/>
-              <a:t>3.04.2017</a:t>
+              <a:t>5.04.2017</a:t>
             </a:fld>
             <a:endParaRPr lang="tr-TR"/>
           </a:p>
@@ -3430,7 +3602,7 @@
             <a:fld id="{DC9C75F7-98FD-4D05-8C3F-C506B544AE03}" type="datetimeFigureOut">
               <a:rPr lang="tr-TR" smtClean="0"/>
               <a:pPr/>
-              <a:t>3.04.2017</a:t>
+              <a:t>5.04.2017</a:t>
             </a:fld>
             <a:endParaRPr lang="tr-TR"/>
           </a:p>
@@ -3721,7 +3893,7 @@
             <a:fld id="{DC9C75F7-98FD-4D05-8C3F-C506B544AE03}" type="datetimeFigureOut">
               <a:rPr lang="tr-TR" smtClean="0"/>
               <a:pPr/>
-              <a:t>3.04.2017</a:t>
+              <a:t>5.04.2017</a:t>
             </a:fld>
             <a:endParaRPr lang="tr-TR"/>
           </a:p>
@@ -3988,7 +4160,7 @@
             <a:fld id="{DC9C75F7-98FD-4D05-8C3F-C506B544AE03}" type="datetimeFigureOut">
               <a:rPr lang="tr-TR" smtClean="0"/>
               <a:pPr/>
-              <a:t>3.04.2017</a:t>
+              <a:t>5.04.2017</a:t>
             </a:fld>
             <a:endParaRPr lang="tr-TR"/>
           </a:p>
@@ -4224,7 +4396,7 @@
             <a:fld id="{DC9C75F7-98FD-4D05-8C3F-C506B544AE03}" type="datetimeFigureOut">
               <a:rPr lang="tr-TR" smtClean="0"/>
               <a:pPr/>
-              <a:t>3.04.2017</a:t>
+              <a:t>5.04.2017</a:t>
             </a:fld>
             <a:endParaRPr lang="tr-TR"/>
           </a:p>
@@ -4719,6 +4891,425 @@
               </a:rPr>
               <a:t>ć</a:t>
             </a:r>
+          </a:p>
+        </p:txBody>
+      </p:sp>
+      <p:pic>
+        <p:nvPicPr>
+          <p:cNvPr id="6" name="Picture 5"/>
+          <p:cNvPicPr>
+            <a:picLocks noChangeAspect="1"/>
+          </p:cNvPicPr>
+          <p:nvPr/>
+        </p:nvPicPr>
+        <p:blipFill>
+          <a:blip r:embed="rId4" cstate="print">
+            <a:extLst>
+              <a:ext uri="{28A0092B-C50C-407E-A947-70E740481C1C}">
+                <a14:useLocalDpi xmlns:a14="http://schemas.microsoft.com/office/drawing/2010/main" val="0"/>
+              </a:ext>
+            </a:extLst>
+          </a:blip>
+          <a:stretch>
+            <a:fillRect/>
+          </a:stretch>
+        </p:blipFill>
+        <p:spPr>
+          <a:xfrm>
+            <a:off x="4116387" y="3416895"/>
+            <a:ext cx="10058400" cy="1422061"/>
+          </a:xfrm>
+          <a:prstGeom prst="rect">
+            <a:avLst/>
+          </a:prstGeom>
+        </p:spPr>
+      </p:pic>
+    </p:spTree>
+    <p:extLst>
+      <p:ext uri="{BB962C8B-B14F-4D97-AF65-F5344CB8AC3E}">
+        <p14:creationId xmlns:p14="http://schemas.microsoft.com/office/powerpoint/2010/main" val="1325838218"/>
+      </p:ext>
+    </p:extLst>
+  </p:cSld>
+  <p:clrMapOvr>
+    <a:masterClrMapping/>
+  </p:clrMapOvr>
+  <mc:AlternateContent xmlns:mc="http://schemas.openxmlformats.org/markup-compatibility/2006" xmlns:p14="http://schemas.microsoft.com/office/powerpoint/2010/main">
+    <mc:Choice Requires="p14">
+      <p:transition spd="med" p14:dur="700">
+        <p:fade/>
+      </p:transition>
+    </mc:Choice>
+    <mc:Fallback xmlns="">
+      <p:transition spd="med">
+        <p:fade/>
+      </p:transition>
+    </mc:Fallback>
+  </mc:AlternateContent>
+  <p:timing>
+    <p:tnLst>
+      <p:par>
+        <p:cTn id="1" dur="indefinite" restart="never" nodeType="tmRoot">
+          <p:childTnLst>
+            <p:seq concurrent="1" nextAc="seek">
+              <p:cTn id="2" dur="indefinite" nodeType="mainSeq">
+                <p:childTnLst>
+                  <p:par>
+                    <p:cTn id="3" fill="hold">
+                      <p:stCondLst>
+                        <p:cond delay="indefinite"/>
+                        <p:cond evt="onBegin" delay="0">
+                          <p:tn val="2"/>
+                        </p:cond>
+                      </p:stCondLst>
+                      <p:childTnLst>
+                        <p:par>
+                          <p:cTn id="4" fill="hold">
+                            <p:stCondLst>
+                              <p:cond delay="0"/>
+                            </p:stCondLst>
+                            <p:childTnLst>
+                              <p:par>
+                                <p:cTn id="5" presetID="10" presetClass="entr" presetSubtype="0" fill="hold" nodeType="afterEffect">
+                                  <p:stCondLst>
+                                    <p:cond delay="0"/>
+                                  </p:stCondLst>
+                                  <p:childTnLst>
+                                    <p:set>
+                                      <p:cBhvr>
+                                        <p:cTn id="6" dur="1" fill="hold">
+                                          <p:stCondLst>
+                                            <p:cond delay="0"/>
+                                          </p:stCondLst>
+                                        </p:cTn>
+                                        <p:tgtEl>
+                                          <p:spTgt spid="7"/>
+                                        </p:tgtEl>
+                                        <p:attrNameLst>
+                                          <p:attrName>style.visibility</p:attrName>
+                                        </p:attrNameLst>
+                                      </p:cBhvr>
+                                      <p:to>
+                                        <p:strVal val="visible"/>
+                                      </p:to>
+                                    </p:set>
+                                    <p:animEffect transition="in" filter="fade">
+                                      <p:cBhvr>
+                                        <p:cTn id="7" dur="500"/>
+                                        <p:tgtEl>
+                                          <p:spTgt spid="7"/>
+                                        </p:tgtEl>
+                                      </p:cBhvr>
+                                    </p:animEffect>
+                                  </p:childTnLst>
+                                </p:cTn>
+                              </p:par>
+                            </p:childTnLst>
+                          </p:cTn>
+                        </p:par>
+                        <p:par>
+                          <p:cTn id="8" fill="hold">
+                            <p:stCondLst>
+                              <p:cond delay="500"/>
+                            </p:stCondLst>
+                            <p:childTnLst>
+                              <p:par>
+                                <p:cTn id="9" presetID="10" presetClass="entr" presetSubtype="0" fill="hold" grpId="0" nodeType="afterEffect">
+                                  <p:stCondLst>
+                                    <p:cond delay="0"/>
+                                  </p:stCondLst>
+                                  <p:childTnLst>
+                                    <p:set>
+                                      <p:cBhvr>
+                                        <p:cTn id="10" dur="1" fill="hold">
+                                          <p:stCondLst>
+                                            <p:cond delay="0"/>
+                                          </p:stCondLst>
+                                        </p:cTn>
+                                        <p:tgtEl>
+                                          <p:spTgt spid="16"/>
+                                        </p:tgtEl>
+                                        <p:attrNameLst>
+                                          <p:attrName>style.visibility</p:attrName>
+                                        </p:attrNameLst>
+                                      </p:cBhvr>
+                                      <p:to>
+                                        <p:strVal val="visible"/>
+                                      </p:to>
+                                    </p:set>
+                                    <p:animEffect transition="in" filter="fade">
+                                      <p:cBhvr>
+                                        <p:cTn id="11" dur="500"/>
+                                        <p:tgtEl>
+                                          <p:spTgt spid="16"/>
+                                        </p:tgtEl>
+                                      </p:cBhvr>
+                                    </p:animEffect>
+                                  </p:childTnLst>
+                                </p:cTn>
+                              </p:par>
+                            </p:childTnLst>
+                          </p:cTn>
+                        </p:par>
+                      </p:childTnLst>
+                    </p:cTn>
+                  </p:par>
+                </p:childTnLst>
+              </p:cTn>
+              <p:prevCondLst>
+                <p:cond evt="onPrev" delay="0">
+                  <p:tgtEl>
+                    <p:sldTgt/>
+                  </p:tgtEl>
+                </p:cond>
+              </p:prevCondLst>
+              <p:nextCondLst>
+                <p:cond evt="onNext" delay="0">
+                  <p:tgtEl>
+                    <p:sldTgt/>
+                  </p:tgtEl>
+                </p:cond>
+              </p:nextCondLst>
+            </p:seq>
+          </p:childTnLst>
+        </p:cTn>
+      </p:par>
+    </p:tnLst>
+    <p:bldLst>
+      <p:bldP spid="16" grpId="0"/>
+    </p:bldLst>
+  </p:timing>
+</p:sld>
+</file>
+
+<file path=ppt/slides/slide10.xml><?xml version="1.0" encoding="utf-8"?>
+<p:sld xmlns:a="http://schemas.openxmlformats.org/drawingml/2006/main" xmlns:r="http://schemas.openxmlformats.org/officeDocument/2006/relationships" xmlns:p="http://schemas.openxmlformats.org/presentationml/2006/main">
+  <p:cSld>
+    <p:spTree>
+      <p:nvGrpSpPr>
+        <p:cNvPr id="1" name=""/>
+        <p:cNvGrpSpPr/>
+        <p:nvPr/>
+      </p:nvGrpSpPr>
+      <p:grpSpPr>
+        <a:xfrm>
+          <a:off x="0" y="0"/>
+          <a:ext cx="0" cy="0"/>
+          <a:chOff x="0" y="0"/>
+          <a:chExt cx="0" cy="0"/>
+        </a:xfrm>
+      </p:grpSpPr>
+      <p:sp>
+        <p:nvSpPr>
+          <p:cNvPr id="16" name="TextBox 15"/>
+          <p:cNvSpPr txBox="1"/>
+          <p:nvPr/>
+        </p:nvSpPr>
+        <p:spPr>
+          <a:xfrm>
+            <a:off x="4969123" y="854313"/>
+            <a:ext cx="8136904" cy="830997"/>
+          </a:xfrm>
+          <a:prstGeom prst="rect">
+            <a:avLst/>
+          </a:prstGeom>
+          <a:noFill/>
+        </p:spPr>
+        <p:txBody>
+          <a:bodyPr wrap="square" rtlCol="0">
+            <a:spAutoFit/>
+          </a:bodyPr>
+          <a:lstStyle/>
+          <a:p>
+            <a:pPr algn="ctr"/>
+            <a:r>
+              <a:rPr lang="sr-Latn-RS" sz="4800" dirty="0">
+                <a:solidFill>
+                  <a:srgbClr val="545250"/>
+                </a:solidFill>
+                <a:latin typeface="Novecento sans wide Book" pitchFamily="50" charset="-94"/>
+              </a:rPr>
+              <a:t>XY</a:t>
+            </a:r>
+            <a:endParaRPr lang="en-US" sz="4800" dirty="0">
+              <a:solidFill>
+                <a:srgbClr val="545250"/>
+              </a:solidFill>
+              <a:latin typeface="Novecento sans wide Book" pitchFamily="50" charset="-94"/>
+            </a:endParaRPr>
+          </a:p>
+        </p:txBody>
+      </p:sp>
+      <p:pic>
+        <p:nvPicPr>
+          <p:cNvPr id="8" name="Picture 7"/>
+          <p:cNvPicPr>
+            <a:picLocks noChangeAspect="1"/>
+          </p:cNvPicPr>
+          <p:nvPr/>
+        </p:nvPicPr>
+        <p:blipFill>
+          <a:blip r:embed="rId3">
+            <a:extLst>
+              <a:ext uri="{28A0092B-C50C-407E-A947-70E740481C1C}">
+                <a14:useLocalDpi xmlns:a14="http://schemas.microsoft.com/office/drawing/2010/main" val="0"/>
+              </a:ext>
+            </a:extLst>
+          </a:blip>
+          <a:stretch>
+            <a:fillRect/>
+          </a:stretch>
+        </p:blipFill>
+        <p:spPr>
+          <a:xfrm rot="5400000">
+            <a:off x="9100648" y="-2221597"/>
+            <a:ext cx="1168254" cy="9003175"/>
+          </a:xfrm>
+          <a:prstGeom prst="rect">
+            <a:avLst/>
+          </a:prstGeom>
+        </p:spPr>
+      </p:pic>
+      <p:pic>
+        <p:nvPicPr>
+          <p:cNvPr id="7" name="Picture 6"/>
+          <p:cNvPicPr>
+            <a:picLocks noChangeAspect="1"/>
+          </p:cNvPicPr>
+          <p:nvPr/>
+        </p:nvPicPr>
+        <p:blipFill>
+          <a:blip r:embed="rId4" cstate="print">
+            <a:extLst>
+              <a:ext uri="{28A0092B-C50C-407E-A947-70E740481C1C}">
+                <a14:useLocalDpi xmlns:a14="http://schemas.microsoft.com/office/drawing/2010/main" val="0"/>
+              </a:ext>
+            </a:extLst>
+          </a:blip>
+          <a:stretch>
+            <a:fillRect/>
+          </a:stretch>
+        </p:blipFill>
+        <p:spPr>
+          <a:xfrm>
+            <a:off x="13488987" y="9412287"/>
+            <a:ext cx="4572000" cy="646390"/>
+          </a:xfrm>
+          <a:prstGeom prst="rect">
+            <a:avLst/>
+          </a:prstGeom>
+        </p:spPr>
+      </p:pic>
+    </p:spTree>
+    <p:extLst>
+      <p:ext uri="{BB962C8B-B14F-4D97-AF65-F5344CB8AC3E}">
+        <p14:creationId xmlns:p14="http://schemas.microsoft.com/office/powerpoint/2010/main" val="2543101088"/>
+      </p:ext>
+    </p:extLst>
+  </p:cSld>
+  <p:clrMapOvr>
+    <a:masterClrMapping/>
+  </p:clrMapOvr>
+  <mc:AlternateContent xmlns:mc="http://schemas.openxmlformats.org/markup-compatibility/2006" xmlns:p14="http://schemas.microsoft.com/office/powerpoint/2010/main">
+    <mc:Choice Requires="p14">
+      <p:transition spd="med" p14:dur="700">
+        <p:fade/>
+      </p:transition>
+    </mc:Choice>
+    <mc:Fallback xmlns="">
+      <p:transition spd="med">
+        <p:fade/>
+      </p:transition>
+    </mc:Fallback>
+  </mc:AlternateContent>
+</p:sld>
+</file>
+
+<file path=ppt/slides/slide11.xml><?xml version="1.0" encoding="utf-8"?>
+<p:sld xmlns:a="http://schemas.openxmlformats.org/drawingml/2006/main" xmlns:r="http://schemas.openxmlformats.org/officeDocument/2006/relationships" xmlns:p="http://schemas.openxmlformats.org/presentationml/2006/main">
+  <p:cSld>
+    <p:spTree>
+      <p:nvGrpSpPr>
+        <p:cNvPr id="1" name=""/>
+        <p:cNvGrpSpPr/>
+        <p:nvPr/>
+      </p:nvGrpSpPr>
+      <p:grpSpPr>
+        <a:xfrm>
+          <a:off x="0" y="0"/>
+          <a:ext cx="0" cy="0"/>
+          <a:chOff x="0" y="0"/>
+          <a:chExt cx="0" cy="0"/>
+        </a:xfrm>
+      </p:grpSpPr>
+      <p:pic>
+        <p:nvPicPr>
+          <p:cNvPr id="7" name="Picture 6"/>
+          <p:cNvPicPr>
+            <a:picLocks noChangeAspect="1"/>
+          </p:cNvPicPr>
+          <p:nvPr/>
+        </p:nvPicPr>
+        <p:blipFill>
+          <a:blip r:embed="rId3">
+            <a:extLst>
+              <a:ext uri="{28A0092B-C50C-407E-A947-70E740481C1C}">
+                <a14:useLocalDpi xmlns:a14="http://schemas.microsoft.com/office/drawing/2010/main" val="0"/>
+              </a:ext>
+            </a:extLst>
+          </a:blip>
+          <a:stretch>
+            <a:fillRect/>
+          </a:stretch>
+        </p:blipFill>
+        <p:spPr>
+          <a:xfrm rot="5400000">
+            <a:off x="7936677" y="1487905"/>
+            <a:ext cx="2323284" cy="7295336"/>
+          </a:xfrm>
+          <a:prstGeom prst="rect">
+            <a:avLst/>
+          </a:prstGeom>
+        </p:spPr>
+      </p:pic>
+      <p:sp>
+        <p:nvSpPr>
+          <p:cNvPr id="16" name="TextBox 15"/>
+          <p:cNvSpPr txBox="1"/>
+          <p:nvPr/>
+        </p:nvSpPr>
+        <p:spPr>
+          <a:xfrm>
+            <a:off x="3754677" y="5528934"/>
+            <a:ext cx="10575486" cy="830997"/>
+          </a:xfrm>
+          <a:prstGeom prst="rect">
+            <a:avLst/>
+          </a:prstGeom>
+          <a:noFill/>
+        </p:spPr>
+        <p:txBody>
+          <a:bodyPr wrap="square" rtlCol="0">
+            <a:spAutoFit/>
+          </a:bodyPr>
+          <a:lstStyle/>
+          <a:p>
+            <a:pPr algn="ctr"/>
+            <a:r>
+              <a:rPr lang="en-US" sz="4800" dirty="0">
+                <a:solidFill>
+                  <a:srgbClr val="545250"/>
+                </a:solidFill>
+                <a:latin typeface="Novecento sans wide Book" pitchFamily="50" charset="-94"/>
+              </a:rPr>
+              <a:t>Thank you for your attention</a:t>
+            </a:r>
+            <a:endParaRPr lang="tr-TR" sz="4800" dirty="0">
+              <a:solidFill>
+                <a:srgbClr val="545250"/>
+              </a:solidFill>
+              <a:latin typeface="Novecento sans wide Book" pitchFamily="50" charset="-94"/>
+            </a:endParaRPr>
           </a:p>
         </p:txBody>
       </p:sp>
@@ -6977,14 +7568,8 @@
                 </a:solidFill>
                 <a:latin typeface="Novecento sans wide Book" pitchFamily="50" charset="-94"/>
               </a:rPr>
-              <a:t>Tight Coupling</a:t>
-            </a:r>
-            <a:endParaRPr lang="en-US" sz="4800" dirty="0">
-              <a:solidFill>
-                <a:srgbClr val="545250"/>
-              </a:solidFill>
-              <a:latin typeface="Novecento sans wide Book" pitchFamily="50" charset="-94"/>
-            </a:endParaRPr>
+              <a:t>Application Layering</a:t>
+            </a:r>
           </a:p>
         </p:txBody>
       </p:sp>
@@ -7048,6 +7633,1332 @@
           </a:prstGeom>
         </p:spPr>
       </p:pic>
+      <p:sp>
+        <p:nvSpPr>
+          <p:cNvPr id="2" name="Rectangle: Rounded Corners 1"/>
+          <p:cNvSpPr/>
+          <p:nvPr/>
+        </p:nvSpPr>
+        <p:spPr>
+          <a:xfrm>
+            <a:off x="6173787" y="3316287"/>
+            <a:ext cx="5257800" cy="833169"/>
+          </a:xfrm>
+          <a:prstGeom prst="roundRect">
+            <a:avLst/>
+          </a:prstGeom>
+          <a:solidFill>
+            <a:schemeClr val="accent6"/>
+          </a:solidFill>
+          <a:ln>
+            <a:noFill/>
+          </a:ln>
+        </p:spPr>
+        <p:style>
+          <a:lnRef idx="0">
+            <a:scrgbClr r="0" g="0" b="0"/>
+          </a:lnRef>
+          <a:fillRef idx="0">
+            <a:scrgbClr r="0" g="0" b="0"/>
+          </a:fillRef>
+          <a:effectRef idx="0">
+            <a:scrgbClr r="0" g="0" b="0"/>
+          </a:effectRef>
+          <a:fontRef idx="minor">
+            <a:schemeClr val="lt1"/>
+          </a:fontRef>
+        </p:style>
+        <p:txBody>
+          <a:bodyPr rtlCol="0" anchor="ctr"/>
+          <a:lstStyle/>
+          <a:p>
+            <a:pPr algn="ctr"/>
+            <a:r>
+              <a:rPr lang="en-US" sz="4000" dirty="0"/>
+              <a:t>View</a:t>
+            </a:r>
+            <a:endParaRPr lang="sr-Latn-RS" sz="4000" dirty="0"/>
+          </a:p>
+        </p:txBody>
+      </p:sp>
+      <p:sp>
+        <p:nvSpPr>
+          <p:cNvPr id="6" name="Rectangle: Rounded Corners 5"/>
+          <p:cNvSpPr/>
+          <p:nvPr/>
+        </p:nvSpPr>
+        <p:spPr>
+          <a:xfrm>
+            <a:off x="6173787" y="4759056"/>
+            <a:ext cx="5257800" cy="833169"/>
+          </a:xfrm>
+          <a:prstGeom prst="roundRect">
+            <a:avLst/>
+          </a:prstGeom>
+          <a:solidFill>
+            <a:schemeClr val="accent5"/>
+          </a:solidFill>
+          <a:ln>
+            <a:noFill/>
+          </a:ln>
+        </p:spPr>
+        <p:style>
+          <a:lnRef idx="0">
+            <a:scrgbClr r="0" g="0" b="0"/>
+          </a:lnRef>
+          <a:fillRef idx="0">
+            <a:scrgbClr r="0" g="0" b="0"/>
+          </a:fillRef>
+          <a:effectRef idx="0">
+            <a:scrgbClr r="0" g="0" b="0"/>
+          </a:effectRef>
+          <a:fontRef idx="minor">
+            <a:schemeClr val="lt1"/>
+          </a:fontRef>
+        </p:style>
+        <p:txBody>
+          <a:bodyPr rtlCol="0" anchor="ctr"/>
+          <a:lstStyle/>
+          <a:p>
+            <a:pPr algn="ctr"/>
+            <a:r>
+              <a:rPr lang="en-US" sz="4000" dirty="0"/>
+              <a:t>Presentation</a:t>
+            </a:r>
+            <a:endParaRPr lang="sr-Latn-RS" sz="4000" dirty="0"/>
+          </a:p>
+        </p:txBody>
+      </p:sp>
+      <p:sp>
+        <p:nvSpPr>
+          <p:cNvPr id="9" name="Rectangle: Rounded Corners 8"/>
+          <p:cNvSpPr/>
+          <p:nvPr/>
+        </p:nvSpPr>
+        <p:spPr>
+          <a:xfrm>
+            <a:off x="6173787" y="6201825"/>
+            <a:ext cx="5257800" cy="833169"/>
+          </a:xfrm>
+          <a:prstGeom prst="roundRect">
+            <a:avLst/>
+          </a:prstGeom>
+          <a:solidFill>
+            <a:schemeClr val="accent3"/>
+          </a:solidFill>
+          <a:ln>
+            <a:noFill/>
+          </a:ln>
+        </p:spPr>
+        <p:style>
+          <a:lnRef idx="0">
+            <a:scrgbClr r="0" g="0" b="0"/>
+          </a:lnRef>
+          <a:fillRef idx="0">
+            <a:scrgbClr r="0" g="0" b="0"/>
+          </a:fillRef>
+          <a:effectRef idx="0">
+            <a:scrgbClr r="0" g="0" b="0"/>
+          </a:effectRef>
+          <a:fontRef idx="minor">
+            <a:schemeClr val="lt1"/>
+          </a:fontRef>
+        </p:style>
+        <p:txBody>
+          <a:bodyPr rtlCol="0" anchor="ctr"/>
+          <a:lstStyle/>
+          <a:p>
+            <a:pPr algn="ctr"/>
+            <a:r>
+              <a:rPr lang="en-US" sz="4000" dirty="0"/>
+              <a:t>Repository</a:t>
+            </a:r>
+            <a:endParaRPr lang="sr-Latn-RS" sz="4000" dirty="0"/>
+          </a:p>
+        </p:txBody>
+      </p:sp>
+      <p:sp>
+        <p:nvSpPr>
+          <p:cNvPr id="10" name="Rectangle: Rounded Corners 9"/>
+          <p:cNvSpPr/>
+          <p:nvPr/>
+        </p:nvSpPr>
+        <p:spPr>
+          <a:xfrm>
+            <a:off x="6173787" y="7644594"/>
+            <a:ext cx="5257800" cy="833169"/>
+          </a:xfrm>
+          <a:prstGeom prst="roundRect">
+            <a:avLst/>
+          </a:prstGeom>
+          <a:solidFill>
+            <a:schemeClr val="accent2"/>
+          </a:solidFill>
+          <a:ln>
+            <a:noFill/>
+          </a:ln>
+        </p:spPr>
+        <p:style>
+          <a:lnRef idx="0">
+            <a:scrgbClr r="0" g="0" b="0"/>
+          </a:lnRef>
+          <a:fillRef idx="0">
+            <a:scrgbClr r="0" g="0" b="0"/>
+          </a:fillRef>
+          <a:effectRef idx="0">
+            <a:scrgbClr r="0" g="0" b="0"/>
+          </a:effectRef>
+          <a:fontRef idx="minor">
+            <a:schemeClr val="lt1"/>
+          </a:fontRef>
+        </p:style>
+        <p:txBody>
+          <a:bodyPr rtlCol="0" anchor="ctr"/>
+          <a:lstStyle/>
+          <a:p>
+            <a:pPr algn="ctr"/>
+            <a:r>
+              <a:rPr lang="en-US" sz="4000" dirty="0"/>
+              <a:t>Service</a:t>
+            </a:r>
+            <a:endParaRPr lang="sr-Latn-RS" sz="4000" dirty="0"/>
+          </a:p>
+        </p:txBody>
+      </p:sp>
+      <p:sp>
+        <p:nvSpPr>
+          <p:cNvPr id="3" name="TextBox 2"/>
+          <p:cNvSpPr txBox="1"/>
+          <p:nvPr/>
+        </p:nvSpPr>
+        <p:spPr>
+          <a:xfrm>
+            <a:off x="12117387" y="3021924"/>
+            <a:ext cx="4495800" cy="1200329"/>
+          </a:xfrm>
+          <a:prstGeom prst="rect">
+            <a:avLst/>
+          </a:prstGeom>
+          <a:noFill/>
+        </p:spPr>
+        <p:txBody>
+          <a:bodyPr wrap="square" rtlCol="0">
+            <a:spAutoFit/>
+          </a:bodyPr>
+          <a:lstStyle/>
+          <a:p>
+            <a:r>
+              <a:rPr lang="en-US" sz="3600" dirty="0"/>
+              <a:t>We have layers, so we have loose coupling.</a:t>
+            </a:r>
+            <a:endParaRPr lang="sr-Latn-RS" sz="3600" dirty="0"/>
+          </a:p>
+        </p:txBody>
+      </p:sp>
+      <p:sp>
+        <p:nvSpPr>
+          <p:cNvPr id="4" name="Action Button: Help 3">
+            <a:hlinkClick r:id="" action="ppaction://noaction" highlightClick="1"/>
+          </p:cNvPr>
+          <p:cNvSpPr/>
+          <p:nvPr/>
+        </p:nvSpPr>
+        <p:spPr>
+          <a:xfrm>
+            <a:off x="13609075" y="5006151"/>
+            <a:ext cx="1512424" cy="1219200"/>
+          </a:xfrm>
+          <a:prstGeom prst="actionButtonHelp">
+            <a:avLst/>
+          </a:prstGeom>
+        </p:spPr>
+        <p:style>
+          <a:lnRef idx="3">
+            <a:schemeClr val="lt1"/>
+          </a:lnRef>
+          <a:fillRef idx="1">
+            <a:schemeClr val="accent2"/>
+          </a:fillRef>
+          <a:effectRef idx="1">
+            <a:schemeClr val="accent2"/>
+          </a:effectRef>
+          <a:fontRef idx="minor">
+            <a:schemeClr val="lt1"/>
+          </a:fontRef>
+        </p:style>
+        <p:txBody>
+          <a:bodyPr rtlCol="0" anchor="ctr"/>
+          <a:lstStyle/>
+          <a:p>
+            <a:pPr algn="ctr"/>
+            <a:endParaRPr lang="sr-Latn-RS"/>
+          </a:p>
+        </p:txBody>
+      </p:sp>
+      <p:sp>
+        <p:nvSpPr>
+          <p:cNvPr id="11" name="TextBox 10"/>
+          <p:cNvSpPr txBox="1"/>
+          <p:nvPr/>
+        </p:nvSpPr>
+        <p:spPr>
+          <a:xfrm>
+            <a:off x="12117387" y="6973886"/>
+            <a:ext cx="4495800" cy="1200329"/>
+          </a:xfrm>
+          <a:prstGeom prst="rect">
+            <a:avLst/>
+          </a:prstGeom>
+          <a:noFill/>
+        </p:spPr>
+        <p:txBody>
+          <a:bodyPr wrap="square" rtlCol="0">
+            <a:spAutoFit/>
+          </a:bodyPr>
+          <a:lstStyle/>
+          <a:p>
+            <a:pPr algn="ctr"/>
+            <a:r>
+              <a:rPr lang="en-US" sz="3600" dirty="0">
+                <a:latin typeface="Consolas" panose="020B0609020204030204" pitchFamily="49" charset="0"/>
+              </a:rPr>
+              <a:t>Let’s look at the code!</a:t>
+            </a:r>
+            <a:endParaRPr lang="sr-Latn-RS" sz="3600" dirty="0">
+              <a:latin typeface="Consolas" panose="020B0609020204030204" pitchFamily="49" charset="0"/>
+            </a:endParaRPr>
+          </a:p>
+        </p:txBody>
+      </p:sp>
+    </p:spTree>
+    <p:extLst>
+      <p:ext uri="{BB962C8B-B14F-4D97-AF65-F5344CB8AC3E}">
+        <p14:creationId xmlns:p14="http://schemas.microsoft.com/office/powerpoint/2010/main" val="3590924626"/>
+      </p:ext>
+    </p:extLst>
+  </p:cSld>
+  <p:clrMapOvr>
+    <a:masterClrMapping/>
+  </p:clrMapOvr>
+  <mc:AlternateContent xmlns:mc="http://schemas.openxmlformats.org/markup-compatibility/2006" xmlns:p14="http://schemas.microsoft.com/office/powerpoint/2010/main">
+    <mc:Choice Requires="p14">
+      <p:transition spd="med" p14:dur="700">
+        <p:fade/>
+      </p:transition>
+    </mc:Choice>
+    <mc:Fallback xmlns="">
+      <p:transition spd="med">
+        <p:fade/>
+      </p:transition>
+    </mc:Fallback>
+  </mc:AlternateContent>
+  <p:timing>
+    <p:tnLst>
+      <p:par>
+        <p:cTn id="1" dur="indefinite" restart="never" nodeType="tmRoot">
+          <p:childTnLst>
+            <p:seq concurrent="1" nextAc="seek">
+              <p:cTn id="2" dur="indefinite" nodeType="mainSeq">
+                <p:childTnLst>
+                  <p:par>
+                    <p:cTn id="3" fill="hold">
+                      <p:stCondLst>
+                        <p:cond delay="indefinite"/>
+                      </p:stCondLst>
+                      <p:childTnLst>
+                        <p:par>
+                          <p:cTn id="4" fill="hold">
+                            <p:stCondLst>
+                              <p:cond delay="0"/>
+                            </p:stCondLst>
+                            <p:childTnLst>
+                              <p:par>
+                                <p:cTn id="5" presetID="10" presetClass="entr" presetSubtype="0" fill="hold" grpId="0" nodeType="clickEffect">
+                                  <p:stCondLst>
+                                    <p:cond delay="0"/>
+                                  </p:stCondLst>
+                                  <p:childTnLst>
+                                    <p:set>
+                                      <p:cBhvr>
+                                        <p:cTn id="6" dur="1" fill="hold">
+                                          <p:stCondLst>
+                                            <p:cond delay="0"/>
+                                          </p:stCondLst>
+                                        </p:cTn>
+                                        <p:tgtEl>
+                                          <p:spTgt spid="2"/>
+                                        </p:tgtEl>
+                                        <p:attrNameLst>
+                                          <p:attrName>style.visibility</p:attrName>
+                                        </p:attrNameLst>
+                                      </p:cBhvr>
+                                      <p:to>
+                                        <p:strVal val="visible"/>
+                                      </p:to>
+                                    </p:set>
+                                    <p:animEffect transition="in" filter="fade">
+                                      <p:cBhvr>
+                                        <p:cTn id="7" dur="500"/>
+                                        <p:tgtEl>
+                                          <p:spTgt spid="2"/>
+                                        </p:tgtEl>
+                                      </p:cBhvr>
+                                    </p:animEffect>
+                                  </p:childTnLst>
+                                </p:cTn>
+                              </p:par>
+                              <p:par>
+                                <p:cTn id="8" presetID="10" presetClass="entr" presetSubtype="0" fill="hold" grpId="0" nodeType="withEffect">
+                                  <p:stCondLst>
+                                    <p:cond delay="0"/>
+                                  </p:stCondLst>
+                                  <p:childTnLst>
+                                    <p:set>
+                                      <p:cBhvr>
+                                        <p:cTn id="9" dur="1" fill="hold">
+                                          <p:stCondLst>
+                                            <p:cond delay="0"/>
+                                          </p:stCondLst>
+                                        </p:cTn>
+                                        <p:tgtEl>
+                                          <p:spTgt spid="6"/>
+                                        </p:tgtEl>
+                                        <p:attrNameLst>
+                                          <p:attrName>style.visibility</p:attrName>
+                                        </p:attrNameLst>
+                                      </p:cBhvr>
+                                      <p:to>
+                                        <p:strVal val="visible"/>
+                                      </p:to>
+                                    </p:set>
+                                    <p:animEffect transition="in" filter="fade">
+                                      <p:cBhvr>
+                                        <p:cTn id="10" dur="500"/>
+                                        <p:tgtEl>
+                                          <p:spTgt spid="6"/>
+                                        </p:tgtEl>
+                                      </p:cBhvr>
+                                    </p:animEffect>
+                                  </p:childTnLst>
+                                </p:cTn>
+                              </p:par>
+                              <p:par>
+                                <p:cTn id="11" presetID="10" presetClass="entr" presetSubtype="0" fill="hold" grpId="0" nodeType="withEffect">
+                                  <p:stCondLst>
+                                    <p:cond delay="0"/>
+                                  </p:stCondLst>
+                                  <p:childTnLst>
+                                    <p:set>
+                                      <p:cBhvr>
+                                        <p:cTn id="12" dur="1" fill="hold">
+                                          <p:stCondLst>
+                                            <p:cond delay="0"/>
+                                          </p:stCondLst>
+                                        </p:cTn>
+                                        <p:tgtEl>
+                                          <p:spTgt spid="9"/>
+                                        </p:tgtEl>
+                                        <p:attrNameLst>
+                                          <p:attrName>style.visibility</p:attrName>
+                                        </p:attrNameLst>
+                                      </p:cBhvr>
+                                      <p:to>
+                                        <p:strVal val="visible"/>
+                                      </p:to>
+                                    </p:set>
+                                    <p:animEffect transition="in" filter="fade">
+                                      <p:cBhvr>
+                                        <p:cTn id="13" dur="500"/>
+                                        <p:tgtEl>
+                                          <p:spTgt spid="9"/>
+                                        </p:tgtEl>
+                                      </p:cBhvr>
+                                    </p:animEffect>
+                                  </p:childTnLst>
+                                </p:cTn>
+                              </p:par>
+                              <p:par>
+                                <p:cTn id="14" presetID="10" presetClass="entr" presetSubtype="0" fill="hold" grpId="0" nodeType="withEffect">
+                                  <p:stCondLst>
+                                    <p:cond delay="0"/>
+                                  </p:stCondLst>
+                                  <p:childTnLst>
+                                    <p:set>
+                                      <p:cBhvr>
+                                        <p:cTn id="15" dur="1" fill="hold">
+                                          <p:stCondLst>
+                                            <p:cond delay="0"/>
+                                          </p:stCondLst>
+                                        </p:cTn>
+                                        <p:tgtEl>
+                                          <p:spTgt spid="10"/>
+                                        </p:tgtEl>
+                                        <p:attrNameLst>
+                                          <p:attrName>style.visibility</p:attrName>
+                                        </p:attrNameLst>
+                                      </p:cBhvr>
+                                      <p:to>
+                                        <p:strVal val="visible"/>
+                                      </p:to>
+                                    </p:set>
+                                    <p:animEffect transition="in" filter="fade">
+                                      <p:cBhvr>
+                                        <p:cTn id="16" dur="500"/>
+                                        <p:tgtEl>
+                                          <p:spTgt spid="10"/>
+                                        </p:tgtEl>
+                                      </p:cBhvr>
+                                    </p:animEffect>
+                                  </p:childTnLst>
+                                </p:cTn>
+                              </p:par>
+                            </p:childTnLst>
+                          </p:cTn>
+                        </p:par>
+                      </p:childTnLst>
+                    </p:cTn>
+                  </p:par>
+                  <p:par>
+                    <p:cTn id="17" fill="hold">
+                      <p:stCondLst>
+                        <p:cond delay="indefinite"/>
+                      </p:stCondLst>
+                      <p:childTnLst>
+                        <p:par>
+                          <p:cTn id="18" fill="hold">
+                            <p:stCondLst>
+                              <p:cond delay="0"/>
+                            </p:stCondLst>
+                            <p:childTnLst>
+                              <p:par>
+                                <p:cTn id="19" presetID="53" presetClass="entr" presetSubtype="16" fill="hold" grpId="0" nodeType="clickEffect">
+                                  <p:stCondLst>
+                                    <p:cond delay="0"/>
+                                  </p:stCondLst>
+                                  <p:childTnLst>
+                                    <p:set>
+                                      <p:cBhvr>
+                                        <p:cTn id="20" dur="1" fill="hold">
+                                          <p:stCondLst>
+                                            <p:cond delay="0"/>
+                                          </p:stCondLst>
+                                        </p:cTn>
+                                        <p:tgtEl>
+                                          <p:spTgt spid="3"/>
+                                        </p:tgtEl>
+                                        <p:attrNameLst>
+                                          <p:attrName>style.visibility</p:attrName>
+                                        </p:attrNameLst>
+                                      </p:cBhvr>
+                                      <p:to>
+                                        <p:strVal val="visible"/>
+                                      </p:to>
+                                    </p:set>
+                                    <p:anim calcmode="lin" valueType="num">
+                                      <p:cBhvr>
+                                        <p:cTn id="21" dur="500" fill="hold"/>
+                                        <p:tgtEl>
+                                          <p:spTgt spid="3"/>
+                                        </p:tgtEl>
+                                        <p:attrNameLst>
+                                          <p:attrName>ppt_w</p:attrName>
+                                        </p:attrNameLst>
+                                      </p:cBhvr>
+                                      <p:tavLst>
+                                        <p:tav tm="0">
+                                          <p:val>
+                                            <p:fltVal val="0"/>
+                                          </p:val>
+                                        </p:tav>
+                                        <p:tav tm="100000">
+                                          <p:val>
+                                            <p:strVal val="#ppt_w"/>
+                                          </p:val>
+                                        </p:tav>
+                                      </p:tavLst>
+                                    </p:anim>
+                                    <p:anim calcmode="lin" valueType="num">
+                                      <p:cBhvr>
+                                        <p:cTn id="22" dur="500" fill="hold"/>
+                                        <p:tgtEl>
+                                          <p:spTgt spid="3"/>
+                                        </p:tgtEl>
+                                        <p:attrNameLst>
+                                          <p:attrName>ppt_h</p:attrName>
+                                        </p:attrNameLst>
+                                      </p:cBhvr>
+                                      <p:tavLst>
+                                        <p:tav tm="0">
+                                          <p:val>
+                                            <p:fltVal val="0"/>
+                                          </p:val>
+                                        </p:tav>
+                                        <p:tav tm="100000">
+                                          <p:val>
+                                            <p:strVal val="#ppt_h"/>
+                                          </p:val>
+                                        </p:tav>
+                                      </p:tavLst>
+                                    </p:anim>
+                                    <p:animEffect transition="in" filter="fade">
+                                      <p:cBhvr>
+                                        <p:cTn id="23" dur="500"/>
+                                        <p:tgtEl>
+                                          <p:spTgt spid="3"/>
+                                        </p:tgtEl>
+                                      </p:cBhvr>
+                                    </p:animEffect>
+                                  </p:childTnLst>
+                                </p:cTn>
+                              </p:par>
+                            </p:childTnLst>
+                          </p:cTn>
+                        </p:par>
+                      </p:childTnLst>
+                    </p:cTn>
+                  </p:par>
+                  <p:par>
+                    <p:cTn id="24" fill="hold">
+                      <p:stCondLst>
+                        <p:cond delay="indefinite"/>
+                      </p:stCondLst>
+                      <p:childTnLst>
+                        <p:par>
+                          <p:cTn id="25" fill="hold">
+                            <p:stCondLst>
+                              <p:cond delay="0"/>
+                            </p:stCondLst>
+                            <p:childTnLst>
+                              <p:par>
+                                <p:cTn id="26" presetID="31" presetClass="entr" presetSubtype="0" fill="hold" grpId="0" nodeType="clickEffect">
+                                  <p:stCondLst>
+                                    <p:cond delay="0"/>
+                                  </p:stCondLst>
+                                  <p:childTnLst>
+                                    <p:set>
+                                      <p:cBhvr>
+                                        <p:cTn id="27" dur="1" fill="hold">
+                                          <p:stCondLst>
+                                            <p:cond delay="0"/>
+                                          </p:stCondLst>
+                                        </p:cTn>
+                                        <p:tgtEl>
+                                          <p:spTgt spid="4"/>
+                                        </p:tgtEl>
+                                        <p:attrNameLst>
+                                          <p:attrName>style.visibility</p:attrName>
+                                        </p:attrNameLst>
+                                      </p:cBhvr>
+                                      <p:to>
+                                        <p:strVal val="visible"/>
+                                      </p:to>
+                                    </p:set>
+                                    <p:anim calcmode="lin" valueType="num">
+                                      <p:cBhvr>
+                                        <p:cTn id="28" dur="1000" fill="hold"/>
+                                        <p:tgtEl>
+                                          <p:spTgt spid="4"/>
+                                        </p:tgtEl>
+                                        <p:attrNameLst>
+                                          <p:attrName>ppt_w</p:attrName>
+                                        </p:attrNameLst>
+                                      </p:cBhvr>
+                                      <p:tavLst>
+                                        <p:tav tm="0">
+                                          <p:val>
+                                            <p:fltVal val="0"/>
+                                          </p:val>
+                                        </p:tav>
+                                        <p:tav tm="100000">
+                                          <p:val>
+                                            <p:strVal val="#ppt_w"/>
+                                          </p:val>
+                                        </p:tav>
+                                      </p:tavLst>
+                                    </p:anim>
+                                    <p:anim calcmode="lin" valueType="num">
+                                      <p:cBhvr>
+                                        <p:cTn id="29" dur="1000" fill="hold"/>
+                                        <p:tgtEl>
+                                          <p:spTgt spid="4"/>
+                                        </p:tgtEl>
+                                        <p:attrNameLst>
+                                          <p:attrName>ppt_h</p:attrName>
+                                        </p:attrNameLst>
+                                      </p:cBhvr>
+                                      <p:tavLst>
+                                        <p:tav tm="0">
+                                          <p:val>
+                                            <p:fltVal val="0"/>
+                                          </p:val>
+                                        </p:tav>
+                                        <p:tav tm="100000">
+                                          <p:val>
+                                            <p:strVal val="#ppt_h"/>
+                                          </p:val>
+                                        </p:tav>
+                                      </p:tavLst>
+                                    </p:anim>
+                                    <p:anim calcmode="lin" valueType="num">
+                                      <p:cBhvr>
+                                        <p:cTn id="30" dur="1000" fill="hold"/>
+                                        <p:tgtEl>
+                                          <p:spTgt spid="4"/>
+                                        </p:tgtEl>
+                                        <p:attrNameLst>
+                                          <p:attrName>style.rotation</p:attrName>
+                                        </p:attrNameLst>
+                                      </p:cBhvr>
+                                      <p:tavLst>
+                                        <p:tav tm="0">
+                                          <p:val>
+                                            <p:fltVal val="90"/>
+                                          </p:val>
+                                        </p:tav>
+                                        <p:tav tm="100000">
+                                          <p:val>
+                                            <p:fltVal val="0"/>
+                                          </p:val>
+                                        </p:tav>
+                                      </p:tavLst>
+                                    </p:anim>
+                                    <p:animEffect transition="in" filter="fade">
+                                      <p:cBhvr>
+                                        <p:cTn id="31" dur="1000"/>
+                                        <p:tgtEl>
+                                          <p:spTgt spid="4"/>
+                                        </p:tgtEl>
+                                      </p:cBhvr>
+                                    </p:animEffect>
+                                  </p:childTnLst>
+                                </p:cTn>
+                              </p:par>
+                            </p:childTnLst>
+                          </p:cTn>
+                        </p:par>
+                      </p:childTnLst>
+                    </p:cTn>
+                  </p:par>
+                  <p:par>
+                    <p:cTn id="32" fill="hold">
+                      <p:stCondLst>
+                        <p:cond delay="indefinite"/>
+                      </p:stCondLst>
+                      <p:childTnLst>
+                        <p:par>
+                          <p:cTn id="33" fill="hold">
+                            <p:stCondLst>
+                              <p:cond delay="0"/>
+                            </p:stCondLst>
+                            <p:childTnLst>
+                              <p:par>
+                                <p:cTn id="34" presetID="53" presetClass="entr" presetSubtype="16" fill="hold" grpId="0" nodeType="clickEffect">
+                                  <p:stCondLst>
+                                    <p:cond delay="0"/>
+                                  </p:stCondLst>
+                                  <p:childTnLst>
+                                    <p:set>
+                                      <p:cBhvr>
+                                        <p:cTn id="35" dur="1" fill="hold">
+                                          <p:stCondLst>
+                                            <p:cond delay="0"/>
+                                          </p:stCondLst>
+                                        </p:cTn>
+                                        <p:tgtEl>
+                                          <p:spTgt spid="11"/>
+                                        </p:tgtEl>
+                                        <p:attrNameLst>
+                                          <p:attrName>style.visibility</p:attrName>
+                                        </p:attrNameLst>
+                                      </p:cBhvr>
+                                      <p:to>
+                                        <p:strVal val="visible"/>
+                                      </p:to>
+                                    </p:set>
+                                    <p:anim calcmode="lin" valueType="num">
+                                      <p:cBhvr>
+                                        <p:cTn id="36" dur="500" fill="hold"/>
+                                        <p:tgtEl>
+                                          <p:spTgt spid="11"/>
+                                        </p:tgtEl>
+                                        <p:attrNameLst>
+                                          <p:attrName>ppt_w</p:attrName>
+                                        </p:attrNameLst>
+                                      </p:cBhvr>
+                                      <p:tavLst>
+                                        <p:tav tm="0">
+                                          <p:val>
+                                            <p:fltVal val="0"/>
+                                          </p:val>
+                                        </p:tav>
+                                        <p:tav tm="100000">
+                                          <p:val>
+                                            <p:strVal val="#ppt_w"/>
+                                          </p:val>
+                                        </p:tav>
+                                      </p:tavLst>
+                                    </p:anim>
+                                    <p:anim calcmode="lin" valueType="num">
+                                      <p:cBhvr>
+                                        <p:cTn id="37" dur="500" fill="hold"/>
+                                        <p:tgtEl>
+                                          <p:spTgt spid="11"/>
+                                        </p:tgtEl>
+                                        <p:attrNameLst>
+                                          <p:attrName>ppt_h</p:attrName>
+                                        </p:attrNameLst>
+                                      </p:cBhvr>
+                                      <p:tavLst>
+                                        <p:tav tm="0">
+                                          <p:val>
+                                            <p:fltVal val="0"/>
+                                          </p:val>
+                                        </p:tav>
+                                        <p:tav tm="100000">
+                                          <p:val>
+                                            <p:strVal val="#ppt_h"/>
+                                          </p:val>
+                                        </p:tav>
+                                      </p:tavLst>
+                                    </p:anim>
+                                    <p:animEffect transition="in" filter="fade">
+                                      <p:cBhvr>
+                                        <p:cTn id="38" dur="500"/>
+                                        <p:tgtEl>
+                                          <p:spTgt spid="11"/>
+                                        </p:tgtEl>
+                                      </p:cBhvr>
+                                    </p:animEffect>
+                                  </p:childTnLst>
+                                </p:cTn>
+                              </p:par>
+                            </p:childTnLst>
+                          </p:cTn>
+                        </p:par>
+                      </p:childTnLst>
+                    </p:cTn>
+                  </p:par>
+                </p:childTnLst>
+              </p:cTn>
+              <p:prevCondLst>
+                <p:cond evt="onPrev" delay="0">
+                  <p:tgtEl>
+                    <p:sldTgt/>
+                  </p:tgtEl>
+                </p:cond>
+              </p:prevCondLst>
+              <p:nextCondLst>
+                <p:cond evt="onNext" delay="0">
+                  <p:tgtEl>
+                    <p:sldTgt/>
+                  </p:tgtEl>
+                </p:cond>
+              </p:nextCondLst>
+            </p:seq>
+          </p:childTnLst>
+        </p:cTn>
+      </p:par>
+    </p:tnLst>
+    <p:bldLst>
+      <p:bldP spid="2" grpId="0" animBg="1"/>
+      <p:bldP spid="6" grpId="0" animBg="1"/>
+      <p:bldP spid="9" grpId="0" animBg="1"/>
+      <p:bldP spid="10" grpId="0" animBg="1"/>
+      <p:bldP spid="3" grpId="0"/>
+      <p:bldP spid="4" grpId="0" animBg="1"/>
+      <p:bldP spid="11" grpId="0"/>
+    </p:bldLst>
+  </p:timing>
+</p:sld>
+</file>
+
+<file path=ppt/slides/slide7.xml><?xml version="1.0" encoding="utf-8"?>
+<p:sld xmlns:a="http://schemas.openxmlformats.org/drawingml/2006/main" xmlns:r="http://schemas.openxmlformats.org/officeDocument/2006/relationships" xmlns:p="http://schemas.openxmlformats.org/presentationml/2006/main">
+  <p:cSld>
+    <p:spTree>
+      <p:nvGrpSpPr>
+        <p:cNvPr id="1" name=""/>
+        <p:cNvGrpSpPr/>
+        <p:nvPr/>
+      </p:nvGrpSpPr>
+      <p:grpSpPr>
+        <a:xfrm>
+          <a:off x="0" y="0"/>
+          <a:ext cx="0" cy="0"/>
+          <a:chOff x="0" y="0"/>
+          <a:chExt cx="0" cy="0"/>
+        </a:xfrm>
+      </p:grpSpPr>
+      <p:sp>
+        <p:nvSpPr>
+          <p:cNvPr id="16" name="TextBox 15"/>
+          <p:cNvSpPr txBox="1"/>
+          <p:nvPr/>
+        </p:nvSpPr>
+        <p:spPr>
+          <a:xfrm>
+            <a:off x="4969123" y="854313"/>
+            <a:ext cx="8136904" cy="830997"/>
+          </a:xfrm>
+          <a:prstGeom prst="rect">
+            <a:avLst/>
+          </a:prstGeom>
+          <a:noFill/>
+        </p:spPr>
+        <p:txBody>
+          <a:bodyPr wrap="square" rtlCol="0">
+            <a:spAutoFit/>
+          </a:bodyPr>
+          <a:lstStyle/>
+          <a:p>
+            <a:pPr algn="ctr"/>
+            <a:r>
+              <a:rPr lang="en-US" sz="4800" dirty="0">
+                <a:solidFill>
+                  <a:srgbClr val="545250"/>
+                </a:solidFill>
+                <a:latin typeface="Novecento sans wide Book" pitchFamily="50" charset="-94"/>
+              </a:rPr>
+              <a:t>Tight Coupling</a:t>
+            </a:r>
+          </a:p>
+        </p:txBody>
+      </p:sp>
+      <p:pic>
+        <p:nvPicPr>
+          <p:cNvPr id="8" name="Picture 7"/>
+          <p:cNvPicPr>
+            <a:picLocks noChangeAspect="1"/>
+          </p:cNvPicPr>
+          <p:nvPr/>
+        </p:nvPicPr>
+        <p:blipFill>
+          <a:blip r:embed="rId3">
+            <a:extLst>
+              <a:ext uri="{28A0092B-C50C-407E-A947-70E740481C1C}">
+                <a14:useLocalDpi xmlns:a14="http://schemas.microsoft.com/office/drawing/2010/main" val="0"/>
+              </a:ext>
+            </a:extLst>
+          </a:blip>
+          <a:stretch>
+            <a:fillRect/>
+          </a:stretch>
+        </p:blipFill>
+        <p:spPr>
+          <a:xfrm rot="5400000">
+            <a:off x="9100648" y="-2221597"/>
+            <a:ext cx="1168254" cy="9003175"/>
+          </a:xfrm>
+          <a:prstGeom prst="rect">
+            <a:avLst/>
+          </a:prstGeom>
+        </p:spPr>
+      </p:pic>
+      <p:pic>
+        <p:nvPicPr>
+          <p:cNvPr id="7" name="Picture 6"/>
+          <p:cNvPicPr>
+            <a:picLocks noChangeAspect="1"/>
+          </p:cNvPicPr>
+          <p:nvPr/>
+        </p:nvPicPr>
+        <p:blipFill>
+          <a:blip r:embed="rId4" cstate="print">
+            <a:extLst>
+              <a:ext uri="{28A0092B-C50C-407E-A947-70E740481C1C}">
+                <a14:useLocalDpi xmlns:a14="http://schemas.microsoft.com/office/drawing/2010/main" val="0"/>
+              </a:ext>
+            </a:extLst>
+          </a:blip>
+          <a:stretch>
+            <a:fillRect/>
+          </a:stretch>
+        </p:blipFill>
+        <p:spPr>
+          <a:xfrm>
+            <a:off x="13488987" y="9412287"/>
+            <a:ext cx="4572000" cy="646390"/>
+          </a:xfrm>
+          <a:prstGeom prst="rect">
+            <a:avLst/>
+          </a:prstGeom>
+        </p:spPr>
+      </p:pic>
+      <p:sp>
+        <p:nvSpPr>
+          <p:cNvPr id="5" name="Rectangle: Rounded Corners 4"/>
+          <p:cNvSpPr/>
+          <p:nvPr/>
+        </p:nvSpPr>
+        <p:spPr>
+          <a:xfrm>
+            <a:off x="6173787" y="3316287"/>
+            <a:ext cx="5257800" cy="833169"/>
+          </a:xfrm>
+          <a:prstGeom prst="roundRect">
+            <a:avLst/>
+          </a:prstGeom>
+          <a:solidFill>
+            <a:schemeClr val="accent6"/>
+          </a:solidFill>
+          <a:ln>
+            <a:noFill/>
+          </a:ln>
+        </p:spPr>
+        <p:style>
+          <a:lnRef idx="0">
+            <a:scrgbClr r="0" g="0" b="0"/>
+          </a:lnRef>
+          <a:fillRef idx="0">
+            <a:scrgbClr r="0" g="0" b="0"/>
+          </a:fillRef>
+          <a:effectRef idx="0">
+            <a:scrgbClr r="0" g="0" b="0"/>
+          </a:effectRef>
+          <a:fontRef idx="minor">
+            <a:schemeClr val="lt1"/>
+          </a:fontRef>
+        </p:style>
+        <p:txBody>
+          <a:bodyPr rtlCol="0" anchor="ctr"/>
+          <a:lstStyle/>
+          <a:p>
+            <a:pPr algn="ctr"/>
+            <a:r>
+              <a:rPr lang="en-US" sz="4000" dirty="0"/>
+              <a:t>View</a:t>
+            </a:r>
+            <a:endParaRPr lang="sr-Latn-RS" sz="4000" dirty="0"/>
+          </a:p>
+        </p:txBody>
+      </p:sp>
+      <p:sp>
+        <p:nvSpPr>
+          <p:cNvPr id="6" name="Rectangle: Rounded Corners 5"/>
+          <p:cNvSpPr/>
+          <p:nvPr/>
+        </p:nvSpPr>
+        <p:spPr>
+          <a:xfrm>
+            <a:off x="6173787" y="4759056"/>
+            <a:ext cx="5257800" cy="833169"/>
+          </a:xfrm>
+          <a:prstGeom prst="roundRect">
+            <a:avLst/>
+          </a:prstGeom>
+          <a:solidFill>
+            <a:schemeClr val="accent5"/>
+          </a:solidFill>
+          <a:ln>
+            <a:noFill/>
+          </a:ln>
+        </p:spPr>
+        <p:style>
+          <a:lnRef idx="0">
+            <a:scrgbClr r="0" g="0" b="0"/>
+          </a:lnRef>
+          <a:fillRef idx="0">
+            <a:scrgbClr r="0" g="0" b="0"/>
+          </a:fillRef>
+          <a:effectRef idx="0">
+            <a:scrgbClr r="0" g="0" b="0"/>
+          </a:effectRef>
+          <a:fontRef idx="minor">
+            <a:schemeClr val="lt1"/>
+          </a:fontRef>
+        </p:style>
+        <p:txBody>
+          <a:bodyPr rtlCol="0" anchor="ctr"/>
+          <a:lstStyle/>
+          <a:p>
+            <a:pPr algn="ctr"/>
+            <a:r>
+              <a:rPr lang="en-US" sz="4000" dirty="0"/>
+              <a:t>Presentation</a:t>
+            </a:r>
+            <a:endParaRPr lang="sr-Latn-RS" sz="4000" dirty="0"/>
+          </a:p>
+        </p:txBody>
+      </p:sp>
+      <p:sp>
+        <p:nvSpPr>
+          <p:cNvPr id="9" name="Rectangle: Rounded Corners 8"/>
+          <p:cNvSpPr/>
+          <p:nvPr/>
+        </p:nvSpPr>
+        <p:spPr>
+          <a:xfrm>
+            <a:off x="6173787" y="6201825"/>
+            <a:ext cx="5257800" cy="833169"/>
+          </a:xfrm>
+          <a:prstGeom prst="roundRect">
+            <a:avLst/>
+          </a:prstGeom>
+          <a:solidFill>
+            <a:schemeClr val="accent3"/>
+          </a:solidFill>
+          <a:ln>
+            <a:noFill/>
+          </a:ln>
+        </p:spPr>
+        <p:style>
+          <a:lnRef idx="0">
+            <a:scrgbClr r="0" g="0" b="0"/>
+          </a:lnRef>
+          <a:fillRef idx="0">
+            <a:scrgbClr r="0" g="0" b="0"/>
+          </a:fillRef>
+          <a:effectRef idx="0">
+            <a:scrgbClr r="0" g="0" b="0"/>
+          </a:effectRef>
+          <a:fontRef idx="minor">
+            <a:schemeClr val="lt1"/>
+          </a:fontRef>
+        </p:style>
+        <p:txBody>
+          <a:bodyPr rtlCol="0" anchor="ctr"/>
+          <a:lstStyle/>
+          <a:p>
+            <a:pPr algn="ctr"/>
+            <a:r>
+              <a:rPr lang="en-US" sz="4000" dirty="0"/>
+              <a:t>Repository</a:t>
+            </a:r>
+            <a:endParaRPr lang="sr-Latn-RS" sz="4000" dirty="0"/>
+          </a:p>
+        </p:txBody>
+      </p:sp>
+      <p:sp>
+        <p:nvSpPr>
+          <p:cNvPr id="10" name="Rectangle: Rounded Corners 9"/>
+          <p:cNvSpPr/>
+          <p:nvPr/>
+        </p:nvSpPr>
+        <p:spPr>
+          <a:xfrm>
+            <a:off x="6173787" y="7644594"/>
+            <a:ext cx="5257800" cy="833169"/>
+          </a:xfrm>
+          <a:prstGeom prst="roundRect">
+            <a:avLst/>
+          </a:prstGeom>
+          <a:solidFill>
+            <a:schemeClr val="accent2"/>
+          </a:solidFill>
+          <a:ln>
+            <a:noFill/>
+          </a:ln>
+        </p:spPr>
+        <p:style>
+          <a:lnRef idx="0">
+            <a:scrgbClr r="0" g="0" b="0"/>
+          </a:lnRef>
+          <a:fillRef idx="0">
+            <a:scrgbClr r="0" g="0" b="0"/>
+          </a:fillRef>
+          <a:effectRef idx="0">
+            <a:scrgbClr r="0" g="0" b="0"/>
+          </a:effectRef>
+          <a:fontRef idx="minor">
+            <a:schemeClr val="lt1"/>
+          </a:fontRef>
+        </p:style>
+        <p:txBody>
+          <a:bodyPr rtlCol="0" anchor="ctr"/>
+          <a:lstStyle/>
+          <a:p>
+            <a:pPr algn="ctr"/>
+            <a:r>
+              <a:rPr lang="en-US" sz="4000" dirty="0"/>
+              <a:t>Service</a:t>
+            </a:r>
+            <a:endParaRPr lang="sr-Latn-RS" sz="4000" dirty="0"/>
+          </a:p>
+        </p:txBody>
+      </p:sp>
+      <p:pic>
+        <p:nvPicPr>
+          <p:cNvPr id="4" name="Picture 3"/>
+          <p:cNvPicPr>
+            <a:picLocks noChangeAspect="1"/>
+          </p:cNvPicPr>
+          <p:nvPr/>
+        </p:nvPicPr>
+        <p:blipFill>
+          <a:blip r:embed="rId5"/>
+          <a:stretch>
+            <a:fillRect/>
+          </a:stretch>
+        </p:blipFill>
+        <p:spPr>
+          <a:xfrm>
+            <a:off x="9983787" y="3750716"/>
+            <a:ext cx="833691" cy="1290807"/>
+          </a:xfrm>
+          <a:prstGeom prst="rect">
+            <a:avLst/>
+          </a:prstGeom>
+        </p:spPr>
+      </p:pic>
+      <p:pic>
+        <p:nvPicPr>
+          <p:cNvPr id="12" name="Picture 11"/>
+          <p:cNvPicPr>
+            <a:picLocks noChangeAspect="1"/>
+          </p:cNvPicPr>
+          <p:nvPr/>
+        </p:nvPicPr>
+        <p:blipFill>
+          <a:blip r:embed="rId5"/>
+          <a:stretch>
+            <a:fillRect/>
+          </a:stretch>
+        </p:blipFill>
+        <p:spPr>
+          <a:xfrm>
+            <a:off x="9979931" y="5299341"/>
+            <a:ext cx="833691" cy="1290807"/>
+          </a:xfrm>
+          <a:prstGeom prst="rect">
+            <a:avLst/>
+          </a:prstGeom>
+        </p:spPr>
+      </p:pic>
+      <p:pic>
+        <p:nvPicPr>
+          <p:cNvPr id="13" name="Picture 12"/>
+          <p:cNvPicPr>
+            <a:picLocks noChangeAspect="1"/>
+          </p:cNvPicPr>
+          <p:nvPr/>
+        </p:nvPicPr>
+        <p:blipFill>
+          <a:blip r:embed="rId5"/>
+          <a:stretch>
+            <a:fillRect/>
+          </a:stretch>
+        </p:blipFill>
+        <p:spPr>
+          <a:xfrm>
+            <a:off x="9988049" y="6847966"/>
+            <a:ext cx="833691" cy="1290807"/>
+          </a:xfrm>
+          <a:prstGeom prst="rect">
+            <a:avLst/>
+          </a:prstGeom>
+        </p:spPr>
+      </p:pic>
+      <p:grpSp>
+        <p:nvGrpSpPr>
+          <p:cNvPr id="15" name="Group 14"/>
+          <p:cNvGrpSpPr/>
+          <p:nvPr/>
+        </p:nvGrpSpPr>
+        <p:grpSpPr>
+          <a:xfrm>
+            <a:off x="10666248" y="3948212"/>
+            <a:ext cx="799583" cy="3993063"/>
+            <a:chOff x="13394898" y="3974538"/>
+            <a:chExt cx="799583" cy="3993063"/>
+          </a:xfrm>
+        </p:grpSpPr>
+        <p:pic>
+          <p:nvPicPr>
+            <p:cNvPr id="11" name="Picture 10"/>
+            <p:cNvPicPr>
+              <a:picLocks noChangeAspect="1"/>
+            </p:cNvPicPr>
+            <p:nvPr/>
+          </p:nvPicPr>
+          <p:blipFill>
+            <a:blip r:embed="rId5"/>
+            <a:stretch>
+              <a:fillRect/>
+            </a:stretch>
+          </p:blipFill>
+          <p:spPr>
+            <a:xfrm>
+              <a:off x="13403016" y="6742173"/>
+              <a:ext cx="791465" cy="1225428"/>
+            </a:xfrm>
+            <a:prstGeom prst="rect">
+              <a:avLst/>
+            </a:prstGeom>
+          </p:spPr>
+        </p:pic>
+        <p:pic>
+          <p:nvPicPr>
+            <p:cNvPr id="17" name="Picture 16"/>
+            <p:cNvPicPr>
+              <a:picLocks noChangeAspect="1"/>
+            </p:cNvPicPr>
+            <p:nvPr/>
+          </p:nvPicPr>
+          <p:blipFill>
+            <a:blip r:embed="rId5"/>
+            <a:stretch>
+              <a:fillRect/>
+            </a:stretch>
+          </p:blipFill>
+          <p:spPr>
+            <a:xfrm>
+              <a:off x="13403016" y="5809566"/>
+              <a:ext cx="791465" cy="1225428"/>
+            </a:xfrm>
+            <a:prstGeom prst="rect">
+              <a:avLst/>
+            </a:prstGeom>
+          </p:spPr>
+        </p:pic>
+        <p:pic>
+          <p:nvPicPr>
+            <p:cNvPr id="18" name="Picture 17"/>
+            <p:cNvPicPr>
+              <a:picLocks noChangeAspect="1"/>
+            </p:cNvPicPr>
+            <p:nvPr/>
+          </p:nvPicPr>
+          <p:blipFill>
+            <a:blip r:embed="rId5"/>
+            <a:stretch>
+              <a:fillRect/>
+            </a:stretch>
+          </p:blipFill>
+          <p:spPr>
+            <a:xfrm>
+              <a:off x="13394898" y="4907145"/>
+              <a:ext cx="791465" cy="1225428"/>
+            </a:xfrm>
+            <a:prstGeom prst="rect">
+              <a:avLst/>
+            </a:prstGeom>
+          </p:spPr>
+        </p:pic>
+        <p:pic>
+          <p:nvPicPr>
+            <p:cNvPr id="19" name="Picture 18"/>
+            <p:cNvPicPr>
+              <a:picLocks noChangeAspect="1"/>
+            </p:cNvPicPr>
+            <p:nvPr/>
+          </p:nvPicPr>
+          <p:blipFill>
+            <a:blip r:embed="rId5"/>
+            <a:stretch>
+              <a:fillRect/>
+            </a:stretch>
+          </p:blipFill>
+          <p:spPr>
+            <a:xfrm>
+              <a:off x="13394898" y="3974538"/>
+              <a:ext cx="791465" cy="1225428"/>
+            </a:xfrm>
+            <a:prstGeom prst="rect">
+              <a:avLst/>
+            </a:prstGeom>
+          </p:spPr>
+        </p:pic>
+      </p:grpSp>
     </p:spTree>
     <p:extLst>
       <p:ext uri="{BB962C8B-B14F-4D97-AF65-F5344CB8AC3E}">
@@ -7070,10 +8981,697 @@
       </p:transition>
     </mc:Fallback>
   </mc:AlternateContent>
+  <p:timing>
+    <p:tnLst>
+      <p:par>
+        <p:cTn id="1" dur="indefinite" restart="never" nodeType="tmRoot">
+          <p:childTnLst>
+            <p:seq concurrent="1" nextAc="seek">
+              <p:cTn id="2" dur="indefinite" nodeType="mainSeq">
+                <p:childTnLst>
+                  <p:par>
+                    <p:cTn id="3" fill="hold">
+                      <p:stCondLst>
+                        <p:cond delay="indefinite"/>
+                      </p:stCondLst>
+                      <p:childTnLst>
+                        <p:par>
+                          <p:cTn id="4" fill="hold">
+                            <p:stCondLst>
+                              <p:cond delay="0"/>
+                            </p:stCondLst>
+                            <p:childTnLst>
+                              <p:par>
+                                <p:cTn id="5" presetID="10" presetClass="entr" presetSubtype="0" fill="hold" grpId="0" nodeType="clickEffect">
+                                  <p:stCondLst>
+                                    <p:cond delay="0"/>
+                                  </p:stCondLst>
+                                  <p:childTnLst>
+                                    <p:set>
+                                      <p:cBhvr>
+                                        <p:cTn id="6" dur="1" fill="hold">
+                                          <p:stCondLst>
+                                            <p:cond delay="0"/>
+                                          </p:stCondLst>
+                                        </p:cTn>
+                                        <p:tgtEl>
+                                          <p:spTgt spid="5"/>
+                                        </p:tgtEl>
+                                        <p:attrNameLst>
+                                          <p:attrName>style.visibility</p:attrName>
+                                        </p:attrNameLst>
+                                      </p:cBhvr>
+                                      <p:to>
+                                        <p:strVal val="visible"/>
+                                      </p:to>
+                                    </p:set>
+                                    <p:animEffect transition="in" filter="fade">
+                                      <p:cBhvr>
+                                        <p:cTn id="7" dur="500"/>
+                                        <p:tgtEl>
+                                          <p:spTgt spid="5"/>
+                                        </p:tgtEl>
+                                      </p:cBhvr>
+                                    </p:animEffect>
+                                  </p:childTnLst>
+                                </p:cTn>
+                              </p:par>
+                              <p:par>
+                                <p:cTn id="8" presetID="10" presetClass="entr" presetSubtype="0" fill="hold" grpId="0" nodeType="withEffect">
+                                  <p:stCondLst>
+                                    <p:cond delay="0"/>
+                                  </p:stCondLst>
+                                  <p:childTnLst>
+                                    <p:set>
+                                      <p:cBhvr>
+                                        <p:cTn id="9" dur="1" fill="hold">
+                                          <p:stCondLst>
+                                            <p:cond delay="0"/>
+                                          </p:stCondLst>
+                                        </p:cTn>
+                                        <p:tgtEl>
+                                          <p:spTgt spid="6"/>
+                                        </p:tgtEl>
+                                        <p:attrNameLst>
+                                          <p:attrName>style.visibility</p:attrName>
+                                        </p:attrNameLst>
+                                      </p:cBhvr>
+                                      <p:to>
+                                        <p:strVal val="visible"/>
+                                      </p:to>
+                                    </p:set>
+                                    <p:animEffect transition="in" filter="fade">
+                                      <p:cBhvr>
+                                        <p:cTn id="10" dur="500"/>
+                                        <p:tgtEl>
+                                          <p:spTgt spid="6"/>
+                                        </p:tgtEl>
+                                      </p:cBhvr>
+                                    </p:animEffect>
+                                  </p:childTnLst>
+                                </p:cTn>
+                              </p:par>
+                              <p:par>
+                                <p:cTn id="11" presetID="10" presetClass="entr" presetSubtype="0" fill="hold" grpId="0" nodeType="withEffect">
+                                  <p:stCondLst>
+                                    <p:cond delay="0"/>
+                                  </p:stCondLst>
+                                  <p:childTnLst>
+                                    <p:set>
+                                      <p:cBhvr>
+                                        <p:cTn id="12" dur="1" fill="hold">
+                                          <p:stCondLst>
+                                            <p:cond delay="0"/>
+                                          </p:stCondLst>
+                                        </p:cTn>
+                                        <p:tgtEl>
+                                          <p:spTgt spid="9"/>
+                                        </p:tgtEl>
+                                        <p:attrNameLst>
+                                          <p:attrName>style.visibility</p:attrName>
+                                        </p:attrNameLst>
+                                      </p:cBhvr>
+                                      <p:to>
+                                        <p:strVal val="visible"/>
+                                      </p:to>
+                                    </p:set>
+                                    <p:animEffect transition="in" filter="fade">
+                                      <p:cBhvr>
+                                        <p:cTn id="13" dur="500"/>
+                                        <p:tgtEl>
+                                          <p:spTgt spid="9"/>
+                                        </p:tgtEl>
+                                      </p:cBhvr>
+                                    </p:animEffect>
+                                  </p:childTnLst>
+                                </p:cTn>
+                              </p:par>
+                              <p:par>
+                                <p:cTn id="14" presetID="10" presetClass="entr" presetSubtype="0" fill="hold" grpId="0" nodeType="withEffect">
+                                  <p:stCondLst>
+                                    <p:cond delay="0"/>
+                                  </p:stCondLst>
+                                  <p:childTnLst>
+                                    <p:set>
+                                      <p:cBhvr>
+                                        <p:cTn id="15" dur="1" fill="hold">
+                                          <p:stCondLst>
+                                            <p:cond delay="0"/>
+                                          </p:stCondLst>
+                                        </p:cTn>
+                                        <p:tgtEl>
+                                          <p:spTgt spid="10"/>
+                                        </p:tgtEl>
+                                        <p:attrNameLst>
+                                          <p:attrName>style.visibility</p:attrName>
+                                        </p:attrNameLst>
+                                      </p:cBhvr>
+                                      <p:to>
+                                        <p:strVal val="visible"/>
+                                      </p:to>
+                                    </p:set>
+                                    <p:animEffect transition="in" filter="fade">
+                                      <p:cBhvr>
+                                        <p:cTn id="16" dur="500"/>
+                                        <p:tgtEl>
+                                          <p:spTgt spid="10"/>
+                                        </p:tgtEl>
+                                      </p:cBhvr>
+                                    </p:animEffect>
+                                  </p:childTnLst>
+                                </p:cTn>
+                              </p:par>
+                            </p:childTnLst>
+                          </p:cTn>
+                        </p:par>
+                      </p:childTnLst>
+                    </p:cTn>
+                  </p:par>
+                  <p:par>
+                    <p:cTn id="17" fill="hold">
+                      <p:stCondLst>
+                        <p:cond delay="indefinite"/>
+                      </p:stCondLst>
+                      <p:childTnLst>
+                        <p:par>
+                          <p:cTn id="18" fill="hold">
+                            <p:stCondLst>
+                              <p:cond delay="0"/>
+                            </p:stCondLst>
+                            <p:childTnLst>
+                              <p:par>
+                                <p:cTn id="19" presetID="53" presetClass="entr" presetSubtype="16" fill="hold" nodeType="clickEffect">
+                                  <p:stCondLst>
+                                    <p:cond delay="0"/>
+                                  </p:stCondLst>
+                                  <p:childTnLst>
+                                    <p:set>
+                                      <p:cBhvr>
+                                        <p:cTn id="20" dur="1" fill="hold">
+                                          <p:stCondLst>
+                                            <p:cond delay="0"/>
+                                          </p:stCondLst>
+                                        </p:cTn>
+                                        <p:tgtEl>
+                                          <p:spTgt spid="4"/>
+                                        </p:tgtEl>
+                                        <p:attrNameLst>
+                                          <p:attrName>style.visibility</p:attrName>
+                                        </p:attrNameLst>
+                                      </p:cBhvr>
+                                      <p:to>
+                                        <p:strVal val="visible"/>
+                                      </p:to>
+                                    </p:set>
+                                    <p:anim calcmode="lin" valueType="num">
+                                      <p:cBhvr>
+                                        <p:cTn id="21" dur="500" fill="hold"/>
+                                        <p:tgtEl>
+                                          <p:spTgt spid="4"/>
+                                        </p:tgtEl>
+                                        <p:attrNameLst>
+                                          <p:attrName>ppt_w</p:attrName>
+                                        </p:attrNameLst>
+                                      </p:cBhvr>
+                                      <p:tavLst>
+                                        <p:tav tm="0">
+                                          <p:val>
+                                            <p:fltVal val="0"/>
+                                          </p:val>
+                                        </p:tav>
+                                        <p:tav tm="100000">
+                                          <p:val>
+                                            <p:strVal val="#ppt_w"/>
+                                          </p:val>
+                                        </p:tav>
+                                      </p:tavLst>
+                                    </p:anim>
+                                    <p:anim calcmode="lin" valueType="num">
+                                      <p:cBhvr>
+                                        <p:cTn id="22" dur="500" fill="hold"/>
+                                        <p:tgtEl>
+                                          <p:spTgt spid="4"/>
+                                        </p:tgtEl>
+                                        <p:attrNameLst>
+                                          <p:attrName>ppt_h</p:attrName>
+                                        </p:attrNameLst>
+                                      </p:cBhvr>
+                                      <p:tavLst>
+                                        <p:tav tm="0">
+                                          <p:val>
+                                            <p:fltVal val="0"/>
+                                          </p:val>
+                                        </p:tav>
+                                        <p:tav tm="100000">
+                                          <p:val>
+                                            <p:strVal val="#ppt_h"/>
+                                          </p:val>
+                                        </p:tav>
+                                      </p:tavLst>
+                                    </p:anim>
+                                    <p:animEffect transition="in" filter="fade">
+                                      <p:cBhvr>
+                                        <p:cTn id="23" dur="500"/>
+                                        <p:tgtEl>
+                                          <p:spTgt spid="4"/>
+                                        </p:tgtEl>
+                                      </p:cBhvr>
+                                    </p:animEffect>
+                                  </p:childTnLst>
+                                </p:cTn>
+                              </p:par>
+                            </p:childTnLst>
+                          </p:cTn>
+                        </p:par>
+                      </p:childTnLst>
+                    </p:cTn>
+                  </p:par>
+                  <p:par>
+                    <p:cTn id="24" fill="hold">
+                      <p:stCondLst>
+                        <p:cond delay="indefinite"/>
+                      </p:stCondLst>
+                      <p:childTnLst>
+                        <p:par>
+                          <p:cTn id="25" fill="hold">
+                            <p:stCondLst>
+                              <p:cond delay="0"/>
+                            </p:stCondLst>
+                            <p:childTnLst>
+                              <p:par>
+                                <p:cTn id="26" presetID="53" presetClass="entr" presetSubtype="16" fill="hold" nodeType="clickEffect">
+                                  <p:stCondLst>
+                                    <p:cond delay="0"/>
+                                  </p:stCondLst>
+                                  <p:childTnLst>
+                                    <p:set>
+                                      <p:cBhvr>
+                                        <p:cTn id="27" dur="1" fill="hold">
+                                          <p:stCondLst>
+                                            <p:cond delay="0"/>
+                                          </p:stCondLst>
+                                        </p:cTn>
+                                        <p:tgtEl>
+                                          <p:spTgt spid="12"/>
+                                        </p:tgtEl>
+                                        <p:attrNameLst>
+                                          <p:attrName>style.visibility</p:attrName>
+                                        </p:attrNameLst>
+                                      </p:cBhvr>
+                                      <p:to>
+                                        <p:strVal val="visible"/>
+                                      </p:to>
+                                    </p:set>
+                                    <p:anim calcmode="lin" valueType="num">
+                                      <p:cBhvr>
+                                        <p:cTn id="28" dur="500" fill="hold"/>
+                                        <p:tgtEl>
+                                          <p:spTgt spid="12"/>
+                                        </p:tgtEl>
+                                        <p:attrNameLst>
+                                          <p:attrName>ppt_w</p:attrName>
+                                        </p:attrNameLst>
+                                      </p:cBhvr>
+                                      <p:tavLst>
+                                        <p:tav tm="0">
+                                          <p:val>
+                                            <p:fltVal val="0"/>
+                                          </p:val>
+                                        </p:tav>
+                                        <p:tav tm="100000">
+                                          <p:val>
+                                            <p:strVal val="#ppt_w"/>
+                                          </p:val>
+                                        </p:tav>
+                                      </p:tavLst>
+                                    </p:anim>
+                                    <p:anim calcmode="lin" valueType="num">
+                                      <p:cBhvr>
+                                        <p:cTn id="29" dur="500" fill="hold"/>
+                                        <p:tgtEl>
+                                          <p:spTgt spid="12"/>
+                                        </p:tgtEl>
+                                        <p:attrNameLst>
+                                          <p:attrName>ppt_h</p:attrName>
+                                        </p:attrNameLst>
+                                      </p:cBhvr>
+                                      <p:tavLst>
+                                        <p:tav tm="0">
+                                          <p:val>
+                                            <p:fltVal val="0"/>
+                                          </p:val>
+                                        </p:tav>
+                                        <p:tav tm="100000">
+                                          <p:val>
+                                            <p:strVal val="#ppt_h"/>
+                                          </p:val>
+                                        </p:tav>
+                                      </p:tavLst>
+                                    </p:anim>
+                                    <p:animEffect transition="in" filter="fade">
+                                      <p:cBhvr>
+                                        <p:cTn id="30" dur="500"/>
+                                        <p:tgtEl>
+                                          <p:spTgt spid="12"/>
+                                        </p:tgtEl>
+                                      </p:cBhvr>
+                                    </p:animEffect>
+                                  </p:childTnLst>
+                                </p:cTn>
+                              </p:par>
+                            </p:childTnLst>
+                          </p:cTn>
+                        </p:par>
+                      </p:childTnLst>
+                    </p:cTn>
+                  </p:par>
+                  <p:par>
+                    <p:cTn id="31" fill="hold">
+                      <p:stCondLst>
+                        <p:cond delay="indefinite"/>
+                      </p:stCondLst>
+                      <p:childTnLst>
+                        <p:par>
+                          <p:cTn id="32" fill="hold">
+                            <p:stCondLst>
+                              <p:cond delay="0"/>
+                            </p:stCondLst>
+                            <p:childTnLst>
+                              <p:par>
+                                <p:cTn id="33" presetID="53" presetClass="entr" presetSubtype="16" fill="hold" nodeType="clickEffect">
+                                  <p:stCondLst>
+                                    <p:cond delay="0"/>
+                                  </p:stCondLst>
+                                  <p:childTnLst>
+                                    <p:set>
+                                      <p:cBhvr>
+                                        <p:cTn id="34" dur="1" fill="hold">
+                                          <p:stCondLst>
+                                            <p:cond delay="0"/>
+                                          </p:stCondLst>
+                                        </p:cTn>
+                                        <p:tgtEl>
+                                          <p:spTgt spid="13"/>
+                                        </p:tgtEl>
+                                        <p:attrNameLst>
+                                          <p:attrName>style.visibility</p:attrName>
+                                        </p:attrNameLst>
+                                      </p:cBhvr>
+                                      <p:to>
+                                        <p:strVal val="visible"/>
+                                      </p:to>
+                                    </p:set>
+                                    <p:anim calcmode="lin" valueType="num">
+                                      <p:cBhvr>
+                                        <p:cTn id="35" dur="500" fill="hold"/>
+                                        <p:tgtEl>
+                                          <p:spTgt spid="13"/>
+                                        </p:tgtEl>
+                                        <p:attrNameLst>
+                                          <p:attrName>ppt_w</p:attrName>
+                                        </p:attrNameLst>
+                                      </p:cBhvr>
+                                      <p:tavLst>
+                                        <p:tav tm="0">
+                                          <p:val>
+                                            <p:fltVal val="0"/>
+                                          </p:val>
+                                        </p:tav>
+                                        <p:tav tm="100000">
+                                          <p:val>
+                                            <p:strVal val="#ppt_w"/>
+                                          </p:val>
+                                        </p:tav>
+                                      </p:tavLst>
+                                    </p:anim>
+                                    <p:anim calcmode="lin" valueType="num">
+                                      <p:cBhvr>
+                                        <p:cTn id="36" dur="500" fill="hold"/>
+                                        <p:tgtEl>
+                                          <p:spTgt spid="13"/>
+                                        </p:tgtEl>
+                                        <p:attrNameLst>
+                                          <p:attrName>ppt_h</p:attrName>
+                                        </p:attrNameLst>
+                                      </p:cBhvr>
+                                      <p:tavLst>
+                                        <p:tav tm="0">
+                                          <p:val>
+                                            <p:fltVal val="0"/>
+                                          </p:val>
+                                        </p:tav>
+                                        <p:tav tm="100000">
+                                          <p:val>
+                                            <p:strVal val="#ppt_h"/>
+                                          </p:val>
+                                        </p:tav>
+                                      </p:tavLst>
+                                    </p:anim>
+                                    <p:animEffect transition="in" filter="fade">
+                                      <p:cBhvr>
+                                        <p:cTn id="37" dur="500"/>
+                                        <p:tgtEl>
+                                          <p:spTgt spid="13"/>
+                                        </p:tgtEl>
+                                      </p:cBhvr>
+                                    </p:animEffect>
+                                  </p:childTnLst>
+                                </p:cTn>
+                              </p:par>
+                            </p:childTnLst>
+                          </p:cTn>
+                        </p:par>
+                      </p:childTnLst>
+                    </p:cTn>
+                  </p:par>
+                  <p:par>
+                    <p:cTn id="38" fill="hold">
+                      <p:stCondLst>
+                        <p:cond delay="indefinite"/>
+                      </p:stCondLst>
+                      <p:childTnLst>
+                        <p:par>
+                          <p:cTn id="39" fill="hold">
+                            <p:stCondLst>
+                              <p:cond delay="0"/>
+                            </p:stCondLst>
+                            <p:childTnLst>
+                              <p:par>
+                                <p:cTn id="40" presetID="10" presetClass="entr" presetSubtype="0" fill="hold" nodeType="clickEffect">
+                                  <p:stCondLst>
+                                    <p:cond delay="0"/>
+                                  </p:stCondLst>
+                                  <p:childTnLst>
+                                    <p:set>
+                                      <p:cBhvr>
+                                        <p:cTn id="41" dur="1" fill="hold">
+                                          <p:stCondLst>
+                                            <p:cond delay="0"/>
+                                          </p:stCondLst>
+                                        </p:cTn>
+                                        <p:tgtEl>
+                                          <p:spTgt spid="15"/>
+                                        </p:tgtEl>
+                                        <p:attrNameLst>
+                                          <p:attrName>style.visibility</p:attrName>
+                                        </p:attrNameLst>
+                                      </p:cBhvr>
+                                      <p:to>
+                                        <p:strVal val="visible"/>
+                                      </p:to>
+                                    </p:set>
+                                    <p:animEffect transition="in" filter="fade">
+                                      <p:cBhvr>
+                                        <p:cTn id="42" dur="500"/>
+                                        <p:tgtEl>
+                                          <p:spTgt spid="15"/>
+                                        </p:tgtEl>
+                                      </p:cBhvr>
+                                    </p:animEffect>
+                                  </p:childTnLst>
+                                </p:cTn>
+                              </p:par>
+                            </p:childTnLst>
+                          </p:cTn>
+                        </p:par>
+                      </p:childTnLst>
+                    </p:cTn>
+                  </p:par>
+                </p:childTnLst>
+              </p:cTn>
+              <p:prevCondLst>
+                <p:cond evt="onPrev" delay="0">
+                  <p:tgtEl>
+                    <p:sldTgt/>
+                  </p:tgtEl>
+                </p:cond>
+              </p:prevCondLst>
+              <p:nextCondLst>
+                <p:cond evt="onNext" delay="0">
+                  <p:tgtEl>
+                    <p:sldTgt/>
+                  </p:tgtEl>
+                </p:cond>
+              </p:nextCondLst>
+            </p:seq>
+          </p:childTnLst>
+        </p:cTn>
+      </p:par>
+    </p:tnLst>
+    <p:bldLst>
+      <p:bldP spid="5" grpId="0" animBg="1"/>
+      <p:bldP spid="6" grpId="0" animBg="1"/>
+      <p:bldP spid="9" grpId="0" animBg="1"/>
+      <p:bldP spid="10" grpId="0" animBg="1"/>
+    </p:bldLst>
+  </p:timing>
 </p:sld>
 </file>
 
-<file path=ppt/slides/slide7.xml><?xml version="1.0" encoding="utf-8"?>
+<file path=ppt/slides/slide8.xml><?xml version="1.0" encoding="utf-8"?>
+<p:sld xmlns:a="http://schemas.openxmlformats.org/drawingml/2006/main" xmlns:r="http://schemas.openxmlformats.org/officeDocument/2006/relationships" xmlns:p="http://schemas.openxmlformats.org/presentationml/2006/main">
+  <p:cSld>
+    <p:spTree>
+      <p:nvGrpSpPr>
+        <p:cNvPr id="1" name=""/>
+        <p:cNvGrpSpPr/>
+        <p:nvPr/>
+      </p:nvGrpSpPr>
+      <p:grpSpPr>
+        <a:xfrm>
+          <a:off x="0" y="0"/>
+          <a:ext cx="0" cy="0"/>
+          <a:chOff x="0" y="0"/>
+          <a:chExt cx="0" cy="0"/>
+        </a:xfrm>
+      </p:grpSpPr>
+      <p:sp>
+        <p:nvSpPr>
+          <p:cNvPr id="16" name="TextBox 15"/>
+          <p:cNvSpPr txBox="1"/>
+          <p:nvPr/>
+        </p:nvSpPr>
+        <p:spPr>
+          <a:xfrm>
+            <a:off x="4040187" y="3925887"/>
+            <a:ext cx="9066928" cy="3139321"/>
+          </a:xfrm>
+          <a:prstGeom prst="rect">
+            <a:avLst/>
+          </a:prstGeom>
+          <a:noFill/>
+        </p:spPr>
+        <p:txBody>
+          <a:bodyPr wrap="square" rtlCol="0">
+            <a:spAutoFit/>
+          </a:bodyPr>
+          <a:lstStyle/>
+          <a:p>
+            <a:pPr algn="ctr"/>
+            <a:r>
+              <a:rPr lang="it-IT" sz="6600" dirty="0">
+                <a:solidFill>
+                  <a:srgbClr val="545250"/>
+                </a:solidFill>
+                <a:latin typeface="Novecento sans wide Book" pitchFamily="50" charset="-94"/>
+              </a:rPr>
+              <a:t>Lab example: Tight Coupling to Loose Coupling</a:t>
+            </a:r>
+            <a:endParaRPr lang="sr-Latn-RS" sz="6600" dirty="0">
+              <a:solidFill>
+                <a:srgbClr val="545250"/>
+              </a:solidFill>
+              <a:latin typeface="Novecento sans wide Book" pitchFamily="50" charset="-94"/>
+            </a:endParaRPr>
+          </a:p>
+        </p:txBody>
+      </p:sp>
+      <p:pic>
+        <p:nvPicPr>
+          <p:cNvPr id="8" name="Picture 7"/>
+          <p:cNvPicPr>
+            <a:picLocks noChangeAspect="1"/>
+          </p:cNvPicPr>
+          <p:nvPr/>
+        </p:nvPicPr>
+        <p:blipFill>
+          <a:blip r:embed="rId3">
+            <a:extLst>
+              <a:ext uri="{28A0092B-C50C-407E-A947-70E740481C1C}">
+                <a14:useLocalDpi xmlns:a14="http://schemas.microsoft.com/office/drawing/2010/main" val="0"/>
+              </a:ext>
+            </a:extLst>
+          </a:blip>
+          <a:stretch>
+            <a:fillRect/>
+          </a:stretch>
+        </p:blipFill>
+        <p:spPr>
+          <a:xfrm rot="5400000">
+            <a:off x="8454536" y="-2460908"/>
+            <a:ext cx="1168254" cy="9003175"/>
+          </a:xfrm>
+          <a:prstGeom prst="rect">
+            <a:avLst/>
+          </a:prstGeom>
+        </p:spPr>
+      </p:pic>
+      <p:pic>
+        <p:nvPicPr>
+          <p:cNvPr id="7" name="Picture 6"/>
+          <p:cNvPicPr>
+            <a:picLocks noChangeAspect="1"/>
+          </p:cNvPicPr>
+          <p:nvPr/>
+        </p:nvPicPr>
+        <p:blipFill>
+          <a:blip r:embed="rId4" cstate="print">
+            <a:extLst>
+              <a:ext uri="{28A0092B-C50C-407E-A947-70E740481C1C}">
+                <a14:useLocalDpi xmlns:a14="http://schemas.microsoft.com/office/drawing/2010/main" val="0"/>
+              </a:ext>
+            </a:extLst>
+          </a:blip>
+          <a:stretch>
+            <a:fillRect/>
+          </a:stretch>
+        </p:blipFill>
+        <p:spPr>
+          <a:xfrm>
+            <a:off x="13488987" y="9412287"/>
+            <a:ext cx="4572000" cy="646390"/>
+          </a:xfrm>
+          <a:prstGeom prst="rect">
+            <a:avLst/>
+          </a:prstGeom>
+        </p:spPr>
+      </p:pic>
+    </p:spTree>
+    <p:extLst>
+      <p:ext uri="{BB962C8B-B14F-4D97-AF65-F5344CB8AC3E}">
+        <p14:creationId xmlns:p14="http://schemas.microsoft.com/office/powerpoint/2010/main" val="2386714344"/>
+      </p:ext>
+    </p:extLst>
+  </p:cSld>
+  <p:clrMapOvr>
+    <a:masterClrMapping/>
+  </p:clrMapOvr>
+  <mc:AlternateContent xmlns:mc="http://schemas.openxmlformats.org/markup-compatibility/2006" xmlns:p14="http://schemas.microsoft.com/office/powerpoint/2010/main">
+    <mc:Choice Requires="p14">
+      <p:transition spd="med" p14:dur="700">
+        <p:fade/>
+      </p:transition>
+    </mc:Choice>
+    <mc:Fallback xmlns="">
+      <p:transition spd="med">
+        <p:fade/>
+      </p:transition>
+    </mc:Fallback>
+  </mc:AlternateContent>
+</p:sld>
+</file>
+
+<file path=ppt/slides/slide9.xml><?xml version="1.0" encoding="utf-8"?>
 <p:sld xmlns:a="http://schemas.openxmlformats.org/drawingml/2006/main" xmlns:r="http://schemas.openxmlformats.org/officeDocument/2006/relationships" xmlns:p="http://schemas.openxmlformats.org/presentationml/2006/main">
   <p:cSld>
     <p:spTree>
@@ -7565,425 +10163,6 @@
       </p:transition>
     </mc:Fallback>
   </mc:AlternateContent>
-</p:sld>
-</file>
-
-<file path=ppt/slides/slide8.xml><?xml version="1.0" encoding="utf-8"?>
-<p:sld xmlns:a="http://schemas.openxmlformats.org/drawingml/2006/main" xmlns:r="http://schemas.openxmlformats.org/officeDocument/2006/relationships" xmlns:p="http://schemas.openxmlformats.org/presentationml/2006/main">
-  <p:cSld>
-    <p:spTree>
-      <p:nvGrpSpPr>
-        <p:cNvPr id="1" name=""/>
-        <p:cNvGrpSpPr/>
-        <p:nvPr/>
-      </p:nvGrpSpPr>
-      <p:grpSpPr>
-        <a:xfrm>
-          <a:off x="0" y="0"/>
-          <a:ext cx="0" cy="0"/>
-          <a:chOff x="0" y="0"/>
-          <a:chExt cx="0" cy="0"/>
-        </a:xfrm>
-      </p:grpSpPr>
-      <p:sp>
-        <p:nvSpPr>
-          <p:cNvPr id="16" name="TextBox 15"/>
-          <p:cNvSpPr txBox="1"/>
-          <p:nvPr/>
-        </p:nvSpPr>
-        <p:spPr>
-          <a:xfrm>
-            <a:off x="4969123" y="854313"/>
-            <a:ext cx="8136904" cy="830997"/>
-          </a:xfrm>
-          <a:prstGeom prst="rect">
-            <a:avLst/>
-          </a:prstGeom>
-          <a:noFill/>
-        </p:spPr>
-        <p:txBody>
-          <a:bodyPr wrap="square" rtlCol="0">
-            <a:spAutoFit/>
-          </a:bodyPr>
-          <a:lstStyle/>
-          <a:p>
-            <a:pPr algn="ctr"/>
-            <a:r>
-              <a:rPr lang="sr-Latn-RS" sz="4800" dirty="0">
-                <a:solidFill>
-                  <a:srgbClr val="545250"/>
-                </a:solidFill>
-                <a:latin typeface="Novecento sans wide Book" pitchFamily="50" charset="-94"/>
-              </a:rPr>
-              <a:t>XY</a:t>
-            </a:r>
-            <a:endParaRPr lang="en-US" sz="4800" dirty="0">
-              <a:solidFill>
-                <a:srgbClr val="545250"/>
-              </a:solidFill>
-              <a:latin typeface="Novecento sans wide Book" pitchFamily="50" charset="-94"/>
-            </a:endParaRPr>
-          </a:p>
-        </p:txBody>
-      </p:sp>
-      <p:pic>
-        <p:nvPicPr>
-          <p:cNvPr id="8" name="Picture 7"/>
-          <p:cNvPicPr>
-            <a:picLocks noChangeAspect="1"/>
-          </p:cNvPicPr>
-          <p:nvPr/>
-        </p:nvPicPr>
-        <p:blipFill>
-          <a:blip r:embed="rId3">
-            <a:extLst>
-              <a:ext uri="{28A0092B-C50C-407E-A947-70E740481C1C}">
-                <a14:useLocalDpi xmlns:a14="http://schemas.microsoft.com/office/drawing/2010/main" val="0"/>
-              </a:ext>
-            </a:extLst>
-          </a:blip>
-          <a:stretch>
-            <a:fillRect/>
-          </a:stretch>
-        </p:blipFill>
-        <p:spPr>
-          <a:xfrm rot="5400000">
-            <a:off x="9100648" y="-2221597"/>
-            <a:ext cx="1168254" cy="9003175"/>
-          </a:xfrm>
-          <a:prstGeom prst="rect">
-            <a:avLst/>
-          </a:prstGeom>
-        </p:spPr>
-      </p:pic>
-      <p:pic>
-        <p:nvPicPr>
-          <p:cNvPr id="7" name="Picture 6"/>
-          <p:cNvPicPr>
-            <a:picLocks noChangeAspect="1"/>
-          </p:cNvPicPr>
-          <p:nvPr/>
-        </p:nvPicPr>
-        <p:blipFill>
-          <a:blip r:embed="rId4" cstate="print">
-            <a:extLst>
-              <a:ext uri="{28A0092B-C50C-407E-A947-70E740481C1C}">
-                <a14:useLocalDpi xmlns:a14="http://schemas.microsoft.com/office/drawing/2010/main" val="0"/>
-              </a:ext>
-            </a:extLst>
-          </a:blip>
-          <a:stretch>
-            <a:fillRect/>
-          </a:stretch>
-        </p:blipFill>
-        <p:spPr>
-          <a:xfrm>
-            <a:off x="13488987" y="9412287"/>
-            <a:ext cx="4572000" cy="646390"/>
-          </a:xfrm>
-          <a:prstGeom prst="rect">
-            <a:avLst/>
-          </a:prstGeom>
-        </p:spPr>
-      </p:pic>
-    </p:spTree>
-    <p:extLst>
-      <p:ext uri="{BB962C8B-B14F-4D97-AF65-F5344CB8AC3E}">
-        <p14:creationId xmlns:p14="http://schemas.microsoft.com/office/powerpoint/2010/main" val="2543101088"/>
-      </p:ext>
-    </p:extLst>
-  </p:cSld>
-  <p:clrMapOvr>
-    <a:masterClrMapping/>
-  </p:clrMapOvr>
-  <mc:AlternateContent xmlns:mc="http://schemas.openxmlformats.org/markup-compatibility/2006" xmlns:p14="http://schemas.microsoft.com/office/powerpoint/2010/main">
-    <mc:Choice Requires="p14">
-      <p:transition spd="med" p14:dur="700">
-        <p:fade/>
-      </p:transition>
-    </mc:Choice>
-    <mc:Fallback xmlns="">
-      <p:transition spd="med">
-        <p:fade/>
-      </p:transition>
-    </mc:Fallback>
-  </mc:AlternateContent>
-</p:sld>
-</file>
-
-<file path=ppt/slides/slide9.xml><?xml version="1.0" encoding="utf-8"?>
-<p:sld xmlns:a="http://schemas.openxmlformats.org/drawingml/2006/main" xmlns:r="http://schemas.openxmlformats.org/officeDocument/2006/relationships" xmlns:p="http://schemas.openxmlformats.org/presentationml/2006/main">
-  <p:cSld>
-    <p:spTree>
-      <p:nvGrpSpPr>
-        <p:cNvPr id="1" name=""/>
-        <p:cNvGrpSpPr/>
-        <p:nvPr/>
-      </p:nvGrpSpPr>
-      <p:grpSpPr>
-        <a:xfrm>
-          <a:off x="0" y="0"/>
-          <a:ext cx="0" cy="0"/>
-          <a:chOff x="0" y="0"/>
-          <a:chExt cx="0" cy="0"/>
-        </a:xfrm>
-      </p:grpSpPr>
-      <p:pic>
-        <p:nvPicPr>
-          <p:cNvPr id="7" name="Picture 6"/>
-          <p:cNvPicPr>
-            <a:picLocks noChangeAspect="1"/>
-          </p:cNvPicPr>
-          <p:nvPr/>
-        </p:nvPicPr>
-        <p:blipFill>
-          <a:blip r:embed="rId3">
-            <a:extLst>
-              <a:ext uri="{28A0092B-C50C-407E-A947-70E740481C1C}">
-                <a14:useLocalDpi xmlns:a14="http://schemas.microsoft.com/office/drawing/2010/main" val="0"/>
-              </a:ext>
-            </a:extLst>
-          </a:blip>
-          <a:stretch>
-            <a:fillRect/>
-          </a:stretch>
-        </p:blipFill>
-        <p:spPr>
-          <a:xfrm rot="5400000">
-            <a:off x="7936677" y="1487905"/>
-            <a:ext cx="2323284" cy="7295336"/>
-          </a:xfrm>
-          <a:prstGeom prst="rect">
-            <a:avLst/>
-          </a:prstGeom>
-        </p:spPr>
-      </p:pic>
-      <p:sp>
-        <p:nvSpPr>
-          <p:cNvPr id="16" name="TextBox 15"/>
-          <p:cNvSpPr txBox="1"/>
-          <p:nvPr/>
-        </p:nvSpPr>
-        <p:spPr>
-          <a:xfrm>
-            <a:off x="3754677" y="5528934"/>
-            <a:ext cx="10575486" cy="830997"/>
-          </a:xfrm>
-          <a:prstGeom prst="rect">
-            <a:avLst/>
-          </a:prstGeom>
-          <a:noFill/>
-        </p:spPr>
-        <p:txBody>
-          <a:bodyPr wrap="square" rtlCol="0">
-            <a:spAutoFit/>
-          </a:bodyPr>
-          <a:lstStyle/>
-          <a:p>
-            <a:pPr algn="ctr"/>
-            <a:r>
-              <a:rPr lang="en-US" sz="4800" dirty="0">
-                <a:solidFill>
-                  <a:srgbClr val="545250"/>
-                </a:solidFill>
-                <a:latin typeface="Novecento sans wide Book" pitchFamily="50" charset="-94"/>
-              </a:rPr>
-              <a:t>Thank you for your attention</a:t>
-            </a:r>
-            <a:endParaRPr lang="tr-TR" sz="4800" dirty="0">
-              <a:solidFill>
-                <a:srgbClr val="545250"/>
-              </a:solidFill>
-              <a:latin typeface="Novecento sans wide Book" pitchFamily="50" charset="-94"/>
-            </a:endParaRPr>
-          </a:p>
-        </p:txBody>
-      </p:sp>
-      <p:pic>
-        <p:nvPicPr>
-          <p:cNvPr id="6" name="Picture 5"/>
-          <p:cNvPicPr>
-            <a:picLocks noChangeAspect="1"/>
-          </p:cNvPicPr>
-          <p:nvPr/>
-        </p:nvPicPr>
-        <p:blipFill>
-          <a:blip r:embed="rId4" cstate="print">
-            <a:extLst>
-              <a:ext uri="{28A0092B-C50C-407E-A947-70E740481C1C}">
-                <a14:useLocalDpi xmlns:a14="http://schemas.microsoft.com/office/drawing/2010/main" val="0"/>
-              </a:ext>
-            </a:extLst>
-          </a:blip>
-          <a:stretch>
-            <a:fillRect/>
-          </a:stretch>
-        </p:blipFill>
-        <p:spPr>
-          <a:xfrm>
-            <a:off x="4116387" y="3416895"/>
-            <a:ext cx="10058400" cy="1422061"/>
-          </a:xfrm>
-          <a:prstGeom prst="rect">
-            <a:avLst/>
-          </a:prstGeom>
-        </p:spPr>
-      </p:pic>
-    </p:spTree>
-    <p:extLst>
-      <p:ext uri="{BB962C8B-B14F-4D97-AF65-F5344CB8AC3E}">
-        <p14:creationId xmlns:p14="http://schemas.microsoft.com/office/powerpoint/2010/main" val="1325838218"/>
-      </p:ext>
-    </p:extLst>
-  </p:cSld>
-  <p:clrMapOvr>
-    <a:masterClrMapping/>
-  </p:clrMapOvr>
-  <mc:AlternateContent xmlns:mc="http://schemas.openxmlformats.org/markup-compatibility/2006" xmlns:p14="http://schemas.microsoft.com/office/powerpoint/2010/main">
-    <mc:Choice Requires="p14">
-      <p:transition spd="med" p14:dur="700">
-        <p:fade/>
-      </p:transition>
-    </mc:Choice>
-    <mc:Fallback xmlns="">
-      <p:transition spd="med">
-        <p:fade/>
-      </p:transition>
-    </mc:Fallback>
-  </mc:AlternateContent>
-  <p:timing>
-    <p:tnLst>
-      <p:par>
-        <p:cTn id="1" dur="indefinite" restart="never" nodeType="tmRoot">
-          <p:childTnLst>
-            <p:seq concurrent="1" nextAc="seek">
-              <p:cTn id="2" dur="indefinite" nodeType="mainSeq">
-                <p:childTnLst>
-                  <p:par>
-                    <p:cTn id="3" fill="hold">
-                      <p:stCondLst>
-                        <p:cond delay="indefinite"/>
-                        <p:cond evt="onBegin" delay="0">
-                          <p:tn val="2"/>
-                        </p:cond>
-                      </p:stCondLst>
-                      <p:childTnLst>
-                        <p:par>
-                          <p:cTn id="4" fill="hold">
-                            <p:stCondLst>
-                              <p:cond delay="0"/>
-                            </p:stCondLst>
-                            <p:childTnLst>
-                              <p:par>
-                                <p:cTn id="5" presetID="10" presetClass="entr" presetSubtype="0" fill="hold" nodeType="afterEffect">
-                                  <p:stCondLst>
-                                    <p:cond delay="0"/>
-                                  </p:stCondLst>
-                                  <p:childTnLst>
-                                    <p:set>
-                                      <p:cBhvr>
-                                        <p:cTn id="6" dur="1" fill="hold">
-                                          <p:stCondLst>
-                                            <p:cond delay="0"/>
-                                          </p:stCondLst>
-                                        </p:cTn>
-                                        <p:tgtEl>
-                                          <p:spTgt spid="7"/>
-                                        </p:tgtEl>
-                                        <p:attrNameLst>
-                                          <p:attrName>style.visibility</p:attrName>
-                                        </p:attrNameLst>
-                                      </p:cBhvr>
-                                      <p:to>
-                                        <p:strVal val="visible"/>
-                                      </p:to>
-                                    </p:set>
-                                    <p:animEffect transition="in" filter="fade">
-                                      <p:cBhvr>
-                                        <p:cTn id="7" dur="500"/>
-                                        <p:tgtEl>
-                                          <p:spTgt spid="7"/>
-                                        </p:tgtEl>
-                                      </p:cBhvr>
-                                    </p:animEffect>
-                                  </p:childTnLst>
-                                </p:cTn>
-                              </p:par>
-                            </p:childTnLst>
-                          </p:cTn>
-                        </p:par>
-                        <p:par>
-                          <p:cTn id="8" fill="hold">
-                            <p:stCondLst>
-                              <p:cond delay="500"/>
-                            </p:stCondLst>
-                            <p:childTnLst>
-                              <p:par>
-                                <p:cTn id="9" presetID="10" presetClass="entr" presetSubtype="0" fill="hold" grpId="0" nodeType="afterEffect">
-                                  <p:stCondLst>
-                                    <p:cond delay="0"/>
-                                  </p:stCondLst>
-                                  <p:childTnLst>
-                                    <p:set>
-                                      <p:cBhvr>
-                                        <p:cTn id="10" dur="1" fill="hold">
-                                          <p:stCondLst>
-                                            <p:cond delay="0"/>
-                                          </p:stCondLst>
-                                        </p:cTn>
-                                        <p:tgtEl>
-                                          <p:spTgt spid="16"/>
-                                        </p:tgtEl>
-                                        <p:attrNameLst>
-                                          <p:attrName>style.visibility</p:attrName>
-                                        </p:attrNameLst>
-                                      </p:cBhvr>
-                                      <p:to>
-                                        <p:strVal val="visible"/>
-                                      </p:to>
-                                    </p:set>
-                                    <p:animEffect transition="in" filter="fade">
-                                      <p:cBhvr>
-                                        <p:cTn id="11" dur="500"/>
-                                        <p:tgtEl>
-                                          <p:spTgt spid="16"/>
-                                        </p:tgtEl>
-                                      </p:cBhvr>
-                                    </p:animEffect>
-                                  </p:childTnLst>
-                                </p:cTn>
-                              </p:par>
-                            </p:childTnLst>
-                          </p:cTn>
-                        </p:par>
-                      </p:childTnLst>
-                    </p:cTn>
-                  </p:par>
-                </p:childTnLst>
-              </p:cTn>
-              <p:prevCondLst>
-                <p:cond evt="onPrev" delay="0">
-                  <p:tgtEl>
-                    <p:sldTgt/>
-                  </p:tgtEl>
-                </p:cond>
-              </p:prevCondLst>
-              <p:nextCondLst>
-                <p:cond evt="onNext" delay="0">
-                  <p:tgtEl>
-                    <p:sldTgt/>
-                  </p:tgtEl>
-                </p:cond>
-              </p:nextCondLst>
-            </p:seq>
-          </p:childTnLst>
-        </p:cTn>
-      </p:par>
-    </p:tnLst>
-    <p:bldLst>
-      <p:bldP spid="16" grpId="0"/>
-    </p:bldLst>
-  </p:timing>
 </p:sld>
 </file>
 

</xml_diff>

<commit_message>
Relationship between the collaborators slide
</commit_message>
<xml_diff>
--- a/DI Course.pptx
+++ b/DI Course.pptx
@@ -15,9 +15,9 @@
     <p:sldId id="326" r:id="rId3"/>
     <p:sldId id="337" r:id="rId4"/>
     <p:sldId id="338" r:id="rId5"/>
-    <p:sldId id="344" r:id="rId6"/>
-    <p:sldId id="345" r:id="rId7"/>
-    <p:sldId id="339" r:id="rId8"/>
+    <p:sldId id="345" r:id="rId6"/>
+    <p:sldId id="339" r:id="rId7"/>
+    <p:sldId id="346" r:id="rId8"/>
     <p:sldId id="342" r:id="rId9"/>
     <p:sldId id="341" r:id="rId10"/>
     <p:sldId id="343" r:id="rId11"/>
@@ -1441,7 +1441,7 @@
     </p:spTree>
     <p:extLst>
       <p:ext uri="{BB962C8B-B14F-4D97-AF65-F5344CB8AC3E}">
-        <p14:creationId xmlns:p14="http://schemas.microsoft.com/office/powerpoint/2010/main" val="2650053537"/>
+        <p14:creationId xmlns:p14="http://schemas.microsoft.com/office/powerpoint/2010/main" val="84193633"/>
       </p:ext>
     </p:extLst>
   </p:cSld>
@@ -1526,7 +1526,7 @@
     </p:spTree>
     <p:extLst>
       <p:ext uri="{BB962C8B-B14F-4D97-AF65-F5344CB8AC3E}">
-        <p14:creationId xmlns:p14="http://schemas.microsoft.com/office/powerpoint/2010/main" val="84193633"/>
+        <p14:creationId xmlns:p14="http://schemas.microsoft.com/office/powerpoint/2010/main" val="53900278"/>
       </p:ext>
     </p:extLst>
   </p:cSld>
@@ -1611,7 +1611,7 @@
     </p:spTree>
     <p:extLst>
       <p:ext uri="{BB962C8B-B14F-4D97-AF65-F5344CB8AC3E}">
-        <p14:creationId xmlns:p14="http://schemas.microsoft.com/office/powerpoint/2010/main" val="53900278"/>
+        <p14:creationId xmlns:p14="http://schemas.microsoft.com/office/powerpoint/2010/main" val="1248298809"/>
       </p:ext>
     </p:extLst>
   </p:cSld>
@@ -8189,7 +8189,7 @@
 </file>
 
 <file path=ppt/slides/slide5.xml><?xml version="1.0" encoding="utf-8"?>
-<p:sld xmlns:a="http://schemas.openxmlformats.org/drawingml/2006/main" xmlns:r="http://schemas.openxmlformats.org/officeDocument/2006/relationships" xmlns:p="http://schemas.openxmlformats.org/presentationml/2006/main" show="0">
+<p:sld xmlns:a="http://schemas.openxmlformats.org/drawingml/2006/main" xmlns:r="http://schemas.openxmlformats.org/officeDocument/2006/relationships" xmlns:p="http://schemas.openxmlformats.org/presentationml/2006/main">
   <p:cSld>
     <p:spTree>
       <p:nvGrpSpPr>
@@ -8594,696 +8594,6 @@
         </p:nvSpPr>
         <p:spPr>
           <a:xfrm>
-            <a:off x="12822238" y="3885702"/>
-            <a:ext cx="3908442" cy="1077218"/>
-          </a:xfrm>
-          <a:prstGeom prst="rect">
-            <a:avLst/>
-          </a:prstGeom>
-          <a:noFill/>
-        </p:spPr>
-        <p:txBody>
-          <a:bodyPr wrap="none" rtlCol="0">
-            <a:spAutoFit/>
-          </a:bodyPr>
-          <a:lstStyle/>
-          <a:p>
-            <a:r>
-              <a:rPr lang="sr-Latn-RS" dirty="0"/>
-              <a:t>LISKOV SUBSTITUTION</a:t>
-            </a:r>
-            <a:endParaRPr lang="en-US" dirty="0"/>
-          </a:p>
-          <a:p>
-            <a:pPr algn="ctr"/>
-            <a:r>
-              <a:rPr lang="sr-Latn-RS" dirty="0"/>
-              <a:t> PRINCIPLE</a:t>
-            </a:r>
-          </a:p>
-        </p:txBody>
-      </p:sp>
-      <p:sp>
-        <p:nvSpPr>
-          <p:cNvPr id="26" name="Rectangle 25"/>
-          <p:cNvSpPr/>
-          <p:nvPr/>
-        </p:nvSpPr>
-        <p:spPr>
-          <a:xfrm>
-            <a:off x="8543956" y="6595439"/>
-            <a:ext cx="381000" cy="2286000"/>
-          </a:xfrm>
-          <a:prstGeom prst="rect">
-            <a:avLst/>
-          </a:prstGeom>
-        </p:spPr>
-        <p:style>
-          <a:lnRef idx="2">
-            <a:schemeClr val="accent1">
-              <a:shade val="50000"/>
-            </a:schemeClr>
-          </a:lnRef>
-          <a:fillRef idx="1">
-            <a:schemeClr val="accent1"/>
-          </a:fillRef>
-          <a:effectRef idx="0">
-            <a:schemeClr val="accent1"/>
-          </a:effectRef>
-          <a:fontRef idx="minor">
-            <a:schemeClr val="lt1"/>
-          </a:fontRef>
-        </p:style>
-        <p:txBody>
-          <a:bodyPr rtlCol="0" anchor="ctr"/>
-          <a:lstStyle/>
-          <a:p>
-            <a:pPr algn="ctr"/>
-            <a:endParaRPr lang="sr-Latn-RS"/>
-          </a:p>
-        </p:txBody>
-      </p:sp>
-      <p:sp>
-        <p:nvSpPr>
-          <p:cNvPr id="27" name="Rectangle: Top Corners Rounded 26"/>
-          <p:cNvSpPr/>
-          <p:nvPr/>
-        </p:nvSpPr>
-        <p:spPr>
-          <a:xfrm rot="5400000">
-            <a:off x="8848756" y="7547939"/>
-            <a:ext cx="533400" cy="381000"/>
-          </a:xfrm>
-          <a:prstGeom prst="round2SameRect">
-            <a:avLst/>
-          </a:prstGeom>
-        </p:spPr>
-        <p:style>
-          <a:lnRef idx="2">
-            <a:schemeClr val="accent3">
-              <a:shade val="50000"/>
-            </a:schemeClr>
-          </a:lnRef>
-          <a:fillRef idx="1">
-            <a:schemeClr val="accent3"/>
-          </a:fillRef>
-          <a:effectRef idx="0">
-            <a:schemeClr val="accent3"/>
-          </a:effectRef>
-          <a:fontRef idx="minor">
-            <a:schemeClr val="lt1"/>
-          </a:fontRef>
-        </p:style>
-        <p:txBody>
-          <a:bodyPr rtlCol="0" anchor="ctr"/>
-          <a:lstStyle/>
-          <a:p>
-            <a:pPr algn="ctr"/>
-            <a:endParaRPr lang="sr-Latn-RS"/>
-          </a:p>
-        </p:txBody>
-      </p:sp>
-      <p:sp>
-        <p:nvSpPr>
-          <p:cNvPr id="21" name="Rectangle 20"/>
-          <p:cNvSpPr/>
-          <p:nvPr/>
-        </p:nvSpPr>
-        <p:spPr>
-          <a:xfrm>
-            <a:off x="9660962" y="7293558"/>
-            <a:ext cx="1349344" cy="889762"/>
-          </a:xfrm>
-          <a:prstGeom prst="rect">
-            <a:avLst/>
-          </a:prstGeom>
-        </p:spPr>
-        <p:style>
-          <a:lnRef idx="2">
-            <a:schemeClr val="accent1">
-              <a:shade val="50000"/>
-            </a:schemeClr>
-          </a:lnRef>
-          <a:fillRef idx="1">
-            <a:schemeClr val="accent1"/>
-          </a:fillRef>
-          <a:effectRef idx="0">
-            <a:schemeClr val="accent1"/>
-          </a:effectRef>
-          <a:fontRef idx="minor">
-            <a:schemeClr val="lt1"/>
-          </a:fontRef>
-        </p:style>
-        <p:txBody>
-          <a:bodyPr rtlCol="0" anchor="ctr"/>
-          <a:lstStyle/>
-          <a:p>
-            <a:pPr algn="ctr"/>
-            <a:r>
-              <a:rPr lang="en-US" sz="2800" dirty="0"/>
-              <a:t>Adapter</a:t>
-            </a:r>
-            <a:endParaRPr lang="sr-Latn-RS" sz="2800" dirty="0"/>
-          </a:p>
-        </p:txBody>
-      </p:sp>
-      <p:pic>
-        <p:nvPicPr>
-          <p:cNvPr id="1036" name="Picture 12" descr="device-mobile-phone-icon.png (1024×1024)"/>
-          <p:cNvPicPr>
-            <a:picLocks noChangeAspect="1" noChangeArrowheads="1"/>
-          </p:cNvPicPr>
-          <p:nvPr/>
-        </p:nvPicPr>
-        <p:blipFill>
-          <a:blip r:embed="rId8" cstate="print">
-            <a:extLst>
-              <a:ext uri="{28A0092B-C50C-407E-A947-70E740481C1C}">
-                <a14:useLocalDpi xmlns:a14="http://schemas.microsoft.com/office/drawing/2010/main" val="0"/>
-              </a:ext>
-            </a:extLst>
-          </a:blip>
-          <a:srcRect/>
-          <a:stretch>
-            <a:fillRect/>
-          </a:stretch>
-        </p:blipFill>
-        <p:spPr bwMode="auto">
-          <a:xfrm>
-            <a:off x="11365312" y="7222813"/>
-            <a:ext cx="1031251" cy="1031251"/>
-          </a:xfrm>
-          <a:prstGeom prst="rect">
-            <a:avLst/>
-          </a:prstGeom>
-          <a:noFill/>
-          <a:extLst>
-            <a:ext uri="{909E8E84-426E-40DD-AFC4-6F175D3DCCD1}">
-              <a14:hiddenFill xmlns:a14="http://schemas.microsoft.com/office/drawing/2010/main">
-                <a:solidFill>
-                  <a:srgbClr val="FFFFFF"/>
-                </a:solidFill>
-              </a14:hiddenFill>
-            </a:ext>
-          </a:extLst>
-        </p:spPr>
-      </p:pic>
-      <p:cxnSp>
-        <p:nvCxnSpPr>
-          <p:cNvPr id="23" name="Straight Connector 22"/>
-          <p:cNvCxnSpPr>
-            <a:stCxn id="27" idx="3"/>
-            <a:endCxn id="21" idx="1"/>
-          </p:cNvCxnSpPr>
-          <p:nvPr/>
-        </p:nvCxnSpPr>
-        <p:spPr>
-          <a:xfrm>
-            <a:off x="9305956" y="7738439"/>
-            <a:ext cx="355006" cy="0"/>
-          </a:xfrm>
-          <a:prstGeom prst="line">
-            <a:avLst/>
-          </a:prstGeom>
-        </p:spPr>
-        <p:style>
-          <a:lnRef idx="1">
-            <a:schemeClr val="accent6"/>
-          </a:lnRef>
-          <a:fillRef idx="0">
-            <a:schemeClr val="accent6"/>
-          </a:fillRef>
-          <a:effectRef idx="0">
-            <a:schemeClr val="accent6"/>
-          </a:effectRef>
-          <a:fontRef idx="minor">
-            <a:schemeClr val="tx1"/>
-          </a:fontRef>
-        </p:style>
-      </p:cxnSp>
-      <p:cxnSp>
-        <p:nvCxnSpPr>
-          <p:cNvPr id="25" name="Straight Connector 24"/>
-          <p:cNvCxnSpPr>
-            <a:stCxn id="21" idx="3"/>
-          </p:cNvCxnSpPr>
-          <p:nvPr/>
-        </p:nvCxnSpPr>
-        <p:spPr>
-          <a:xfrm flipV="1">
-            <a:off x="11010306" y="7738438"/>
-            <a:ext cx="626895" cy="1"/>
-          </a:xfrm>
-          <a:prstGeom prst="line">
-            <a:avLst/>
-          </a:prstGeom>
-        </p:spPr>
-        <p:style>
-          <a:lnRef idx="1">
-            <a:schemeClr val="accent6"/>
-          </a:lnRef>
-          <a:fillRef idx="0">
-            <a:schemeClr val="accent6"/>
-          </a:fillRef>
-          <a:effectRef idx="0">
-            <a:schemeClr val="accent6"/>
-          </a:effectRef>
-          <a:fontRef idx="minor">
-            <a:schemeClr val="tx1"/>
-          </a:fontRef>
-        </p:style>
-      </p:cxnSp>
-    </p:spTree>
-    <p:extLst>
-      <p:ext uri="{BB962C8B-B14F-4D97-AF65-F5344CB8AC3E}">
-        <p14:creationId xmlns:p14="http://schemas.microsoft.com/office/powerpoint/2010/main" val="453038125"/>
-      </p:ext>
-    </p:extLst>
-  </p:cSld>
-  <p:clrMapOvr>
-    <a:masterClrMapping/>
-  </p:clrMapOvr>
-  <mc:AlternateContent xmlns:mc="http://schemas.openxmlformats.org/markup-compatibility/2006">
-    <mc:Choice xmlns:p14="http://schemas.microsoft.com/office/powerpoint/2010/main" Requires="p14">
-      <p:transition spd="med" p14:dur="700">
-        <p:fade/>
-      </p:transition>
-    </mc:Choice>
-    <mc:Fallback>
-      <p:transition spd="med">
-        <p:fade/>
-      </p:transition>
-    </mc:Fallback>
-  </mc:AlternateContent>
-</p:sld>
-</file>
-
-<file path=ppt/slides/slide6.xml><?xml version="1.0" encoding="utf-8"?>
-<p:sld xmlns:a="http://schemas.openxmlformats.org/drawingml/2006/main" xmlns:r="http://schemas.openxmlformats.org/officeDocument/2006/relationships" xmlns:p="http://schemas.openxmlformats.org/presentationml/2006/main">
-  <p:cSld>
-    <p:spTree>
-      <p:nvGrpSpPr>
-        <p:cNvPr id="1" name=""/>
-        <p:cNvGrpSpPr/>
-        <p:nvPr/>
-      </p:nvGrpSpPr>
-      <p:grpSpPr>
-        <a:xfrm>
-          <a:off x="0" y="0"/>
-          <a:ext cx="0" cy="0"/>
-          <a:chOff x="0" y="0"/>
-          <a:chExt cx="0" cy="0"/>
-        </a:xfrm>
-      </p:grpSpPr>
-      <p:sp>
-        <p:nvSpPr>
-          <p:cNvPr id="16" name="TextBox 15"/>
-          <p:cNvSpPr txBox="1"/>
-          <p:nvPr/>
-        </p:nvSpPr>
-        <p:spPr>
-          <a:xfrm>
-            <a:off x="5234343" y="882782"/>
-            <a:ext cx="8900864" cy="830997"/>
-          </a:xfrm>
-          <a:prstGeom prst="rect">
-            <a:avLst/>
-          </a:prstGeom>
-          <a:noFill/>
-        </p:spPr>
-        <p:txBody>
-          <a:bodyPr wrap="square" rtlCol="0">
-            <a:spAutoFit/>
-          </a:bodyPr>
-          <a:lstStyle/>
-          <a:p>
-            <a:pPr algn="ctr"/>
-            <a:r>
-              <a:rPr lang="en-US" sz="4800" dirty="0">
-                <a:solidFill>
-                  <a:srgbClr val="545250"/>
-                </a:solidFill>
-                <a:latin typeface="Novecento sans wide Book" pitchFamily="50" charset="-94"/>
-              </a:rPr>
-              <a:t>Understanding the purpose of DI </a:t>
-            </a:r>
-          </a:p>
-        </p:txBody>
-      </p:sp>
-      <p:pic>
-        <p:nvPicPr>
-          <p:cNvPr id="8" name="Picture 7"/>
-          <p:cNvPicPr>
-            <a:picLocks noChangeAspect="1"/>
-          </p:cNvPicPr>
-          <p:nvPr/>
-        </p:nvPicPr>
-        <p:blipFill>
-          <a:blip r:embed="rId3">
-            <a:extLst>
-              <a:ext uri="{28A0092B-C50C-407E-A947-70E740481C1C}">
-                <a14:useLocalDpi xmlns:a14="http://schemas.microsoft.com/office/drawing/2010/main" val="0"/>
-              </a:ext>
-            </a:extLst>
-          </a:blip>
-          <a:stretch>
-            <a:fillRect/>
-          </a:stretch>
-        </p:blipFill>
-        <p:spPr>
-          <a:xfrm rot="5400000">
-            <a:off x="9100648" y="-2221597"/>
-            <a:ext cx="1168254" cy="9003175"/>
-          </a:xfrm>
-          <a:prstGeom prst="rect">
-            <a:avLst/>
-          </a:prstGeom>
-        </p:spPr>
-      </p:pic>
-      <p:pic>
-        <p:nvPicPr>
-          <p:cNvPr id="7" name="Picture 6"/>
-          <p:cNvPicPr>
-            <a:picLocks noChangeAspect="1"/>
-          </p:cNvPicPr>
-          <p:nvPr/>
-        </p:nvPicPr>
-        <p:blipFill>
-          <a:blip r:embed="rId4" cstate="print">
-            <a:extLst>
-              <a:ext uri="{28A0092B-C50C-407E-A947-70E740481C1C}">
-                <a14:useLocalDpi xmlns:a14="http://schemas.microsoft.com/office/drawing/2010/main" val="0"/>
-              </a:ext>
-            </a:extLst>
-          </a:blip>
-          <a:stretch>
-            <a:fillRect/>
-          </a:stretch>
-        </p:blipFill>
-        <p:spPr>
-          <a:xfrm>
-            <a:off x="13488987" y="9412287"/>
-            <a:ext cx="4572000" cy="646390"/>
-          </a:xfrm>
-          <a:prstGeom prst="rect">
-            <a:avLst/>
-          </a:prstGeom>
-        </p:spPr>
-      </p:pic>
-      <p:pic>
-        <p:nvPicPr>
-          <p:cNvPr id="3" name="Picture 2"/>
-          <p:cNvPicPr>
-            <a:picLocks noChangeAspect="1"/>
-          </p:cNvPicPr>
-          <p:nvPr/>
-        </p:nvPicPr>
-        <p:blipFill>
-          <a:blip r:embed="rId5">
-            <a:extLst>
-              <a:ext uri="{28A0092B-C50C-407E-A947-70E740481C1C}">
-                <a14:useLocalDpi xmlns:a14="http://schemas.microsoft.com/office/drawing/2010/main" val="0"/>
-              </a:ext>
-            </a:extLst>
-          </a:blip>
-          <a:stretch>
-            <a:fillRect/>
-          </a:stretch>
-        </p:blipFill>
-        <p:spPr>
-          <a:xfrm>
-            <a:off x="1277937" y="3059112"/>
-            <a:ext cx="4648200" cy="3486150"/>
-          </a:xfrm>
-          <a:prstGeom prst="rect">
-            <a:avLst/>
-          </a:prstGeom>
-        </p:spPr>
-      </p:pic>
-      <p:sp>
-        <p:nvSpPr>
-          <p:cNvPr id="4" name="TextBox 3"/>
-          <p:cNvSpPr txBox="1"/>
-          <p:nvPr/>
-        </p:nvSpPr>
-        <p:spPr>
-          <a:xfrm>
-            <a:off x="2382055" y="7035177"/>
-            <a:ext cx="2439963" cy="646331"/>
-          </a:xfrm>
-          <a:prstGeom prst="rect">
-            <a:avLst/>
-          </a:prstGeom>
-          <a:noFill/>
-        </p:spPr>
-        <p:txBody>
-          <a:bodyPr wrap="none" rtlCol="0">
-            <a:spAutoFit/>
-          </a:bodyPr>
-          <a:lstStyle/>
-          <a:p>
-            <a:r>
-              <a:rPr lang="en-US" sz="3600" dirty="0"/>
-              <a:t>Cheap hotel</a:t>
-            </a:r>
-            <a:endParaRPr lang="sr-Latn-RS" sz="3600" dirty="0"/>
-          </a:p>
-        </p:txBody>
-      </p:sp>
-      <p:sp>
-        <p:nvSpPr>
-          <p:cNvPr id="5" name="Rectangle 4"/>
-          <p:cNvSpPr/>
-          <p:nvPr/>
-        </p:nvSpPr>
-        <p:spPr>
-          <a:xfrm>
-            <a:off x="8535987" y="3281311"/>
-            <a:ext cx="381000" cy="2286000"/>
-          </a:xfrm>
-          <a:prstGeom prst="rect">
-            <a:avLst/>
-          </a:prstGeom>
-        </p:spPr>
-        <p:style>
-          <a:lnRef idx="2">
-            <a:schemeClr val="accent1">
-              <a:shade val="50000"/>
-            </a:schemeClr>
-          </a:lnRef>
-          <a:fillRef idx="1">
-            <a:schemeClr val="accent1"/>
-          </a:fillRef>
-          <a:effectRef idx="0">
-            <a:schemeClr val="accent1"/>
-          </a:effectRef>
-          <a:fontRef idx="minor">
-            <a:schemeClr val="lt1"/>
-          </a:fontRef>
-        </p:style>
-        <p:txBody>
-          <a:bodyPr rtlCol="0" anchor="ctr"/>
-          <a:lstStyle/>
-          <a:p>
-            <a:pPr algn="ctr"/>
-            <a:endParaRPr lang="sr-Latn-RS"/>
-          </a:p>
-        </p:txBody>
-      </p:sp>
-      <p:sp>
-        <p:nvSpPr>
-          <p:cNvPr id="6" name="Rectangle: Top Corners Rounded 5"/>
-          <p:cNvSpPr/>
-          <p:nvPr/>
-        </p:nvSpPr>
-        <p:spPr>
-          <a:xfrm rot="5400000">
-            <a:off x="8840787" y="4233811"/>
-            <a:ext cx="533400" cy="381000"/>
-          </a:xfrm>
-          <a:prstGeom prst="round2SameRect">
-            <a:avLst/>
-          </a:prstGeom>
-        </p:spPr>
-        <p:style>
-          <a:lnRef idx="2">
-            <a:schemeClr val="accent3">
-              <a:shade val="50000"/>
-            </a:schemeClr>
-          </a:lnRef>
-          <a:fillRef idx="1">
-            <a:schemeClr val="accent3"/>
-          </a:fillRef>
-          <a:effectRef idx="0">
-            <a:schemeClr val="accent3"/>
-          </a:effectRef>
-          <a:fontRef idx="minor">
-            <a:schemeClr val="lt1"/>
-          </a:fontRef>
-        </p:style>
-        <p:txBody>
-          <a:bodyPr rtlCol="0" anchor="ctr"/>
-          <a:lstStyle/>
-          <a:p>
-            <a:pPr algn="ctr"/>
-            <a:endParaRPr lang="sr-Latn-RS"/>
-          </a:p>
-        </p:txBody>
-      </p:sp>
-      <p:pic>
-        <p:nvPicPr>
-          <p:cNvPr id="1030" name="Picture 6" descr="http://megaicons.net/static/img/icons_sizes/8/178/512/hair-stuff-hair-dryer-icon.png"/>
-          <p:cNvPicPr>
-            <a:picLocks noChangeAspect="1" noChangeArrowheads="1"/>
-          </p:cNvPicPr>
-          <p:nvPr/>
-        </p:nvPicPr>
-        <p:blipFill>
-          <a:blip r:embed="rId6" cstate="print">
-            <a:extLst>
-              <a:ext uri="{28A0092B-C50C-407E-A947-70E740481C1C}">
-                <a14:useLocalDpi xmlns:a14="http://schemas.microsoft.com/office/drawing/2010/main" val="0"/>
-              </a:ext>
-            </a:extLst>
-          </a:blip>
-          <a:srcRect/>
-          <a:stretch>
-            <a:fillRect/>
-          </a:stretch>
-        </p:blipFill>
-        <p:spPr bwMode="auto">
-          <a:xfrm>
-            <a:off x="10494200" y="4424311"/>
-            <a:ext cx="1143001" cy="1143001"/>
-          </a:xfrm>
-          <a:prstGeom prst="rect">
-            <a:avLst/>
-          </a:prstGeom>
-          <a:noFill/>
-          <a:extLst>
-            <a:ext uri="{909E8E84-426E-40DD-AFC4-6F175D3DCCD1}">
-              <a14:hiddenFill xmlns:a14="http://schemas.microsoft.com/office/drawing/2010/main">
-                <a:solidFill>
-                  <a:srgbClr val="FFFFFF"/>
-                </a:solidFill>
-              </a14:hiddenFill>
-            </a:ext>
-          </a:extLst>
-        </p:spPr>
-      </p:pic>
-      <p:cxnSp>
-        <p:nvCxnSpPr>
-          <p:cNvPr id="17" name="Straight Connector 16"/>
-          <p:cNvCxnSpPr>
-            <a:stCxn id="6" idx="0"/>
-          </p:cNvCxnSpPr>
-          <p:nvPr/>
-        </p:nvCxnSpPr>
-        <p:spPr>
-          <a:xfrm>
-            <a:off x="9107487" y="4691011"/>
-            <a:ext cx="1562100" cy="764515"/>
-          </a:xfrm>
-          <a:prstGeom prst="line">
-            <a:avLst/>
-          </a:prstGeom>
-        </p:spPr>
-        <p:style>
-          <a:lnRef idx="1">
-            <a:schemeClr val="accent1"/>
-          </a:lnRef>
-          <a:fillRef idx="0">
-            <a:schemeClr val="accent1"/>
-          </a:fillRef>
-          <a:effectRef idx="0">
-            <a:schemeClr val="accent1"/>
-          </a:effectRef>
-          <a:fontRef idx="minor">
-            <a:schemeClr val="tx1"/>
-          </a:fontRef>
-        </p:style>
-      </p:cxnSp>
-      <p:pic>
-        <p:nvPicPr>
-          <p:cNvPr id="1034" name="Picture 10" descr="11949906841863687126socket.svg.med.png (300×292)"/>
-          <p:cNvPicPr>
-            <a:picLocks noChangeAspect="1" noChangeArrowheads="1"/>
-          </p:cNvPicPr>
-          <p:nvPr/>
-        </p:nvPicPr>
-        <p:blipFill>
-          <a:blip r:embed="rId7" cstate="print">
-            <a:extLst>
-              <a:ext uri="{28A0092B-C50C-407E-A947-70E740481C1C}">
-                <a14:useLocalDpi xmlns:a14="http://schemas.microsoft.com/office/drawing/2010/main" val="0"/>
-              </a:ext>
-            </a:extLst>
-          </a:blip>
-          <a:srcRect/>
-          <a:stretch>
-            <a:fillRect/>
-          </a:stretch>
-        </p:blipFill>
-        <p:spPr bwMode="auto">
-          <a:xfrm>
-            <a:off x="10212387" y="2864118"/>
-            <a:ext cx="1223138" cy="1190521"/>
-          </a:xfrm>
-          <a:prstGeom prst="rect">
-            <a:avLst/>
-          </a:prstGeom>
-          <a:noFill/>
-          <a:extLst>
-            <a:ext uri="{909E8E84-426E-40DD-AFC4-6F175D3DCCD1}">
-              <a14:hiddenFill xmlns:a14="http://schemas.microsoft.com/office/drawing/2010/main">
-                <a:solidFill>
-                  <a:srgbClr val="FFFFFF"/>
-                </a:solidFill>
-              </a14:hiddenFill>
-            </a:ext>
-          </a:extLst>
-        </p:spPr>
-      </p:pic>
-      <p:cxnSp>
-        <p:nvCxnSpPr>
-          <p:cNvPr id="19" name="Straight Connector 18"/>
-          <p:cNvCxnSpPr>
-            <a:endCxn id="6" idx="2"/>
-          </p:cNvCxnSpPr>
-          <p:nvPr/>
-        </p:nvCxnSpPr>
-        <p:spPr>
-          <a:xfrm flipH="1">
-            <a:off x="9107487" y="3566023"/>
-            <a:ext cx="1386713" cy="591588"/>
-          </a:xfrm>
-          <a:prstGeom prst="line">
-            <a:avLst/>
-          </a:prstGeom>
-        </p:spPr>
-        <p:style>
-          <a:lnRef idx="1">
-            <a:schemeClr val="accent1"/>
-          </a:lnRef>
-          <a:fillRef idx="0">
-            <a:schemeClr val="accent1"/>
-          </a:fillRef>
-          <a:effectRef idx="0">
-            <a:schemeClr val="accent1"/>
-          </a:effectRef>
-          <a:fontRef idx="minor">
-            <a:schemeClr val="tx1"/>
-          </a:fontRef>
-        </p:style>
-      </p:cxnSp>
-      <p:sp>
-        <p:nvSpPr>
-          <p:cNvPr id="20" name="TextBox 19"/>
-          <p:cNvSpPr txBox="1"/>
-          <p:nvPr/>
-        </p:nvSpPr>
-        <p:spPr>
-          <a:xfrm>
             <a:off x="13375720" y="3885702"/>
             <a:ext cx="4368312" cy="1200329"/>
           </a:xfrm>
@@ -9630,10 +8940,712 @@
       </p:transition>
     </mc:Fallback>
   </mc:AlternateContent>
+  <p:timing>
+    <p:tnLst>
+      <p:par>
+        <p:cTn id="1" dur="indefinite" restart="never" nodeType="tmRoot">
+          <p:childTnLst>
+            <p:seq concurrent="1" nextAc="seek">
+              <p:cTn id="2" dur="indefinite" nodeType="mainSeq">
+                <p:childTnLst>
+                  <p:par>
+                    <p:cTn id="3" fill="hold">
+                      <p:stCondLst>
+                        <p:cond delay="indefinite"/>
+                        <p:cond evt="onBegin" delay="0">
+                          <p:tn val="2"/>
+                        </p:cond>
+                      </p:stCondLst>
+                      <p:childTnLst>
+                        <p:par>
+                          <p:cTn id="4" fill="hold">
+                            <p:stCondLst>
+                              <p:cond delay="0"/>
+                            </p:stCondLst>
+                            <p:childTnLst>
+                              <p:par>
+                                <p:cTn id="5" presetID="10" presetClass="entr" presetSubtype="0" fill="hold" nodeType="afterEffect">
+                                  <p:stCondLst>
+                                    <p:cond delay="0"/>
+                                  </p:stCondLst>
+                                  <p:childTnLst>
+                                    <p:set>
+                                      <p:cBhvr>
+                                        <p:cTn id="6" dur="1" fill="hold">
+                                          <p:stCondLst>
+                                            <p:cond delay="0"/>
+                                          </p:stCondLst>
+                                        </p:cTn>
+                                        <p:tgtEl>
+                                          <p:spTgt spid="3"/>
+                                        </p:tgtEl>
+                                        <p:attrNameLst>
+                                          <p:attrName>style.visibility</p:attrName>
+                                        </p:attrNameLst>
+                                      </p:cBhvr>
+                                      <p:to>
+                                        <p:strVal val="visible"/>
+                                      </p:to>
+                                    </p:set>
+                                    <p:animEffect transition="in" filter="fade">
+                                      <p:cBhvr>
+                                        <p:cTn id="7" dur="500"/>
+                                        <p:tgtEl>
+                                          <p:spTgt spid="3"/>
+                                        </p:tgtEl>
+                                      </p:cBhvr>
+                                    </p:animEffect>
+                                  </p:childTnLst>
+                                </p:cTn>
+                              </p:par>
+                            </p:childTnLst>
+                          </p:cTn>
+                        </p:par>
+                        <p:par>
+                          <p:cTn id="8" fill="hold">
+                            <p:stCondLst>
+                              <p:cond delay="500"/>
+                            </p:stCondLst>
+                            <p:childTnLst>
+                              <p:par>
+                                <p:cTn id="9" presetID="10" presetClass="entr" presetSubtype="0" fill="hold" grpId="0" nodeType="afterEffect">
+                                  <p:stCondLst>
+                                    <p:cond delay="0"/>
+                                  </p:stCondLst>
+                                  <p:childTnLst>
+                                    <p:set>
+                                      <p:cBhvr>
+                                        <p:cTn id="10" dur="1" fill="hold">
+                                          <p:stCondLst>
+                                            <p:cond delay="0"/>
+                                          </p:stCondLst>
+                                        </p:cTn>
+                                        <p:tgtEl>
+                                          <p:spTgt spid="4"/>
+                                        </p:tgtEl>
+                                        <p:attrNameLst>
+                                          <p:attrName>style.visibility</p:attrName>
+                                        </p:attrNameLst>
+                                      </p:cBhvr>
+                                      <p:to>
+                                        <p:strVal val="visible"/>
+                                      </p:to>
+                                    </p:set>
+                                    <p:animEffect transition="in" filter="fade">
+                                      <p:cBhvr>
+                                        <p:cTn id="11" dur="500"/>
+                                        <p:tgtEl>
+                                          <p:spTgt spid="4"/>
+                                        </p:tgtEl>
+                                      </p:cBhvr>
+                                    </p:animEffect>
+                                  </p:childTnLst>
+                                </p:cTn>
+                              </p:par>
+                            </p:childTnLst>
+                          </p:cTn>
+                        </p:par>
+                      </p:childTnLst>
+                    </p:cTn>
+                  </p:par>
+                  <p:par>
+                    <p:cTn id="12" fill="hold">
+                      <p:stCondLst>
+                        <p:cond delay="indefinite"/>
+                      </p:stCondLst>
+                      <p:childTnLst>
+                        <p:par>
+                          <p:cTn id="13" fill="hold">
+                            <p:stCondLst>
+                              <p:cond delay="0"/>
+                            </p:stCondLst>
+                            <p:childTnLst>
+                              <p:par>
+                                <p:cTn id="14" presetID="10" presetClass="entr" presetSubtype="0" fill="hold" grpId="0" nodeType="clickEffect">
+                                  <p:stCondLst>
+                                    <p:cond delay="0"/>
+                                  </p:stCondLst>
+                                  <p:childTnLst>
+                                    <p:set>
+                                      <p:cBhvr>
+                                        <p:cTn id="15" dur="1" fill="hold">
+                                          <p:stCondLst>
+                                            <p:cond delay="0"/>
+                                          </p:stCondLst>
+                                        </p:cTn>
+                                        <p:tgtEl>
+                                          <p:spTgt spid="5"/>
+                                        </p:tgtEl>
+                                        <p:attrNameLst>
+                                          <p:attrName>style.visibility</p:attrName>
+                                        </p:attrNameLst>
+                                      </p:cBhvr>
+                                      <p:to>
+                                        <p:strVal val="visible"/>
+                                      </p:to>
+                                    </p:set>
+                                    <p:animEffect transition="in" filter="fade">
+                                      <p:cBhvr>
+                                        <p:cTn id="16" dur="500"/>
+                                        <p:tgtEl>
+                                          <p:spTgt spid="5"/>
+                                        </p:tgtEl>
+                                      </p:cBhvr>
+                                    </p:animEffect>
+                                  </p:childTnLst>
+                                </p:cTn>
+                              </p:par>
+                              <p:par>
+                                <p:cTn id="17" presetID="10" presetClass="entr" presetSubtype="0" fill="hold" grpId="0" nodeType="withEffect">
+                                  <p:stCondLst>
+                                    <p:cond delay="0"/>
+                                  </p:stCondLst>
+                                  <p:childTnLst>
+                                    <p:set>
+                                      <p:cBhvr>
+                                        <p:cTn id="18" dur="1" fill="hold">
+                                          <p:stCondLst>
+                                            <p:cond delay="0"/>
+                                          </p:stCondLst>
+                                        </p:cTn>
+                                        <p:tgtEl>
+                                          <p:spTgt spid="6"/>
+                                        </p:tgtEl>
+                                        <p:attrNameLst>
+                                          <p:attrName>style.visibility</p:attrName>
+                                        </p:attrNameLst>
+                                      </p:cBhvr>
+                                      <p:to>
+                                        <p:strVal val="visible"/>
+                                      </p:to>
+                                    </p:set>
+                                    <p:animEffect transition="in" filter="fade">
+                                      <p:cBhvr>
+                                        <p:cTn id="19" dur="500"/>
+                                        <p:tgtEl>
+                                          <p:spTgt spid="6"/>
+                                        </p:tgtEl>
+                                      </p:cBhvr>
+                                    </p:animEffect>
+                                  </p:childTnLst>
+                                </p:cTn>
+                              </p:par>
+                              <p:par>
+                                <p:cTn id="20" presetID="10" presetClass="entr" presetSubtype="0" fill="hold" nodeType="withEffect">
+                                  <p:stCondLst>
+                                    <p:cond delay="0"/>
+                                  </p:stCondLst>
+                                  <p:childTnLst>
+                                    <p:set>
+                                      <p:cBhvr>
+                                        <p:cTn id="21" dur="1" fill="hold">
+                                          <p:stCondLst>
+                                            <p:cond delay="0"/>
+                                          </p:stCondLst>
+                                        </p:cTn>
+                                        <p:tgtEl>
+                                          <p:spTgt spid="1030"/>
+                                        </p:tgtEl>
+                                        <p:attrNameLst>
+                                          <p:attrName>style.visibility</p:attrName>
+                                        </p:attrNameLst>
+                                      </p:cBhvr>
+                                      <p:to>
+                                        <p:strVal val="visible"/>
+                                      </p:to>
+                                    </p:set>
+                                    <p:animEffect transition="in" filter="fade">
+                                      <p:cBhvr>
+                                        <p:cTn id="22" dur="500"/>
+                                        <p:tgtEl>
+                                          <p:spTgt spid="1030"/>
+                                        </p:tgtEl>
+                                      </p:cBhvr>
+                                    </p:animEffect>
+                                  </p:childTnLst>
+                                </p:cTn>
+                              </p:par>
+                              <p:par>
+                                <p:cTn id="23" presetID="10" presetClass="entr" presetSubtype="0" fill="hold" nodeType="withEffect">
+                                  <p:stCondLst>
+                                    <p:cond delay="0"/>
+                                  </p:stCondLst>
+                                  <p:childTnLst>
+                                    <p:set>
+                                      <p:cBhvr>
+                                        <p:cTn id="24" dur="1" fill="hold">
+                                          <p:stCondLst>
+                                            <p:cond delay="0"/>
+                                          </p:stCondLst>
+                                        </p:cTn>
+                                        <p:tgtEl>
+                                          <p:spTgt spid="17"/>
+                                        </p:tgtEl>
+                                        <p:attrNameLst>
+                                          <p:attrName>style.visibility</p:attrName>
+                                        </p:attrNameLst>
+                                      </p:cBhvr>
+                                      <p:to>
+                                        <p:strVal val="visible"/>
+                                      </p:to>
+                                    </p:set>
+                                    <p:animEffect transition="in" filter="fade">
+                                      <p:cBhvr>
+                                        <p:cTn id="25" dur="500"/>
+                                        <p:tgtEl>
+                                          <p:spTgt spid="17"/>
+                                        </p:tgtEl>
+                                      </p:cBhvr>
+                                    </p:animEffect>
+                                  </p:childTnLst>
+                                </p:cTn>
+                              </p:par>
+                              <p:par>
+                                <p:cTn id="26" presetID="10" presetClass="entr" presetSubtype="0" fill="hold" nodeType="withEffect">
+                                  <p:stCondLst>
+                                    <p:cond delay="0"/>
+                                  </p:stCondLst>
+                                  <p:childTnLst>
+                                    <p:set>
+                                      <p:cBhvr>
+                                        <p:cTn id="27" dur="1" fill="hold">
+                                          <p:stCondLst>
+                                            <p:cond delay="0"/>
+                                          </p:stCondLst>
+                                        </p:cTn>
+                                        <p:tgtEl>
+                                          <p:spTgt spid="1034"/>
+                                        </p:tgtEl>
+                                        <p:attrNameLst>
+                                          <p:attrName>style.visibility</p:attrName>
+                                        </p:attrNameLst>
+                                      </p:cBhvr>
+                                      <p:to>
+                                        <p:strVal val="visible"/>
+                                      </p:to>
+                                    </p:set>
+                                    <p:animEffect transition="in" filter="fade">
+                                      <p:cBhvr>
+                                        <p:cTn id="28" dur="500"/>
+                                        <p:tgtEl>
+                                          <p:spTgt spid="1034"/>
+                                        </p:tgtEl>
+                                      </p:cBhvr>
+                                    </p:animEffect>
+                                  </p:childTnLst>
+                                </p:cTn>
+                              </p:par>
+                              <p:par>
+                                <p:cTn id="29" presetID="10" presetClass="entr" presetSubtype="0" fill="hold" nodeType="withEffect">
+                                  <p:stCondLst>
+                                    <p:cond delay="0"/>
+                                  </p:stCondLst>
+                                  <p:childTnLst>
+                                    <p:set>
+                                      <p:cBhvr>
+                                        <p:cTn id="30" dur="1" fill="hold">
+                                          <p:stCondLst>
+                                            <p:cond delay="0"/>
+                                          </p:stCondLst>
+                                        </p:cTn>
+                                        <p:tgtEl>
+                                          <p:spTgt spid="19"/>
+                                        </p:tgtEl>
+                                        <p:attrNameLst>
+                                          <p:attrName>style.visibility</p:attrName>
+                                        </p:attrNameLst>
+                                      </p:cBhvr>
+                                      <p:to>
+                                        <p:strVal val="visible"/>
+                                      </p:to>
+                                    </p:set>
+                                    <p:animEffect transition="in" filter="fade">
+                                      <p:cBhvr>
+                                        <p:cTn id="31" dur="500"/>
+                                        <p:tgtEl>
+                                          <p:spTgt spid="19"/>
+                                        </p:tgtEl>
+                                      </p:cBhvr>
+                                    </p:animEffect>
+                                  </p:childTnLst>
+                                </p:cTn>
+                              </p:par>
+                              <p:par>
+                                <p:cTn id="32" presetID="10" presetClass="entr" presetSubtype="0" fill="hold" grpId="0" nodeType="withEffect">
+                                  <p:stCondLst>
+                                    <p:cond delay="0"/>
+                                  </p:stCondLst>
+                                  <p:childTnLst>
+                                    <p:set>
+                                      <p:cBhvr>
+                                        <p:cTn id="33" dur="1" fill="hold">
+                                          <p:stCondLst>
+                                            <p:cond delay="0"/>
+                                          </p:stCondLst>
+                                        </p:cTn>
+                                        <p:tgtEl>
+                                          <p:spTgt spid="20"/>
+                                        </p:tgtEl>
+                                        <p:attrNameLst>
+                                          <p:attrName>style.visibility</p:attrName>
+                                        </p:attrNameLst>
+                                      </p:cBhvr>
+                                      <p:to>
+                                        <p:strVal val="visible"/>
+                                      </p:to>
+                                    </p:set>
+                                    <p:animEffect transition="in" filter="fade">
+                                      <p:cBhvr>
+                                        <p:cTn id="34" dur="500"/>
+                                        <p:tgtEl>
+                                          <p:spTgt spid="20"/>
+                                        </p:tgtEl>
+                                      </p:cBhvr>
+                                    </p:animEffect>
+                                  </p:childTnLst>
+                                </p:cTn>
+                              </p:par>
+                            </p:childTnLst>
+                          </p:cTn>
+                        </p:par>
+                      </p:childTnLst>
+                    </p:cTn>
+                  </p:par>
+                  <p:par>
+                    <p:cTn id="35" fill="hold">
+                      <p:stCondLst>
+                        <p:cond delay="indefinite"/>
+                      </p:stCondLst>
+                      <p:childTnLst>
+                        <p:par>
+                          <p:cTn id="36" fill="hold">
+                            <p:stCondLst>
+                              <p:cond delay="0"/>
+                            </p:stCondLst>
+                            <p:childTnLst>
+                              <p:par>
+                                <p:cTn id="37" presetID="10" presetClass="entr" presetSubtype="0" fill="hold" grpId="0" nodeType="clickEffect">
+                                  <p:stCondLst>
+                                    <p:cond delay="0"/>
+                                  </p:stCondLst>
+                                  <p:childTnLst>
+                                    <p:set>
+                                      <p:cBhvr>
+                                        <p:cTn id="38" dur="1" fill="hold">
+                                          <p:stCondLst>
+                                            <p:cond delay="0"/>
+                                          </p:stCondLst>
+                                        </p:cTn>
+                                        <p:tgtEl>
+                                          <p:spTgt spid="26"/>
+                                        </p:tgtEl>
+                                        <p:attrNameLst>
+                                          <p:attrName>style.visibility</p:attrName>
+                                        </p:attrNameLst>
+                                      </p:cBhvr>
+                                      <p:to>
+                                        <p:strVal val="visible"/>
+                                      </p:to>
+                                    </p:set>
+                                    <p:animEffect transition="in" filter="fade">
+                                      <p:cBhvr>
+                                        <p:cTn id="39" dur="500"/>
+                                        <p:tgtEl>
+                                          <p:spTgt spid="26"/>
+                                        </p:tgtEl>
+                                      </p:cBhvr>
+                                    </p:animEffect>
+                                  </p:childTnLst>
+                                </p:cTn>
+                              </p:par>
+                              <p:par>
+                                <p:cTn id="40" presetID="10" presetClass="entr" presetSubtype="0" fill="hold" grpId="0" nodeType="withEffect">
+                                  <p:stCondLst>
+                                    <p:cond delay="0"/>
+                                  </p:stCondLst>
+                                  <p:childTnLst>
+                                    <p:set>
+                                      <p:cBhvr>
+                                        <p:cTn id="41" dur="1" fill="hold">
+                                          <p:stCondLst>
+                                            <p:cond delay="0"/>
+                                          </p:stCondLst>
+                                        </p:cTn>
+                                        <p:tgtEl>
+                                          <p:spTgt spid="27"/>
+                                        </p:tgtEl>
+                                        <p:attrNameLst>
+                                          <p:attrName>style.visibility</p:attrName>
+                                        </p:attrNameLst>
+                                      </p:cBhvr>
+                                      <p:to>
+                                        <p:strVal val="visible"/>
+                                      </p:to>
+                                    </p:set>
+                                    <p:animEffect transition="in" filter="fade">
+                                      <p:cBhvr>
+                                        <p:cTn id="42" dur="500"/>
+                                        <p:tgtEl>
+                                          <p:spTgt spid="27"/>
+                                        </p:tgtEl>
+                                      </p:cBhvr>
+                                    </p:animEffect>
+                                  </p:childTnLst>
+                                </p:cTn>
+                              </p:par>
+                              <p:par>
+                                <p:cTn id="43" presetID="10" presetClass="entr" presetSubtype="0" fill="hold" grpId="0" nodeType="withEffect">
+                                  <p:stCondLst>
+                                    <p:cond delay="0"/>
+                                  </p:stCondLst>
+                                  <p:childTnLst>
+                                    <p:set>
+                                      <p:cBhvr>
+                                        <p:cTn id="44" dur="1" fill="hold">
+                                          <p:stCondLst>
+                                            <p:cond delay="0"/>
+                                          </p:stCondLst>
+                                        </p:cTn>
+                                        <p:tgtEl>
+                                          <p:spTgt spid="21"/>
+                                        </p:tgtEl>
+                                        <p:attrNameLst>
+                                          <p:attrName>style.visibility</p:attrName>
+                                        </p:attrNameLst>
+                                      </p:cBhvr>
+                                      <p:to>
+                                        <p:strVal val="visible"/>
+                                      </p:to>
+                                    </p:set>
+                                    <p:animEffect transition="in" filter="fade">
+                                      <p:cBhvr>
+                                        <p:cTn id="45" dur="500"/>
+                                        <p:tgtEl>
+                                          <p:spTgt spid="21"/>
+                                        </p:tgtEl>
+                                      </p:cBhvr>
+                                    </p:animEffect>
+                                  </p:childTnLst>
+                                </p:cTn>
+                              </p:par>
+                              <p:par>
+                                <p:cTn id="46" presetID="10" presetClass="entr" presetSubtype="0" fill="hold" nodeType="withEffect">
+                                  <p:stCondLst>
+                                    <p:cond delay="0"/>
+                                  </p:stCondLst>
+                                  <p:childTnLst>
+                                    <p:set>
+                                      <p:cBhvr>
+                                        <p:cTn id="47" dur="1" fill="hold">
+                                          <p:stCondLst>
+                                            <p:cond delay="0"/>
+                                          </p:stCondLst>
+                                        </p:cTn>
+                                        <p:tgtEl>
+                                          <p:spTgt spid="23"/>
+                                        </p:tgtEl>
+                                        <p:attrNameLst>
+                                          <p:attrName>style.visibility</p:attrName>
+                                        </p:attrNameLst>
+                                      </p:cBhvr>
+                                      <p:to>
+                                        <p:strVal val="visible"/>
+                                      </p:to>
+                                    </p:set>
+                                    <p:animEffect transition="in" filter="fade">
+                                      <p:cBhvr>
+                                        <p:cTn id="48" dur="500"/>
+                                        <p:tgtEl>
+                                          <p:spTgt spid="23"/>
+                                        </p:tgtEl>
+                                      </p:cBhvr>
+                                    </p:animEffect>
+                                  </p:childTnLst>
+                                </p:cTn>
+                              </p:par>
+                              <p:par>
+                                <p:cTn id="49" presetID="10" presetClass="entr" presetSubtype="0" fill="hold" nodeType="withEffect">
+                                  <p:stCondLst>
+                                    <p:cond delay="0"/>
+                                  </p:stCondLst>
+                                  <p:childTnLst>
+                                    <p:set>
+                                      <p:cBhvr>
+                                        <p:cTn id="50" dur="1" fill="hold">
+                                          <p:stCondLst>
+                                            <p:cond delay="0"/>
+                                          </p:stCondLst>
+                                        </p:cTn>
+                                        <p:tgtEl>
+                                          <p:spTgt spid="11"/>
+                                        </p:tgtEl>
+                                        <p:attrNameLst>
+                                          <p:attrName>style.visibility</p:attrName>
+                                        </p:attrNameLst>
+                                      </p:cBhvr>
+                                      <p:to>
+                                        <p:strVal val="visible"/>
+                                      </p:to>
+                                    </p:set>
+                                    <p:animEffect transition="in" filter="fade">
+                                      <p:cBhvr>
+                                        <p:cTn id="51" dur="500"/>
+                                        <p:tgtEl>
+                                          <p:spTgt spid="11"/>
+                                        </p:tgtEl>
+                                      </p:cBhvr>
+                                    </p:animEffect>
+                                  </p:childTnLst>
+                                </p:cTn>
+                              </p:par>
+                              <p:par>
+                                <p:cTn id="52" presetID="10" presetClass="entr" presetSubtype="0" fill="hold" nodeType="withEffect">
+                                  <p:stCondLst>
+                                    <p:cond delay="0"/>
+                                  </p:stCondLst>
+                                  <p:childTnLst>
+                                    <p:set>
+                                      <p:cBhvr>
+                                        <p:cTn id="53" dur="1" fill="hold">
+                                          <p:stCondLst>
+                                            <p:cond delay="0"/>
+                                          </p:stCondLst>
+                                        </p:cTn>
+                                        <p:tgtEl>
+                                          <p:spTgt spid="28"/>
+                                        </p:tgtEl>
+                                        <p:attrNameLst>
+                                          <p:attrName>style.visibility</p:attrName>
+                                        </p:attrNameLst>
+                                      </p:cBhvr>
+                                      <p:to>
+                                        <p:strVal val="visible"/>
+                                      </p:to>
+                                    </p:set>
+                                    <p:animEffect transition="in" filter="fade">
+                                      <p:cBhvr>
+                                        <p:cTn id="54" dur="500"/>
+                                        <p:tgtEl>
+                                          <p:spTgt spid="28"/>
+                                        </p:tgtEl>
+                                      </p:cBhvr>
+                                    </p:animEffect>
+                                  </p:childTnLst>
+                                </p:cTn>
+                              </p:par>
+                              <p:par>
+                                <p:cTn id="55" presetID="10" presetClass="entr" presetSubtype="0" fill="hold" grpId="0" nodeType="withEffect">
+                                  <p:stCondLst>
+                                    <p:cond delay="0"/>
+                                  </p:stCondLst>
+                                  <p:childTnLst>
+                                    <p:set>
+                                      <p:cBhvr>
+                                        <p:cTn id="56" dur="1" fill="hold">
+                                          <p:stCondLst>
+                                            <p:cond delay="0"/>
+                                          </p:stCondLst>
+                                        </p:cTn>
+                                        <p:tgtEl>
+                                          <p:spTgt spid="33"/>
+                                        </p:tgtEl>
+                                        <p:attrNameLst>
+                                          <p:attrName>style.visibility</p:attrName>
+                                        </p:attrNameLst>
+                                      </p:cBhvr>
+                                      <p:to>
+                                        <p:strVal val="visible"/>
+                                      </p:to>
+                                    </p:set>
+                                    <p:animEffect transition="in" filter="fade">
+                                      <p:cBhvr>
+                                        <p:cTn id="57" dur="500"/>
+                                        <p:tgtEl>
+                                          <p:spTgt spid="33"/>
+                                        </p:tgtEl>
+                                      </p:cBhvr>
+                                    </p:animEffect>
+                                  </p:childTnLst>
+                                </p:cTn>
+                              </p:par>
+                              <p:par>
+                                <p:cTn id="58" presetID="10" presetClass="entr" presetSubtype="0" fill="hold" grpId="0" nodeType="withEffect">
+                                  <p:stCondLst>
+                                    <p:cond delay="0"/>
+                                  </p:stCondLst>
+                                  <p:childTnLst>
+                                    <p:set>
+                                      <p:cBhvr>
+                                        <p:cTn id="59" dur="1" fill="hold">
+                                          <p:stCondLst>
+                                            <p:cond delay="0"/>
+                                          </p:stCondLst>
+                                        </p:cTn>
+                                        <p:tgtEl>
+                                          <p:spTgt spid="34"/>
+                                        </p:tgtEl>
+                                        <p:attrNameLst>
+                                          <p:attrName>style.visibility</p:attrName>
+                                        </p:attrNameLst>
+                                      </p:cBhvr>
+                                      <p:to>
+                                        <p:strVal val="visible"/>
+                                      </p:to>
+                                    </p:set>
+                                    <p:animEffect transition="in" filter="fade">
+                                      <p:cBhvr>
+                                        <p:cTn id="60" dur="500"/>
+                                        <p:tgtEl>
+                                          <p:spTgt spid="34"/>
+                                        </p:tgtEl>
+                                      </p:cBhvr>
+                                    </p:animEffect>
+                                  </p:childTnLst>
+                                </p:cTn>
+                              </p:par>
+                            </p:childTnLst>
+                          </p:cTn>
+                        </p:par>
+                      </p:childTnLst>
+                    </p:cTn>
+                  </p:par>
+                </p:childTnLst>
+              </p:cTn>
+              <p:prevCondLst>
+                <p:cond evt="onPrev" delay="0">
+                  <p:tgtEl>
+                    <p:sldTgt/>
+                  </p:tgtEl>
+                </p:cond>
+              </p:prevCondLst>
+              <p:nextCondLst>
+                <p:cond evt="onNext" delay="0">
+                  <p:tgtEl>
+                    <p:sldTgt/>
+                  </p:tgtEl>
+                </p:cond>
+              </p:nextCondLst>
+            </p:seq>
+          </p:childTnLst>
+        </p:cTn>
+      </p:par>
+    </p:tnLst>
+    <p:bldLst>
+      <p:bldP spid="4" grpId="0"/>
+      <p:bldP spid="5" grpId="0" animBg="1"/>
+      <p:bldP spid="6" grpId="0" animBg="1"/>
+      <p:bldP spid="20" grpId="0"/>
+      <p:bldP spid="26" grpId="0" animBg="1"/>
+      <p:bldP spid="27" grpId="0" animBg="1"/>
+      <p:bldP spid="21" grpId="0" animBg="1"/>
+      <p:bldP spid="33" grpId="0"/>
+      <p:bldP spid="34" grpId="0" animBg="1"/>
+    </p:bldLst>
+  </p:timing>
 </p:sld>
 </file>
 
-<file path=ppt/slides/slide7.xml><?xml version="1.0" encoding="utf-8"?>
+<file path=ppt/slides/slide6.xml><?xml version="1.0" encoding="utf-8"?>
 <p:sld xmlns:a="http://schemas.openxmlformats.org/drawingml/2006/main" xmlns:r="http://schemas.openxmlformats.org/officeDocument/2006/relationships" xmlns:p="http://schemas.openxmlformats.org/presentationml/2006/main">
   <p:cSld>
     <p:spTree>
@@ -9755,6 +9767,179 @@
     <p:extLst>
       <p:ext uri="{BB962C8B-B14F-4D97-AF65-F5344CB8AC3E}">
         <p14:creationId xmlns:p14="http://schemas.microsoft.com/office/powerpoint/2010/main" val="1388900505"/>
+      </p:ext>
+    </p:extLst>
+  </p:cSld>
+  <p:clrMapOvr>
+    <a:masterClrMapping/>
+  </p:clrMapOvr>
+  <mc:AlternateContent xmlns:mc="http://schemas.openxmlformats.org/markup-compatibility/2006" xmlns:p14="http://schemas.microsoft.com/office/powerpoint/2010/main">
+    <mc:Choice Requires="p14">
+      <p:transition spd="med" p14:dur="700">
+        <p:fade/>
+      </p:transition>
+    </mc:Choice>
+    <mc:Fallback xmlns="">
+      <p:transition spd="med">
+        <p:fade/>
+      </p:transition>
+    </mc:Fallback>
+  </mc:AlternateContent>
+</p:sld>
+</file>
+
+<file path=ppt/slides/slide7.xml><?xml version="1.0" encoding="utf-8"?>
+<p:sld xmlns:a="http://schemas.openxmlformats.org/drawingml/2006/main" xmlns:r="http://schemas.openxmlformats.org/officeDocument/2006/relationships" xmlns:p="http://schemas.openxmlformats.org/presentationml/2006/main">
+  <p:cSld>
+    <p:spTree>
+      <p:nvGrpSpPr>
+        <p:cNvPr id="1" name=""/>
+        <p:cNvGrpSpPr/>
+        <p:nvPr/>
+      </p:nvGrpSpPr>
+      <p:grpSpPr>
+        <a:xfrm>
+          <a:off x="0" y="0"/>
+          <a:ext cx="0" cy="0"/>
+          <a:chOff x="0" y="0"/>
+          <a:chExt cx="0" cy="0"/>
+        </a:xfrm>
+      </p:grpSpPr>
+      <p:sp>
+        <p:nvSpPr>
+          <p:cNvPr id="16" name="TextBox 15"/>
+          <p:cNvSpPr txBox="1"/>
+          <p:nvPr/>
+        </p:nvSpPr>
+        <p:spPr>
+          <a:xfrm>
+            <a:off x="4510443" y="841374"/>
+            <a:ext cx="10348664" cy="830997"/>
+          </a:xfrm>
+          <a:prstGeom prst="rect">
+            <a:avLst/>
+          </a:prstGeom>
+          <a:noFill/>
+        </p:spPr>
+        <p:txBody>
+          <a:bodyPr wrap="square" rtlCol="0">
+            <a:spAutoFit/>
+          </a:bodyPr>
+          <a:lstStyle/>
+          <a:p>
+            <a:pPr algn="ctr"/>
+            <a:r>
+              <a:rPr lang="sr-Latn-RS" sz="4800" dirty="0">
+                <a:solidFill>
+                  <a:srgbClr val="545250"/>
+                </a:solidFill>
+                <a:latin typeface="Novecento sans wide Book" pitchFamily="50" charset="-94"/>
+              </a:rPr>
+              <a:t>Relationship between the collaborators</a:t>
+            </a:r>
+            <a:endParaRPr lang="en-US" sz="4800" dirty="0">
+              <a:solidFill>
+                <a:srgbClr val="545250"/>
+              </a:solidFill>
+              <a:latin typeface="Novecento sans wide Book" pitchFamily="50" charset="-94"/>
+            </a:endParaRPr>
+          </a:p>
+        </p:txBody>
+      </p:sp>
+      <p:pic>
+        <p:nvPicPr>
+          <p:cNvPr id="8" name="Picture 7"/>
+          <p:cNvPicPr>
+            <a:picLocks noChangeAspect="1"/>
+          </p:cNvPicPr>
+          <p:nvPr/>
+        </p:nvPicPr>
+        <p:blipFill>
+          <a:blip r:embed="rId3">
+            <a:extLst>
+              <a:ext uri="{28A0092B-C50C-407E-A947-70E740481C1C}">
+                <a14:useLocalDpi xmlns:a14="http://schemas.microsoft.com/office/drawing/2010/main" val="0"/>
+              </a:ext>
+            </a:extLst>
+          </a:blip>
+          <a:stretch>
+            <a:fillRect/>
+          </a:stretch>
+        </p:blipFill>
+        <p:spPr>
+          <a:xfrm rot="5400000">
+            <a:off x="9100648" y="-2221597"/>
+            <a:ext cx="1168254" cy="9003175"/>
+          </a:xfrm>
+          <a:prstGeom prst="rect">
+            <a:avLst/>
+          </a:prstGeom>
+        </p:spPr>
+      </p:pic>
+      <p:pic>
+        <p:nvPicPr>
+          <p:cNvPr id="7" name="Picture 6"/>
+          <p:cNvPicPr>
+            <a:picLocks noChangeAspect="1"/>
+          </p:cNvPicPr>
+          <p:nvPr/>
+        </p:nvPicPr>
+        <p:blipFill>
+          <a:blip r:embed="rId4" cstate="print">
+            <a:extLst>
+              <a:ext uri="{28A0092B-C50C-407E-A947-70E740481C1C}">
+                <a14:useLocalDpi xmlns:a14="http://schemas.microsoft.com/office/drawing/2010/main" val="0"/>
+              </a:ext>
+            </a:extLst>
+          </a:blip>
+          <a:stretch>
+            <a:fillRect/>
+          </a:stretch>
+        </p:blipFill>
+        <p:spPr>
+          <a:xfrm>
+            <a:off x="13488987" y="9412287"/>
+            <a:ext cx="4572000" cy="646390"/>
+          </a:xfrm>
+          <a:prstGeom prst="rect">
+            <a:avLst/>
+          </a:prstGeom>
+        </p:spPr>
+      </p:pic>
+      <p:pic>
+        <p:nvPicPr>
+          <p:cNvPr id="5" name="Picture 4"/>
+          <p:cNvPicPr>
+            <a:picLocks noChangeAspect="1"/>
+          </p:cNvPicPr>
+          <p:nvPr/>
+        </p:nvPicPr>
+        <p:blipFill>
+          <a:blip r:embed="rId5">
+            <a:extLst>
+              <a:ext uri="{28A0092B-C50C-407E-A947-70E740481C1C}">
+                <a14:useLocalDpi xmlns:a14="http://schemas.microsoft.com/office/drawing/2010/main" val="0"/>
+              </a:ext>
+            </a:extLst>
+          </a:blip>
+          <a:stretch>
+            <a:fillRect/>
+          </a:stretch>
+        </p:blipFill>
+        <p:spPr>
+          <a:xfrm>
+            <a:off x="1758950" y="2973387"/>
+            <a:ext cx="14773275" cy="4343400"/>
+          </a:xfrm>
+          <a:prstGeom prst="rect">
+            <a:avLst/>
+          </a:prstGeom>
+        </p:spPr>
+      </p:pic>
+    </p:spTree>
+    <p:extLst>
+      <p:ext uri="{BB962C8B-B14F-4D97-AF65-F5344CB8AC3E}">
+        <p14:creationId xmlns:p14="http://schemas.microsoft.com/office/powerpoint/2010/main" val="1353652370"/>
       </p:ext>
     </p:extLst>
   </p:cSld>

</xml_diff>

<commit_message>
Bootstrap Application project added
</commit_message>
<xml_diff>
--- a/DI Course.pptx
+++ b/DI Course.pptx
@@ -5,10 +5,10 @@
     <p:sldMasterId id="2147483650" r:id="rId1"/>
   </p:sldMasterIdLst>
   <p:notesMasterIdLst>
-    <p:notesMasterId r:id="rId22"/>
+    <p:notesMasterId r:id="rId23"/>
   </p:notesMasterIdLst>
   <p:handoutMasterIdLst>
-    <p:handoutMasterId r:id="rId23"/>
+    <p:handoutMasterId r:id="rId24"/>
   </p:handoutMasterIdLst>
   <p:sldIdLst>
     <p:sldId id="256" r:id="rId2"/>
@@ -26,11 +26,12 @@
     <p:sldId id="352" r:id="rId14"/>
     <p:sldId id="353" r:id="rId15"/>
     <p:sldId id="343" r:id="rId16"/>
-    <p:sldId id="340" r:id="rId17"/>
-    <p:sldId id="347" r:id="rId18"/>
-    <p:sldId id="348" r:id="rId19"/>
-    <p:sldId id="327" r:id="rId20"/>
-    <p:sldId id="295" r:id="rId21"/>
+    <p:sldId id="354" r:id="rId17"/>
+    <p:sldId id="340" r:id="rId18"/>
+    <p:sldId id="347" r:id="rId19"/>
+    <p:sldId id="348" r:id="rId20"/>
+    <p:sldId id="327" r:id="rId21"/>
+    <p:sldId id="295" r:id="rId22"/>
   </p:sldIdLst>
   <p:sldSz cx="18291175" cy="10290175"/>
   <p:notesSz cx="6858000" cy="9144000"/>
@@ -1363,7 +1364,7 @@
     </p:spTree>
     <p:extLst>
       <p:ext uri="{BB962C8B-B14F-4D97-AF65-F5344CB8AC3E}">
-        <p14:creationId xmlns:p14="http://schemas.microsoft.com/office/powerpoint/2010/main" val="2488509581"/>
+        <p14:creationId xmlns:p14="http://schemas.microsoft.com/office/powerpoint/2010/main" val="967787451"/>
       </p:ext>
     </p:extLst>
   </p:cSld>
@@ -1448,7 +1449,7 @@
     </p:spTree>
     <p:extLst>
       <p:ext uri="{BB962C8B-B14F-4D97-AF65-F5344CB8AC3E}">
-        <p14:creationId xmlns:p14="http://schemas.microsoft.com/office/powerpoint/2010/main" val="1790556973"/>
+        <p14:creationId xmlns:p14="http://schemas.microsoft.com/office/powerpoint/2010/main" val="2488509581"/>
       </p:ext>
     </p:extLst>
   </p:cSld>
@@ -1533,7 +1534,7 @@
     </p:spTree>
     <p:extLst>
       <p:ext uri="{BB962C8B-B14F-4D97-AF65-F5344CB8AC3E}">
-        <p14:creationId xmlns:p14="http://schemas.microsoft.com/office/powerpoint/2010/main" val="3810562109"/>
+        <p14:creationId xmlns:p14="http://schemas.microsoft.com/office/powerpoint/2010/main" val="1790556973"/>
       </p:ext>
     </p:extLst>
   </p:cSld>
@@ -1618,7 +1619,7 @@
     </p:spTree>
     <p:extLst>
       <p:ext uri="{BB962C8B-B14F-4D97-AF65-F5344CB8AC3E}">
-        <p14:creationId xmlns:p14="http://schemas.microsoft.com/office/powerpoint/2010/main" val="2338377447"/>
+        <p14:creationId xmlns:p14="http://schemas.microsoft.com/office/powerpoint/2010/main" val="3810562109"/>
       </p:ext>
     </p:extLst>
   </p:cSld>
@@ -1780,6 +1781,91 @@
               <a:rPr lang="tr-TR" smtClean="0"/>
               <a:pPr/>
               <a:t>20</a:t>
+            </a:fld>
+            <a:endParaRPr lang="tr-TR"/>
+          </a:p>
+        </p:txBody>
+      </p:sp>
+    </p:spTree>
+    <p:extLst>
+      <p:ext uri="{BB962C8B-B14F-4D97-AF65-F5344CB8AC3E}">
+        <p14:creationId xmlns:p14="http://schemas.microsoft.com/office/powerpoint/2010/main" val="2338377447"/>
+      </p:ext>
+    </p:extLst>
+  </p:cSld>
+  <p:clrMapOvr>
+    <a:masterClrMapping/>
+  </p:clrMapOvr>
+</p:notes>
+</file>
+
+<file path=ppt/notesSlides/notesSlide21.xml><?xml version="1.0" encoding="utf-8"?>
+<p:notes xmlns:a="http://schemas.openxmlformats.org/drawingml/2006/main" xmlns:r="http://schemas.openxmlformats.org/officeDocument/2006/relationships" xmlns:p="http://schemas.openxmlformats.org/presentationml/2006/main">
+  <p:cSld>
+    <p:spTree>
+      <p:nvGrpSpPr>
+        <p:cNvPr id="1" name=""/>
+        <p:cNvGrpSpPr/>
+        <p:nvPr/>
+      </p:nvGrpSpPr>
+      <p:grpSpPr>
+        <a:xfrm>
+          <a:off x="0" y="0"/>
+          <a:ext cx="0" cy="0"/>
+          <a:chOff x="0" y="0"/>
+          <a:chExt cx="0" cy="0"/>
+        </a:xfrm>
+      </p:grpSpPr>
+      <p:sp>
+        <p:nvSpPr>
+          <p:cNvPr id="2" name="Slide Image Placeholder 1"/>
+          <p:cNvSpPr>
+            <a:spLocks noGrp="1" noRot="1" noChangeAspect="1"/>
+          </p:cNvSpPr>
+          <p:nvPr>
+            <p:ph type="sldImg"/>
+          </p:nvPr>
+        </p:nvSpPr>
+        <p:spPr/>
+      </p:sp>
+      <p:sp>
+        <p:nvSpPr>
+          <p:cNvPr id="3" name="Notes Placeholder 2"/>
+          <p:cNvSpPr>
+            <a:spLocks noGrp="1"/>
+          </p:cNvSpPr>
+          <p:nvPr>
+            <p:ph type="body" idx="1"/>
+          </p:nvPr>
+        </p:nvSpPr>
+        <p:spPr/>
+        <p:txBody>
+          <a:bodyPr/>
+          <a:lstStyle/>
+          <a:p>
+            <a:endParaRPr lang="tr-TR" dirty="0"/>
+          </a:p>
+        </p:txBody>
+      </p:sp>
+      <p:sp>
+        <p:nvSpPr>
+          <p:cNvPr id="4" name="Slide Number Placeholder 3"/>
+          <p:cNvSpPr>
+            <a:spLocks noGrp="1"/>
+          </p:cNvSpPr>
+          <p:nvPr>
+            <p:ph type="sldNum" sz="quarter" idx="10"/>
+          </p:nvPr>
+        </p:nvSpPr>
+        <p:spPr/>
+        <p:txBody>
+          <a:bodyPr/>
+          <a:lstStyle/>
+          <a:p>
+            <a:fld id="{802DA432-7CF7-4A2F-BE93-45834DC6981A}" type="slidenum">
+              <a:rPr lang="tr-TR" smtClean="0"/>
+              <a:pPr/>
+              <a:t>21</a:t>
             </a:fld>
             <a:endParaRPr lang="tr-TR"/>
           </a:p>
@@ -10398,6 +10484,795 @@
       </p:grpSpPr>
       <p:sp>
         <p:nvSpPr>
+          <p:cNvPr id="2" name="Rectangle 1"/>
+          <p:cNvSpPr/>
+          <p:nvPr/>
+        </p:nvSpPr>
+        <p:spPr>
+          <a:xfrm>
+            <a:off x="5487987" y="2478087"/>
+            <a:ext cx="7772400" cy="6934200"/>
+          </a:xfrm>
+          <a:prstGeom prst="rect">
+            <a:avLst/>
+          </a:prstGeom>
+          <a:solidFill>
+            <a:schemeClr val="bg2"/>
+          </a:solidFill>
+        </p:spPr>
+        <p:style>
+          <a:lnRef idx="2">
+            <a:schemeClr val="accent1">
+              <a:shade val="50000"/>
+            </a:schemeClr>
+          </a:lnRef>
+          <a:fillRef idx="1">
+            <a:schemeClr val="accent1"/>
+          </a:fillRef>
+          <a:effectRef idx="0">
+            <a:schemeClr val="accent1"/>
+          </a:effectRef>
+          <a:fontRef idx="minor">
+            <a:schemeClr val="lt1"/>
+          </a:fontRef>
+        </p:style>
+        <p:txBody>
+          <a:bodyPr rtlCol="0" anchor="ctr"/>
+          <a:lstStyle/>
+          <a:p>
+            <a:pPr algn="ctr"/>
+            <a:endParaRPr lang="sr-Latn-RS" dirty="0"/>
+          </a:p>
+        </p:txBody>
+      </p:sp>
+      <p:sp>
+        <p:nvSpPr>
+          <p:cNvPr id="16" name="TextBox 15"/>
+          <p:cNvSpPr txBox="1"/>
+          <p:nvPr/>
+        </p:nvSpPr>
+        <p:spPr>
+          <a:xfrm>
+            <a:off x="4969123" y="854313"/>
+            <a:ext cx="8136904" cy="830997"/>
+          </a:xfrm>
+          <a:prstGeom prst="rect">
+            <a:avLst/>
+          </a:prstGeom>
+          <a:noFill/>
+        </p:spPr>
+        <p:txBody>
+          <a:bodyPr wrap="square" rtlCol="0">
+            <a:spAutoFit/>
+          </a:bodyPr>
+          <a:lstStyle/>
+          <a:p>
+            <a:pPr algn="ctr"/>
+            <a:r>
+              <a:rPr lang="en-US" sz="4800" dirty="0">
+                <a:solidFill>
+                  <a:srgbClr val="545250"/>
+                </a:solidFill>
+                <a:latin typeface="Novecento sans wide Book" pitchFamily="50" charset="-94"/>
+              </a:rPr>
+              <a:t>Composing the Application</a:t>
+            </a:r>
+          </a:p>
+        </p:txBody>
+      </p:sp>
+      <p:pic>
+        <p:nvPicPr>
+          <p:cNvPr id="8" name="Picture 7"/>
+          <p:cNvPicPr>
+            <a:picLocks noChangeAspect="1"/>
+          </p:cNvPicPr>
+          <p:nvPr/>
+        </p:nvPicPr>
+        <p:blipFill>
+          <a:blip r:embed="rId3">
+            <a:extLst>
+              <a:ext uri="{28A0092B-C50C-407E-A947-70E740481C1C}">
+                <a14:useLocalDpi xmlns:a14="http://schemas.microsoft.com/office/drawing/2010/main" val="0"/>
+              </a:ext>
+            </a:extLst>
+          </a:blip>
+          <a:stretch>
+            <a:fillRect/>
+          </a:stretch>
+        </p:blipFill>
+        <p:spPr>
+          <a:xfrm rot="5400000">
+            <a:off x="9100648" y="-2221597"/>
+            <a:ext cx="1168254" cy="9003175"/>
+          </a:xfrm>
+          <a:prstGeom prst="rect">
+            <a:avLst/>
+          </a:prstGeom>
+        </p:spPr>
+      </p:pic>
+      <p:pic>
+        <p:nvPicPr>
+          <p:cNvPr id="7" name="Picture 6"/>
+          <p:cNvPicPr>
+            <a:picLocks noChangeAspect="1"/>
+          </p:cNvPicPr>
+          <p:nvPr/>
+        </p:nvPicPr>
+        <p:blipFill>
+          <a:blip r:embed="rId4" cstate="print">
+            <a:extLst>
+              <a:ext uri="{28A0092B-C50C-407E-A947-70E740481C1C}">
+                <a14:useLocalDpi xmlns:a14="http://schemas.microsoft.com/office/drawing/2010/main" val="0"/>
+              </a:ext>
+            </a:extLst>
+          </a:blip>
+          <a:stretch>
+            <a:fillRect/>
+          </a:stretch>
+        </p:blipFill>
+        <p:spPr>
+          <a:xfrm>
+            <a:off x="13488987" y="9412287"/>
+            <a:ext cx="4572000" cy="646390"/>
+          </a:xfrm>
+          <a:prstGeom prst="rect">
+            <a:avLst/>
+          </a:prstGeom>
+        </p:spPr>
+      </p:pic>
+      <p:sp>
+        <p:nvSpPr>
+          <p:cNvPr id="5" name="Rectangle: Rounded Corners 4"/>
+          <p:cNvSpPr/>
+          <p:nvPr/>
+        </p:nvSpPr>
+        <p:spPr>
+          <a:xfrm>
+            <a:off x="6173787" y="3316287"/>
+            <a:ext cx="5257800" cy="833169"/>
+          </a:xfrm>
+          <a:prstGeom prst="roundRect">
+            <a:avLst/>
+          </a:prstGeom>
+          <a:solidFill>
+            <a:schemeClr val="accent6"/>
+          </a:solidFill>
+          <a:ln>
+            <a:noFill/>
+          </a:ln>
+        </p:spPr>
+        <p:style>
+          <a:lnRef idx="0">
+            <a:scrgbClr r="0" g="0" b="0"/>
+          </a:lnRef>
+          <a:fillRef idx="0">
+            <a:scrgbClr r="0" g="0" b="0"/>
+          </a:fillRef>
+          <a:effectRef idx="0">
+            <a:scrgbClr r="0" g="0" b="0"/>
+          </a:effectRef>
+          <a:fontRef idx="minor">
+            <a:schemeClr val="lt1"/>
+          </a:fontRef>
+        </p:style>
+        <p:txBody>
+          <a:bodyPr rtlCol="0" anchor="ctr"/>
+          <a:lstStyle/>
+          <a:p>
+            <a:pPr algn="ctr"/>
+            <a:r>
+              <a:rPr lang="en-US" sz="4000" dirty="0"/>
+              <a:t>View</a:t>
+            </a:r>
+            <a:endParaRPr lang="sr-Latn-RS" sz="4000" dirty="0"/>
+          </a:p>
+        </p:txBody>
+      </p:sp>
+      <p:sp>
+        <p:nvSpPr>
+          <p:cNvPr id="6" name="Rectangle: Rounded Corners 5"/>
+          <p:cNvSpPr/>
+          <p:nvPr/>
+        </p:nvSpPr>
+        <p:spPr>
+          <a:xfrm>
+            <a:off x="6173787" y="4759056"/>
+            <a:ext cx="5257800" cy="833169"/>
+          </a:xfrm>
+          <a:prstGeom prst="roundRect">
+            <a:avLst/>
+          </a:prstGeom>
+          <a:solidFill>
+            <a:schemeClr val="accent5"/>
+          </a:solidFill>
+          <a:ln>
+            <a:noFill/>
+          </a:ln>
+        </p:spPr>
+        <p:style>
+          <a:lnRef idx="0">
+            <a:scrgbClr r="0" g="0" b="0"/>
+          </a:lnRef>
+          <a:fillRef idx="0">
+            <a:scrgbClr r="0" g="0" b="0"/>
+          </a:fillRef>
+          <a:effectRef idx="0">
+            <a:scrgbClr r="0" g="0" b="0"/>
+          </a:effectRef>
+          <a:fontRef idx="minor">
+            <a:schemeClr val="lt1"/>
+          </a:fontRef>
+        </p:style>
+        <p:txBody>
+          <a:bodyPr rtlCol="0" anchor="ctr"/>
+          <a:lstStyle/>
+          <a:p>
+            <a:pPr algn="ctr"/>
+            <a:r>
+              <a:rPr lang="en-US" sz="4000" dirty="0"/>
+              <a:t>Presentation</a:t>
+            </a:r>
+            <a:endParaRPr lang="sr-Latn-RS" sz="4000" dirty="0"/>
+          </a:p>
+        </p:txBody>
+      </p:sp>
+      <p:sp>
+        <p:nvSpPr>
+          <p:cNvPr id="9" name="Rectangle: Rounded Corners 8"/>
+          <p:cNvSpPr/>
+          <p:nvPr/>
+        </p:nvSpPr>
+        <p:spPr>
+          <a:xfrm>
+            <a:off x="6173787" y="6201825"/>
+            <a:ext cx="5257800" cy="833169"/>
+          </a:xfrm>
+          <a:prstGeom prst="roundRect">
+            <a:avLst/>
+          </a:prstGeom>
+          <a:solidFill>
+            <a:schemeClr val="accent3"/>
+          </a:solidFill>
+          <a:ln>
+            <a:noFill/>
+          </a:ln>
+        </p:spPr>
+        <p:style>
+          <a:lnRef idx="0">
+            <a:scrgbClr r="0" g="0" b="0"/>
+          </a:lnRef>
+          <a:fillRef idx="0">
+            <a:scrgbClr r="0" g="0" b="0"/>
+          </a:fillRef>
+          <a:effectRef idx="0">
+            <a:scrgbClr r="0" g="0" b="0"/>
+          </a:effectRef>
+          <a:fontRef idx="minor">
+            <a:schemeClr val="lt1"/>
+          </a:fontRef>
+        </p:style>
+        <p:txBody>
+          <a:bodyPr rtlCol="0" anchor="ctr"/>
+          <a:lstStyle/>
+          <a:p>
+            <a:pPr algn="ctr"/>
+            <a:r>
+              <a:rPr lang="en-US" sz="4000" dirty="0"/>
+              <a:t>Repository</a:t>
+            </a:r>
+            <a:endParaRPr lang="sr-Latn-RS" sz="4000" dirty="0"/>
+          </a:p>
+        </p:txBody>
+      </p:sp>
+      <p:sp>
+        <p:nvSpPr>
+          <p:cNvPr id="10" name="Rectangle: Rounded Corners 9"/>
+          <p:cNvSpPr/>
+          <p:nvPr/>
+        </p:nvSpPr>
+        <p:spPr>
+          <a:xfrm>
+            <a:off x="6173787" y="7644594"/>
+            <a:ext cx="5257800" cy="833169"/>
+          </a:xfrm>
+          <a:prstGeom prst="roundRect">
+            <a:avLst/>
+          </a:prstGeom>
+          <a:solidFill>
+            <a:schemeClr val="accent2"/>
+          </a:solidFill>
+          <a:ln>
+            <a:noFill/>
+          </a:ln>
+        </p:spPr>
+        <p:style>
+          <a:lnRef idx="0">
+            <a:scrgbClr r="0" g="0" b="0"/>
+          </a:lnRef>
+          <a:fillRef idx="0">
+            <a:scrgbClr r="0" g="0" b="0"/>
+          </a:fillRef>
+          <a:effectRef idx="0">
+            <a:scrgbClr r="0" g="0" b="0"/>
+          </a:effectRef>
+          <a:fontRef idx="minor">
+            <a:schemeClr val="lt1"/>
+          </a:fontRef>
+        </p:style>
+        <p:txBody>
+          <a:bodyPr rtlCol="0" anchor="ctr"/>
+          <a:lstStyle/>
+          <a:p>
+            <a:pPr algn="ctr"/>
+            <a:r>
+              <a:rPr lang="en-US" sz="4000" dirty="0"/>
+              <a:t>Service</a:t>
+            </a:r>
+            <a:endParaRPr lang="sr-Latn-RS" sz="4000" dirty="0"/>
+          </a:p>
+        </p:txBody>
+      </p:sp>
+      <p:sp>
+        <p:nvSpPr>
+          <p:cNvPr id="3" name="TextBox 2"/>
+          <p:cNvSpPr txBox="1"/>
+          <p:nvPr/>
+        </p:nvSpPr>
+        <p:spPr>
+          <a:xfrm>
+            <a:off x="6192791" y="2571730"/>
+            <a:ext cx="5848396" cy="646331"/>
+          </a:xfrm>
+          <a:prstGeom prst="rect">
+            <a:avLst/>
+          </a:prstGeom>
+          <a:noFill/>
+        </p:spPr>
+        <p:txBody>
+          <a:bodyPr wrap="square" rtlCol="0">
+            <a:spAutoFit/>
+          </a:bodyPr>
+          <a:lstStyle/>
+          <a:p>
+            <a:r>
+              <a:rPr lang="en-US" sz="3600" dirty="0"/>
+              <a:t>Bootstrapper (Application)</a:t>
+            </a:r>
+            <a:endParaRPr lang="sr-Latn-RS" sz="3600" dirty="0"/>
+          </a:p>
+        </p:txBody>
+      </p:sp>
+    </p:spTree>
+    <p:extLst>
+      <p:ext uri="{BB962C8B-B14F-4D97-AF65-F5344CB8AC3E}">
+        <p14:creationId xmlns:p14="http://schemas.microsoft.com/office/powerpoint/2010/main" val="3989934195"/>
+      </p:ext>
+    </p:extLst>
+  </p:cSld>
+  <p:clrMapOvr>
+    <a:masterClrMapping/>
+  </p:clrMapOvr>
+  <mc:AlternateContent xmlns:mc="http://schemas.openxmlformats.org/markup-compatibility/2006" xmlns:p14="http://schemas.microsoft.com/office/powerpoint/2010/main">
+    <mc:Choice Requires="p14">
+      <p:transition spd="med" p14:dur="700">
+        <p:fade/>
+      </p:transition>
+    </mc:Choice>
+    <mc:Fallback xmlns="">
+      <p:transition spd="med">
+        <p:fade/>
+      </p:transition>
+    </mc:Fallback>
+  </mc:AlternateContent>
+  <p:timing>
+    <p:tnLst>
+      <p:par>
+        <p:cTn id="1" dur="indefinite" restart="never" nodeType="tmRoot">
+          <p:childTnLst>
+            <p:seq concurrent="1" nextAc="seek">
+              <p:cTn id="2" dur="indefinite" nodeType="mainSeq">
+                <p:childTnLst>
+                  <p:par>
+                    <p:cTn id="3" fill="hold">
+                      <p:stCondLst>
+                        <p:cond delay="indefinite"/>
+                      </p:stCondLst>
+                      <p:childTnLst>
+                        <p:par>
+                          <p:cTn id="4" fill="hold">
+                            <p:stCondLst>
+                              <p:cond delay="0"/>
+                            </p:stCondLst>
+                            <p:childTnLst>
+                              <p:par>
+                                <p:cTn id="5" presetID="10" presetClass="entr" presetSubtype="0" fill="hold" grpId="0" nodeType="clickEffect">
+                                  <p:stCondLst>
+                                    <p:cond delay="0"/>
+                                  </p:stCondLst>
+                                  <p:childTnLst>
+                                    <p:set>
+                                      <p:cBhvr>
+                                        <p:cTn id="6" dur="1" fill="hold">
+                                          <p:stCondLst>
+                                            <p:cond delay="0"/>
+                                          </p:stCondLst>
+                                        </p:cTn>
+                                        <p:tgtEl>
+                                          <p:spTgt spid="5"/>
+                                        </p:tgtEl>
+                                        <p:attrNameLst>
+                                          <p:attrName>style.visibility</p:attrName>
+                                        </p:attrNameLst>
+                                      </p:cBhvr>
+                                      <p:to>
+                                        <p:strVal val="visible"/>
+                                      </p:to>
+                                    </p:set>
+                                    <p:animEffect transition="in" filter="fade">
+                                      <p:cBhvr>
+                                        <p:cTn id="7" dur="500"/>
+                                        <p:tgtEl>
+                                          <p:spTgt spid="5"/>
+                                        </p:tgtEl>
+                                      </p:cBhvr>
+                                    </p:animEffect>
+                                  </p:childTnLst>
+                                </p:cTn>
+                              </p:par>
+                              <p:par>
+                                <p:cTn id="8" presetID="10" presetClass="entr" presetSubtype="0" fill="hold" grpId="0" nodeType="withEffect">
+                                  <p:stCondLst>
+                                    <p:cond delay="0"/>
+                                  </p:stCondLst>
+                                  <p:childTnLst>
+                                    <p:set>
+                                      <p:cBhvr>
+                                        <p:cTn id="9" dur="1" fill="hold">
+                                          <p:stCondLst>
+                                            <p:cond delay="0"/>
+                                          </p:stCondLst>
+                                        </p:cTn>
+                                        <p:tgtEl>
+                                          <p:spTgt spid="6"/>
+                                        </p:tgtEl>
+                                        <p:attrNameLst>
+                                          <p:attrName>style.visibility</p:attrName>
+                                        </p:attrNameLst>
+                                      </p:cBhvr>
+                                      <p:to>
+                                        <p:strVal val="visible"/>
+                                      </p:to>
+                                    </p:set>
+                                    <p:animEffect transition="in" filter="fade">
+                                      <p:cBhvr>
+                                        <p:cTn id="10" dur="500"/>
+                                        <p:tgtEl>
+                                          <p:spTgt spid="6"/>
+                                        </p:tgtEl>
+                                      </p:cBhvr>
+                                    </p:animEffect>
+                                  </p:childTnLst>
+                                </p:cTn>
+                              </p:par>
+                              <p:par>
+                                <p:cTn id="11" presetID="10" presetClass="entr" presetSubtype="0" fill="hold" grpId="0" nodeType="withEffect">
+                                  <p:stCondLst>
+                                    <p:cond delay="0"/>
+                                  </p:stCondLst>
+                                  <p:childTnLst>
+                                    <p:set>
+                                      <p:cBhvr>
+                                        <p:cTn id="12" dur="1" fill="hold">
+                                          <p:stCondLst>
+                                            <p:cond delay="0"/>
+                                          </p:stCondLst>
+                                        </p:cTn>
+                                        <p:tgtEl>
+                                          <p:spTgt spid="9"/>
+                                        </p:tgtEl>
+                                        <p:attrNameLst>
+                                          <p:attrName>style.visibility</p:attrName>
+                                        </p:attrNameLst>
+                                      </p:cBhvr>
+                                      <p:to>
+                                        <p:strVal val="visible"/>
+                                      </p:to>
+                                    </p:set>
+                                    <p:animEffect transition="in" filter="fade">
+                                      <p:cBhvr>
+                                        <p:cTn id="13" dur="500"/>
+                                        <p:tgtEl>
+                                          <p:spTgt spid="9"/>
+                                        </p:tgtEl>
+                                      </p:cBhvr>
+                                    </p:animEffect>
+                                  </p:childTnLst>
+                                </p:cTn>
+                              </p:par>
+                              <p:par>
+                                <p:cTn id="14" presetID="10" presetClass="entr" presetSubtype="0" fill="hold" grpId="0" nodeType="withEffect">
+                                  <p:stCondLst>
+                                    <p:cond delay="0"/>
+                                  </p:stCondLst>
+                                  <p:childTnLst>
+                                    <p:set>
+                                      <p:cBhvr>
+                                        <p:cTn id="15" dur="1" fill="hold">
+                                          <p:stCondLst>
+                                            <p:cond delay="0"/>
+                                          </p:stCondLst>
+                                        </p:cTn>
+                                        <p:tgtEl>
+                                          <p:spTgt spid="10"/>
+                                        </p:tgtEl>
+                                        <p:attrNameLst>
+                                          <p:attrName>style.visibility</p:attrName>
+                                        </p:attrNameLst>
+                                      </p:cBhvr>
+                                      <p:to>
+                                        <p:strVal val="visible"/>
+                                      </p:to>
+                                    </p:set>
+                                    <p:animEffect transition="in" filter="fade">
+                                      <p:cBhvr>
+                                        <p:cTn id="16" dur="500"/>
+                                        <p:tgtEl>
+                                          <p:spTgt spid="10"/>
+                                        </p:tgtEl>
+                                      </p:cBhvr>
+                                    </p:animEffect>
+                                  </p:childTnLst>
+                                </p:cTn>
+                              </p:par>
+                            </p:childTnLst>
+                          </p:cTn>
+                        </p:par>
+                      </p:childTnLst>
+                    </p:cTn>
+                  </p:par>
+                  <p:par>
+                    <p:cTn id="17" fill="hold">
+                      <p:stCondLst>
+                        <p:cond delay="indefinite"/>
+                      </p:stCondLst>
+                      <p:childTnLst>
+                        <p:par>
+                          <p:cTn id="18" fill="hold">
+                            <p:stCondLst>
+                              <p:cond delay="0"/>
+                            </p:stCondLst>
+                            <p:childTnLst>
+                              <p:par>
+                                <p:cTn id="19" presetID="32" presetClass="emph" presetSubtype="0" fill="hold" grpId="1" nodeType="clickEffect">
+                                  <p:stCondLst>
+                                    <p:cond delay="0"/>
+                                  </p:stCondLst>
+                                  <p:childTnLst>
+                                    <p:animRot by="120000">
+                                      <p:cBhvr>
+                                        <p:cTn id="20" dur="300" fill="hold">
+                                          <p:stCondLst>
+                                            <p:cond delay="0"/>
+                                          </p:stCondLst>
+                                        </p:cTn>
+                                        <p:tgtEl>
+                                          <p:spTgt spid="5"/>
+                                        </p:tgtEl>
+                                        <p:attrNameLst>
+                                          <p:attrName>r</p:attrName>
+                                        </p:attrNameLst>
+                                      </p:cBhvr>
+                                    </p:animRot>
+                                    <p:animRot by="-240000">
+                                      <p:cBhvr>
+                                        <p:cTn id="21" dur="600" fill="hold">
+                                          <p:stCondLst>
+                                            <p:cond delay="600"/>
+                                          </p:stCondLst>
+                                        </p:cTn>
+                                        <p:tgtEl>
+                                          <p:spTgt spid="5"/>
+                                        </p:tgtEl>
+                                        <p:attrNameLst>
+                                          <p:attrName>r</p:attrName>
+                                        </p:attrNameLst>
+                                      </p:cBhvr>
+                                    </p:animRot>
+                                    <p:animRot by="240000">
+                                      <p:cBhvr>
+                                        <p:cTn id="22" dur="600" fill="hold">
+                                          <p:stCondLst>
+                                            <p:cond delay="1200"/>
+                                          </p:stCondLst>
+                                        </p:cTn>
+                                        <p:tgtEl>
+                                          <p:spTgt spid="5"/>
+                                        </p:tgtEl>
+                                        <p:attrNameLst>
+                                          <p:attrName>r</p:attrName>
+                                        </p:attrNameLst>
+                                      </p:cBhvr>
+                                    </p:animRot>
+                                    <p:animRot by="-240000">
+                                      <p:cBhvr>
+                                        <p:cTn id="23" dur="600" fill="hold">
+                                          <p:stCondLst>
+                                            <p:cond delay="1800"/>
+                                          </p:stCondLst>
+                                        </p:cTn>
+                                        <p:tgtEl>
+                                          <p:spTgt spid="5"/>
+                                        </p:tgtEl>
+                                        <p:attrNameLst>
+                                          <p:attrName>r</p:attrName>
+                                        </p:attrNameLst>
+                                      </p:cBhvr>
+                                    </p:animRot>
+                                    <p:animRot by="120000">
+                                      <p:cBhvr>
+                                        <p:cTn id="24" dur="600" fill="hold">
+                                          <p:stCondLst>
+                                            <p:cond delay="2400"/>
+                                          </p:stCondLst>
+                                        </p:cTn>
+                                        <p:tgtEl>
+                                          <p:spTgt spid="5"/>
+                                        </p:tgtEl>
+                                        <p:attrNameLst>
+                                          <p:attrName>r</p:attrName>
+                                        </p:attrNameLst>
+                                      </p:cBhvr>
+                                    </p:animRot>
+                                  </p:childTnLst>
+                                </p:cTn>
+                              </p:par>
+                            </p:childTnLst>
+                          </p:cTn>
+                        </p:par>
+                      </p:childTnLst>
+                    </p:cTn>
+                  </p:par>
+                  <p:par>
+                    <p:cTn id="25" fill="hold">
+                      <p:stCondLst>
+                        <p:cond delay="indefinite"/>
+                      </p:stCondLst>
+                      <p:childTnLst>
+                        <p:par>
+                          <p:cTn id="26" fill="hold">
+                            <p:stCondLst>
+                              <p:cond delay="0"/>
+                            </p:stCondLst>
+                            <p:childTnLst>
+                              <p:par>
+                                <p:cTn id="27" presetID="6" presetClass="entr" presetSubtype="16" fill="hold" grpId="0" nodeType="clickEffect">
+                                  <p:stCondLst>
+                                    <p:cond delay="0"/>
+                                  </p:stCondLst>
+                                  <p:childTnLst>
+                                    <p:set>
+                                      <p:cBhvr>
+                                        <p:cTn id="28" dur="1" fill="hold">
+                                          <p:stCondLst>
+                                            <p:cond delay="0"/>
+                                          </p:stCondLst>
+                                        </p:cTn>
+                                        <p:tgtEl>
+                                          <p:spTgt spid="3"/>
+                                        </p:tgtEl>
+                                        <p:attrNameLst>
+                                          <p:attrName>style.visibility</p:attrName>
+                                        </p:attrNameLst>
+                                      </p:cBhvr>
+                                      <p:to>
+                                        <p:strVal val="visible"/>
+                                      </p:to>
+                                    </p:set>
+                                    <p:animEffect transition="in" filter="circle(in)">
+                                      <p:cBhvr>
+                                        <p:cTn id="29" dur="2000"/>
+                                        <p:tgtEl>
+                                          <p:spTgt spid="3"/>
+                                        </p:tgtEl>
+                                      </p:cBhvr>
+                                    </p:animEffect>
+                                  </p:childTnLst>
+                                </p:cTn>
+                              </p:par>
+                              <p:par>
+                                <p:cTn id="30" presetID="6" presetClass="entr" presetSubtype="16" fill="hold" grpId="0" nodeType="withEffect">
+                                  <p:stCondLst>
+                                    <p:cond delay="0"/>
+                                  </p:stCondLst>
+                                  <p:childTnLst>
+                                    <p:set>
+                                      <p:cBhvr>
+                                        <p:cTn id="31" dur="1" fill="hold">
+                                          <p:stCondLst>
+                                            <p:cond delay="0"/>
+                                          </p:stCondLst>
+                                        </p:cTn>
+                                        <p:tgtEl>
+                                          <p:spTgt spid="2"/>
+                                        </p:tgtEl>
+                                        <p:attrNameLst>
+                                          <p:attrName>style.visibility</p:attrName>
+                                        </p:attrNameLst>
+                                      </p:cBhvr>
+                                      <p:to>
+                                        <p:strVal val="visible"/>
+                                      </p:to>
+                                    </p:set>
+                                    <p:animEffect transition="in" filter="circle(in)">
+                                      <p:cBhvr>
+                                        <p:cTn id="32" dur="2000"/>
+                                        <p:tgtEl>
+                                          <p:spTgt spid="2"/>
+                                        </p:tgtEl>
+                                      </p:cBhvr>
+                                    </p:animEffect>
+                                  </p:childTnLst>
+                                </p:cTn>
+                              </p:par>
+                            </p:childTnLst>
+                          </p:cTn>
+                        </p:par>
+                      </p:childTnLst>
+                    </p:cTn>
+                  </p:par>
+                </p:childTnLst>
+              </p:cTn>
+              <p:prevCondLst>
+                <p:cond evt="onPrev" delay="0">
+                  <p:tgtEl>
+                    <p:sldTgt/>
+                  </p:tgtEl>
+                </p:cond>
+              </p:prevCondLst>
+              <p:nextCondLst>
+                <p:cond evt="onNext" delay="0">
+                  <p:tgtEl>
+                    <p:sldTgt/>
+                  </p:tgtEl>
+                </p:cond>
+              </p:nextCondLst>
+            </p:seq>
+          </p:childTnLst>
+        </p:cTn>
+      </p:par>
+    </p:tnLst>
+    <p:bldLst>
+      <p:bldP spid="2" grpId="0" animBg="1"/>
+      <p:bldP spid="5" grpId="0" animBg="1"/>
+      <p:bldP spid="5" grpId="1" animBg="1"/>
+      <p:bldP spid="6" grpId="0" animBg="1"/>
+      <p:bldP spid="9" grpId="0" animBg="1"/>
+      <p:bldP spid="10" grpId="0" animBg="1"/>
+      <p:bldP spid="3" grpId="0"/>
+    </p:bldLst>
+  </p:timing>
+</p:sld>
+</file>
+
+<file path=ppt/slides/slide17.xml><?xml version="1.0" encoding="utf-8"?>
+<p:sld xmlns:a="http://schemas.openxmlformats.org/drawingml/2006/main" xmlns:r="http://schemas.openxmlformats.org/officeDocument/2006/relationships" xmlns:p="http://schemas.openxmlformats.org/presentationml/2006/main">
+  <p:cSld>
+    <p:spTree>
+      <p:nvGrpSpPr>
+        <p:cNvPr id="1" name=""/>
+        <p:cNvGrpSpPr/>
+        <p:nvPr/>
+      </p:nvGrpSpPr>
+      <p:grpSpPr>
+        <a:xfrm>
+          <a:off x="0" y="0"/>
+          <a:ext cx="0" cy="0"/>
+          <a:chOff x="0" y="0"/>
+          <a:chExt cx="0" cy="0"/>
+        </a:xfrm>
+      </p:grpSpPr>
+      <p:sp>
+        <p:nvSpPr>
           <p:cNvPr id="16" name="TextBox 15"/>
           <p:cNvSpPr txBox="1"/>
           <p:nvPr/>
@@ -10874,7 +11749,7 @@
 </p:sld>
 </file>
 
-<file path=ppt/slides/slide17.xml><?xml version="1.0" encoding="utf-8"?>
+<file path=ppt/slides/slide18.xml><?xml version="1.0" encoding="utf-8"?>
 <p:sld xmlns:a="http://schemas.openxmlformats.org/drawingml/2006/main" xmlns:r="http://schemas.openxmlformats.org/officeDocument/2006/relationships" xmlns:p="http://schemas.openxmlformats.org/presentationml/2006/main">
   <p:cSld>
     <p:spTree>
@@ -11348,7 +12223,7 @@
 </p:sld>
 </file>
 
-<file path=ppt/slides/slide18.xml><?xml version="1.0" encoding="utf-8"?>
+<file path=ppt/slides/slide19.xml><?xml version="1.0" encoding="utf-8"?>
 <p:sld xmlns:a="http://schemas.openxmlformats.org/drawingml/2006/main" xmlns:r="http://schemas.openxmlformats.org/officeDocument/2006/relationships" xmlns:p="http://schemas.openxmlformats.org/presentationml/2006/main">
   <p:cSld>
     <p:spTree>
@@ -12257,149 +13132,6 @@
 </p:sld>
 </file>
 
-<file path=ppt/slides/slide19.xml><?xml version="1.0" encoding="utf-8"?>
-<p:sld xmlns:a="http://schemas.openxmlformats.org/drawingml/2006/main" xmlns:r="http://schemas.openxmlformats.org/officeDocument/2006/relationships" xmlns:p="http://schemas.openxmlformats.org/presentationml/2006/main">
-  <p:cSld>
-    <p:spTree>
-      <p:nvGrpSpPr>
-        <p:cNvPr id="1" name=""/>
-        <p:cNvGrpSpPr/>
-        <p:nvPr/>
-      </p:nvGrpSpPr>
-      <p:grpSpPr>
-        <a:xfrm>
-          <a:off x="0" y="0"/>
-          <a:ext cx="0" cy="0"/>
-          <a:chOff x="0" y="0"/>
-          <a:chExt cx="0" cy="0"/>
-        </a:xfrm>
-      </p:grpSpPr>
-      <p:sp>
-        <p:nvSpPr>
-          <p:cNvPr id="16" name="TextBox 15"/>
-          <p:cNvSpPr txBox="1"/>
-          <p:nvPr/>
-        </p:nvSpPr>
-        <p:spPr>
-          <a:xfrm>
-            <a:off x="4969123" y="854313"/>
-            <a:ext cx="8136904" cy="830997"/>
-          </a:xfrm>
-          <a:prstGeom prst="rect">
-            <a:avLst/>
-          </a:prstGeom>
-          <a:noFill/>
-        </p:spPr>
-        <p:txBody>
-          <a:bodyPr wrap="square" rtlCol="0">
-            <a:spAutoFit/>
-          </a:bodyPr>
-          <a:lstStyle/>
-          <a:p>
-            <a:pPr algn="ctr"/>
-            <a:r>
-              <a:rPr lang="sr-Latn-RS" sz="4800" dirty="0">
-                <a:solidFill>
-                  <a:srgbClr val="545250"/>
-                </a:solidFill>
-                <a:latin typeface="Novecento sans wide Book" pitchFamily="50" charset="-94"/>
-              </a:rPr>
-              <a:t>XY</a:t>
-            </a:r>
-            <a:endParaRPr lang="en-US" sz="4800" dirty="0">
-              <a:solidFill>
-                <a:srgbClr val="545250"/>
-              </a:solidFill>
-              <a:latin typeface="Novecento sans wide Book" pitchFamily="50" charset="-94"/>
-            </a:endParaRPr>
-          </a:p>
-        </p:txBody>
-      </p:sp>
-      <p:pic>
-        <p:nvPicPr>
-          <p:cNvPr id="8" name="Picture 7"/>
-          <p:cNvPicPr>
-            <a:picLocks noChangeAspect="1"/>
-          </p:cNvPicPr>
-          <p:nvPr/>
-        </p:nvPicPr>
-        <p:blipFill>
-          <a:blip r:embed="rId3">
-            <a:extLst>
-              <a:ext uri="{28A0092B-C50C-407E-A947-70E740481C1C}">
-                <a14:useLocalDpi xmlns:a14="http://schemas.microsoft.com/office/drawing/2010/main" val="0"/>
-              </a:ext>
-            </a:extLst>
-          </a:blip>
-          <a:stretch>
-            <a:fillRect/>
-          </a:stretch>
-        </p:blipFill>
-        <p:spPr>
-          <a:xfrm rot="5400000">
-            <a:off x="9100648" y="-2221597"/>
-            <a:ext cx="1168254" cy="9003175"/>
-          </a:xfrm>
-          <a:prstGeom prst="rect">
-            <a:avLst/>
-          </a:prstGeom>
-        </p:spPr>
-      </p:pic>
-      <p:pic>
-        <p:nvPicPr>
-          <p:cNvPr id="7" name="Picture 6"/>
-          <p:cNvPicPr>
-            <a:picLocks noChangeAspect="1"/>
-          </p:cNvPicPr>
-          <p:nvPr/>
-        </p:nvPicPr>
-        <p:blipFill>
-          <a:blip r:embed="rId4" cstate="print">
-            <a:extLst>
-              <a:ext uri="{28A0092B-C50C-407E-A947-70E740481C1C}">
-                <a14:useLocalDpi xmlns:a14="http://schemas.microsoft.com/office/drawing/2010/main" val="0"/>
-              </a:ext>
-            </a:extLst>
-          </a:blip>
-          <a:stretch>
-            <a:fillRect/>
-          </a:stretch>
-        </p:blipFill>
-        <p:spPr>
-          <a:xfrm>
-            <a:off x="13488987" y="9412287"/>
-            <a:ext cx="4572000" cy="646390"/>
-          </a:xfrm>
-          <a:prstGeom prst="rect">
-            <a:avLst/>
-          </a:prstGeom>
-        </p:spPr>
-      </p:pic>
-    </p:spTree>
-    <p:extLst>
-      <p:ext uri="{BB962C8B-B14F-4D97-AF65-F5344CB8AC3E}">
-        <p14:creationId xmlns:p14="http://schemas.microsoft.com/office/powerpoint/2010/main" val="2543101088"/>
-      </p:ext>
-    </p:extLst>
-  </p:cSld>
-  <p:clrMapOvr>
-    <a:masterClrMapping/>
-  </p:clrMapOvr>
-  <mc:AlternateContent xmlns:mc="http://schemas.openxmlformats.org/markup-compatibility/2006" xmlns:p14="http://schemas.microsoft.com/office/powerpoint/2010/main">
-    <mc:Choice Requires="p14">
-      <p:transition spd="med" p14:dur="700">
-        <p:fade/>
-      </p:transition>
-    </mc:Choice>
-    <mc:Fallback xmlns="">
-      <p:transition spd="med">
-        <p:fade/>
-      </p:transition>
-    </mc:Fallback>
-  </mc:AlternateContent>
-</p:sld>
-</file>
-
 <file path=ppt/slides/slide2.xml><?xml version="1.0" encoding="utf-8"?>
 <p:sld xmlns:a="http://schemas.openxmlformats.org/drawingml/2006/main" xmlns:r="http://schemas.openxmlformats.org/officeDocument/2006/relationships" xmlns:p="http://schemas.openxmlformats.org/presentationml/2006/main">
   <p:cSld>
@@ -13231,6 +13963,149 @@
 </file>
 
 <file path=ppt/slides/slide20.xml><?xml version="1.0" encoding="utf-8"?>
+<p:sld xmlns:a="http://schemas.openxmlformats.org/drawingml/2006/main" xmlns:r="http://schemas.openxmlformats.org/officeDocument/2006/relationships" xmlns:p="http://schemas.openxmlformats.org/presentationml/2006/main">
+  <p:cSld>
+    <p:spTree>
+      <p:nvGrpSpPr>
+        <p:cNvPr id="1" name=""/>
+        <p:cNvGrpSpPr/>
+        <p:nvPr/>
+      </p:nvGrpSpPr>
+      <p:grpSpPr>
+        <a:xfrm>
+          <a:off x="0" y="0"/>
+          <a:ext cx="0" cy="0"/>
+          <a:chOff x="0" y="0"/>
+          <a:chExt cx="0" cy="0"/>
+        </a:xfrm>
+      </p:grpSpPr>
+      <p:sp>
+        <p:nvSpPr>
+          <p:cNvPr id="16" name="TextBox 15"/>
+          <p:cNvSpPr txBox="1"/>
+          <p:nvPr/>
+        </p:nvSpPr>
+        <p:spPr>
+          <a:xfrm>
+            <a:off x="4969123" y="854313"/>
+            <a:ext cx="8136904" cy="830997"/>
+          </a:xfrm>
+          <a:prstGeom prst="rect">
+            <a:avLst/>
+          </a:prstGeom>
+          <a:noFill/>
+        </p:spPr>
+        <p:txBody>
+          <a:bodyPr wrap="square" rtlCol="0">
+            <a:spAutoFit/>
+          </a:bodyPr>
+          <a:lstStyle/>
+          <a:p>
+            <a:pPr algn="ctr"/>
+            <a:r>
+              <a:rPr lang="sr-Latn-RS" sz="4800" dirty="0">
+                <a:solidFill>
+                  <a:srgbClr val="545250"/>
+                </a:solidFill>
+                <a:latin typeface="Novecento sans wide Book" pitchFamily="50" charset="-94"/>
+              </a:rPr>
+              <a:t>XY</a:t>
+            </a:r>
+            <a:endParaRPr lang="en-US" sz="4800" dirty="0">
+              <a:solidFill>
+                <a:srgbClr val="545250"/>
+              </a:solidFill>
+              <a:latin typeface="Novecento sans wide Book" pitchFamily="50" charset="-94"/>
+            </a:endParaRPr>
+          </a:p>
+        </p:txBody>
+      </p:sp>
+      <p:pic>
+        <p:nvPicPr>
+          <p:cNvPr id="8" name="Picture 7"/>
+          <p:cNvPicPr>
+            <a:picLocks noChangeAspect="1"/>
+          </p:cNvPicPr>
+          <p:nvPr/>
+        </p:nvPicPr>
+        <p:blipFill>
+          <a:blip r:embed="rId3">
+            <a:extLst>
+              <a:ext uri="{28A0092B-C50C-407E-A947-70E740481C1C}">
+                <a14:useLocalDpi xmlns:a14="http://schemas.microsoft.com/office/drawing/2010/main" val="0"/>
+              </a:ext>
+            </a:extLst>
+          </a:blip>
+          <a:stretch>
+            <a:fillRect/>
+          </a:stretch>
+        </p:blipFill>
+        <p:spPr>
+          <a:xfrm rot="5400000">
+            <a:off x="9100648" y="-2221597"/>
+            <a:ext cx="1168254" cy="9003175"/>
+          </a:xfrm>
+          <a:prstGeom prst="rect">
+            <a:avLst/>
+          </a:prstGeom>
+        </p:spPr>
+      </p:pic>
+      <p:pic>
+        <p:nvPicPr>
+          <p:cNvPr id="7" name="Picture 6"/>
+          <p:cNvPicPr>
+            <a:picLocks noChangeAspect="1"/>
+          </p:cNvPicPr>
+          <p:nvPr/>
+        </p:nvPicPr>
+        <p:blipFill>
+          <a:blip r:embed="rId4" cstate="print">
+            <a:extLst>
+              <a:ext uri="{28A0092B-C50C-407E-A947-70E740481C1C}">
+                <a14:useLocalDpi xmlns:a14="http://schemas.microsoft.com/office/drawing/2010/main" val="0"/>
+              </a:ext>
+            </a:extLst>
+          </a:blip>
+          <a:stretch>
+            <a:fillRect/>
+          </a:stretch>
+        </p:blipFill>
+        <p:spPr>
+          <a:xfrm>
+            <a:off x="13488987" y="9412287"/>
+            <a:ext cx="4572000" cy="646390"/>
+          </a:xfrm>
+          <a:prstGeom prst="rect">
+            <a:avLst/>
+          </a:prstGeom>
+        </p:spPr>
+      </p:pic>
+    </p:spTree>
+    <p:extLst>
+      <p:ext uri="{BB962C8B-B14F-4D97-AF65-F5344CB8AC3E}">
+        <p14:creationId xmlns:p14="http://schemas.microsoft.com/office/powerpoint/2010/main" val="2543101088"/>
+      </p:ext>
+    </p:extLst>
+  </p:cSld>
+  <p:clrMapOvr>
+    <a:masterClrMapping/>
+  </p:clrMapOvr>
+  <mc:AlternateContent xmlns:mc="http://schemas.openxmlformats.org/markup-compatibility/2006" xmlns:p14="http://schemas.microsoft.com/office/powerpoint/2010/main">
+    <mc:Choice Requires="p14">
+      <p:transition spd="med" p14:dur="700">
+        <p:fade/>
+      </p:transition>
+    </mc:Choice>
+    <mc:Fallback xmlns="">
+      <p:transition spd="med">
+        <p:fade/>
+      </p:transition>
+    </mc:Fallback>
+  </mc:AlternateContent>
+</p:sld>
+</file>
+
+<file path=ppt/slides/slide21.xml><?xml version="1.0" encoding="utf-8"?>
 <p:sld xmlns:a="http://schemas.openxmlformats.org/drawingml/2006/main" xmlns:r="http://schemas.openxmlformats.org/officeDocument/2006/relationships" xmlns:p="http://schemas.openxmlformats.org/presentationml/2006/main">
   <p:cSld>
     <p:spTree>

</xml_diff>

<commit_message>
DI Containers folder added, refactor
</commit_message>
<xml_diff>
--- a/DI Course.pptx
+++ b/DI Course.pptx
@@ -5,10 +5,10 @@
     <p:sldMasterId id="2147483650" r:id="rId1"/>
   </p:sldMasterIdLst>
   <p:notesMasterIdLst>
-    <p:notesMasterId r:id="rId24"/>
+    <p:notesMasterId r:id="rId25"/>
   </p:notesMasterIdLst>
   <p:handoutMasterIdLst>
-    <p:handoutMasterId r:id="rId25"/>
+    <p:handoutMasterId r:id="rId26"/>
   </p:handoutMasterIdLst>
   <p:sldIdLst>
     <p:sldId id="256" r:id="rId2"/>
@@ -31,8 +31,9 @@
     <p:sldId id="340" r:id="rId19"/>
     <p:sldId id="347" r:id="rId20"/>
     <p:sldId id="348" r:id="rId21"/>
-    <p:sldId id="327" r:id="rId22"/>
-    <p:sldId id="295" r:id="rId23"/>
+    <p:sldId id="356" r:id="rId22"/>
+    <p:sldId id="327" r:id="rId23"/>
+    <p:sldId id="295" r:id="rId24"/>
   </p:sldIdLst>
   <p:sldSz cx="18291175" cy="10290175"/>
   <p:notesSz cx="6858000" cy="9144000"/>
@@ -1875,7 +1876,7 @@
     </p:spTree>
     <p:extLst>
       <p:ext uri="{BB962C8B-B14F-4D97-AF65-F5344CB8AC3E}">
-        <p14:creationId xmlns:p14="http://schemas.microsoft.com/office/powerpoint/2010/main" val="2338377447"/>
+        <p14:creationId xmlns:p14="http://schemas.microsoft.com/office/powerpoint/2010/main" val="3324600378"/>
       </p:ext>
     </p:extLst>
   </p:cSld>
@@ -1952,6 +1953,91 @@
               <a:rPr lang="tr-TR" smtClean="0"/>
               <a:pPr/>
               <a:t>22</a:t>
+            </a:fld>
+            <a:endParaRPr lang="tr-TR"/>
+          </a:p>
+        </p:txBody>
+      </p:sp>
+    </p:spTree>
+    <p:extLst>
+      <p:ext uri="{BB962C8B-B14F-4D97-AF65-F5344CB8AC3E}">
+        <p14:creationId xmlns:p14="http://schemas.microsoft.com/office/powerpoint/2010/main" val="2338377447"/>
+      </p:ext>
+    </p:extLst>
+  </p:cSld>
+  <p:clrMapOvr>
+    <a:masterClrMapping/>
+  </p:clrMapOvr>
+</p:notes>
+</file>
+
+<file path=ppt/notesSlides/notesSlide23.xml><?xml version="1.0" encoding="utf-8"?>
+<p:notes xmlns:a="http://schemas.openxmlformats.org/drawingml/2006/main" xmlns:r="http://schemas.openxmlformats.org/officeDocument/2006/relationships" xmlns:p="http://schemas.openxmlformats.org/presentationml/2006/main">
+  <p:cSld>
+    <p:spTree>
+      <p:nvGrpSpPr>
+        <p:cNvPr id="1" name=""/>
+        <p:cNvGrpSpPr/>
+        <p:nvPr/>
+      </p:nvGrpSpPr>
+      <p:grpSpPr>
+        <a:xfrm>
+          <a:off x="0" y="0"/>
+          <a:ext cx="0" cy="0"/>
+          <a:chOff x="0" y="0"/>
+          <a:chExt cx="0" cy="0"/>
+        </a:xfrm>
+      </p:grpSpPr>
+      <p:sp>
+        <p:nvSpPr>
+          <p:cNvPr id="2" name="Slide Image Placeholder 1"/>
+          <p:cNvSpPr>
+            <a:spLocks noGrp="1" noRot="1" noChangeAspect="1"/>
+          </p:cNvSpPr>
+          <p:nvPr>
+            <p:ph type="sldImg"/>
+          </p:nvPr>
+        </p:nvSpPr>
+        <p:spPr/>
+      </p:sp>
+      <p:sp>
+        <p:nvSpPr>
+          <p:cNvPr id="3" name="Notes Placeholder 2"/>
+          <p:cNvSpPr>
+            <a:spLocks noGrp="1"/>
+          </p:cNvSpPr>
+          <p:nvPr>
+            <p:ph type="body" idx="1"/>
+          </p:nvPr>
+        </p:nvSpPr>
+        <p:spPr/>
+        <p:txBody>
+          <a:bodyPr/>
+          <a:lstStyle/>
+          <a:p>
+            <a:endParaRPr lang="tr-TR" dirty="0"/>
+          </a:p>
+        </p:txBody>
+      </p:sp>
+      <p:sp>
+        <p:nvSpPr>
+          <p:cNvPr id="4" name="Slide Number Placeholder 3"/>
+          <p:cNvSpPr>
+            <a:spLocks noGrp="1"/>
+          </p:cNvSpPr>
+          <p:nvPr>
+            <p:ph type="sldNum" sz="quarter" idx="10"/>
+          </p:nvPr>
+        </p:nvSpPr>
+        <p:spPr/>
+        <p:txBody>
+          <a:bodyPr/>
+          <a:lstStyle/>
+          <a:p>
+            <a:fld id="{802DA432-7CF7-4A2F-BE93-45834DC6981A}" type="slidenum">
+              <a:rPr lang="tr-TR" smtClean="0"/>
+              <a:pPr/>
+              <a:t>23</a:t>
             </a:fld>
             <a:endParaRPr lang="tr-TR"/>
           </a:p>
@@ -5769,7 +5855,7 @@
         <p:spPr>
           <a:xfrm>
             <a:off x="3735387" y="5526087"/>
-            <a:ext cx="10575486" cy="2677656"/>
+            <a:ext cx="10575486" cy="3416320"/>
           </a:xfrm>
           <a:prstGeom prst="rect">
             <a:avLst/>
@@ -5807,6 +5893,18 @@
               </a:solidFill>
               <a:latin typeface="Novecento sans wide Book" pitchFamily="50" charset="-94"/>
             </a:endParaRPr>
+          </a:p>
+          <a:p>
+            <a:pPr algn="ctr"/>
+            <a:r>
+              <a:rPr lang="sr-Latn-RS" sz="4800" dirty="0">
+                <a:solidFill>
+                  <a:srgbClr val="545250"/>
+                </a:solidFill>
+                <a:latin typeface="Novecento sans wide Book" pitchFamily="50" charset="-94"/>
+              </a:rPr>
+              <a:t>Nemanja Đorđević</a:t>
+            </a:r>
           </a:p>
           <a:p>
             <a:pPr algn="ctr"/>
@@ -11366,7 +11464,7 @@
         <p:spPr>
           <a:xfrm>
             <a:off x="4040187" y="4230687"/>
-            <a:ext cx="9066928" cy="3139321"/>
+            <a:ext cx="12649200" cy="3139321"/>
           </a:xfrm>
           <a:prstGeom prst="rect">
             <a:avLst/>
@@ -11379,7 +11477,6 @@
           </a:bodyPr>
           <a:lstStyle/>
           <a:p>
-            <a:pPr algn="ctr"/>
             <a:r>
               <a:rPr lang="it-IT" sz="6600" dirty="0">
                 <a:solidFill>
@@ -11387,7 +11484,7 @@
                 </a:solidFill>
                 <a:latin typeface="Novecento sans wide Book" pitchFamily="50" charset="-94"/>
               </a:rPr>
-              <a:t>DEMO: Add Bootstraper app, add different Repository</a:t>
+              <a:t>DEMO: Add Bootstraper app, Add different Repository, Add Caching repository</a:t>
             </a:r>
             <a:endParaRPr lang="sr-Latn-RS" sz="6600" dirty="0">
               <a:solidFill>
@@ -14232,6 +14329,172 @@
           <a:p>
             <a:pPr algn="ctr"/>
             <a:r>
+              <a:rPr lang="en-US" sz="4800" dirty="0">
+                <a:solidFill>
+                  <a:srgbClr val="545250"/>
+                </a:solidFill>
+                <a:latin typeface="Novecento sans wide Book" pitchFamily="50" charset="-94"/>
+              </a:rPr>
+              <a:t>Composition Root</a:t>
+            </a:r>
+          </a:p>
+        </p:txBody>
+      </p:sp>
+      <p:pic>
+        <p:nvPicPr>
+          <p:cNvPr id="8" name="Picture 7"/>
+          <p:cNvPicPr>
+            <a:picLocks noChangeAspect="1"/>
+          </p:cNvPicPr>
+          <p:nvPr/>
+        </p:nvPicPr>
+        <p:blipFill>
+          <a:blip r:embed="rId3">
+            <a:extLst>
+              <a:ext uri="{28A0092B-C50C-407E-A947-70E740481C1C}">
+                <a14:useLocalDpi xmlns:a14="http://schemas.microsoft.com/office/drawing/2010/main" val="0"/>
+              </a:ext>
+            </a:extLst>
+          </a:blip>
+          <a:stretch>
+            <a:fillRect/>
+          </a:stretch>
+        </p:blipFill>
+        <p:spPr>
+          <a:xfrm rot="5400000">
+            <a:off x="9100648" y="-2221597"/>
+            <a:ext cx="1168254" cy="9003175"/>
+          </a:xfrm>
+          <a:prstGeom prst="rect">
+            <a:avLst/>
+          </a:prstGeom>
+        </p:spPr>
+      </p:pic>
+      <p:pic>
+        <p:nvPicPr>
+          <p:cNvPr id="7" name="Picture 6"/>
+          <p:cNvPicPr>
+            <a:picLocks noChangeAspect="1"/>
+          </p:cNvPicPr>
+          <p:nvPr/>
+        </p:nvPicPr>
+        <p:blipFill>
+          <a:blip r:embed="rId4" cstate="print">
+            <a:extLst>
+              <a:ext uri="{28A0092B-C50C-407E-A947-70E740481C1C}">
+                <a14:useLocalDpi xmlns:a14="http://schemas.microsoft.com/office/drawing/2010/main" val="0"/>
+              </a:ext>
+            </a:extLst>
+          </a:blip>
+          <a:stretch>
+            <a:fillRect/>
+          </a:stretch>
+        </p:blipFill>
+        <p:spPr>
+          <a:xfrm>
+            <a:off x="13488987" y="9412287"/>
+            <a:ext cx="4572000" cy="646390"/>
+          </a:xfrm>
+          <a:prstGeom prst="rect">
+            <a:avLst/>
+          </a:prstGeom>
+        </p:spPr>
+      </p:pic>
+      <p:sp>
+        <p:nvSpPr>
+          <p:cNvPr id="3" name="Rectangle 2"/>
+          <p:cNvSpPr/>
+          <p:nvPr/>
+        </p:nvSpPr>
+        <p:spPr>
+          <a:xfrm>
+            <a:off x="1777724" y="3392487"/>
+            <a:ext cx="7255576" cy="584775"/>
+          </a:xfrm>
+          <a:prstGeom prst="rect">
+            <a:avLst/>
+          </a:prstGeom>
+        </p:spPr>
+        <p:txBody>
+          <a:bodyPr wrap="none">
+            <a:spAutoFit/>
+          </a:bodyPr>
+          <a:lstStyle/>
+          <a:p>
+            <a:r>
+              <a:rPr lang="en-US" dirty="0"/>
+              <a:t>Where should we compose object graphs?</a:t>
+            </a:r>
+            <a:endParaRPr lang="sr-Latn-RS" dirty="0"/>
+          </a:p>
+        </p:txBody>
+      </p:sp>
+    </p:spTree>
+    <p:extLst>
+      <p:ext uri="{BB962C8B-B14F-4D97-AF65-F5344CB8AC3E}">
+        <p14:creationId xmlns:p14="http://schemas.microsoft.com/office/powerpoint/2010/main" val="707020203"/>
+      </p:ext>
+    </p:extLst>
+  </p:cSld>
+  <p:clrMapOvr>
+    <a:masterClrMapping/>
+  </p:clrMapOvr>
+  <mc:AlternateContent xmlns:mc="http://schemas.openxmlformats.org/markup-compatibility/2006" xmlns:p14="http://schemas.microsoft.com/office/powerpoint/2010/main">
+    <mc:Choice Requires="p14">
+      <p:transition spd="med" p14:dur="700">
+        <p:fade/>
+      </p:transition>
+    </mc:Choice>
+    <mc:Fallback xmlns="">
+      <p:transition spd="med">
+        <p:fade/>
+      </p:transition>
+    </mc:Fallback>
+  </mc:AlternateContent>
+</p:sld>
+</file>
+
+<file path=ppt/slides/slide22.xml><?xml version="1.0" encoding="utf-8"?>
+<p:sld xmlns:a="http://schemas.openxmlformats.org/drawingml/2006/main" xmlns:r="http://schemas.openxmlformats.org/officeDocument/2006/relationships" xmlns:p="http://schemas.openxmlformats.org/presentationml/2006/main">
+  <p:cSld>
+    <p:spTree>
+      <p:nvGrpSpPr>
+        <p:cNvPr id="1" name=""/>
+        <p:cNvGrpSpPr/>
+        <p:nvPr/>
+      </p:nvGrpSpPr>
+      <p:grpSpPr>
+        <a:xfrm>
+          <a:off x="0" y="0"/>
+          <a:ext cx="0" cy="0"/>
+          <a:chOff x="0" y="0"/>
+          <a:chExt cx="0" cy="0"/>
+        </a:xfrm>
+      </p:grpSpPr>
+      <p:sp>
+        <p:nvSpPr>
+          <p:cNvPr id="16" name="TextBox 15"/>
+          <p:cNvSpPr txBox="1"/>
+          <p:nvPr/>
+        </p:nvSpPr>
+        <p:spPr>
+          <a:xfrm>
+            <a:off x="4969123" y="854313"/>
+            <a:ext cx="8136904" cy="830997"/>
+          </a:xfrm>
+          <a:prstGeom prst="rect">
+            <a:avLst/>
+          </a:prstGeom>
+          <a:noFill/>
+        </p:spPr>
+        <p:txBody>
+          <a:bodyPr wrap="square" rtlCol="0">
+            <a:spAutoFit/>
+          </a:bodyPr>
+          <a:lstStyle/>
+          <a:p>
+            <a:pPr algn="ctr"/>
+            <a:r>
               <a:rPr lang="sr-Latn-RS" sz="4800" dirty="0">
                 <a:solidFill>
                   <a:srgbClr val="545250"/>
@@ -14334,7 +14597,7 @@
 </p:sld>
 </file>
 
-<file path=ppt/slides/slide22.xml><?xml version="1.0" encoding="utf-8"?>
+<file path=ppt/slides/slide23.xml><?xml version="1.0" encoding="utf-8"?>
 <p:sld xmlns:a="http://schemas.openxmlformats.org/drawingml/2006/main" xmlns:r="http://schemas.openxmlformats.org/officeDocument/2006/relationships" xmlns:p="http://schemas.openxmlformats.org/presentationml/2006/main">
   <p:cSld>
     <p:spTree>

</xml_diff>

<commit_message>
added DI Containers slides
</commit_message>
<xml_diff>
--- a/DI Course.pptx
+++ b/DI Course.pptx
@@ -5,10 +5,10 @@
     <p:sldMasterId id="2147483650" r:id="rId1"/>
   </p:sldMasterIdLst>
   <p:notesMasterIdLst>
-    <p:notesMasterId r:id="rId25"/>
+    <p:notesMasterId r:id="rId28"/>
   </p:notesMasterIdLst>
   <p:handoutMasterIdLst>
-    <p:handoutMasterId r:id="rId26"/>
+    <p:handoutMasterId r:id="rId29"/>
   </p:handoutMasterIdLst>
   <p:sldIdLst>
     <p:sldId id="256" r:id="rId2"/>
@@ -28,12 +28,15 @@
     <p:sldId id="343" r:id="rId16"/>
     <p:sldId id="354" r:id="rId17"/>
     <p:sldId id="355" r:id="rId18"/>
-    <p:sldId id="340" r:id="rId19"/>
-    <p:sldId id="347" r:id="rId20"/>
-    <p:sldId id="348" r:id="rId21"/>
-    <p:sldId id="356" r:id="rId22"/>
-    <p:sldId id="327" r:id="rId23"/>
-    <p:sldId id="295" r:id="rId24"/>
+    <p:sldId id="356" r:id="rId19"/>
+    <p:sldId id="357" r:id="rId20"/>
+    <p:sldId id="340" r:id="rId21"/>
+    <p:sldId id="347" r:id="rId22"/>
+    <p:sldId id="348" r:id="rId23"/>
+    <p:sldId id="358" r:id="rId24"/>
+    <p:sldId id="359" r:id="rId25"/>
+    <p:sldId id="327" r:id="rId26"/>
+    <p:sldId id="295" r:id="rId27"/>
   </p:sldIdLst>
   <p:sldSz cx="18291175" cy="10290175"/>
   <p:notesSz cx="6858000" cy="9144000"/>
@@ -260,7 +263,7 @@
             <a:fld id="{4D0CBB7A-33AF-434C-B8C5-B5F21D294CDF}" type="datetimeFigureOut">
               <a:rPr lang="tr-TR" smtClean="0"/>
               <a:pPr/>
-              <a:t>5.04.2017</a:t>
+              <a:t>6.04.2017</a:t>
             </a:fld>
             <a:endParaRPr lang="tr-TR"/>
           </a:p>
@@ -427,7 +430,7 @@
             <a:fld id="{6C6C1039-E6FF-4F78-9751-FFD9A3AC8099}" type="datetimeFigureOut">
               <a:rPr lang="tr-TR" smtClean="0"/>
               <a:pPr/>
-              <a:t>5.04.2017</a:t>
+              <a:t>6.04.2017</a:t>
             </a:fld>
             <a:endParaRPr lang="tr-TR"/>
           </a:p>
@@ -1536,7 +1539,7 @@
     </p:spTree>
     <p:extLst>
       <p:ext uri="{BB962C8B-B14F-4D97-AF65-F5344CB8AC3E}">
-        <p14:creationId xmlns:p14="http://schemas.microsoft.com/office/powerpoint/2010/main" val="2488509581"/>
+        <p14:creationId xmlns:p14="http://schemas.microsoft.com/office/powerpoint/2010/main" val="2850449631"/>
       </p:ext>
     </p:extLst>
   </p:cSld>
@@ -1621,7 +1624,7 @@
     </p:spTree>
     <p:extLst>
       <p:ext uri="{BB962C8B-B14F-4D97-AF65-F5344CB8AC3E}">
-        <p14:creationId xmlns:p14="http://schemas.microsoft.com/office/powerpoint/2010/main" val="1790556973"/>
+        <p14:creationId xmlns:p14="http://schemas.microsoft.com/office/powerpoint/2010/main" val="3340181050"/>
       </p:ext>
     </p:extLst>
   </p:cSld>
@@ -1791,7 +1794,7 @@
     </p:spTree>
     <p:extLst>
       <p:ext uri="{BB962C8B-B14F-4D97-AF65-F5344CB8AC3E}">
-        <p14:creationId xmlns:p14="http://schemas.microsoft.com/office/powerpoint/2010/main" val="3810562109"/>
+        <p14:creationId xmlns:p14="http://schemas.microsoft.com/office/powerpoint/2010/main" val="2488509581"/>
       </p:ext>
     </p:extLst>
   </p:cSld>
@@ -1876,7 +1879,7 @@
     </p:spTree>
     <p:extLst>
       <p:ext uri="{BB962C8B-B14F-4D97-AF65-F5344CB8AC3E}">
-        <p14:creationId xmlns:p14="http://schemas.microsoft.com/office/powerpoint/2010/main" val="3324600378"/>
+        <p14:creationId xmlns:p14="http://schemas.microsoft.com/office/powerpoint/2010/main" val="1790556973"/>
       </p:ext>
     </p:extLst>
   </p:cSld>
@@ -1961,7 +1964,7 @@
     </p:spTree>
     <p:extLst>
       <p:ext uri="{BB962C8B-B14F-4D97-AF65-F5344CB8AC3E}">
-        <p14:creationId xmlns:p14="http://schemas.microsoft.com/office/powerpoint/2010/main" val="2338377447"/>
+        <p14:creationId xmlns:p14="http://schemas.microsoft.com/office/powerpoint/2010/main" val="3810562109"/>
       </p:ext>
     </p:extLst>
   </p:cSld>
@@ -2038,6 +2041,261 @@
               <a:rPr lang="tr-TR" smtClean="0"/>
               <a:pPr/>
               <a:t>23</a:t>
+            </a:fld>
+            <a:endParaRPr lang="tr-TR"/>
+          </a:p>
+        </p:txBody>
+      </p:sp>
+    </p:spTree>
+    <p:extLst>
+      <p:ext uri="{BB962C8B-B14F-4D97-AF65-F5344CB8AC3E}">
+        <p14:creationId xmlns:p14="http://schemas.microsoft.com/office/powerpoint/2010/main" val="4062641268"/>
+      </p:ext>
+    </p:extLst>
+  </p:cSld>
+  <p:clrMapOvr>
+    <a:masterClrMapping/>
+  </p:clrMapOvr>
+</p:notes>
+</file>
+
+<file path=ppt/notesSlides/notesSlide24.xml><?xml version="1.0" encoding="utf-8"?>
+<p:notes xmlns:a="http://schemas.openxmlformats.org/drawingml/2006/main" xmlns:r="http://schemas.openxmlformats.org/officeDocument/2006/relationships" xmlns:p="http://schemas.openxmlformats.org/presentationml/2006/main">
+  <p:cSld>
+    <p:spTree>
+      <p:nvGrpSpPr>
+        <p:cNvPr id="1" name=""/>
+        <p:cNvGrpSpPr/>
+        <p:nvPr/>
+      </p:nvGrpSpPr>
+      <p:grpSpPr>
+        <a:xfrm>
+          <a:off x="0" y="0"/>
+          <a:ext cx="0" cy="0"/>
+          <a:chOff x="0" y="0"/>
+          <a:chExt cx="0" cy="0"/>
+        </a:xfrm>
+      </p:grpSpPr>
+      <p:sp>
+        <p:nvSpPr>
+          <p:cNvPr id="2" name="Slide Image Placeholder 1"/>
+          <p:cNvSpPr>
+            <a:spLocks noGrp="1" noRot="1" noChangeAspect="1"/>
+          </p:cNvSpPr>
+          <p:nvPr>
+            <p:ph type="sldImg"/>
+          </p:nvPr>
+        </p:nvSpPr>
+        <p:spPr/>
+      </p:sp>
+      <p:sp>
+        <p:nvSpPr>
+          <p:cNvPr id="3" name="Notes Placeholder 2"/>
+          <p:cNvSpPr>
+            <a:spLocks noGrp="1"/>
+          </p:cNvSpPr>
+          <p:nvPr>
+            <p:ph type="body" idx="1"/>
+          </p:nvPr>
+        </p:nvSpPr>
+        <p:spPr/>
+        <p:txBody>
+          <a:bodyPr/>
+          <a:lstStyle/>
+          <a:p>
+            <a:endParaRPr lang="tr-TR" dirty="0"/>
+          </a:p>
+        </p:txBody>
+      </p:sp>
+      <p:sp>
+        <p:nvSpPr>
+          <p:cNvPr id="4" name="Slide Number Placeholder 3"/>
+          <p:cNvSpPr>
+            <a:spLocks noGrp="1"/>
+          </p:cNvSpPr>
+          <p:nvPr>
+            <p:ph type="sldNum" sz="quarter" idx="10"/>
+          </p:nvPr>
+        </p:nvSpPr>
+        <p:spPr/>
+        <p:txBody>
+          <a:bodyPr/>
+          <a:lstStyle/>
+          <a:p>
+            <a:fld id="{802DA432-7CF7-4A2F-BE93-45834DC6981A}" type="slidenum">
+              <a:rPr lang="tr-TR" smtClean="0"/>
+              <a:pPr/>
+              <a:t>24</a:t>
+            </a:fld>
+            <a:endParaRPr lang="tr-TR"/>
+          </a:p>
+        </p:txBody>
+      </p:sp>
+    </p:spTree>
+    <p:extLst>
+      <p:ext uri="{BB962C8B-B14F-4D97-AF65-F5344CB8AC3E}">
+        <p14:creationId xmlns:p14="http://schemas.microsoft.com/office/powerpoint/2010/main" val="3476181309"/>
+      </p:ext>
+    </p:extLst>
+  </p:cSld>
+  <p:clrMapOvr>
+    <a:masterClrMapping/>
+  </p:clrMapOvr>
+</p:notes>
+</file>
+
+<file path=ppt/notesSlides/notesSlide25.xml><?xml version="1.0" encoding="utf-8"?>
+<p:notes xmlns:a="http://schemas.openxmlformats.org/drawingml/2006/main" xmlns:r="http://schemas.openxmlformats.org/officeDocument/2006/relationships" xmlns:p="http://schemas.openxmlformats.org/presentationml/2006/main">
+  <p:cSld>
+    <p:spTree>
+      <p:nvGrpSpPr>
+        <p:cNvPr id="1" name=""/>
+        <p:cNvGrpSpPr/>
+        <p:nvPr/>
+      </p:nvGrpSpPr>
+      <p:grpSpPr>
+        <a:xfrm>
+          <a:off x="0" y="0"/>
+          <a:ext cx="0" cy="0"/>
+          <a:chOff x="0" y="0"/>
+          <a:chExt cx="0" cy="0"/>
+        </a:xfrm>
+      </p:grpSpPr>
+      <p:sp>
+        <p:nvSpPr>
+          <p:cNvPr id="2" name="Slide Image Placeholder 1"/>
+          <p:cNvSpPr>
+            <a:spLocks noGrp="1" noRot="1" noChangeAspect="1"/>
+          </p:cNvSpPr>
+          <p:nvPr>
+            <p:ph type="sldImg"/>
+          </p:nvPr>
+        </p:nvSpPr>
+        <p:spPr/>
+      </p:sp>
+      <p:sp>
+        <p:nvSpPr>
+          <p:cNvPr id="3" name="Notes Placeholder 2"/>
+          <p:cNvSpPr>
+            <a:spLocks noGrp="1"/>
+          </p:cNvSpPr>
+          <p:nvPr>
+            <p:ph type="body" idx="1"/>
+          </p:nvPr>
+        </p:nvSpPr>
+        <p:spPr/>
+        <p:txBody>
+          <a:bodyPr/>
+          <a:lstStyle/>
+          <a:p>
+            <a:endParaRPr lang="tr-TR" dirty="0"/>
+          </a:p>
+        </p:txBody>
+      </p:sp>
+      <p:sp>
+        <p:nvSpPr>
+          <p:cNvPr id="4" name="Slide Number Placeholder 3"/>
+          <p:cNvSpPr>
+            <a:spLocks noGrp="1"/>
+          </p:cNvSpPr>
+          <p:nvPr>
+            <p:ph type="sldNum" sz="quarter" idx="10"/>
+          </p:nvPr>
+        </p:nvSpPr>
+        <p:spPr/>
+        <p:txBody>
+          <a:bodyPr/>
+          <a:lstStyle/>
+          <a:p>
+            <a:fld id="{802DA432-7CF7-4A2F-BE93-45834DC6981A}" type="slidenum">
+              <a:rPr lang="tr-TR" smtClean="0"/>
+              <a:pPr/>
+              <a:t>25</a:t>
+            </a:fld>
+            <a:endParaRPr lang="tr-TR"/>
+          </a:p>
+        </p:txBody>
+      </p:sp>
+    </p:spTree>
+    <p:extLst>
+      <p:ext uri="{BB962C8B-B14F-4D97-AF65-F5344CB8AC3E}">
+        <p14:creationId xmlns:p14="http://schemas.microsoft.com/office/powerpoint/2010/main" val="2338377447"/>
+      </p:ext>
+    </p:extLst>
+  </p:cSld>
+  <p:clrMapOvr>
+    <a:masterClrMapping/>
+  </p:clrMapOvr>
+</p:notes>
+</file>
+
+<file path=ppt/notesSlides/notesSlide26.xml><?xml version="1.0" encoding="utf-8"?>
+<p:notes xmlns:a="http://schemas.openxmlformats.org/drawingml/2006/main" xmlns:r="http://schemas.openxmlformats.org/officeDocument/2006/relationships" xmlns:p="http://schemas.openxmlformats.org/presentationml/2006/main">
+  <p:cSld>
+    <p:spTree>
+      <p:nvGrpSpPr>
+        <p:cNvPr id="1" name=""/>
+        <p:cNvGrpSpPr/>
+        <p:nvPr/>
+      </p:nvGrpSpPr>
+      <p:grpSpPr>
+        <a:xfrm>
+          <a:off x="0" y="0"/>
+          <a:ext cx="0" cy="0"/>
+          <a:chOff x="0" y="0"/>
+          <a:chExt cx="0" cy="0"/>
+        </a:xfrm>
+      </p:grpSpPr>
+      <p:sp>
+        <p:nvSpPr>
+          <p:cNvPr id="2" name="Slide Image Placeholder 1"/>
+          <p:cNvSpPr>
+            <a:spLocks noGrp="1" noRot="1" noChangeAspect="1"/>
+          </p:cNvSpPr>
+          <p:nvPr>
+            <p:ph type="sldImg"/>
+          </p:nvPr>
+        </p:nvSpPr>
+        <p:spPr/>
+      </p:sp>
+      <p:sp>
+        <p:nvSpPr>
+          <p:cNvPr id="3" name="Notes Placeholder 2"/>
+          <p:cNvSpPr>
+            <a:spLocks noGrp="1"/>
+          </p:cNvSpPr>
+          <p:nvPr>
+            <p:ph type="body" idx="1"/>
+          </p:nvPr>
+        </p:nvSpPr>
+        <p:spPr/>
+        <p:txBody>
+          <a:bodyPr/>
+          <a:lstStyle/>
+          <a:p>
+            <a:endParaRPr lang="tr-TR" dirty="0"/>
+          </a:p>
+        </p:txBody>
+      </p:sp>
+      <p:sp>
+        <p:nvSpPr>
+          <p:cNvPr id="4" name="Slide Number Placeholder 3"/>
+          <p:cNvSpPr>
+            <a:spLocks noGrp="1"/>
+          </p:cNvSpPr>
+          <p:nvPr>
+            <p:ph type="sldNum" sz="quarter" idx="10"/>
+          </p:nvPr>
+        </p:nvSpPr>
+        <p:spPr/>
+        <p:txBody>
+          <a:bodyPr/>
+          <a:lstStyle/>
+          <a:p>
+            <a:fld id="{802DA432-7CF7-4A2F-BE93-45834DC6981A}" type="slidenum">
+              <a:rPr lang="tr-TR" smtClean="0"/>
+              <a:pPr/>
+              <a:t>26</a:t>
             </a:fld>
             <a:endParaRPr lang="tr-TR"/>
           </a:p>
@@ -2833,7 +3091,7 @@
             <a:fld id="{DC9C75F7-98FD-4D05-8C3F-C506B544AE03}" type="datetimeFigureOut">
               <a:rPr lang="tr-TR" smtClean="0"/>
               <a:pPr/>
-              <a:t>5.04.2017</a:t>
+              <a:t>6.04.2017</a:t>
             </a:fld>
             <a:endParaRPr lang="tr-TR"/>
           </a:p>
@@ -3017,7 +3275,7 @@
             <a:fld id="{DC9C75F7-98FD-4D05-8C3F-C506B544AE03}" type="datetimeFigureOut">
               <a:rPr lang="tr-TR" smtClean="0"/>
               <a:pPr/>
-              <a:t>5.04.2017</a:t>
+              <a:t>6.04.2017</a:t>
             </a:fld>
             <a:endParaRPr lang="tr-TR"/>
           </a:p>
@@ -3211,7 +3469,7 @@
             <a:fld id="{DC9C75F7-98FD-4D05-8C3F-C506B544AE03}" type="datetimeFigureOut">
               <a:rPr lang="tr-TR" smtClean="0"/>
               <a:pPr/>
-              <a:t>5.04.2017</a:t>
+              <a:t>6.04.2017</a:t>
             </a:fld>
             <a:endParaRPr lang="tr-TR"/>
           </a:p>
@@ -3395,7 +3653,7 @@
             <a:fld id="{DC9C75F7-98FD-4D05-8C3F-C506B544AE03}" type="datetimeFigureOut">
               <a:rPr lang="tr-TR" smtClean="0"/>
               <a:pPr/>
-              <a:t>5.04.2017</a:t>
+              <a:t>6.04.2017</a:t>
             </a:fld>
             <a:endParaRPr lang="tr-TR"/>
           </a:p>
@@ -3655,7 +3913,7 @@
             <a:fld id="{DC9C75F7-98FD-4D05-8C3F-C506B544AE03}" type="datetimeFigureOut">
               <a:rPr lang="tr-TR" smtClean="0"/>
               <a:pPr/>
-              <a:t>5.04.2017</a:t>
+              <a:t>6.04.2017</a:t>
             </a:fld>
             <a:endParaRPr lang="tr-TR"/>
           </a:p>
@@ -3957,7 +4215,7 @@
             <a:fld id="{DC9C75F7-98FD-4D05-8C3F-C506B544AE03}" type="datetimeFigureOut">
               <a:rPr lang="tr-TR" smtClean="0"/>
               <a:pPr/>
-              <a:t>5.04.2017</a:t>
+              <a:t>6.04.2017</a:t>
             </a:fld>
             <a:endParaRPr lang="tr-TR"/>
           </a:p>
@@ -4393,7 +4651,7 @@
             <a:fld id="{DC9C75F7-98FD-4D05-8C3F-C506B544AE03}" type="datetimeFigureOut">
               <a:rPr lang="tr-TR" smtClean="0"/>
               <a:pPr/>
-              <a:t>5.04.2017</a:t>
+              <a:t>6.04.2017</a:t>
             </a:fld>
             <a:endParaRPr lang="tr-TR"/>
           </a:p>
@@ -4525,7 +4783,7 @@
             <a:fld id="{DC9C75F7-98FD-4D05-8C3F-C506B544AE03}" type="datetimeFigureOut">
               <a:rPr lang="tr-TR" smtClean="0"/>
               <a:pPr/>
-              <a:t>5.04.2017</a:t>
+              <a:t>6.04.2017</a:t>
             </a:fld>
             <a:endParaRPr lang="tr-TR"/>
           </a:p>
@@ -4634,7 +4892,7 @@
             <a:fld id="{DC9C75F7-98FD-4D05-8C3F-C506B544AE03}" type="datetimeFigureOut">
               <a:rPr lang="tr-TR" smtClean="0"/>
               <a:pPr/>
-              <a:t>5.04.2017</a:t>
+              <a:t>6.04.2017</a:t>
             </a:fld>
             <a:endParaRPr lang="tr-TR"/>
           </a:p>
@@ -4925,7 +5183,7 @@
             <a:fld id="{DC9C75F7-98FD-4D05-8C3F-C506B544AE03}" type="datetimeFigureOut">
               <a:rPr lang="tr-TR" smtClean="0"/>
               <a:pPr/>
-              <a:t>5.04.2017</a:t>
+              <a:t>6.04.2017</a:t>
             </a:fld>
             <a:endParaRPr lang="tr-TR"/>
           </a:p>
@@ -5192,7 +5450,7 @@
             <a:fld id="{DC9C75F7-98FD-4D05-8C3F-C506B544AE03}" type="datetimeFigureOut">
               <a:rPr lang="tr-TR" smtClean="0"/>
               <a:pPr/>
-              <a:t>5.04.2017</a:t>
+              <a:t>6.04.2017</a:t>
             </a:fld>
             <a:endParaRPr lang="tr-TR"/>
           </a:p>
@@ -5428,7 +5686,7 @@
             <a:fld id="{DC9C75F7-98FD-4D05-8C3F-C506B544AE03}" type="datetimeFigureOut">
               <a:rPr lang="tr-TR" smtClean="0"/>
               <a:pPr/>
-              <a:t>5.04.2017</a:t>
+              <a:t>6.04.2017</a:t>
             </a:fld>
             <a:endParaRPr lang="tr-TR"/>
           </a:p>
@@ -11627,6 +11885,1872 @@
                 </a:solidFill>
                 <a:latin typeface="Novecento sans wide Book" pitchFamily="50" charset="-94"/>
               </a:rPr>
+              <a:t>Composition Root</a:t>
+            </a:r>
+          </a:p>
+        </p:txBody>
+      </p:sp>
+      <p:pic>
+        <p:nvPicPr>
+          <p:cNvPr id="8" name="Picture 7"/>
+          <p:cNvPicPr>
+            <a:picLocks noChangeAspect="1"/>
+          </p:cNvPicPr>
+          <p:nvPr/>
+        </p:nvPicPr>
+        <p:blipFill>
+          <a:blip r:embed="rId3">
+            <a:extLst>
+              <a:ext uri="{28A0092B-C50C-407E-A947-70E740481C1C}">
+                <a14:useLocalDpi xmlns:a14="http://schemas.microsoft.com/office/drawing/2010/main" val="0"/>
+              </a:ext>
+            </a:extLst>
+          </a:blip>
+          <a:stretch>
+            <a:fillRect/>
+          </a:stretch>
+        </p:blipFill>
+        <p:spPr>
+          <a:xfrm rot="5400000">
+            <a:off x="9100648" y="-2221597"/>
+            <a:ext cx="1168254" cy="9003175"/>
+          </a:xfrm>
+          <a:prstGeom prst="rect">
+            <a:avLst/>
+          </a:prstGeom>
+        </p:spPr>
+      </p:pic>
+      <p:pic>
+        <p:nvPicPr>
+          <p:cNvPr id="7" name="Picture 6"/>
+          <p:cNvPicPr>
+            <a:picLocks noChangeAspect="1"/>
+          </p:cNvPicPr>
+          <p:nvPr/>
+        </p:nvPicPr>
+        <p:blipFill>
+          <a:blip r:embed="rId4" cstate="print">
+            <a:extLst>
+              <a:ext uri="{28A0092B-C50C-407E-A947-70E740481C1C}">
+                <a14:useLocalDpi xmlns:a14="http://schemas.microsoft.com/office/drawing/2010/main" val="0"/>
+              </a:ext>
+            </a:extLst>
+          </a:blip>
+          <a:stretch>
+            <a:fillRect/>
+          </a:stretch>
+        </p:blipFill>
+        <p:spPr>
+          <a:xfrm>
+            <a:off x="13488987" y="9412287"/>
+            <a:ext cx="4572000" cy="646390"/>
+          </a:xfrm>
+          <a:prstGeom prst="rect">
+            <a:avLst/>
+          </a:prstGeom>
+        </p:spPr>
+      </p:pic>
+      <p:sp>
+        <p:nvSpPr>
+          <p:cNvPr id="3" name="Rectangle 2"/>
+          <p:cNvSpPr/>
+          <p:nvPr/>
+        </p:nvSpPr>
+        <p:spPr>
+          <a:xfrm>
+            <a:off x="4553543" y="2630487"/>
+            <a:ext cx="8968064" cy="584775"/>
+          </a:xfrm>
+          <a:prstGeom prst="rect">
+            <a:avLst/>
+          </a:prstGeom>
+        </p:spPr>
+        <p:style>
+          <a:lnRef idx="2">
+            <a:schemeClr val="accent1"/>
+          </a:lnRef>
+          <a:fillRef idx="1">
+            <a:schemeClr val="lt1"/>
+          </a:fillRef>
+          <a:effectRef idx="0">
+            <a:schemeClr val="accent1"/>
+          </a:effectRef>
+          <a:fontRef idx="minor">
+            <a:schemeClr val="dk1"/>
+          </a:fontRef>
+        </p:style>
+        <p:txBody>
+          <a:bodyPr wrap="square">
+            <a:spAutoFit/>
+          </a:bodyPr>
+          <a:lstStyle/>
+          <a:p>
+            <a:r>
+              <a:rPr lang="en-US" dirty="0"/>
+              <a:t>Where should we compose object graphs?</a:t>
+            </a:r>
+            <a:endParaRPr lang="sr-Latn-RS" dirty="0"/>
+          </a:p>
+        </p:txBody>
+      </p:sp>
+      <p:sp>
+        <p:nvSpPr>
+          <p:cNvPr id="2" name="Rectangle 1"/>
+          <p:cNvSpPr/>
+          <p:nvPr/>
+        </p:nvSpPr>
+        <p:spPr>
+          <a:xfrm>
+            <a:off x="4553543" y="3570966"/>
+            <a:ext cx="8968064" cy="584775"/>
+          </a:xfrm>
+          <a:prstGeom prst="rect">
+            <a:avLst/>
+          </a:prstGeom>
+        </p:spPr>
+        <p:style>
+          <a:lnRef idx="2">
+            <a:schemeClr val="accent1"/>
+          </a:lnRef>
+          <a:fillRef idx="1">
+            <a:schemeClr val="lt1"/>
+          </a:fillRef>
+          <a:effectRef idx="0">
+            <a:schemeClr val="accent1"/>
+          </a:effectRef>
+          <a:fontRef idx="minor">
+            <a:schemeClr val="dk1"/>
+          </a:fontRef>
+        </p:style>
+        <p:txBody>
+          <a:bodyPr wrap="square">
+            <a:spAutoFit/>
+          </a:bodyPr>
+          <a:lstStyle/>
+          <a:p>
+            <a:r>
+              <a:rPr lang="en-US" dirty="0"/>
+              <a:t>As close as possible to the application's entry point.</a:t>
+            </a:r>
+            <a:endParaRPr lang="sr-Latn-RS" dirty="0"/>
+          </a:p>
+        </p:txBody>
+      </p:sp>
+      <p:sp>
+        <p:nvSpPr>
+          <p:cNvPr id="5" name="Scroll: Horizontal 4"/>
+          <p:cNvSpPr/>
+          <p:nvPr/>
+        </p:nvSpPr>
+        <p:spPr>
+          <a:xfrm>
+            <a:off x="1810343" y="4401203"/>
+            <a:ext cx="14454463" cy="1600200"/>
+          </a:xfrm>
+          <a:prstGeom prst="horizontalScroll">
+            <a:avLst/>
+          </a:prstGeom>
+        </p:spPr>
+        <p:style>
+          <a:lnRef idx="2">
+            <a:schemeClr val="accent1">
+              <a:shade val="50000"/>
+            </a:schemeClr>
+          </a:lnRef>
+          <a:fillRef idx="1">
+            <a:schemeClr val="accent1"/>
+          </a:fillRef>
+          <a:effectRef idx="0">
+            <a:schemeClr val="accent1"/>
+          </a:effectRef>
+          <a:fontRef idx="minor">
+            <a:schemeClr val="lt1"/>
+          </a:fontRef>
+        </p:style>
+        <p:txBody>
+          <a:bodyPr rtlCol="0" anchor="ctr"/>
+          <a:lstStyle/>
+          <a:p>
+            <a:r>
+              <a:rPr lang="en-US" sz="4000" dirty="0"/>
+              <a:t>A </a:t>
+            </a:r>
+            <a:r>
+              <a:rPr lang="en-US" sz="4000" b="1" dirty="0">
+                <a:solidFill>
+                  <a:srgbClr val="FFC000"/>
+                </a:solidFill>
+              </a:rPr>
+              <a:t>Composition Root </a:t>
+            </a:r>
+            <a:r>
+              <a:rPr lang="en-US" sz="4000" dirty="0"/>
+              <a:t>is a (preferably) unique location in an application where modules are composed together.</a:t>
+            </a:r>
+            <a:endParaRPr lang="sr-Latn-RS" sz="4000" dirty="0"/>
+          </a:p>
+        </p:txBody>
+      </p:sp>
+      <p:sp>
+        <p:nvSpPr>
+          <p:cNvPr id="9" name="Scroll: Horizontal 8"/>
+          <p:cNvSpPr/>
+          <p:nvPr/>
+        </p:nvSpPr>
+        <p:spPr>
+          <a:xfrm>
+            <a:off x="1810343" y="5997626"/>
+            <a:ext cx="14454463" cy="1600200"/>
+          </a:xfrm>
+          <a:prstGeom prst="horizontalScroll">
+            <a:avLst/>
+          </a:prstGeom>
+        </p:spPr>
+        <p:style>
+          <a:lnRef idx="2">
+            <a:schemeClr val="accent1">
+              <a:shade val="50000"/>
+            </a:schemeClr>
+          </a:lnRef>
+          <a:fillRef idx="1">
+            <a:schemeClr val="accent1"/>
+          </a:fillRef>
+          <a:effectRef idx="0">
+            <a:schemeClr val="accent1"/>
+          </a:effectRef>
+          <a:fontRef idx="minor">
+            <a:schemeClr val="lt1"/>
+          </a:fontRef>
+        </p:style>
+        <p:txBody>
+          <a:bodyPr rtlCol="0" anchor="ctr"/>
+          <a:lstStyle/>
+          <a:p>
+            <a:r>
+              <a:rPr lang="en-US" sz="4000" dirty="0"/>
+              <a:t>Only </a:t>
+            </a:r>
+            <a:r>
+              <a:rPr lang="en-US" sz="4000" b="1" dirty="0">
+                <a:solidFill>
+                  <a:srgbClr val="FFC000"/>
+                </a:solidFill>
+              </a:rPr>
+              <a:t>applications</a:t>
+            </a:r>
+            <a:r>
+              <a:rPr lang="en-US" sz="4000" dirty="0"/>
+              <a:t> should have Composition Roots. Libraries and frameworks shouldn't.</a:t>
+            </a:r>
+            <a:endParaRPr lang="sr-Latn-RS" sz="4000" dirty="0"/>
+          </a:p>
+        </p:txBody>
+      </p:sp>
+      <p:sp>
+        <p:nvSpPr>
+          <p:cNvPr id="10" name="Scroll: Horizontal 9"/>
+          <p:cNvSpPr/>
+          <p:nvPr/>
+        </p:nvSpPr>
+        <p:spPr>
+          <a:xfrm>
+            <a:off x="1810343" y="7597826"/>
+            <a:ext cx="14454463" cy="1600200"/>
+          </a:xfrm>
+          <a:prstGeom prst="horizontalScroll">
+            <a:avLst/>
+          </a:prstGeom>
+        </p:spPr>
+        <p:style>
+          <a:lnRef idx="2">
+            <a:schemeClr val="accent1">
+              <a:shade val="50000"/>
+            </a:schemeClr>
+          </a:lnRef>
+          <a:fillRef idx="1">
+            <a:schemeClr val="accent1"/>
+          </a:fillRef>
+          <a:effectRef idx="0">
+            <a:schemeClr val="accent1"/>
+          </a:effectRef>
+          <a:fontRef idx="minor">
+            <a:schemeClr val="lt1"/>
+          </a:fontRef>
+        </p:style>
+        <p:txBody>
+          <a:bodyPr rtlCol="0" anchor="ctr"/>
+          <a:lstStyle/>
+          <a:p>
+            <a:r>
+              <a:rPr lang="en-US" sz="4000" dirty="0"/>
+              <a:t>A DI Container should </a:t>
+            </a:r>
+            <a:r>
+              <a:rPr lang="en-US" sz="4000" b="1" dirty="0">
+                <a:solidFill>
+                  <a:srgbClr val="FFC000"/>
+                </a:solidFill>
+              </a:rPr>
+              <a:t>only be referenced from the Composition Root</a:t>
+            </a:r>
+            <a:r>
+              <a:rPr lang="en-US" sz="4000" dirty="0"/>
+              <a:t>. All other modules should have no reference to the container.</a:t>
+            </a:r>
+            <a:endParaRPr lang="sr-Latn-RS" sz="4800" dirty="0"/>
+          </a:p>
+        </p:txBody>
+      </p:sp>
+    </p:spTree>
+    <p:extLst>
+      <p:ext uri="{BB962C8B-B14F-4D97-AF65-F5344CB8AC3E}">
+        <p14:creationId xmlns:p14="http://schemas.microsoft.com/office/powerpoint/2010/main" val="3511422992"/>
+      </p:ext>
+    </p:extLst>
+  </p:cSld>
+  <p:clrMapOvr>
+    <a:masterClrMapping/>
+  </p:clrMapOvr>
+  <mc:AlternateContent xmlns:mc="http://schemas.openxmlformats.org/markup-compatibility/2006" xmlns:p14="http://schemas.microsoft.com/office/powerpoint/2010/main">
+    <mc:Choice Requires="p14">
+      <p:transition spd="med" p14:dur="700">
+        <p:fade/>
+      </p:transition>
+    </mc:Choice>
+    <mc:Fallback xmlns="">
+      <p:transition spd="med">
+        <p:fade/>
+      </p:transition>
+    </mc:Fallback>
+  </mc:AlternateContent>
+  <p:timing>
+    <p:tnLst>
+      <p:par>
+        <p:cTn id="1" dur="indefinite" restart="never" nodeType="tmRoot">
+          <p:childTnLst>
+            <p:seq concurrent="1" nextAc="seek">
+              <p:cTn id="2" dur="indefinite" nodeType="mainSeq">
+                <p:childTnLst>
+                  <p:par>
+                    <p:cTn id="3" fill="hold">
+                      <p:stCondLst>
+                        <p:cond delay="indefinite"/>
+                      </p:stCondLst>
+                      <p:childTnLst>
+                        <p:par>
+                          <p:cTn id="4" fill="hold">
+                            <p:stCondLst>
+                              <p:cond delay="0"/>
+                            </p:stCondLst>
+                            <p:childTnLst>
+                              <p:par>
+                                <p:cTn id="5" presetID="2" presetClass="entr" presetSubtype="1" fill="hold" grpId="0" nodeType="clickEffect">
+                                  <p:stCondLst>
+                                    <p:cond delay="0"/>
+                                  </p:stCondLst>
+                                  <p:childTnLst>
+                                    <p:set>
+                                      <p:cBhvr>
+                                        <p:cTn id="6" dur="1" fill="hold">
+                                          <p:stCondLst>
+                                            <p:cond delay="0"/>
+                                          </p:stCondLst>
+                                        </p:cTn>
+                                        <p:tgtEl>
+                                          <p:spTgt spid="3"/>
+                                        </p:tgtEl>
+                                        <p:attrNameLst>
+                                          <p:attrName>style.visibility</p:attrName>
+                                        </p:attrNameLst>
+                                      </p:cBhvr>
+                                      <p:to>
+                                        <p:strVal val="visible"/>
+                                      </p:to>
+                                    </p:set>
+                                    <p:anim calcmode="lin" valueType="num">
+                                      <p:cBhvr additive="base">
+                                        <p:cTn id="7" dur="500" fill="hold"/>
+                                        <p:tgtEl>
+                                          <p:spTgt spid="3"/>
+                                        </p:tgtEl>
+                                        <p:attrNameLst>
+                                          <p:attrName>ppt_x</p:attrName>
+                                        </p:attrNameLst>
+                                      </p:cBhvr>
+                                      <p:tavLst>
+                                        <p:tav tm="0">
+                                          <p:val>
+                                            <p:strVal val="#ppt_x"/>
+                                          </p:val>
+                                        </p:tav>
+                                        <p:tav tm="100000">
+                                          <p:val>
+                                            <p:strVal val="#ppt_x"/>
+                                          </p:val>
+                                        </p:tav>
+                                      </p:tavLst>
+                                    </p:anim>
+                                    <p:anim calcmode="lin" valueType="num">
+                                      <p:cBhvr additive="base">
+                                        <p:cTn id="8" dur="500" fill="hold"/>
+                                        <p:tgtEl>
+                                          <p:spTgt spid="3"/>
+                                        </p:tgtEl>
+                                        <p:attrNameLst>
+                                          <p:attrName>ppt_y</p:attrName>
+                                        </p:attrNameLst>
+                                      </p:cBhvr>
+                                      <p:tavLst>
+                                        <p:tav tm="0">
+                                          <p:val>
+                                            <p:strVal val="0-#ppt_h/2"/>
+                                          </p:val>
+                                        </p:tav>
+                                        <p:tav tm="100000">
+                                          <p:val>
+                                            <p:strVal val="#ppt_y"/>
+                                          </p:val>
+                                        </p:tav>
+                                      </p:tavLst>
+                                    </p:anim>
+                                  </p:childTnLst>
+                                </p:cTn>
+                              </p:par>
+                            </p:childTnLst>
+                          </p:cTn>
+                        </p:par>
+                      </p:childTnLst>
+                    </p:cTn>
+                  </p:par>
+                  <p:par>
+                    <p:cTn id="9" fill="hold">
+                      <p:stCondLst>
+                        <p:cond delay="indefinite"/>
+                      </p:stCondLst>
+                      <p:childTnLst>
+                        <p:par>
+                          <p:cTn id="10" fill="hold">
+                            <p:stCondLst>
+                              <p:cond delay="0"/>
+                            </p:stCondLst>
+                            <p:childTnLst>
+                              <p:par>
+                                <p:cTn id="11" presetID="2" presetClass="entr" presetSubtype="4" fill="hold" grpId="0" nodeType="clickEffect">
+                                  <p:stCondLst>
+                                    <p:cond delay="0"/>
+                                  </p:stCondLst>
+                                  <p:childTnLst>
+                                    <p:set>
+                                      <p:cBhvr>
+                                        <p:cTn id="12" dur="1" fill="hold">
+                                          <p:stCondLst>
+                                            <p:cond delay="0"/>
+                                          </p:stCondLst>
+                                        </p:cTn>
+                                        <p:tgtEl>
+                                          <p:spTgt spid="2"/>
+                                        </p:tgtEl>
+                                        <p:attrNameLst>
+                                          <p:attrName>style.visibility</p:attrName>
+                                        </p:attrNameLst>
+                                      </p:cBhvr>
+                                      <p:to>
+                                        <p:strVal val="visible"/>
+                                      </p:to>
+                                    </p:set>
+                                    <p:anim calcmode="lin" valueType="num">
+                                      <p:cBhvr additive="base">
+                                        <p:cTn id="13" dur="500" fill="hold"/>
+                                        <p:tgtEl>
+                                          <p:spTgt spid="2"/>
+                                        </p:tgtEl>
+                                        <p:attrNameLst>
+                                          <p:attrName>ppt_x</p:attrName>
+                                        </p:attrNameLst>
+                                      </p:cBhvr>
+                                      <p:tavLst>
+                                        <p:tav tm="0">
+                                          <p:val>
+                                            <p:strVal val="#ppt_x"/>
+                                          </p:val>
+                                        </p:tav>
+                                        <p:tav tm="100000">
+                                          <p:val>
+                                            <p:strVal val="#ppt_x"/>
+                                          </p:val>
+                                        </p:tav>
+                                      </p:tavLst>
+                                    </p:anim>
+                                    <p:anim calcmode="lin" valueType="num">
+                                      <p:cBhvr additive="base">
+                                        <p:cTn id="14" dur="500" fill="hold"/>
+                                        <p:tgtEl>
+                                          <p:spTgt spid="2"/>
+                                        </p:tgtEl>
+                                        <p:attrNameLst>
+                                          <p:attrName>ppt_y</p:attrName>
+                                        </p:attrNameLst>
+                                      </p:cBhvr>
+                                      <p:tavLst>
+                                        <p:tav tm="0">
+                                          <p:val>
+                                            <p:strVal val="1+#ppt_h/2"/>
+                                          </p:val>
+                                        </p:tav>
+                                        <p:tav tm="100000">
+                                          <p:val>
+                                            <p:strVal val="#ppt_y"/>
+                                          </p:val>
+                                        </p:tav>
+                                      </p:tavLst>
+                                    </p:anim>
+                                  </p:childTnLst>
+                                </p:cTn>
+                              </p:par>
+                            </p:childTnLst>
+                          </p:cTn>
+                        </p:par>
+                      </p:childTnLst>
+                    </p:cTn>
+                  </p:par>
+                  <p:par>
+                    <p:cTn id="15" fill="hold">
+                      <p:stCondLst>
+                        <p:cond delay="indefinite"/>
+                      </p:stCondLst>
+                      <p:childTnLst>
+                        <p:par>
+                          <p:cTn id="16" fill="hold">
+                            <p:stCondLst>
+                              <p:cond delay="0"/>
+                            </p:stCondLst>
+                            <p:childTnLst>
+                              <p:par>
+                                <p:cTn id="17" presetID="16" presetClass="entr" presetSubtype="21" fill="hold" grpId="0" nodeType="clickEffect">
+                                  <p:stCondLst>
+                                    <p:cond delay="0"/>
+                                  </p:stCondLst>
+                                  <p:childTnLst>
+                                    <p:set>
+                                      <p:cBhvr>
+                                        <p:cTn id="18" dur="1" fill="hold">
+                                          <p:stCondLst>
+                                            <p:cond delay="0"/>
+                                          </p:stCondLst>
+                                        </p:cTn>
+                                        <p:tgtEl>
+                                          <p:spTgt spid="5"/>
+                                        </p:tgtEl>
+                                        <p:attrNameLst>
+                                          <p:attrName>style.visibility</p:attrName>
+                                        </p:attrNameLst>
+                                      </p:cBhvr>
+                                      <p:to>
+                                        <p:strVal val="visible"/>
+                                      </p:to>
+                                    </p:set>
+                                    <p:animEffect transition="in" filter="barn(inVertical)">
+                                      <p:cBhvr>
+                                        <p:cTn id="19" dur="500"/>
+                                        <p:tgtEl>
+                                          <p:spTgt spid="5"/>
+                                        </p:tgtEl>
+                                      </p:cBhvr>
+                                    </p:animEffect>
+                                  </p:childTnLst>
+                                </p:cTn>
+                              </p:par>
+                            </p:childTnLst>
+                          </p:cTn>
+                        </p:par>
+                      </p:childTnLst>
+                    </p:cTn>
+                  </p:par>
+                  <p:par>
+                    <p:cTn id="20" fill="hold">
+                      <p:stCondLst>
+                        <p:cond delay="indefinite"/>
+                      </p:stCondLst>
+                      <p:childTnLst>
+                        <p:par>
+                          <p:cTn id="21" fill="hold">
+                            <p:stCondLst>
+                              <p:cond delay="0"/>
+                            </p:stCondLst>
+                            <p:childTnLst>
+                              <p:par>
+                                <p:cTn id="22" presetID="16" presetClass="entr" presetSubtype="21" fill="hold" grpId="0" nodeType="clickEffect">
+                                  <p:stCondLst>
+                                    <p:cond delay="0"/>
+                                  </p:stCondLst>
+                                  <p:childTnLst>
+                                    <p:set>
+                                      <p:cBhvr>
+                                        <p:cTn id="23" dur="1" fill="hold">
+                                          <p:stCondLst>
+                                            <p:cond delay="0"/>
+                                          </p:stCondLst>
+                                        </p:cTn>
+                                        <p:tgtEl>
+                                          <p:spTgt spid="9"/>
+                                        </p:tgtEl>
+                                        <p:attrNameLst>
+                                          <p:attrName>style.visibility</p:attrName>
+                                        </p:attrNameLst>
+                                      </p:cBhvr>
+                                      <p:to>
+                                        <p:strVal val="visible"/>
+                                      </p:to>
+                                    </p:set>
+                                    <p:animEffect transition="in" filter="barn(inVertical)">
+                                      <p:cBhvr>
+                                        <p:cTn id="24" dur="500"/>
+                                        <p:tgtEl>
+                                          <p:spTgt spid="9"/>
+                                        </p:tgtEl>
+                                      </p:cBhvr>
+                                    </p:animEffect>
+                                  </p:childTnLst>
+                                </p:cTn>
+                              </p:par>
+                            </p:childTnLst>
+                          </p:cTn>
+                        </p:par>
+                      </p:childTnLst>
+                    </p:cTn>
+                  </p:par>
+                  <p:par>
+                    <p:cTn id="25" fill="hold">
+                      <p:stCondLst>
+                        <p:cond delay="indefinite"/>
+                      </p:stCondLst>
+                      <p:childTnLst>
+                        <p:par>
+                          <p:cTn id="26" fill="hold">
+                            <p:stCondLst>
+                              <p:cond delay="0"/>
+                            </p:stCondLst>
+                            <p:childTnLst>
+                              <p:par>
+                                <p:cTn id="27" presetID="16" presetClass="entr" presetSubtype="21" fill="hold" grpId="0" nodeType="clickEffect">
+                                  <p:stCondLst>
+                                    <p:cond delay="0"/>
+                                  </p:stCondLst>
+                                  <p:childTnLst>
+                                    <p:set>
+                                      <p:cBhvr>
+                                        <p:cTn id="28" dur="1" fill="hold">
+                                          <p:stCondLst>
+                                            <p:cond delay="0"/>
+                                          </p:stCondLst>
+                                        </p:cTn>
+                                        <p:tgtEl>
+                                          <p:spTgt spid="10"/>
+                                        </p:tgtEl>
+                                        <p:attrNameLst>
+                                          <p:attrName>style.visibility</p:attrName>
+                                        </p:attrNameLst>
+                                      </p:cBhvr>
+                                      <p:to>
+                                        <p:strVal val="visible"/>
+                                      </p:to>
+                                    </p:set>
+                                    <p:animEffect transition="in" filter="barn(inVertical)">
+                                      <p:cBhvr>
+                                        <p:cTn id="29" dur="500"/>
+                                        <p:tgtEl>
+                                          <p:spTgt spid="10"/>
+                                        </p:tgtEl>
+                                      </p:cBhvr>
+                                    </p:animEffect>
+                                  </p:childTnLst>
+                                </p:cTn>
+                              </p:par>
+                            </p:childTnLst>
+                          </p:cTn>
+                        </p:par>
+                      </p:childTnLst>
+                    </p:cTn>
+                  </p:par>
+                </p:childTnLst>
+              </p:cTn>
+              <p:prevCondLst>
+                <p:cond evt="onPrev" delay="0">
+                  <p:tgtEl>
+                    <p:sldTgt/>
+                  </p:tgtEl>
+                </p:cond>
+              </p:prevCondLst>
+              <p:nextCondLst>
+                <p:cond evt="onNext" delay="0">
+                  <p:tgtEl>
+                    <p:sldTgt/>
+                  </p:tgtEl>
+                </p:cond>
+              </p:nextCondLst>
+            </p:seq>
+          </p:childTnLst>
+        </p:cTn>
+      </p:par>
+    </p:tnLst>
+    <p:bldLst>
+      <p:bldP spid="3" grpId="0" animBg="1"/>
+      <p:bldP spid="2" grpId="0" animBg="1"/>
+      <p:bldP spid="5" grpId="0" animBg="1"/>
+      <p:bldP spid="9" grpId="0" animBg="1"/>
+      <p:bldP spid="10" grpId="0" animBg="1"/>
+    </p:bldLst>
+  </p:timing>
+</p:sld>
+</file>
+
+<file path=ppt/slides/slide19.xml><?xml version="1.0" encoding="utf-8"?>
+<p:sld xmlns:a="http://schemas.openxmlformats.org/drawingml/2006/main" xmlns:r="http://schemas.openxmlformats.org/officeDocument/2006/relationships" xmlns:p="http://schemas.openxmlformats.org/presentationml/2006/main">
+  <p:cSld>
+    <p:spTree>
+      <p:nvGrpSpPr>
+        <p:cNvPr id="1" name=""/>
+        <p:cNvGrpSpPr/>
+        <p:nvPr/>
+      </p:nvGrpSpPr>
+      <p:grpSpPr>
+        <a:xfrm>
+          <a:off x="0" y="0"/>
+          <a:ext cx="0" cy="0"/>
+          <a:chOff x="0" y="0"/>
+          <a:chExt cx="0" cy="0"/>
+        </a:xfrm>
+      </p:grpSpPr>
+      <p:sp>
+        <p:nvSpPr>
+          <p:cNvPr id="16" name="TextBox 15"/>
+          <p:cNvSpPr txBox="1"/>
+          <p:nvPr/>
+        </p:nvSpPr>
+        <p:spPr>
+          <a:xfrm>
+            <a:off x="4969123" y="854313"/>
+            <a:ext cx="8136904" cy="830997"/>
+          </a:xfrm>
+          <a:prstGeom prst="rect">
+            <a:avLst/>
+          </a:prstGeom>
+          <a:noFill/>
+        </p:spPr>
+        <p:txBody>
+          <a:bodyPr wrap="square" rtlCol="0">
+            <a:spAutoFit/>
+          </a:bodyPr>
+          <a:lstStyle/>
+          <a:p>
+            <a:pPr algn="ctr"/>
+            <a:r>
+              <a:rPr lang="en-US" sz="4800" dirty="0">
+                <a:solidFill>
+                  <a:srgbClr val="545250"/>
+                </a:solidFill>
+                <a:latin typeface="Novecento sans wide Book" pitchFamily="50" charset="-94"/>
+              </a:rPr>
+              <a:t>The appropriate entry point</a:t>
+            </a:r>
+          </a:p>
+        </p:txBody>
+      </p:sp>
+      <p:pic>
+        <p:nvPicPr>
+          <p:cNvPr id="8" name="Picture 7"/>
+          <p:cNvPicPr>
+            <a:picLocks noChangeAspect="1"/>
+          </p:cNvPicPr>
+          <p:nvPr/>
+        </p:nvPicPr>
+        <p:blipFill>
+          <a:blip r:embed="rId3">
+            <a:extLst>
+              <a:ext uri="{28A0092B-C50C-407E-A947-70E740481C1C}">
+                <a14:useLocalDpi xmlns:a14="http://schemas.microsoft.com/office/drawing/2010/main" val="0"/>
+              </a:ext>
+            </a:extLst>
+          </a:blip>
+          <a:stretch>
+            <a:fillRect/>
+          </a:stretch>
+        </p:blipFill>
+        <p:spPr>
+          <a:xfrm rot="5400000">
+            <a:off x="9100648" y="-2221597"/>
+            <a:ext cx="1168254" cy="9003175"/>
+          </a:xfrm>
+          <a:prstGeom prst="rect">
+            <a:avLst/>
+          </a:prstGeom>
+        </p:spPr>
+      </p:pic>
+      <p:pic>
+        <p:nvPicPr>
+          <p:cNvPr id="7" name="Picture 6"/>
+          <p:cNvPicPr>
+            <a:picLocks noChangeAspect="1"/>
+          </p:cNvPicPr>
+          <p:nvPr/>
+        </p:nvPicPr>
+        <p:blipFill>
+          <a:blip r:embed="rId4" cstate="print">
+            <a:extLst>
+              <a:ext uri="{28A0092B-C50C-407E-A947-70E740481C1C}">
+                <a14:useLocalDpi xmlns:a14="http://schemas.microsoft.com/office/drawing/2010/main" val="0"/>
+              </a:ext>
+            </a:extLst>
+          </a:blip>
+          <a:stretch>
+            <a:fillRect/>
+          </a:stretch>
+        </p:blipFill>
+        <p:spPr>
+          <a:xfrm>
+            <a:off x="13488987" y="9412287"/>
+            <a:ext cx="4572000" cy="646390"/>
+          </a:xfrm>
+          <a:prstGeom prst="rect">
+            <a:avLst/>
+          </a:prstGeom>
+        </p:spPr>
+      </p:pic>
+      <p:sp>
+        <p:nvSpPr>
+          <p:cNvPr id="2" name="Rectangle 1"/>
+          <p:cNvSpPr/>
+          <p:nvPr/>
+        </p:nvSpPr>
+        <p:spPr>
+          <a:xfrm>
+            <a:off x="763587" y="3129152"/>
+            <a:ext cx="15621000" cy="5078313"/>
+          </a:xfrm>
+          <a:prstGeom prst="rect">
+            <a:avLst/>
+          </a:prstGeom>
+        </p:spPr>
+        <p:txBody>
+          <a:bodyPr wrap="square">
+            <a:spAutoFit/>
+          </a:bodyPr>
+          <a:lstStyle/>
+          <a:p>
+            <a:pPr marL="457200" indent="-457200">
+              <a:buFont typeface="Arial" panose="020B0604020202020204" pitchFamily="34" charset="0"/>
+              <a:buChar char="•"/>
+            </a:pPr>
+            <a:r>
+              <a:rPr lang="sr-Latn-RS" sz="3600" dirty="0"/>
+              <a:t>In console applications it's the Main method</a:t>
+            </a:r>
+            <a:endParaRPr lang="en-US" sz="3600" dirty="0"/>
+          </a:p>
+          <a:p>
+            <a:endParaRPr lang="sr-Latn-RS" sz="3600" dirty="0"/>
+          </a:p>
+          <a:p>
+            <a:pPr marL="457200" indent="-457200">
+              <a:buFont typeface="Arial" panose="020B0604020202020204" pitchFamily="34" charset="0"/>
+              <a:buChar char="•"/>
+            </a:pPr>
+            <a:r>
+              <a:rPr lang="sr-Latn-RS" sz="3600" dirty="0"/>
+              <a:t>In ASP.NET MVC applications it's global.asax and a custom IControllerFactory</a:t>
+            </a:r>
+            <a:endParaRPr lang="en-US" sz="3600" dirty="0"/>
+          </a:p>
+          <a:p>
+            <a:pPr marL="457200" indent="-457200">
+              <a:buFont typeface="Arial" panose="020B0604020202020204" pitchFamily="34" charset="0"/>
+              <a:buChar char="•"/>
+            </a:pPr>
+            <a:endParaRPr lang="sr-Latn-RS" sz="3600" dirty="0"/>
+          </a:p>
+          <a:p>
+            <a:pPr marL="457200" indent="-457200">
+              <a:buFont typeface="Arial" panose="020B0604020202020204" pitchFamily="34" charset="0"/>
+              <a:buChar char="•"/>
+            </a:pPr>
+            <a:r>
+              <a:rPr lang="sr-Latn-RS" sz="3600" dirty="0"/>
+              <a:t>In WPF applications it's the Application.OnStartup method</a:t>
+            </a:r>
+            <a:endParaRPr lang="en-US" sz="3600" dirty="0"/>
+          </a:p>
+          <a:p>
+            <a:pPr marL="457200" indent="-457200">
+              <a:buFont typeface="Arial" panose="020B0604020202020204" pitchFamily="34" charset="0"/>
+              <a:buChar char="•"/>
+            </a:pPr>
+            <a:endParaRPr lang="sr-Latn-RS" sz="3600" dirty="0"/>
+          </a:p>
+          <a:p>
+            <a:pPr marL="457200" indent="-457200">
+              <a:buFont typeface="Arial" panose="020B0604020202020204" pitchFamily="34" charset="0"/>
+              <a:buChar char="•"/>
+            </a:pPr>
+            <a:r>
+              <a:rPr lang="sr-Latn-RS" sz="3600" dirty="0"/>
+              <a:t>In WCF it's a custom ServiceHostFactory</a:t>
+            </a:r>
+            <a:endParaRPr lang="en-US" sz="3600" dirty="0"/>
+          </a:p>
+          <a:p>
+            <a:pPr marL="457200" indent="-457200">
+              <a:buFont typeface="Arial" panose="020B0604020202020204" pitchFamily="34" charset="0"/>
+              <a:buChar char="•"/>
+            </a:pPr>
+            <a:endParaRPr lang="sr-Latn-RS" sz="3600" dirty="0"/>
+          </a:p>
+          <a:p>
+            <a:pPr marL="457200" indent="-457200">
+              <a:buFont typeface="Arial" panose="020B0604020202020204" pitchFamily="34" charset="0"/>
+              <a:buChar char="•"/>
+            </a:pPr>
+            <a:r>
+              <a:rPr lang="sr-Latn-RS" sz="3600" dirty="0">
+                <a:solidFill>
+                  <a:srgbClr val="00B050"/>
+                </a:solidFill>
+              </a:rPr>
+              <a:t>In ASP.NET Core </a:t>
+            </a:r>
+            <a:r>
+              <a:rPr lang="en-US" sz="3600" dirty="0">
+                <a:solidFill>
+                  <a:srgbClr val="00B050"/>
+                </a:solidFill>
+              </a:rPr>
+              <a:t>it’s</a:t>
+            </a:r>
+            <a:r>
+              <a:rPr lang="sr-Latn-RS" sz="3600" dirty="0">
+                <a:solidFill>
+                  <a:srgbClr val="00B050"/>
+                </a:solidFill>
+              </a:rPr>
+              <a:t> the ConfigureServices method </a:t>
+            </a:r>
+            <a:r>
+              <a:rPr lang="en-US" sz="3600" dirty="0">
+                <a:solidFill>
+                  <a:srgbClr val="00B050"/>
+                </a:solidFill>
+              </a:rPr>
+              <a:t>in Startup class</a:t>
+            </a:r>
+            <a:endParaRPr lang="sr-Latn-RS" sz="3600" dirty="0">
+              <a:solidFill>
+                <a:srgbClr val="00B050"/>
+              </a:solidFill>
+            </a:endParaRPr>
+          </a:p>
+        </p:txBody>
+      </p:sp>
+    </p:spTree>
+    <p:extLst>
+      <p:ext uri="{BB962C8B-B14F-4D97-AF65-F5344CB8AC3E}">
+        <p14:creationId xmlns:p14="http://schemas.microsoft.com/office/powerpoint/2010/main" val="1109511531"/>
+      </p:ext>
+    </p:extLst>
+  </p:cSld>
+  <p:clrMapOvr>
+    <a:masterClrMapping/>
+  </p:clrMapOvr>
+  <mc:AlternateContent xmlns:mc="http://schemas.openxmlformats.org/markup-compatibility/2006" xmlns:p14="http://schemas.microsoft.com/office/powerpoint/2010/main">
+    <mc:Choice Requires="p14">
+      <p:transition spd="med" p14:dur="700">
+        <p:fade/>
+      </p:transition>
+    </mc:Choice>
+    <mc:Fallback xmlns="">
+      <p:transition spd="med">
+        <p:fade/>
+      </p:transition>
+    </mc:Fallback>
+  </mc:AlternateContent>
+</p:sld>
+</file>
+
+<file path=ppt/slides/slide2.xml><?xml version="1.0" encoding="utf-8"?>
+<p:sld xmlns:a="http://schemas.openxmlformats.org/drawingml/2006/main" xmlns:r="http://schemas.openxmlformats.org/officeDocument/2006/relationships" xmlns:p="http://schemas.openxmlformats.org/presentationml/2006/main">
+  <p:cSld>
+    <p:spTree>
+      <p:nvGrpSpPr>
+        <p:cNvPr id="1" name=""/>
+        <p:cNvGrpSpPr/>
+        <p:nvPr/>
+      </p:nvGrpSpPr>
+      <p:grpSpPr>
+        <a:xfrm>
+          <a:off x="0" y="0"/>
+          <a:ext cx="0" cy="0"/>
+          <a:chOff x="0" y="0"/>
+          <a:chExt cx="0" cy="0"/>
+        </a:xfrm>
+      </p:grpSpPr>
+      <p:sp>
+        <p:nvSpPr>
+          <p:cNvPr id="16" name="TextBox 15"/>
+          <p:cNvSpPr txBox="1"/>
+          <p:nvPr/>
+        </p:nvSpPr>
+        <p:spPr>
+          <a:xfrm>
+            <a:off x="4969123" y="854313"/>
+            <a:ext cx="8136904" cy="830997"/>
+          </a:xfrm>
+          <a:prstGeom prst="rect">
+            <a:avLst/>
+          </a:prstGeom>
+          <a:noFill/>
+        </p:spPr>
+        <p:txBody>
+          <a:bodyPr wrap="square" rtlCol="0">
+            <a:spAutoFit/>
+          </a:bodyPr>
+          <a:lstStyle/>
+          <a:p>
+            <a:pPr algn="ctr"/>
+            <a:r>
+              <a:rPr lang="en-US" sz="4800" dirty="0">
+                <a:solidFill>
+                  <a:srgbClr val="545250"/>
+                </a:solidFill>
+                <a:latin typeface="Novecento sans wide Book" pitchFamily="50" charset="-94"/>
+              </a:rPr>
+              <a:t>What is DI?</a:t>
+            </a:r>
+            <a:endParaRPr lang="sr-Latn-RS" sz="4800" dirty="0">
+              <a:solidFill>
+                <a:srgbClr val="545250"/>
+              </a:solidFill>
+              <a:latin typeface="Novecento sans wide Book" pitchFamily="50" charset="-94"/>
+            </a:endParaRPr>
+          </a:p>
+        </p:txBody>
+      </p:sp>
+      <p:pic>
+        <p:nvPicPr>
+          <p:cNvPr id="8" name="Picture 7"/>
+          <p:cNvPicPr>
+            <a:picLocks noChangeAspect="1"/>
+          </p:cNvPicPr>
+          <p:nvPr/>
+        </p:nvPicPr>
+        <p:blipFill>
+          <a:blip r:embed="rId3">
+            <a:extLst>
+              <a:ext uri="{28A0092B-C50C-407E-A947-70E740481C1C}">
+                <a14:useLocalDpi xmlns:a14="http://schemas.microsoft.com/office/drawing/2010/main" val="0"/>
+              </a:ext>
+            </a:extLst>
+          </a:blip>
+          <a:stretch>
+            <a:fillRect/>
+          </a:stretch>
+        </p:blipFill>
+        <p:spPr>
+          <a:xfrm rot="5400000">
+            <a:off x="8454536" y="-2460908"/>
+            <a:ext cx="1168254" cy="9003175"/>
+          </a:xfrm>
+          <a:prstGeom prst="rect">
+            <a:avLst/>
+          </a:prstGeom>
+        </p:spPr>
+      </p:pic>
+      <p:pic>
+        <p:nvPicPr>
+          <p:cNvPr id="7" name="Picture 6"/>
+          <p:cNvPicPr>
+            <a:picLocks noChangeAspect="1"/>
+          </p:cNvPicPr>
+          <p:nvPr/>
+        </p:nvPicPr>
+        <p:blipFill>
+          <a:blip r:embed="rId4" cstate="print">
+            <a:extLst>
+              <a:ext uri="{28A0092B-C50C-407E-A947-70E740481C1C}">
+                <a14:useLocalDpi xmlns:a14="http://schemas.microsoft.com/office/drawing/2010/main" val="0"/>
+              </a:ext>
+            </a:extLst>
+          </a:blip>
+          <a:stretch>
+            <a:fillRect/>
+          </a:stretch>
+        </p:blipFill>
+        <p:spPr>
+          <a:xfrm>
+            <a:off x="13488987" y="9412287"/>
+            <a:ext cx="4572000" cy="646390"/>
+          </a:xfrm>
+          <a:prstGeom prst="rect">
+            <a:avLst/>
+          </a:prstGeom>
+        </p:spPr>
+      </p:pic>
+      <p:sp>
+        <p:nvSpPr>
+          <p:cNvPr id="9" name="Rectangle 8"/>
+          <p:cNvSpPr/>
+          <p:nvPr/>
+        </p:nvSpPr>
+        <p:spPr>
+          <a:xfrm>
+            <a:off x="1483172" y="2163142"/>
+            <a:ext cx="2994731" cy="923330"/>
+          </a:xfrm>
+          <a:prstGeom prst="rect">
+            <a:avLst/>
+          </a:prstGeom>
+          <a:noFill/>
+        </p:spPr>
+        <p:txBody>
+          <a:bodyPr wrap="none" lIns="91440" tIns="45720" rIns="91440" bIns="45720">
+            <a:spAutoFit/>
+          </a:bodyPr>
+          <a:lstStyle/>
+          <a:p>
+            <a:pPr algn="ctr"/>
+            <a:r>
+              <a:rPr lang="en-US" sz="5400" b="0" cap="none" spc="0" dirty="0">
+                <a:ln w="0"/>
+                <a:solidFill>
+                  <a:schemeClr val="tx1"/>
+                </a:solidFill>
+                <a:effectLst>
+                  <a:outerShdw blurRad="38100" dist="38100" dir="2700000" algn="tl">
+                    <a:srgbClr val="000000">
+                      <a:alpha val="43137"/>
+                    </a:srgbClr>
+                  </a:outerShdw>
+                </a:effectLst>
+              </a:rPr>
+              <a:t>Wikipedia</a:t>
+            </a:r>
+          </a:p>
+        </p:txBody>
+      </p:sp>
+      <p:sp>
+        <p:nvSpPr>
+          <p:cNvPr id="2" name="Rectangle 1"/>
+          <p:cNvSpPr/>
+          <p:nvPr/>
+        </p:nvSpPr>
+        <p:spPr>
+          <a:xfrm>
+            <a:off x="1483172" y="3163887"/>
+            <a:ext cx="16349215" cy="990600"/>
+          </a:xfrm>
+          <a:prstGeom prst="rect">
+            <a:avLst/>
+          </a:prstGeom>
+        </p:spPr>
+        <p:style>
+          <a:lnRef idx="2">
+            <a:schemeClr val="accent1">
+              <a:shade val="50000"/>
+            </a:schemeClr>
+          </a:lnRef>
+          <a:fillRef idx="1">
+            <a:schemeClr val="accent1"/>
+          </a:fillRef>
+          <a:effectRef idx="0">
+            <a:schemeClr val="accent1"/>
+          </a:effectRef>
+          <a:fontRef idx="minor">
+            <a:schemeClr val="lt1"/>
+          </a:fontRef>
+        </p:style>
+        <p:txBody>
+          <a:bodyPr rtlCol="0" anchor="ctr"/>
+          <a:lstStyle/>
+          <a:p>
+            <a:r>
+              <a:rPr lang="en-US" dirty="0"/>
+              <a:t>Dependency injection is a software design pattern that allows a choice of component to be made at run-time rather than compile time.</a:t>
+            </a:r>
+            <a:endParaRPr lang="sr-Latn-RS" dirty="0"/>
+          </a:p>
+        </p:txBody>
+      </p:sp>
+      <p:sp>
+        <p:nvSpPr>
+          <p:cNvPr id="10" name="Rectangle 9"/>
+          <p:cNvSpPr/>
+          <p:nvPr/>
+        </p:nvSpPr>
+        <p:spPr>
+          <a:xfrm>
+            <a:off x="1483172" y="5068887"/>
+            <a:ext cx="16349215" cy="1143000"/>
+          </a:xfrm>
+          <a:prstGeom prst="rect">
+            <a:avLst/>
+          </a:prstGeom>
+        </p:spPr>
+        <p:style>
+          <a:lnRef idx="2">
+            <a:schemeClr val="accent1">
+              <a:shade val="50000"/>
+            </a:schemeClr>
+          </a:lnRef>
+          <a:fillRef idx="1">
+            <a:schemeClr val="accent1"/>
+          </a:fillRef>
+          <a:effectRef idx="0">
+            <a:schemeClr val="accent1"/>
+          </a:effectRef>
+          <a:fontRef idx="minor">
+            <a:schemeClr val="lt1"/>
+          </a:fontRef>
+        </p:style>
+        <p:txBody>
+          <a:bodyPr rtlCol="0" anchor="ctr"/>
+          <a:lstStyle/>
+          <a:p>
+            <a:r>
+              <a:rPr lang="en-US" dirty="0"/>
+              <a:t>Dependency injection is a software design pattern that allows the removal of hard-coded dependencies and makes it possible to change them, whether at run-time or compile-time.</a:t>
+            </a:r>
+            <a:endParaRPr lang="sr-Latn-RS" dirty="0"/>
+          </a:p>
+        </p:txBody>
+      </p:sp>
+      <p:sp>
+        <p:nvSpPr>
+          <p:cNvPr id="4" name="Explosion: 8 Points 3"/>
+          <p:cNvSpPr/>
+          <p:nvPr/>
+        </p:nvSpPr>
+        <p:spPr>
+          <a:xfrm>
+            <a:off x="16462375" y="3506787"/>
+            <a:ext cx="1828800" cy="1295400"/>
+          </a:xfrm>
+          <a:prstGeom prst="irregularSeal1">
+            <a:avLst/>
+          </a:prstGeom>
+        </p:spPr>
+        <p:style>
+          <a:lnRef idx="3">
+            <a:schemeClr val="lt1"/>
+          </a:lnRef>
+          <a:fillRef idx="1">
+            <a:schemeClr val="accent3"/>
+          </a:fillRef>
+          <a:effectRef idx="1">
+            <a:schemeClr val="accent3"/>
+          </a:effectRef>
+          <a:fontRef idx="minor">
+            <a:schemeClr val="lt1"/>
+          </a:fontRef>
+        </p:style>
+        <p:txBody>
+          <a:bodyPr rtlCol="0" anchor="ctr"/>
+          <a:lstStyle/>
+          <a:p>
+            <a:pPr algn="ctr"/>
+            <a:r>
+              <a:rPr lang="sr-Latn-RS" dirty="0"/>
+              <a:t>2012</a:t>
+            </a:r>
+          </a:p>
+        </p:txBody>
+      </p:sp>
+      <p:sp>
+        <p:nvSpPr>
+          <p:cNvPr id="11" name="Explosion: 8 Points 10"/>
+          <p:cNvSpPr/>
+          <p:nvPr/>
+        </p:nvSpPr>
+        <p:spPr>
+          <a:xfrm>
+            <a:off x="16462375" y="5640387"/>
+            <a:ext cx="1828800" cy="1295400"/>
+          </a:xfrm>
+          <a:prstGeom prst="irregularSeal1">
+            <a:avLst/>
+          </a:prstGeom>
+        </p:spPr>
+        <p:style>
+          <a:lnRef idx="3">
+            <a:schemeClr val="lt1"/>
+          </a:lnRef>
+          <a:fillRef idx="1">
+            <a:schemeClr val="accent3"/>
+          </a:fillRef>
+          <a:effectRef idx="1">
+            <a:schemeClr val="accent3"/>
+          </a:effectRef>
+          <a:fontRef idx="minor">
+            <a:schemeClr val="lt1"/>
+          </a:fontRef>
+        </p:style>
+        <p:txBody>
+          <a:bodyPr rtlCol="0" anchor="ctr"/>
+          <a:lstStyle/>
+          <a:p>
+            <a:pPr algn="ctr"/>
+            <a:r>
+              <a:rPr lang="sr-Latn-RS" dirty="0"/>
+              <a:t>2013</a:t>
+            </a:r>
+          </a:p>
+        </p:txBody>
+      </p:sp>
+      <p:sp>
+        <p:nvSpPr>
+          <p:cNvPr id="12" name="Rectangle 11"/>
+          <p:cNvSpPr/>
+          <p:nvPr/>
+        </p:nvSpPr>
+        <p:spPr>
+          <a:xfrm>
+            <a:off x="1483172" y="7126287"/>
+            <a:ext cx="16349215" cy="1143000"/>
+          </a:xfrm>
+          <a:prstGeom prst="rect">
+            <a:avLst/>
+          </a:prstGeom>
+        </p:spPr>
+        <p:style>
+          <a:lnRef idx="2">
+            <a:schemeClr val="accent1">
+              <a:shade val="50000"/>
+            </a:schemeClr>
+          </a:lnRef>
+          <a:fillRef idx="1">
+            <a:schemeClr val="accent1"/>
+          </a:fillRef>
+          <a:effectRef idx="0">
+            <a:schemeClr val="accent1"/>
+          </a:effectRef>
+          <a:fontRef idx="minor">
+            <a:schemeClr val="lt1"/>
+          </a:fontRef>
+        </p:style>
+        <p:txBody>
+          <a:bodyPr rtlCol="0" anchor="ctr"/>
+          <a:lstStyle/>
+          <a:p>
+            <a:r>
+              <a:rPr lang="en-US" dirty="0"/>
+              <a:t>In software engineering, dependency injection is a technique whereby one object supplies the dependencies of another object.</a:t>
+            </a:r>
+            <a:endParaRPr lang="sr-Latn-RS" dirty="0"/>
+          </a:p>
+        </p:txBody>
+      </p:sp>
+      <p:sp>
+        <p:nvSpPr>
+          <p:cNvPr id="13" name="Explosion: 8 Points 12"/>
+          <p:cNvSpPr/>
+          <p:nvPr/>
+        </p:nvSpPr>
+        <p:spPr>
+          <a:xfrm>
+            <a:off x="16462375" y="7773987"/>
+            <a:ext cx="1828800" cy="1295400"/>
+          </a:xfrm>
+          <a:prstGeom prst="irregularSeal1">
+            <a:avLst/>
+          </a:prstGeom>
+        </p:spPr>
+        <p:style>
+          <a:lnRef idx="3">
+            <a:schemeClr val="lt1"/>
+          </a:lnRef>
+          <a:fillRef idx="1">
+            <a:schemeClr val="accent3"/>
+          </a:fillRef>
+          <a:effectRef idx="1">
+            <a:schemeClr val="accent3"/>
+          </a:effectRef>
+          <a:fontRef idx="minor">
+            <a:schemeClr val="lt1"/>
+          </a:fontRef>
+        </p:style>
+        <p:txBody>
+          <a:bodyPr rtlCol="0" anchor="ctr"/>
+          <a:lstStyle/>
+          <a:p>
+            <a:pPr algn="ctr"/>
+            <a:r>
+              <a:rPr lang="sr-Latn-RS" dirty="0"/>
+              <a:t>201</a:t>
+            </a:r>
+            <a:r>
+              <a:rPr lang="en-US" dirty="0"/>
+              <a:t>7</a:t>
+            </a:r>
+            <a:endParaRPr lang="sr-Latn-RS" dirty="0"/>
+          </a:p>
+        </p:txBody>
+      </p:sp>
+    </p:spTree>
+    <p:extLst>
+      <p:ext uri="{BB962C8B-B14F-4D97-AF65-F5344CB8AC3E}">
+        <p14:creationId xmlns:p14="http://schemas.microsoft.com/office/powerpoint/2010/main" val="743265572"/>
+      </p:ext>
+    </p:extLst>
+  </p:cSld>
+  <p:clrMapOvr>
+    <a:masterClrMapping/>
+  </p:clrMapOvr>
+  <mc:AlternateContent xmlns:mc="http://schemas.openxmlformats.org/markup-compatibility/2006" xmlns:p14="http://schemas.microsoft.com/office/powerpoint/2010/main">
+    <mc:Choice Requires="p14">
+      <p:transition spd="med" p14:dur="700">
+        <p:fade/>
+      </p:transition>
+    </mc:Choice>
+    <mc:Fallback xmlns="">
+      <p:transition spd="med">
+        <p:fade/>
+      </p:transition>
+    </mc:Fallback>
+  </mc:AlternateContent>
+  <p:timing>
+    <p:tnLst>
+      <p:par>
+        <p:cTn id="1" dur="indefinite" restart="never" nodeType="tmRoot">
+          <p:childTnLst>
+            <p:seq concurrent="1" nextAc="seek">
+              <p:cTn id="2" dur="indefinite" nodeType="mainSeq">
+                <p:childTnLst>
+                  <p:par>
+                    <p:cTn id="3" fill="hold">
+                      <p:stCondLst>
+                        <p:cond delay="indefinite"/>
+                      </p:stCondLst>
+                      <p:childTnLst>
+                        <p:par>
+                          <p:cTn id="4" fill="hold">
+                            <p:stCondLst>
+                              <p:cond delay="0"/>
+                            </p:stCondLst>
+                            <p:childTnLst>
+                              <p:par>
+                                <p:cTn id="5" presetID="10" presetClass="entr" presetSubtype="0" fill="hold" grpId="0" nodeType="clickEffect" nodePh="1">
+                                  <p:stCondLst>
+                                    <p:cond delay="0"/>
+                                  </p:stCondLst>
+                                  <p:endCondLst>
+                                    <p:cond evt="begin" delay="0">
+                                      <p:tn val="5"/>
+                                    </p:cond>
+                                  </p:endCondLst>
+                                  <p:childTnLst>
+                                    <p:set>
+                                      <p:cBhvr>
+                                        <p:cTn id="6" dur="1" fill="hold">
+                                          <p:stCondLst>
+                                            <p:cond delay="0"/>
+                                          </p:stCondLst>
+                                        </p:cTn>
+                                        <p:tgtEl>
+                                          <p:spTgt spid="9"/>
+                                        </p:tgtEl>
+                                        <p:attrNameLst>
+                                          <p:attrName>style.visibility</p:attrName>
+                                        </p:attrNameLst>
+                                      </p:cBhvr>
+                                      <p:to>
+                                        <p:strVal val="visible"/>
+                                      </p:to>
+                                    </p:set>
+                                    <p:animEffect transition="in" filter="fade">
+                                      <p:cBhvr>
+                                        <p:cTn id="7" dur="500"/>
+                                        <p:tgtEl>
+                                          <p:spTgt spid="9"/>
+                                        </p:tgtEl>
+                                      </p:cBhvr>
+                                    </p:animEffect>
+                                  </p:childTnLst>
+                                </p:cTn>
+                              </p:par>
+                            </p:childTnLst>
+                          </p:cTn>
+                        </p:par>
+                      </p:childTnLst>
+                    </p:cTn>
+                  </p:par>
+                  <p:par>
+                    <p:cTn id="8" fill="hold">
+                      <p:stCondLst>
+                        <p:cond delay="indefinite"/>
+                      </p:stCondLst>
+                      <p:childTnLst>
+                        <p:par>
+                          <p:cTn id="9" fill="hold">
+                            <p:stCondLst>
+                              <p:cond delay="0"/>
+                            </p:stCondLst>
+                            <p:childTnLst>
+                              <p:par>
+                                <p:cTn id="10" presetID="10" presetClass="entr" presetSubtype="0" fill="hold" grpId="0" nodeType="clickEffect">
+                                  <p:stCondLst>
+                                    <p:cond delay="0"/>
+                                  </p:stCondLst>
+                                  <p:childTnLst>
+                                    <p:set>
+                                      <p:cBhvr>
+                                        <p:cTn id="11" dur="1" fill="hold">
+                                          <p:stCondLst>
+                                            <p:cond delay="0"/>
+                                          </p:stCondLst>
+                                        </p:cTn>
+                                        <p:tgtEl>
+                                          <p:spTgt spid="2"/>
+                                        </p:tgtEl>
+                                        <p:attrNameLst>
+                                          <p:attrName>style.visibility</p:attrName>
+                                        </p:attrNameLst>
+                                      </p:cBhvr>
+                                      <p:to>
+                                        <p:strVal val="visible"/>
+                                      </p:to>
+                                    </p:set>
+                                    <p:animEffect transition="in" filter="fade">
+                                      <p:cBhvr>
+                                        <p:cTn id="12" dur="500"/>
+                                        <p:tgtEl>
+                                          <p:spTgt spid="2"/>
+                                        </p:tgtEl>
+                                      </p:cBhvr>
+                                    </p:animEffect>
+                                  </p:childTnLst>
+                                </p:cTn>
+                              </p:par>
+                            </p:childTnLst>
+                          </p:cTn>
+                        </p:par>
+                        <p:par>
+                          <p:cTn id="13" fill="hold">
+                            <p:stCondLst>
+                              <p:cond delay="500"/>
+                            </p:stCondLst>
+                            <p:childTnLst>
+                              <p:par>
+                                <p:cTn id="14" presetID="10" presetClass="entr" presetSubtype="0" fill="hold" grpId="0" nodeType="afterEffect">
+                                  <p:stCondLst>
+                                    <p:cond delay="0"/>
+                                  </p:stCondLst>
+                                  <p:childTnLst>
+                                    <p:set>
+                                      <p:cBhvr>
+                                        <p:cTn id="15" dur="1" fill="hold">
+                                          <p:stCondLst>
+                                            <p:cond delay="0"/>
+                                          </p:stCondLst>
+                                        </p:cTn>
+                                        <p:tgtEl>
+                                          <p:spTgt spid="4"/>
+                                        </p:tgtEl>
+                                        <p:attrNameLst>
+                                          <p:attrName>style.visibility</p:attrName>
+                                        </p:attrNameLst>
+                                      </p:cBhvr>
+                                      <p:to>
+                                        <p:strVal val="visible"/>
+                                      </p:to>
+                                    </p:set>
+                                    <p:animEffect transition="in" filter="fade">
+                                      <p:cBhvr>
+                                        <p:cTn id="16" dur="500"/>
+                                        <p:tgtEl>
+                                          <p:spTgt spid="4"/>
+                                        </p:tgtEl>
+                                      </p:cBhvr>
+                                    </p:animEffect>
+                                  </p:childTnLst>
+                                </p:cTn>
+                              </p:par>
+                            </p:childTnLst>
+                          </p:cTn>
+                        </p:par>
+                      </p:childTnLst>
+                    </p:cTn>
+                  </p:par>
+                  <p:par>
+                    <p:cTn id="17" fill="hold">
+                      <p:stCondLst>
+                        <p:cond delay="indefinite"/>
+                      </p:stCondLst>
+                      <p:childTnLst>
+                        <p:par>
+                          <p:cTn id="18" fill="hold">
+                            <p:stCondLst>
+                              <p:cond delay="0"/>
+                            </p:stCondLst>
+                            <p:childTnLst>
+                              <p:par>
+                                <p:cTn id="19" presetID="10" presetClass="entr" presetSubtype="0" fill="hold" grpId="0" nodeType="clickEffect">
+                                  <p:stCondLst>
+                                    <p:cond delay="0"/>
+                                  </p:stCondLst>
+                                  <p:childTnLst>
+                                    <p:set>
+                                      <p:cBhvr>
+                                        <p:cTn id="20" dur="1" fill="hold">
+                                          <p:stCondLst>
+                                            <p:cond delay="0"/>
+                                          </p:stCondLst>
+                                        </p:cTn>
+                                        <p:tgtEl>
+                                          <p:spTgt spid="10"/>
+                                        </p:tgtEl>
+                                        <p:attrNameLst>
+                                          <p:attrName>style.visibility</p:attrName>
+                                        </p:attrNameLst>
+                                      </p:cBhvr>
+                                      <p:to>
+                                        <p:strVal val="visible"/>
+                                      </p:to>
+                                    </p:set>
+                                    <p:animEffect transition="in" filter="fade">
+                                      <p:cBhvr>
+                                        <p:cTn id="21" dur="500"/>
+                                        <p:tgtEl>
+                                          <p:spTgt spid="10"/>
+                                        </p:tgtEl>
+                                      </p:cBhvr>
+                                    </p:animEffect>
+                                  </p:childTnLst>
+                                </p:cTn>
+                              </p:par>
+                            </p:childTnLst>
+                          </p:cTn>
+                        </p:par>
+                        <p:par>
+                          <p:cTn id="22" fill="hold">
+                            <p:stCondLst>
+                              <p:cond delay="500"/>
+                            </p:stCondLst>
+                            <p:childTnLst>
+                              <p:par>
+                                <p:cTn id="23" presetID="10" presetClass="entr" presetSubtype="0" fill="hold" grpId="0" nodeType="afterEffect">
+                                  <p:stCondLst>
+                                    <p:cond delay="0"/>
+                                  </p:stCondLst>
+                                  <p:childTnLst>
+                                    <p:set>
+                                      <p:cBhvr>
+                                        <p:cTn id="24" dur="1" fill="hold">
+                                          <p:stCondLst>
+                                            <p:cond delay="0"/>
+                                          </p:stCondLst>
+                                        </p:cTn>
+                                        <p:tgtEl>
+                                          <p:spTgt spid="11"/>
+                                        </p:tgtEl>
+                                        <p:attrNameLst>
+                                          <p:attrName>style.visibility</p:attrName>
+                                        </p:attrNameLst>
+                                      </p:cBhvr>
+                                      <p:to>
+                                        <p:strVal val="visible"/>
+                                      </p:to>
+                                    </p:set>
+                                    <p:animEffect transition="in" filter="fade">
+                                      <p:cBhvr>
+                                        <p:cTn id="25" dur="500"/>
+                                        <p:tgtEl>
+                                          <p:spTgt spid="11"/>
+                                        </p:tgtEl>
+                                      </p:cBhvr>
+                                    </p:animEffect>
+                                  </p:childTnLst>
+                                </p:cTn>
+                              </p:par>
+                            </p:childTnLst>
+                          </p:cTn>
+                        </p:par>
+                      </p:childTnLst>
+                    </p:cTn>
+                  </p:par>
+                  <p:par>
+                    <p:cTn id="26" fill="hold">
+                      <p:stCondLst>
+                        <p:cond delay="indefinite"/>
+                      </p:stCondLst>
+                      <p:childTnLst>
+                        <p:par>
+                          <p:cTn id="27" fill="hold">
+                            <p:stCondLst>
+                              <p:cond delay="0"/>
+                            </p:stCondLst>
+                            <p:childTnLst>
+                              <p:par>
+                                <p:cTn id="28" presetID="10" presetClass="entr" presetSubtype="0" fill="hold" grpId="0" nodeType="clickEffect">
+                                  <p:stCondLst>
+                                    <p:cond delay="0"/>
+                                  </p:stCondLst>
+                                  <p:childTnLst>
+                                    <p:set>
+                                      <p:cBhvr>
+                                        <p:cTn id="29" dur="1" fill="hold">
+                                          <p:stCondLst>
+                                            <p:cond delay="0"/>
+                                          </p:stCondLst>
+                                        </p:cTn>
+                                        <p:tgtEl>
+                                          <p:spTgt spid="12"/>
+                                        </p:tgtEl>
+                                        <p:attrNameLst>
+                                          <p:attrName>style.visibility</p:attrName>
+                                        </p:attrNameLst>
+                                      </p:cBhvr>
+                                      <p:to>
+                                        <p:strVal val="visible"/>
+                                      </p:to>
+                                    </p:set>
+                                    <p:animEffect transition="in" filter="fade">
+                                      <p:cBhvr>
+                                        <p:cTn id="30" dur="500"/>
+                                        <p:tgtEl>
+                                          <p:spTgt spid="12"/>
+                                        </p:tgtEl>
+                                      </p:cBhvr>
+                                    </p:animEffect>
+                                  </p:childTnLst>
+                                </p:cTn>
+                              </p:par>
+                            </p:childTnLst>
+                          </p:cTn>
+                        </p:par>
+                        <p:par>
+                          <p:cTn id="31" fill="hold">
+                            <p:stCondLst>
+                              <p:cond delay="500"/>
+                            </p:stCondLst>
+                            <p:childTnLst>
+                              <p:par>
+                                <p:cTn id="32" presetID="10" presetClass="entr" presetSubtype="0" fill="hold" grpId="0" nodeType="afterEffect">
+                                  <p:stCondLst>
+                                    <p:cond delay="0"/>
+                                  </p:stCondLst>
+                                  <p:childTnLst>
+                                    <p:set>
+                                      <p:cBhvr>
+                                        <p:cTn id="33" dur="1" fill="hold">
+                                          <p:stCondLst>
+                                            <p:cond delay="0"/>
+                                          </p:stCondLst>
+                                        </p:cTn>
+                                        <p:tgtEl>
+                                          <p:spTgt spid="13"/>
+                                        </p:tgtEl>
+                                        <p:attrNameLst>
+                                          <p:attrName>style.visibility</p:attrName>
+                                        </p:attrNameLst>
+                                      </p:cBhvr>
+                                      <p:to>
+                                        <p:strVal val="visible"/>
+                                      </p:to>
+                                    </p:set>
+                                    <p:animEffect transition="in" filter="fade">
+                                      <p:cBhvr>
+                                        <p:cTn id="34" dur="500"/>
+                                        <p:tgtEl>
+                                          <p:spTgt spid="13"/>
+                                        </p:tgtEl>
+                                      </p:cBhvr>
+                                    </p:animEffect>
+                                  </p:childTnLst>
+                                </p:cTn>
+                              </p:par>
+                            </p:childTnLst>
+                          </p:cTn>
+                        </p:par>
+                      </p:childTnLst>
+                    </p:cTn>
+                  </p:par>
+                </p:childTnLst>
+              </p:cTn>
+              <p:prevCondLst>
+                <p:cond evt="onPrev" delay="0">
+                  <p:tgtEl>
+                    <p:sldTgt/>
+                  </p:tgtEl>
+                </p:cond>
+              </p:prevCondLst>
+              <p:nextCondLst>
+                <p:cond evt="onNext" delay="0">
+                  <p:tgtEl>
+                    <p:sldTgt/>
+                  </p:tgtEl>
+                </p:cond>
+              </p:nextCondLst>
+            </p:seq>
+          </p:childTnLst>
+        </p:cTn>
+      </p:par>
+    </p:tnLst>
+    <p:bldLst>
+      <p:bldP spid="9" grpId="0"/>
+      <p:bldP spid="2" grpId="0" animBg="1"/>
+      <p:bldP spid="10" grpId="0" animBg="1"/>
+      <p:bldP spid="4" grpId="0" animBg="1"/>
+      <p:bldP spid="11" grpId="0" animBg="1"/>
+      <p:bldP spid="12" grpId="0" animBg="1"/>
+      <p:bldP spid="13" grpId="0" animBg="1"/>
+    </p:bldLst>
+  </p:timing>
+</p:sld>
+</file>
+
+<file path=ppt/slides/slide20.xml><?xml version="1.0" encoding="utf-8"?>
+<p:sld xmlns:a="http://schemas.openxmlformats.org/drawingml/2006/main" xmlns:r="http://schemas.openxmlformats.org/officeDocument/2006/relationships" xmlns:p="http://schemas.openxmlformats.org/presentationml/2006/main">
+  <p:cSld>
+    <p:spTree>
+      <p:nvGrpSpPr>
+        <p:cNvPr id="1" name=""/>
+        <p:cNvGrpSpPr/>
+        <p:nvPr/>
+      </p:nvGrpSpPr>
+      <p:grpSpPr>
+        <a:xfrm>
+          <a:off x="0" y="0"/>
+          <a:ext cx="0" cy="0"/>
+          <a:chOff x="0" y="0"/>
+          <a:chExt cx="0" cy="0"/>
+        </a:xfrm>
+      </p:grpSpPr>
+      <p:sp>
+        <p:nvSpPr>
+          <p:cNvPr id="16" name="TextBox 15"/>
+          <p:cNvSpPr txBox="1"/>
+          <p:nvPr/>
+        </p:nvSpPr>
+        <p:spPr>
+          <a:xfrm>
+            <a:off x="4969123" y="854313"/>
+            <a:ext cx="8136904" cy="830997"/>
+          </a:xfrm>
+          <a:prstGeom prst="rect">
+            <a:avLst/>
+          </a:prstGeom>
+          <a:noFill/>
+        </p:spPr>
+        <p:txBody>
+          <a:bodyPr wrap="square" rtlCol="0">
+            <a:spAutoFit/>
+          </a:bodyPr>
+          <a:lstStyle/>
+          <a:p>
+            <a:pPr algn="ctr"/>
+            <a:r>
+              <a:rPr lang="en-US" sz="4800" dirty="0">
+                <a:solidFill>
+                  <a:srgbClr val="545250"/>
+                </a:solidFill>
+                <a:latin typeface="Novecento sans wide Book" pitchFamily="50" charset="-94"/>
+              </a:rPr>
               <a:t>Benefits of DI</a:t>
             </a:r>
             <a:endParaRPr lang="sr-Latn-RS" sz="4800" dirty="0">
@@ -12075,7 +14199,7 @@
 </p:sld>
 </file>
 
-<file path=ppt/slides/slide19.xml><?xml version="1.0" encoding="utf-8"?>
+<file path=ppt/slides/slide21.xml><?xml version="1.0" encoding="utf-8"?>
 <p:sld xmlns:a="http://schemas.openxmlformats.org/drawingml/2006/main" xmlns:r="http://schemas.openxmlformats.org/officeDocument/2006/relationships" xmlns:p="http://schemas.openxmlformats.org/presentationml/2006/main">
   <p:cSld>
     <p:spTree>
@@ -12534,448 +14658,6 @@
   <p:clrMapOvr>
     <a:masterClrMapping/>
   </p:clrMapOvr>
-  <mc:AlternateContent xmlns:mc="http://schemas.openxmlformats.org/markup-compatibility/2006">
-    <mc:Choice xmlns:p14="http://schemas.microsoft.com/office/powerpoint/2010/main" Requires="p14">
-      <p:transition spd="med" p14:dur="700">
-        <p:fade/>
-      </p:transition>
-    </mc:Choice>
-    <mc:Fallback>
-      <p:transition spd="med">
-        <p:fade/>
-      </p:transition>
-    </mc:Fallback>
-  </mc:AlternateContent>
-</p:sld>
-</file>
-
-<file path=ppt/slides/slide2.xml><?xml version="1.0" encoding="utf-8"?>
-<p:sld xmlns:a="http://schemas.openxmlformats.org/drawingml/2006/main" xmlns:r="http://schemas.openxmlformats.org/officeDocument/2006/relationships" xmlns:p="http://schemas.openxmlformats.org/presentationml/2006/main">
-  <p:cSld>
-    <p:spTree>
-      <p:nvGrpSpPr>
-        <p:cNvPr id="1" name=""/>
-        <p:cNvGrpSpPr/>
-        <p:nvPr/>
-      </p:nvGrpSpPr>
-      <p:grpSpPr>
-        <a:xfrm>
-          <a:off x="0" y="0"/>
-          <a:ext cx="0" cy="0"/>
-          <a:chOff x="0" y="0"/>
-          <a:chExt cx="0" cy="0"/>
-        </a:xfrm>
-      </p:grpSpPr>
-      <p:sp>
-        <p:nvSpPr>
-          <p:cNvPr id="16" name="TextBox 15"/>
-          <p:cNvSpPr txBox="1"/>
-          <p:nvPr/>
-        </p:nvSpPr>
-        <p:spPr>
-          <a:xfrm>
-            <a:off x="4969123" y="854313"/>
-            <a:ext cx="8136904" cy="830997"/>
-          </a:xfrm>
-          <a:prstGeom prst="rect">
-            <a:avLst/>
-          </a:prstGeom>
-          <a:noFill/>
-        </p:spPr>
-        <p:txBody>
-          <a:bodyPr wrap="square" rtlCol="0">
-            <a:spAutoFit/>
-          </a:bodyPr>
-          <a:lstStyle/>
-          <a:p>
-            <a:pPr algn="ctr"/>
-            <a:r>
-              <a:rPr lang="en-US" sz="4800" dirty="0">
-                <a:solidFill>
-                  <a:srgbClr val="545250"/>
-                </a:solidFill>
-                <a:latin typeface="Novecento sans wide Book" pitchFamily="50" charset="-94"/>
-              </a:rPr>
-              <a:t>What is DI?</a:t>
-            </a:r>
-            <a:endParaRPr lang="sr-Latn-RS" sz="4800" dirty="0">
-              <a:solidFill>
-                <a:srgbClr val="545250"/>
-              </a:solidFill>
-              <a:latin typeface="Novecento sans wide Book" pitchFamily="50" charset="-94"/>
-            </a:endParaRPr>
-          </a:p>
-        </p:txBody>
-      </p:sp>
-      <p:pic>
-        <p:nvPicPr>
-          <p:cNvPr id="8" name="Picture 7"/>
-          <p:cNvPicPr>
-            <a:picLocks noChangeAspect="1"/>
-          </p:cNvPicPr>
-          <p:nvPr/>
-        </p:nvPicPr>
-        <p:blipFill>
-          <a:blip r:embed="rId3">
-            <a:extLst>
-              <a:ext uri="{28A0092B-C50C-407E-A947-70E740481C1C}">
-                <a14:useLocalDpi xmlns:a14="http://schemas.microsoft.com/office/drawing/2010/main" val="0"/>
-              </a:ext>
-            </a:extLst>
-          </a:blip>
-          <a:stretch>
-            <a:fillRect/>
-          </a:stretch>
-        </p:blipFill>
-        <p:spPr>
-          <a:xfrm rot="5400000">
-            <a:off x="8454536" y="-2460908"/>
-            <a:ext cx="1168254" cy="9003175"/>
-          </a:xfrm>
-          <a:prstGeom prst="rect">
-            <a:avLst/>
-          </a:prstGeom>
-        </p:spPr>
-      </p:pic>
-      <p:pic>
-        <p:nvPicPr>
-          <p:cNvPr id="7" name="Picture 6"/>
-          <p:cNvPicPr>
-            <a:picLocks noChangeAspect="1"/>
-          </p:cNvPicPr>
-          <p:nvPr/>
-        </p:nvPicPr>
-        <p:blipFill>
-          <a:blip r:embed="rId4" cstate="print">
-            <a:extLst>
-              <a:ext uri="{28A0092B-C50C-407E-A947-70E740481C1C}">
-                <a14:useLocalDpi xmlns:a14="http://schemas.microsoft.com/office/drawing/2010/main" val="0"/>
-              </a:ext>
-            </a:extLst>
-          </a:blip>
-          <a:stretch>
-            <a:fillRect/>
-          </a:stretch>
-        </p:blipFill>
-        <p:spPr>
-          <a:xfrm>
-            <a:off x="13488987" y="9412287"/>
-            <a:ext cx="4572000" cy="646390"/>
-          </a:xfrm>
-          <a:prstGeom prst="rect">
-            <a:avLst/>
-          </a:prstGeom>
-        </p:spPr>
-      </p:pic>
-      <p:sp>
-        <p:nvSpPr>
-          <p:cNvPr id="9" name="Rectangle 8"/>
-          <p:cNvSpPr/>
-          <p:nvPr/>
-        </p:nvSpPr>
-        <p:spPr>
-          <a:xfrm>
-            <a:off x="1483172" y="2163142"/>
-            <a:ext cx="2994731" cy="923330"/>
-          </a:xfrm>
-          <a:prstGeom prst="rect">
-            <a:avLst/>
-          </a:prstGeom>
-          <a:noFill/>
-        </p:spPr>
-        <p:txBody>
-          <a:bodyPr wrap="none" lIns="91440" tIns="45720" rIns="91440" bIns="45720">
-            <a:spAutoFit/>
-          </a:bodyPr>
-          <a:lstStyle/>
-          <a:p>
-            <a:pPr algn="ctr"/>
-            <a:r>
-              <a:rPr lang="en-US" sz="5400" b="0" cap="none" spc="0" dirty="0">
-                <a:ln w="0"/>
-                <a:solidFill>
-                  <a:schemeClr val="tx1"/>
-                </a:solidFill>
-                <a:effectLst>
-                  <a:outerShdw blurRad="38100" dist="38100" dir="2700000" algn="tl">
-                    <a:srgbClr val="000000">
-                      <a:alpha val="43137"/>
-                    </a:srgbClr>
-                  </a:outerShdw>
-                </a:effectLst>
-              </a:rPr>
-              <a:t>Wikipedia</a:t>
-            </a:r>
-          </a:p>
-        </p:txBody>
-      </p:sp>
-      <p:sp>
-        <p:nvSpPr>
-          <p:cNvPr id="2" name="Rectangle 1"/>
-          <p:cNvSpPr/>
-          <p:nvPr/>
-        </p:nvSpPr>
-        <p:spPr>
-          <a:xfrm>
-            <a:off x="1483172" y="3163887"/>
-            <a:ext cx="16349215" cy="990600"/>
-          </a:xfrm>
-          <a:prstGeom prst="rect">
-            <a:avLst/>
-          </a:prstGeom>
-        </p:spPr>
-        <p:style>
-          <a:lnRef idx="2">
-            <a:schemeClr val="accent1">
-              <a:shade val="50000"/>
-            </a:schemeClr>
-          </a:lnRef>
-          <a:fillRef idx="1">
-            <a:schemeClr val="accent1"/>
-          </a:fillRef>
-          <a:effectRef idx="0">
-            <a:schemeClr val="accent1"/>
-          </a:effectRef>
-          <a:fontRef idx="minor">
-            <a:schemeClr val="lt1"/>
-          </a:fontRef>
-        </p:style>
-        <p:txBody>
-          <a:bodyPr rtlCol="0" anchor="ctr"/>
-          <a:lstStyle/>
-          <a:p>
-            <a:r>
-              <a:rPr lang="en-US" dirty="0"/>
-              <a:t>Dependency injection is a software design pattern that allows a choice of component to be made at run-time rather than compile time.</a:t>
-            </a:r>
-            <a:endParaRPr lang="sr-Latn-RS" dirty="0"/>
-          </a:p>
-        </p:txBody>
-      </p:sp>
-      <p:sp>
-        <p:nvSpPr>
-          <p:cNvPr id="10" name="Rectangle 9"/>
-          <p:cNvSpPr/>
-          <p:nvPr/>
-        </p:nvSpPr>
-        <p:spPr>
-          <a:xfrm>
-            <a:off x="1483172" y="5068887"/>
-            <a:ext cx="16349215" cy="1143000"/>
-          </a:xfrm>
-          <a:prstGeom prst="rect">
-            <a:avLst/>
-          </a:prstGeom>
-        </p:spPr>
-        <p:style>
-          <a:lnRef idx="2">
-            <a:schemeClr val="accent1">
-              <a:shade val="50000"/>
-            </a:schemeClr>
-          </a:lnRef>
-          <a:fillRef idx="1">
-            <a:schemeClr val="accent1"/>
-          </a:fillRef>
-          <a:effectRef idx="0">
-            <a:schemeClr val="accent1"/>
-          </a:effectRef>
-          <a:fontRef idx="minor">
-            <a:schemeClr val="lt1"/>
-          </a:fontRef>
-        </p:style>
-        <p:txBody>
-          <a:bodyPr rtlCol="0" anchor="ctr"/>
-          <a:lstStyle/>
-          <a:p>
-            <a:r>
-              <a:rPr lang="en-US" dirty="0"/>
-              <a:t>Dependency injection is a software design pattern that allows the removal of hard-coded dependencies and makes it possible to change them, whether at run-time or compile-time.</a:t>
-            </a:r>
-            <a:endParaRPr lang="sr-Latn-RS" dirty="0"/>
-          </a:p>
-        </p:txBody>
-      </p:sp>
-      <p:sp>
-        <p:nvSpPr>
-          <p:cNvPr id="4" name="Explosion: 8 Points 3"/>
-          <p:cNvSpPr/>
-          <p:nvPr/>
-        </p:nvSpPr>
-        <p:spPr>
-          <a:xfrm>
-            <a:off x="16462375" y="3506787"/>
-            <a:ext cx="1828800" cy="1295400"/>
-          </a:xfrm>
-          <a:prstGeom prst="irregularSeal1">
-            <a:avLst/>
-          </a:prstGeom>
-        </p:spPr>
-        <p:style>
-          <a:lnRef idx="3">
-            <a:schemeClr val="lt1"/>
-          </a:lnRef>
-          <a:fillRef idx="1">
-            <a:schemeClr val="accent3"/>
-          </a:fillRef>
-          <a:effectRef idx="1">
-            <a:schemeClr val="accent3"/>
-          </a:effectRef>
-          <a:fontRef idx="minor">
-            <a:schemeClr val="lt1"/>
-          </a:fontRef>
-        </p:style>
-        <p:txBody>
-          <a:bodyPr rtlCol="0" anchor="ctr"/>
-          <a:lstStyle/>
-          <a:p>
-            <a:pPr algn="ctr"/>
-            <a:r>
-              <a:rPr lang="sr-Latn-RS" dirty="0"/>
-              <a:t>2012</a:t>
-            </a:r>
-          </a:p>
-        </p:txBody>
-      </p:sp>
-      <p:sp>
-        <p:nvSpPr>
-          <p:cNvPr id="11" name="Explosion: 8 Points 10"/>
-          <p:cNvSpPr/>
-          <p:nvPr/>
-        </p:nvSpPr>
-        <p:spPr>
-          <a:xfrm>
-            <a:off x="16462375" y="5640387"/>
-            <a:ext cx="1828800" cy="1295400"/>
-          </a:xfrm>
-          <a:prstGeom prst="irregularSeal1">
-            <a:avLst/>
-          </a:prstGeom>
-        </p:spPr>
-        <p:style>
-          <a:lnRef idx="3">
-            <a:schemeClr val="lt1"/>
-          </a:lnRef>
-          <a:fillRef idx="1">
-            <a:schemeClr val="accent3"/>
-          </a:fillRef>
-          <a:effectRef idx="1">
-            <a:schemeClr val="accent3"/>
-          </a:effectRef>
-          <a:fontRef idx="minor">
-            <a:schemeClr val="lt1"/>
-          </a:fontRef>
-        </p:style>
-        <p:txBody>
-          <a:bodyPr rtlCol="0" anchor="ctr"/>
-          <a:lstStyle/>
-          <a:p>
-            <a:pPr algn="ctr"/>
-            <a:r>
-              <a:rPr lang="sr-Latn-RS" dirty="0"/>
-              <a:t>2013</a:t>
-            </a:r>
-          </a:p>
-        </p:txBody>
-      </p:sp>
-      <p:sp>
-        <p:nvSpPr>
-          <p:cNvPr id="12" name="Rectangle 11"/>
-          <p:cNvSpPr/>
-          <p:nvPr/>
-        </p:nvSpPr>
-        <p:spPr>
-          <a:xfrm>
-            <a:off x="1483172" y="7126287"/>
-            <a:ext cx="16349215" cy="1143000"/>
-          </a:xfrm>
-          <a:prstGeom prst="rect">
-            <a:avLst/>
-          </a:prstGeom>
-        </p:spPr>
-        <p:style>
-          <a:lnRef idx="2">
-            <a:schemeClr val="accent1">
-              <a:shade val="50000"/>
-            </a:schemeClr>
-          </a:lnRef>
-          <a:fillRef idx="1">
-            <a:schemeClr val="accent1"/>
-          </a:fillRef>
-          <a:effectRef idx="0">
-            <a:schemeClr val="accent1"/>
-          </a:effectRef>
-          <a:fontRef idx="minor">
-            <a:schemeClr val="lt1"/>
-          </a:fontRef>
-        </p:style>
-        <p:txBody>
-          <a:bodyPr rtlCol="0" anchor="ctr"/>
-          <a:lstStyle/>
-          <a:p>
-            <a:r>
-              <a:rPr lang="en-US" dirty="0"/>
-              <a:t>In software engineering, dependency injection is a technique whereby one object supplies the dependencies of another object.</a:t>
-            </a:r>
-            <a:endParaRPr lang="sr-Latn-RS" dirty="0"/>
-          </a:p>
-        </p:txBody>
-      </p:sp>
-      <p:sp>
-        <p:nvSpPr>
-          <p:cNvPr id="13" name="Explosion: 8 Points 12"/>
-          <p:cNvSpPr/>
-          <p:nvPr/>
-        </p:nvSpPr>
-        <p:spPr>
-          <a:xfrm>
-            <a:off x="16462375" y="7773987"/>
-            <a:ext cx="1828800" cy="1295400"/>
-          </a:xfrm>
-          <a:prstGeom prst="irregularSeal1">
-            <a:avLst/>
-          </a:prstGeom>
-        </p:spPr>
-        <p:style>
-          <a:lnRef idx="3">
-            <a:schemeClr val="lt1"/>
-          </a:lnRef>
-          <a:fillRef idx="1">
-            <a:schemeClr val="accent3"/>
-          </a:fillRef>
-          <a:effectRef idx="1">
-            <a:schemeClr val="accent3"/>
-          </a:effectRef>
-          <a:fontRef idx="minor">
-            <a:schemeClr val="lt1"/>
-          </a:fontRef>
-        </p:style>
-        <p:txBody>
-          <a:bodyPr rtlCol="0" anchor="ctr"/>
-          <a:lstStyle/>
-          <a:p>
-            <a:pPr algn="ctr"/>
-            <a:r>
-              <a:rPr lang="sr-Latn-RS" dirty="0"/>
-              <a:t>201</a:t>
-            </a:r>
-            <a:r>
-              <a:rPr lang="en-US" dirty="0"/>
-              <a:t>7</a:t>
-            </a:r>
-            <a:endParaRPr lang="sr-Latn-RS" dirty="0"/>
-          </a:p>
-        </p:txBody>
-      </p:sp>
-    </p:spTree>
-    <p:extLst>
-      <p:ext uri="{BB962C8B-B14F-4D97-AF65-F5344CB8AC3E}">
-        <p14:creationId xmlns:p14="http://schemas.microsoft.com/office/powerpoint/2010/main" val="743265572"/>
-      </p:ext>
-    </p:extLst>
-  </p:cSld>
-  <p:clrMapOvr>
-    <a:masterClrMapping/>
-  </p:clrMapOvr>
   <mc:AlternateContent xmlns:mc="http://schemas.openxmlformats.org/markup-compatibility/2006" xmlns:p14="http://schemas.microsoft.com/office/powerpoint/2010/main">
     <mc:Choice Requires="p14">
       <p:transition spd="med" p14:dur="700">
@@ -12988,398 +14670,10 @@
       </p:transition>
     </mc:Fallback>
   </mc:AlternateContent>
-  <p:timing>
-    <p:tnLst>
-      <p:par>
-        <p:cTn id="1" dur="indefinite" restart="never" nodeType="tmRoot">
-          <p:childTnLst>
-            <p:seq concurrent="1" nextAc="seek">
-              <p:cTn id="2" dur="indefinite" nodeType="mainSeq">
-                <p:childTnLst>
-                  <p:par>
-                    <p:cTn id="3" fill="hold">
-                      <p:stCondLst>
-                        <p:cond delay="indefinite"/>
-                      </p:stCondLst>
-                      <p:childTnLst>
-                        <p:par>
-                          <p:cTn id="4" fill="hold">
-                            <p:stCondLst>
-                              <p:cond delay="0"/>
-                            </p:stCondLst>
-                            <p:childTnLst>
-                              <p:par>
-                                <p:cTn id="5" presetID="10" presetClass="entr" presetSubtype="0" fill="hold" grpId="0" nodeType="clickEffect" nodePh="1">
-                                  <p:stCondLst>
-                                    <p:cond delay="0"/>
-                                  </p:stCondLst>
-                                  <p:endCondLst>
-                                    <p:cond evt="begin" delay="0">
-                                      <p:tn val="5"/>
-                                    </p:cond>
-                                  </p:endCondLst>
-                                  <p:childTnLst>
-                                    <p:set>
-                                      <p:cBhvr>
-                                        <p:cTn id="6" dur="1" fill="hold">
-                                          <p:stCondLst>
-                                            <p:cond delay="0"/>
-                                          </p:stCondLst>
-                                        </p:cTn>
-                                        <p:tgtEl>
-                                          <p:spTgt spid="9"/>
-                                        </p:tgtEl>
-                                        <p:attrNameLst>
-                                          <p:attrName>style.visibility</p:attrName>
-                                        </p:attrNameLst>
-                                      </p:cBhvr>
-                                      <p:to>
-                                        <p:strVal val="visible"/>
-                                      </p:to>
-                                    </p:set>
-                                    <p:animEffect transition="in" filter="fade">
-                                      <p:cBhvr>
-                                        <p:cTn id="7" dur="500"/>
-                                        <p:tgtEl>
-                                          <p:spTgt spid="9"/>
-                                        </p:tgtEl>
-                                      </p:cBhvr>
-                                    </p:animEffect>
-                                  </p:childTnLst>
-                                </p:cTn>
-                              </p:par>
-                            </p:childTnLst>
-                          </p:cTn>
-                        </p:par>
-                      </p:childTnLst>
-                    </p:cTn>
-                  </p:par>
-                  <p:par>
-                    <p:cTn id="8" fill="hold">
-                      <p:stCondLst>
-                        <p:cond delay="indefinite"/>
-                      </p:stCondLst>
-                      <p:childTnLst>
-                        <p:par>
-                          <p:cTn id="9" fill="hold">
-                            <p:stCondLst>
-                              <p:cond delay="0"/>
-                            </p:stCondLst>
-                            <p:childTnLst>
-                              <p:par>
-                                <p:cTn id="10" presetID="10" presetClass="entr" presetSubtype="0" fill="hold" grpId="0" nodeType="clickEffect">
-                                  <p:stCondLst>
-                                    <p:cond delay="0"/>
-                                  </p:stCondLst>
-                                  <p:childTnLst>
-                                    <p:set>
-                                      <p:cBhvr>
-                                        <p:cTn id="11" dur="1" fill="hold">
-                                          <p:stCondLst>
-                                            <p:cond delay="0"/>
-                                          </p:stCondLst>
-                                        </p:cTn>
-                                        <p:tgtEl>
-                                          <p:spTgt spid="2"/>
-                                        </p:tgtEl>
-                                        <p:attrNameLst>
-                                          <p:attrName>style.visibility</p:attrName>
-                                        </p:attrNameLst>
-                                      </p:cBhvr>
-                                      <p:to>
-                                        <p:strVal val="visible"/>
-                                      </p:to>
-                                    </p:set>
-                                    <p:animEffect transition="in" filter="fade">
-                                      <p:cBhvr>
-                                        <p:cTn id="12" dur="500"/>
-                                        <p:tgtEl>
-                                          <p:spTgt spid="2"/>
-                                        </p:tgtEl>
-                                      </p:cBhvr>
-                                    </p:animEffect>
-                                  </p:childTnLst>
-                                </p:cTn>
-                              </p:par>
-                            </p:childTnLst>
-                          </p:cTn>
-                        </p:par>
-                        <p:par>
-                          <p:cTn id="13" fill="hold">
-                            <p:stCondLst>
-                              <p:cond delay="500"/>
-                            </p:stCondLst>
-                            <p:childTnLst>
-                              <p:par>
-                                <p:cTn id="14" presetID="10" presetClass="entr" presetSubtype="0" fill="hold" grpId="0" nodeType="afterEffect">
-                                  <p:stCondLst>
-                                    <p:cond delay="0"/>
-                                  </p:stCondLst>
-                                  <p:childTnLst>
-                                    <p:set>
-                                      <p:cBhvr>
-                                        <p:cTn id="15" dur="1" fill="hold">
-                                          <p:stCondLst>
-                                            <p:cond delay="0"/>
-                                          </p:stCondLst>
-                                        </p:cTn>
-                                        <p:tgtEl>
-                                          <p:spTgt spid="4"/>
-                                        </p:tgtEl>
-                                        <p:attrNameLst>
-                                          <p:attrName>style.visibility</p:attrName>
-                                        </p:attrNameLst>
-                                      </p:cBhvr>
-                                      <p:to>
-                                        <p:strVal val="visible"/>
-                                      </p:to>
-                                    </p:set>
-                                    <p:animEffect transition="in" filter="fade">
-                                      <p:cBhvr>
-                                        <p:cTn id="16" dur="500"/>
-                                        <p:tgtEl>
-                                          <p:spTgt spid="4"/>
-                                        </p:tgtEl>
-                                      </p:cBhvr>
-                                    </p:animEffect>
-                                  </p:childTnLst>
-                                </p:cTn>
-                              </p:par>
-                            </p:childTnLst>
-                          </p:cTn>
-                        </p:par>
-                      </p:childTnLst>
-                    </p:cTn>
-                  </p:par>
-                  <p:par>
-                    <p:cTn id="17" fill="hold">
-                      <p:stCondLst>
-                        <p:cond delay="indefinite"/>
-                      </p:stCondLst>
-                      <p:childTnLst>
-                        <p:par>
-                          <p:cTn id="18" fill="hold">
-                            <p:stCondLst>
-                              <p:cond delay="0"/>
-                            </p:stCondLst>
-                            <p:childTnLst>
-                              <p:par>
-                                <p:cTn id="19" presetID="10" presetClass="entr" presetSubtype="0" fill="hold" grpId="0" nodeType="clickEffect">
-                                  <p:stCondLst>
-                                    <p:cond delay="0"/>
-                                  </p:stCondLst>
-                                  <p:childTnLst>
-                                    <p:set>
-                                      <p:cBhvr>
-                                        <p:cTn id="20" dur="1" fill="hold">
-                                          <p:stCondLst>
-                                            <p:cond delay="0"/>
-                                          </p:stCondLst>
-                                        </p:cTn>
-                                        <p:tgtEl>
-                                          <p:spTgt spid="10"/>
-                                        </p:tgtEl>
-                                        <p:attrNameLst>
-                                          <p:attrName>style.visibility</p:attrName>
-                                        </p:attrNameLst>
-                                      </p:cBhvr>
-                                      <p:to>
-                                        <p:strVal val="visible"/>
-                                      </p:to>
-                                    </p:set>
-                                    <p:animEffect transition="in" filter="fade">
-                                      <p:cBhvr>
-                                        <p:cTn id="21" dur="500"/>
-                                        <p:tgtEl>
-                                          <p:spTgt spid="10"/>
-                                        </p:tgtEl>
-                                      </p:cBhvr>
-                                    </p:animEffect>
-                                  </p:childTnLst>
-                                </p:cTn>
-                              </p:par>
-                            </p:childTnLst>
-                          </p:cTn>
-                        </p:par>
-                        <p:par>
-                          <p:cTn id="22" fill="hold">
-                            <p:stCondLst>
-                              <p:cond delay="500"/>
-                            </p:stCondLst>
-                            <p:childTnLst>
-                              <p:par>
-                                <p:cTn id="23" presetID="10" presetClass="entr" presetSubtype="0" fill="hold" grpId="0" nodeType="afterEffect">
-                                  <p:stCondLst>
-                                    <p:cond delay="0"/>
-                                  </p:stCondLst>
-                                  <p:childTnLst>
-                                    <p:set>
-                                      <p:cBhvr>
-                                        <p:cTn id="24" dur="1" fill="hold">
-                                          <p:stCondLst>
-                                            <p:cond delay="0"/>
-                                          </p:stCondLst>
-                                        </p:cTn>
-                                        <p:tgtEl>
-                                          <p:spTgt spid="11"/>
-                                        </p:tgtEl>
-                                        <p:attrNameLst>
-                                          <p:attrName>style.visibility</p:attrName>
-                                        </p:attrNameLst>
-                                      </p:cBhvr>
-                                      <p:to>
-                                        <p:strVal val="visible"/>
-                                      </p:to>
-                                    </p:set>
-                                    <p:animEffect transition="in" filter="fade">
-                                      <p:cBhvr>
-                                        <p:cTn id="25" dur="500"/>
-                                        <p:tgtEl>
-                                          <p:spTgt spid="11"/>
-                                        </p:tgtEl>
-                                      </p:cBhvr>
-                                    </p:animEffect>
-                                  </p:childTnLst>
-                                </p:cTn>
-                              </p:par>
-                            </p:childTnLst>
-                          </p:cTn>
-                        </p:par>
-                      </p:childTnLst>
-                    </p:cTn>
-                  </p:par>
-                  <p:par>
-                    <p:cTn id="26" fill="hold">
-                      <p:stCondLst>
-                        <p:cond delay="indefinite"/>
-                      </p:stCondLst>
-                      <p:childTnLst>
-                        <p:par>
-                          <p:cTn id="27" fill="hold">
-                            <p:stCondLst>
-                              <p:cond delay="0"/>
-                            </p:stCondLst>
-                            <p:childTnLst>
-                              <p:par>
-                                <p:cTn id="28" presetID="10" presetClass="entr" presetSubtype="0" fill="hold" grpId="0" nodeType="clickEffect">
-                                  <p:stCondLst>
-                                    <p:cond delay="0"/>
-                                  </p:stCondLst>
-                                  <p:childTnLst>
-                                    <p:set>
-                                      <p:cBhvr>
-                                        <p:cTn id="29" dur="1" fill="hold">
-                                          <p:stCondLst>
-                                            <p:cond delay="0"/>
-                                          </p:stCondLst>
-                                        </p:cTn>
-                                        <p:tgtEl>
-                                          <p:spTgt spid="12"/>
-                                        </p:tgtEl>
-                                        <p:attrNameLst>
-                                          <p:attrName>style.visibility</p:attrName>
-                                        </p:attrNameLst>
-                                      </p:cBhvr>
-                                      <p:to>
-                                        <p:strVal val="visible"/>
-                                      </p:to>
-                                    </p:set>
-                                    <p:animEffect transition="in" filter="fade">
-                                      <p:cBhvr>
-                                        <p:cTn id="30" dur="500"/>
-                                        <p:tgtEl>
-                                          <p:spTgt spid="12"/>
-                                        </p:tgtEl>
-                                      </p:cBhvr>
-                                    </p:animEffect>
-                                  </p:childTnLst>
-                                </p:cTn>
-                              </p:par>
-                            </p:childTnLst>
-                          </p:cTn>
-                        </p:par>
-                        <p:par>
-                          <p:cTn id="31" fill="hold">
-                            <p:stCondLst>
-                              <p:cond delay="500"/>
-                            </p:stCondLst>
-                            <p:childTnLst>
-                              <p:par>
-                                <p:cTn id="32" presetID="10" presetClass="entr" presetSubtype="0" fill="hold" grpId="0" nodeType="afterEffect">
-                                  <p:stCondLst>
-                                    <p:cond delay="0"/>
-                                  </p:stCondLst>
-                                  <p:childTnLst>
-                                    <p:set>
-                                      <p:cBhvr>
-                                        <p:cTn id="33" dur="1" fill="hold">
-                                          <p:stCondLst>
-                                            <p:cond delay="0"/>
-                                          </p:stCondLst>
-                                        </p:cTn>
-                                        <p:tgtEl>
-                                          <p:spTgt spid="13"/>
-                                        </p:tgtEl>
-                                        <p:attrNameLst>
-                                          <p:attrName>style.visibility</p:attrName>
-                                        </p:attrNameLst>
-                                      </p:cBhvr>
-                                      <p:to>
-                                        <p:strVal val="visible"/>
-                                      </p:to>
-                                    </p:set>
-                                    <p:animEffect transition="in" filter="fade">
-                                      <p:cBhvr>
-                                        <p:cTn id="34" dur="500"/>
-                                        <p:tgtEl>
-                                          <p:spTgt spid="13"/>
-                                        </p:tgtEl>
-                                      </p:cBhvr>
-                                    </p:animEffect>
-                                  </p:childTnLst>
-                                </p:cTn>
-                              </p:par>
-                            </p:childTnLst>
-                          </p:cTn>
-                        </p:par>
-                      </p:childTnLst>
-                    </p:cTn>
-                  </p:par>
-                </p:childTnLst>
-              </p:cTn>
-              <p:prevCondLst>
-                <p:cond evt="onPrev" delay="0">
-                  <p:tgtEl>
-                    <p:sldTgt/>
-                  </p:tgtEl>
-                </p:cond>
-              </p:prevCondLst>
-              <p:nextCondLst>
-                <p:cond evt="onNext" delay="0">
-                  <p:tgtEl>
-                    <p:sldTgt/>
-                  </p:tgtEl>
-                </p:cond>
-              </p:nextCondLst>
-            </p:seq>
-          </p:childTnLst>
-        </p:cTn>
-      </p:par>
-    </p:tnLst>
-    <p:bldLst>
-      <p:bldP spid="9" grpId="0"/>
-      <p:bldP spid="2" grpId="0" animBg="1"/>
-      <p:bldP spid="10" grpId="0" animBg="1"/>
-      <p:bldP spid="4" grpId="0" animBg="1"/>
-      <p:bldP spid="11" grpId="0" animBg="1"/>
-      <p:bldP spid="12" grpId="0" animBg="1"/>
-      <p:bldP spid="13" grpId="0" animBg="1"/>
-    </p:bldLst>
-  </p:timing>
 </p:sld>
 </file>
 
-<file path=ppt/slides/slide20.xml><?xml version="1.0" encoding="utf-8"?>
+<file path=ppt/slides/slide22.xml><?xml version="1.0" encoding="utf-8"?>
 <p:sld xmlns:a="http://schemas.openxmlformats.org/drawingml/2006/main" xmlns:r="http://schemas.openxmlformats.org/officeDocument/2006/relationships" xmlns:p="http://schemas.openxmlformats.org/presentationml/2006/main">
   <p:cSld>
     <p:spTree>
@@ -14288,7 +15582,7 @@
 </p:sld>
 </file>
 
-<file path=ppt/slides/slide21.xml><?xml version="1.0" encoding="utf-8"?>
+<file path=ppt/slides/slide23.xml><?xml version="1.0" encoding="utf-8"?>
 <p:sld xmlns:a="http://schemas.openxmlformats.org/drawingml/2006/main" xmlns:r="http://schemas.openxmlformats.org/officeDocument/2006/relationships" xmlns:p="http://schemas.openxmlformats.org/presentationml/2006/main">
   <p:cSld>
     <p:spTree>
@@ -14335,7 +15629,7 @@
                 </a:solidFill>
                 <a:latin typeface="Novecento sans wide Book" pitchFamily="50" charset="-94"/>
               </a:rPr>
-              <a:t>Composition Root</a:t>
+              <a:t>DI Containers</a:t>
             </a:r>
           </a:p>
         </p:txBody>
@@ -14362,7 +15656,7 @@
         </p:blipFill>
         <p:spPr>
           <a:xfrm rot="5400000">
-            <a:off x="9100648" y="-2221597"/>
+            <a:off x="8872048" y="-2221597"/>
             <a:ext cx="1168254" cy="9003175"/>
           </a:xfrm>
           <a:prstGeom prst="rect">
@@ -14400,39 +15694,86 @@
           </a:prstGeom>
         </p:spPr>
       </p:pic>
-      <p:sp>
-        <p:nvSpPr>
-          <p:cNvPr id="3" name="Rectangle 2"/>
-          <p:cNvSpPr/>
+      <p:pic>
+        <p:nvPicPr>
+          <p:cNvPr id="1028" name="Picture 4" descr="Basic features"/>
+          <p:cNvPicPr>
+            <a:picLocks noChangeAspect="1" noChangeArrowheads="1"/>
+          </p:cNvPicPr>
           <p:nvPr/>
-        </p:nvSpPr>
-        <p:spPr>
+        </p:nvPicPr>
+        <p:blipFill>
+          <a:blip r:embed="rId5">
+            <a:extLst>
+              <a:ext uri="{28A0092B-C50C-407E-A947-70E740481C1C}">
+                <a14:useLocalDpi xmlns:a14="http://schemas.microsoft.com/office/drawing/2010/main" val="0"/>
+              </a:ext>
+            </a:extLst>
+          </a:blip>
+          <a:srcRect/>
+          <a:stretch>
+            <a:fillRect/>
+          </a:stretch>
+        </p:blipFill>
+        <p:spPr bwMode="auto">
           <a:xfrm>
-            <a:off x="1777724" y="3392487"/>
-            <a:ext cx="7255576" cy="584775"/>
+            <a:off x="2516187" y="1792287"/>
+            <a:ext cx="10820401" cy="8115301"/>
           </a:xfrm>
           <a:prstGeom prst="rect">
             <a:avLst/>
           </a:prstGeom>
+          <a:noFill/>
+          <a:extLst>
+            <a:ext uri="{909E8E84-426E-40DD-AFC4-6F175D3DCCD1}">
+              <a14:hiddenFill xmlns:a14="http://schemas.microsoft.com/office/drawing/2010/main">
+                <a:solidFill>
+                  <a:srgbClr val="FFFFFF"/>
+                </a:solidFill>
+              </a14:hiddenFill>
+            </a:ext>
+          </a:extLst>
+        </p:spPr>
+      </p:pic>
+      <p:sp>
+        <p:nvSpPr>
+          <p:cNvPr id="10" name="TextBox 9"/>
+          <p:cNvSpPr txBox="1"/>
+          <p:nvPr/>
+        </p:nvSpPr>
+        <p:spPr>
+          <a:xfrm>
+            <a:off x="2592387" y="1970166"/>
+            <a:ext cx="3666709" cy="646331"/>
+          </a:xfrm>
+          <a:prstGeom prst="rect">
+            <a:avLst/>
+          </a:prstGeom>
+          <a:noFill/>
         </p:spPr>
         <p:txBody>
-          <a:bodyPr wrap="none">
+          <a:bodyPr wrap="none" rtlCol="0">
             <a:spAutoFit/>
           </a:bodyPr>
           <a:lstStyle/>
           <a:p>
             <a:r>
-              <a:rPr lang="en-US" dirty="0"/>
-              <a:t>Where should we compose object graphs?</a:t>
-            </a:r>
-            <a:endParaRPr lang="sr-Latn-RS" dirty="0"/>
+              <a:rPr lang="sr-Latn-RS" sz="3600" dirty="0">
+                <a:solidFill>
+                  <a:schemeClr val="accent1">
+                    <a:lumMod val="50000"/>
+                  </a:schemeClr>
+                </a:solidFill>
+              </a:rPr>
+              <a:t>Which one to use?</a:t>
+            </a:r>
           </a:p>
         </p:txBody>
       </p:sp>
     </p:spTree>
     <p:extLst>
       <p:ext uri="{BB962C8B-B14F-4D97-AF65-F5344CB8AC3E}">
-        <p14:creationId xmlns:p14="http://schemas.microsoft.com/office/powerpoint/2010/main" val="707020203"/>
+        <p14:creationId xmlns:p14="http://schemas.microsoft.com/office/powerpoint/2010/main" val="1878286554"/>
       </p:ext>
     </p:extLst>
   </p:cSld>
@@ -14454,7 +15795,171 @@
 </p:sld>
 </file>
 
-<file path=ppt/slides/slide22.xml><?xml version="1.0" encoding="utf-8"?>
+<file path=ppt/slides/slide24.xml><?xml version="1.0" encoding="utf-8"?>
+<p:sld xmlns:a="http://schemas.openxmlformats.org/drawingml/2006/main" xmlns:r="http://schemas.openxmlformats.org/officeDocument/2006/relationships" xmlns:p="http://schemas.openxmlformats.org/presentationml/2006/main">
+  <p:cSld>
+    <p:spTree>
+      <p:nvGrpSpPr>
+        <p:cNvPr id="1" name=""/>
+        <p:cNvGrpSpPr/>
+        <p:nvPr/>
+      </p:nvGrpSpPr>
+      <p:grpSpPr>
+        <a:xfrm>
+          <a:off x="0" y="0"/>
+          <a:ext cx="0" cy="0"/>
+          <a:chOff x="0" y="0"/>
+          <a:chExt cx="0" cy="0"/>
+        </a:xfrm>
+      </p:grpSpPr>
+      <p:sp>
+        <p:nvSpPr>
+          <p:cNvPr id="16" name="TextBox 15"/>
+          <p:cNvSpPr txBox="1"/>
+          <p:nvPr/>
+        </p:nvSpPr>
+        <p:spPr>
+          <a:xfrm>
+            <a:off x="3209363" y="3925887"/>
+            <a:ext cx="11658600" cy="3139321"/>
+          </a:xfrm>
+          <a:prstGeom prst="rect">
+            <a:avLst/>
+          </a:prstGeom>
+          <a:noFill/>
+        </p:spPr>
+        <p:txBody>
+          <a:bodyPr wrap="square" rtlCol="0">
+            <a:spAutoFit/>
+          </a:bodyPr>
+          <a:lstStyle/>
+          <a:p>
+            <a:pPr algn="ctr"/>
+            <a:r>
+              <a:rPr lang="it-IT" sz="6600" dirty="0">
+                <a:solidFill>
+                  <a:srgbClr val="545250"/>
+                </a:solidFill>
+                <a:latin typeface="Novecento sans wide Book" pitchFamily="50" charset="-94"/>
+              </a:rPr>
+              <a:t>Lab </a:t>
+            </a:r>
+            <a:r>
+              <a:rPr lang="sr-Latn-RS" sz="6600" dirty="0">
+                <a:solidFill>
+                  <a:srgbClr val="545250"/>
+                </a:solidFill>
+                <a:latin typeface="Novecento sans wide Book" pitchFamily="50" charset="-94"/>
+              </a:rPr>
+              <a:t>excercise</a:t>
+            </a:r>
+            <a:r>
+              <a:rPr lang="it-IT" sz="6600" dirty="0">
+                <a:solidFill>
+                  <a:srgbClr val="545250"/>
+                </a:solidFill>
+                <a:latin typeface="Novecento sans wide Book" pitchFamily="50" charset="-94"/>
+              </a:rPr>
+              <a:t>: </a:t>
+            </a:r>
+            <a:r>
+              <a:rPr lang="sr-Latn-RS" sz="6600" dirty="0">
+                <a:solidFill>
+                  <a:srgbClr val="545250"/>
+                </a:solidFill>
+                <a:latin typeface="Novecento sans wide Book" pitchFamily="50" charset="-94"/>
+              </a:rPr>
+              <a:t>Add DI Container which reads configuration from file </a:t>
+            </a:r>
+          </a:p>
+        </p:txBody>
+      </p:sp>
+      <p:pic>
+        <p:nvPicPr>
+          <p:cNvPr id="8" name="Picture 7"/>
+          <p:cNvPicPr>
+            <a:picLocks noChangeAspect="1"/>
+          </p:cNvPicPr>
+          <p:nvPr/>
+        </p:nvPicPr>
+        <p:blipFill>
+          <a:blip r:embed="rId3">
+            <a:extLst>
+              <a:ext uri="{28A0092B-C50C-407E-A947-70E740481C1C}">
+                <a14:useLocalDpi xmlns:a14="http://schemas.microsoft.com/office/drawing/2010/main" val="0"/>
+              </a:ext>
+            </a:extLst>
+          </a:blip>
+          <a:stretch>
+            <a:fillRect/>
+          </a:stretch>
+        </p:blipFill>
+        <p:spPr>
+          <a:xfrm rot="5400000">
+            <a:off x="8454536" y="-2460908"/>
+            <a:ext cx="1168254" cy="9003175"/>
+          </a:xfrm>
+          <a:prstGeom prst="rect">
+            <a:avLst/>
+          </a:prstGeom>
+        </p:spPr>
+      </p:pic>
+      <p:pic>
+        <p:nvPicPr>
+          <p:cNvPr id="7" name="Picture 6"/>
+          <p:cNvPicPr>
+            <a:picLocks noChangeAspect="1"/>
+          </p:cNvPicPr>
+          <p:nvPr/>
+        </p:nvPicPr>
+        <p:blipFill>
+          <a:blip r:embed="rId4" cstate="print">
+            <a:extLst>
+              <a:ext uri="{28A0092B-C50C-407E-A947-70E740481C1C}">
+                <a14:useLocalDpi xmlns:a14="http://schemas.microsoft.com/office/drawing/2010/main" val="0"/>
+              </a:ext>
+            </a:extLst>
+          </a:blip>
+          <a:stretch>
+            <a:fillRect/>
+          </a:stretch>
+        </p:blipFill>
+        <p:spPr>
+          <a:xfrm>
+            <a:off x="13488987" y="9412287"/>
+            <a:ext cx="4572000" cy="646390"/>
+          </a:xfrm>
+          <a:prstGeom prst="rect">
+            <a:avLst/>
+          </a:prstGeom>
+        </p:spPr>
+      </p:pic>
+    </p:spTree>
+    <p:extLst>
+      <p:ext uri="{BB962C8B-B14F-4D97-AF65-F5344CB8AC3E}">
+        <p14:creationId xmlns:p14="http://schemas.microsoft.com/office/powerpoint/2010/main" val="2769170956"/>
+      </p:ext>
+    </p:extLst>
+  </p:cSld>
+  <p:clrMapOvr>
+    <a:masterClrMapping/>
+  </p:clrMapOvr>
+  <mc:AlternateContent xmlns:mc="http://schemas.openxmlformats.org/markup-compatibility/2006" xmlns:p14="http://schemas.microsoft.com/office/powerpoint/2010/main">
+    <mc:Choice Requires="p14">
+      <p:transition spd="med" p14:dur="700">
+        <p:fade/>
+      </p:transition>
+    </mc:Choice>
+    <mc:Fallback xmlns="">
+      <p:transition spd="med">
+        <p:fade/>
+      </p:transition>
+    </mc:Fallback>
+  </mc:AlternateContent>
+</p:sld>
+</file>
+
+<file path=ppt/slides/slide25.xml><?xml version="1.0" encoding="utf-8"?>
 <p:sld xmlns:a="http://schemas.openxmlformats.org/drawingml/2006/main" xmlns:r="http://schemas.openxmlformats.org/officeDocument/2006/relationships" xmlns:p="http://schemas.openxmlformats.org/presentationml/2006/main">
   <p:cSld>
     <p:spTree>
@@ -14597,7 +16102,7 @@
 </p:sld>
 </file>
 
-<file path=ppt/slides/slide23.xml><?xml version="1.0" encoding="utf-8"?>
+<file path=ppt/slides/slide26.xml><?xml version="1.0" encoding="utf-8"?>
 <p:sld xmlns:a="http://schemas.openxmlformats.org/drawingml/2006/main" xmlns:r="http://schemas.openxmlformats.org/officeDocument/2006/relationships" xmlns:p="http://schemas.openxmlformats.org/presentationml/2006/main">
   <p:cSld>
     <p:spTree>
@@ -16660,13 +18165,13 @@
   <p:clrMapOvr>
     <a:masterClrMapping/>
   </p:clrMapOvr>
-  <mc:AlternateContent xmlns:mc="http://schemas.openxmlformats.org/markup-compatibility/2006">
-    <mc:Choice xmlns:p14="http://schemas.microsoft.com/office/powerpoint/2010/main" Requires="p14">
+  <mc:AlternateContent xmlns:mc="http://schemas.openxmlformats.org/markup-compatibility/2006" xmlns:p14="http://schemas.microsoft.com/office/powerpoint/2010/main">
+    <mc:Choice Requires="p14">
       <p:transition spd="med" p14:dur="700">
         <p:fade/>
       </p:transition>
     </mc:Choice>
-    <mc:Fallback>
+    <mc:Fallback xmlns="">
       <p:transition spd="med">
         <p:fade/>
       </p:transition>

</xml_diff>

<commit_message>
DI slides and notes changed
</commit_message>
<xml_diff>
--- a/DI Course.pptx
+++ b/DI Course.pptx
@@ -5,10 +5,10 @@
     <p:sldMasterId id="2147483650" r:id="rId1"/>
   </p:sldMasterIdLst>
   <p:notesMasterIdLst>
-    <p:notesMasterId r:id="rId28"/>
+    <p:notesMasterId r:id="rId29"/>
   </p:notesMasterIdLst>
   <p:handoutMasterIdLst>
-    <p:handoutMasterId r:id="rId29"/>
+    <p:handoutMasterId r:id="rId30"/>
   </p:handoutMasterIdLst>
   <p:sldIdLst>
     <p:sldId id="256" r:id="rId2"/>
@@ -34,9 +34,10 @@
     <p:sldId id="347" r:id="rId22"/>
     <p:sldId id="348" r:id="rId23"/>
     <p:sldId id="358" r:id="rId24"/>
-    <p:sldId id="359" r:id="rId25"/>
-    <p:sldId id="327" r:id="rId26"/>
-    <p:sldId id="295" r:id="rId27"/>
+    <p:sldId id="360" r:id="rId25"/>
+    <p:sldId id="359" r:id="rId26"/>
+    <p:sldId id="327" r:id="rId27"/>
+    <p:sldId id="295" r:id="rId28"/>
   </p:sldIdLst>
   <p:sldSz cx="18291175" cy="10290175"/>
   <p:notesSz cx="6858000" cy="9144000"/>
@@ -2134,7 +2135,7 @@
     </p:spTree>
     <p:extLst>
       <p:ext uri="{BB962C8B-B14F-4D97-AF65-F5344CB8AC3E}">
-        <p14:creationId xmlns:p14="http://schemas.microsoft.com/office/powerpoint/2010/main" val="3476181309"/>
+        <p14:creationId xmlns:p14="http://schemas.microsoft.com/office/powerpoint/2010/main" val="4055114066"/>
       </p:ext>
     </p:extLst>
   </p:cSld>
@@ -2219,7 +2220,7 @@
     </p:spTree>
     <p:extLst>
       <p:ext uri="{BB962C8B-B14F-4D97-AF65-F5344CB8AC3E}">
-        <p14:creationId xmlns:p14="http://schemas.microsoft.com/office/powerpoint/2010/main" val="2338377447"/>
+        <p14:creationId xmlns:p14="http://schemas.microsoft.com/office/powerpoint/2010/main" val="3476181309"/>
       </p:ext>
     </p:extLst>
   </p:cSld>
@@ -2296,6 +2297,91 @@
               <a:rPr lang="tr-TR" smtClean="0"/>
               <a:pPr/>
               <a:t>26</a:t>
+            </a:fld>
+            <a:endParaRPr lang="tr-TR"/>
+          </a:p>
+        </p:txBody>
+      </p:sp>
+    </p:spTree>
+    <p:extLst>
+      <p:ext uri="{BB962C8B-B14F-4D97-AF65-F5344CB8AC3E}">
+        <p14:creationId xmlns:p14="http://schemas.microsoft.com/office/powerpoint/2010/main" val="2338377447"/>
+      </p:ext>
+    </p:extLst>
+  </p:cSld>
+  <p:clrMapOvr>
+    <a:masterClrMapping/>
+  </p:clrMapOvr>
+</p:notes>
+</file>
+
+<file path=ppt/notesSlides/notesSlide27.xml><?xml version="1.0" encoding="utf-8"?>
+<p:notes xmlns:a="http://schemas.openxmlformats.org/drawingml/2006/main" xmlns:r="http://schemas.openxmlformats.org/officeDocument/2006/relationships" xmlns:p="http://schemas.openxmlformats.org/presentationml/2006/main">
+  <p:cSld>
+    <p:spTree>
+      <p:nvGrpSpPr>
+        <p:cNvPr id="1" name=""/>
+        <p:cNvGrpSpPr/>
+        <p:nvPr/>
+      </p:nvGrpSpPr>
+      <p:grpSpPr>
+        <a:xfrm>
+          <a:off x="0" y="0"/>
+          <a:ext cx="0" cy="0"/>
+          <a:chOff x="0" y="0"/>
+          <a:chExt cx="0" cy="0"/>
+        </a:xfrm>
+      </p:grpSpPr>
+      <p:sp>
+        <p:nvSpPr>
+          <p:cNvPr id="2" name="Slide Image Placeholder 1"/>
+          <p:cNvSpPr>
+            <a:spLocks noGrp="1" noRot="1" noChangeAspect="1"/>
+          </p:cNvSpPr>
+          <p:nvPr>
+            <p:ph type="sldImg"/>
+          </p:nvPr>
+        </p:nvSpPr>
+        <p:spPr/>
+      </p:sp>
+      <p:sp>
+        <p:nvSpPr>
+          <p:cNvPr id="3" name="Notes Placeholder 2"/>
+          <p:cNvSpPr>
+            <a:spLocks noGrp="1"/>
+          </p:cNvSpPr>
+          <p:nvPr>
+            <p:ph type="body" idx="1"/>
+          </p:nvPr>
+        </p:nvSpPr>
+        <p:spPr/>
+        <p:txBody>
+          <a:bodyPr/>
+          <a:lstStyle/>
+          <a:p>
+            <a:endParaRPr lang="tr-TR" dirty="0"/>
+          </a:p>
+        </p:txBody>
+      </p:sp>
+      <p:sp>
+        <p:nvSpPr>
+          <p:cNvPr id="4" name="Slide Number Placeholder 3"/>
+          <p:cNvSpPr>
+            <a:spLocks noGrp="1"/>
+          </p:cNvSpPr>
+          <p:nvPr>
+            <p:ph type="sldNum" sz="quarter" idx="10"/>
+          </p:nvPr>
+        </p:nvSpPr>
+        <p:spPr/>
+        <p:txBody>
+          <a:bodyPr/>
+          <a:lstStyle/>
+          <a:p>
+            <a:fld id="{802DA432-7CF7-4A2F-BE93-45834DC6981A}" type="slidenum">
+              <a:rPr lang="tr-TR" smtClean="0"/>
+              <a:pPr/>
+              <a:t>27</a:t>
             </a:fld>
             <a:endParaRPr lang="tr-TR"/>
           </a:p>
@@ -15770,6 +15856,37 @@
           </a:p>
         </p:txBody>
       </p:sp>
+      <p:sp>
+        <p:nvSpPr>
+          <p:cNvPr id="5" name="Rectangle 4"/>
+          <p:cNvSpPr/>
+          <p:nvPr/>
+        </p:nvSpPr>
+        <p:spPr>
+          <a:xfrm>
+            <a:off x="13641387" y="1831667"/>
+            <a:ext cx="4267200" cy="830997"/>
+          </a:xfrm>
+          <a:prstGeom prst="rect">
+            <a:avLst/>
+          </a:prstGeom>
+        </p:spPr>
+        <p:txBody>
+          <a:bodyPr wrap="square">
+            <a:spAutoFit/>
+          </a:bodyPr>
+          <a:lstStyle/>
+          <a:p>
+            <a:r>
+              <a:rPr lang="sr-Latn-RS" sz="2400" dirty="0">
+                <a:hlinkClick r:id="rId6"/>
+              </a:rPr>
+              <a:t>https://github.com/danielpalme/IocPerformance</a:t>
+            </a:r>
+            <a:endParaRPr lang="sr-Latn-RS" sz="2400" dirty="0"/>
+          </a:p>
+        </p:txBody>
+      </p:sp>
     </p:spTree>
     <p:extLst>
       <p:ext uri="{BB962C8B-B14F-4D97-AF65-F5344CB8AC3E}">
@@ -15796,6 +15913,433 @@
 </file>
 
 <file path=ppt/slides/slide24.xml><?xml version="1.0" encoding="utf-8"?>
+<p:sld xmlns:a="http://schemas.openxmlformats.org/drawingml/2006/main" xmlns:r="http://schemas.openxmlformats.org/officeDocument/2006/relationships" xmlns:p="http://schemas.openxmlformats.org/presentationml/2006/main">
+  <p:cSld>
+    <p:spTree>
+      <p:nvGrpSpPr>
+        <p:cNvPr id="1" name=""/>
+        <p:cNvGrpSpPr/>
+        <p:nvPr/>
+      </p:nvGrpSpPr>
+      <p:grpSpPr>
+        <a:xfrm>
+          <a:off x="0" y="0"/>
+          <a:ext cx="0" cy="0"/>
+          <a:chOff x="0" y="0"/>
+          <a:chExt cx="0" cy="0"/>
+        </a:xfrm>
+      </p:grpSpPr>
+      <p:sp>
+        <p:nvSpPr>
+          <p:cNvPr id="16" name="TextBox 15"/>
+          <p:cNvSpPr txBox="1"/>
+          <p:nvPr/>
+        </p:nvSpPr>
+        <p:spPr>
+          <a:xfrm>
+            <a:off x="4969123" y="854313"/>
+            <a:ext cx="8136904" cy="830997"/>
+          </a:xfrm>
+          <a:prstGeom prst="rect">
+            <a:avLst/>
+          </a:prstGeom>
+          <a:noFill/>
+        </p:spPr>
+        <p:txBody>
+          <a:bodyPr wrap="square" rtlCol="0">
+            <a:spAutoFit/>
+          </a:bodyPr>
+          <a:lstStyle/>
+          <a:p>
+            <a:pPr algn="ctr"/>
+            <a:r>
+              <a:rPr lang="sr-Latn-RS" sz="4800" dirty="0">
+                <a:solidFill>
+                  <a:srgbClr val="545250"/>
+                </a:solidFill>
+                <a:latin typeface="Novecento sans wide Book" pitchFamily="50" charset="-94"/>
+              </a:rPr>
+              <a:t>DI Containers</a:t>
+            </a:r>
+            <a:endParaRPr lang="en-US" sz="4800" dirty="0">
+              <a:solidFill>
+                <a:srgbClr val="545250"/>
+              </a:solidFill>
+              <a:latin typeface="Novecento sans wide Book" pitchFamily="50" charset="-94"/>
+            </a:endParaRPr>
+          </a:p>
+        </p:txBody>
+      </p:sp>
+      <p:pic>
+        <p:nvPicPr>
+          <p:cNvPr id="8" name="Picture 7"/>
+          <p:cNvPicPr>
+            <a:picLocks noChangeAspect="1"/>
+          </p:cNvPicPr>
+          <p:nvPr/>
+        </p:nvPicPr>
+        <p:blipFill>
+          <a:blip r:embed="rId3">
+            <a:extLst>
+              <a:ext uri="{28A0092B-C50C-407E-A947-70E740481C1C}">
+                <a14:useLocalDpi xmlns:a14="http://schemas.microsoft.com/office/drawing/2010/main" val="0"/>
+              </a:ext>
+            </a:extLst>
+          </a:blip>
+          <a:stretch>
+            <a:fillRect/>
+          </a:stretch>
+        </p:blipFill>
+        <p:spPr>
+          <a:xfrm rot="5400000">
+            <a:off x="9100648" y="-2221597"/>
+            <a:ext cx="1168254" cy="9003175"/>
+          </a:xfrm>
+          <a:prstGeom prst="rect">
+            <a:avLst/>
+          </a:prstGeom>
+        </p:spPr>
+      </p:pic>
+      <p:pic>
+        <p:nvPicPr>
+          <p:cNvPr id="7" name="Picture 6"/>
+          <p:cNvPicPr>
+            <a:picLocks noChangeAspect="1"/>
+          </p:cNvPicPr>
+          <p:nvPr/>
+        </p:nvPicPr>
+        <p:blipFill>
+          <a:blip r:embed="rId4" cstate="print">
+            <a:extLst>
+              <a:ext uri="{28A0092B-C50C-407E-A947-70E740481C1C}">
+                <a14:useLocalDpi xmlns:a14="http://schemas.microsoft.com/office/drawing/2010/main" val="0"/>
+              </a:ext>
+            </a:extLst>
+          </a:blip>
+          <a:stretch>
+            <a:fillRect/>
+          </a:stretch>
+        </p:blipFill>
+        <p:spPr>
+          <a:xfrm>
+            <a:off x="13488987" y="9412287"/>
+            <a:ext cx="4572000" cy="646390"/>
+          </a:xfrm>
+          <a:prstGeom prst="rect">
+            <a:avLst/>
+          </a:prstGeom>
+        </p:spPr>
+      </p:pic>
+      <p:sp>
+        <p:nvSpPr>
+          <p:cNvPr id="3" name="Rectangle 2"/>
+          <p:cNvSpPr/>
+          <p:nvPr/>
+        </p:nvSpPr>
+        <p:spPr>
+          <a:xfrm>
+            <a:off x="1676026" y="2844332"/>
+            <a:ext cx="11430001" cy="1631216"/>
+          </a:xfrm>
+          <a:prstGeom prst="rect">
+            <a:avLst/>
+          </a:prstGeom>
+        </p:spPr>
+        <p:txBody>
+          <a:bodyPr wrap="square">
+            <a:spAutoFit/>
+          </a:bodyPr>
+          <a:lstStyle/>
+          <a:p>
+            <a:pPr marL="457200" indent="-457200">
+              <a:buFont typeface="Arial" panose="020B0604020202020204" pitchFamily="34" charset="0"/>
+              <a:buChar char="•"/>
+            </a:pPr>
+            <a:r>
+              <a:rPr lang="sr-Latn-RS" dirty="0"/>
+              <a:t>Code as configuration</a:t>
+            </a:r>
+            <a:endParaRPr lang="en-US" dirty="0"/>
+          </a:p>
+          <a:p>
+            <a:pPr marL="457200" indent="-457200">
+              <a:buFont typeface="Arial" panose="020B0604020202020204" pitchFamily="34" charset="0"/>
+              <a:buChar char="•"/>
+            </a:pPr>
+            <a:r>
+              <a:rPr lang="en-US" dirty="0"/>
+              <a:t>File</a:t>
+            </a:r>
+            <a:r>
+              <a:rPr lang="sr-Latn-RS" dirty="0"/>
+              <a:t> configuration</a:t>
+            </a:r>
+            <a:r>
+              <a:rPr lang="en-US" dirty="0"/>
+              <a:t> (XML/JSON)</a:t>
+            </a:r>
+            <a:endParaRPr lang="sr-Latn-RS" dirty="0"/>
+          </a:p>
+          <a:p>
+            <a:pPr marL="457200" indent="-457200">
+              <a:buFont typeface="Arial" panose="020B0604020202020204" pitchFamily="34" charset="0"/>
+              <a:buChar char="•"/>
+            </a:pPr>
+            <a:r>
+              <a:rPr lang="sr-Latn-RS" sz="3600" dirty="0"/>
+              <a:t>AUTO-REGISTRATION</a:t>
+            </a:r>
+            <a:r>
+              <a:rPr lang="sr-Latn-RS" dirty="0"/>
+              <a:t> </a:t>
+            </a:r>
+          </a:p>
+        </p:txBody>
+      </p:sp>
+      <p:sp>
+        <p:nvSpPr>
+          <p:cNvPr id="5" name="Rectangle 4"/>
+          <p:cNvSpPr/>
+          <p:nvPr/>
+        </p:nvSpPr>
+        <p:spPr>
+          <a:xfrm>
+            <a:off x="1668319" y="5221287"/>
+            <a:ext cx="10677667" cy="2554545"/>
+          </a:xfrm>
+          <a:prstGeom prst="rect">
+            <a:avLst/>
+          </a:prstGeom>
+        </p:spPr>
+        <p:txBody>
+          <a:bodyPr wrap="square">
+            <a:spAutoFit/>
+          </a:bodyPr>
+          <a:lstStyle/>
+          <a:p>
+            <a:r>
+              <a:rPr lang="en-US" dirty="0" err="1">
+                <a:solidFill>
+                  <a:srgbClr val="0000FF"/>
+                </a:solidFill>
+                <a:latin typeface="Consolas" panose="020B0609020204030204" pitchFamily="49" charset="0"/>
+              </a:rPr>
+              <a:t>var</a:t>
+            </a:r>
+            <a:r>
+              <a:rPr lang="sr-Latn-RS" dirty="0"/>
+              <a:t> dataAccess =</a:t>
+            </a:r>
+            <a:r>
+              <a:rPr lang="en-US" dirty="0"/>
+              <a:t> </a:t>
+            </a:r>
+            <a:r>
+              <a:rPr lang="en-US" dirty="0" err="1">
+                <a:solidFill>
+                  <a:srgbClr val="2B91AF"/>
+                </a:solidFill>
+                <a:latin typeface="Consolas" panose="020B0609020204030204" pitchFamily="49" charset="0"/>
+              </a:rPr>
+              <a:t>Assemlby</a:t>
+            </a:r>
+            <a:r>
+              <a:rPr lang="sr-Latn-RS" dirty="0"/>
+              <a:t>.GetExecutingAssembly();</a:t>
+            </a:r>
+          </a:p>
+          <a:p>
+            <a:endParaRPr lang="sr-Latn-RS" dirty="0"/>
+          </a:p>
+          <a:p>
+            <a:r>
+              <a:rPr lang="sr-Latn-RS" dirty="0"/>
+              <a:t>builder.RegisterAssemblyTypes(dataAccess)</a:t>
+            </a:r>
+          </a:p>
+          <a:p>
+            <a:r>
+              <a:rPr lang="sr-Latn-RS" dirty="0"/>
+              <a:t>       .Where(t =&gt; t.Name.</a:t>
+            </a:r>
+            <a:r>
+              <a:rPr lang="sr-Latn-RS"/>
+              <a:t>EndsWith("Repository</a:t>
+            </a:r>
+            <a:r>
+              <a:rPr lang="sr-Latn-RS" dirty="0"/>
+              <a:t>"))</a:t>
+            </a:r>
+          </a:p>
+          <a:p>
+            <a:r>
+              <a:rPr lang="sr-Latn-RS" dirty="0"/>
+              <a:t>       .AsImplementedInterfaces();</a:t>
+            </a:r>
+          </a:p>
+        </p:txBody>
+      </p:sp>
+    </p:spTree>
+    <p:extLst>
+      <p:ext uri="{BB962C8B-B14F-4D97-AF65-F5344CB8AC3E}">
+        <p14:creationId xmlns:p14="http://schemas.microsoft.com/office/powerpoint/2010/main" val="223362689"/>
+      </p:ext>
+    </p:extLst>
+  </p:cSld>
+  <p:clrMapOvr>
+    <a:masterClrMapping/>
+  </p:clrMapOvr>
+  <mc:AlternateContent xmlns:mc="http://schemas.openxmlformats.org/markup-compatibility/2006" xmlns:p14="http://schemas.microsoft.com/office/powerpoint/2010/main">
+    <mc:Choice Requires="p14">
+      <p:transition spd="med" p14:dur="700">
+        <p:fade/>
+      </p:transition>
+    </mc:Choice>
+    <mc:Fallback xmlns="">
+      <p:transition spd="med">
+        <p:fade/>
+      </p:transition>
+    </mc:Fallback>
+  </mc:AlternateContent>
+  <p:timing>
+    <p:tnLst>
+      <p:par>
+        <p:cTn id="1" dur="indefinite" restart="never" nodeType="tmRoot">
+          <p:childTnLst>
+            <p:seq concurrent="1" nextAc="seek">
+              <p:cTn id="2" dur="indefinite" nodeType="mainSeq">
+                <p:childTnLst>
+                  <p:par>
+                    <p:cTn id="3" fill="hold">
+                      <p:stCondLst>
+                        <p:cond delay="indefinite"/>
+                        <p:cond evt="onBegin" delay="0">
+                          <p:tn val="2"/>
+                        </p:cond>
+                      </p:stCondLst>
+                      <p:childTnLst>
+                        <p:par>
+                          <p:cTn id="4" fill="hold">
+                            <p:stCondLst>
+                              <p:cond delay="0"/>
+                            </p:stCondLst>
+                            <p:childTnLst>
+                              <p:par>
+                                <p:cTn id="5" presetID="1" presetClass="entr" presetSubtype="0" fill="hold" grpId="0" nodeType="afterEffect">
+                                  <p:stCondLst>
+                                    <p:cond delay="0"/>
+                                  </p:stCondLst>
+                                  <p:childTnLst>
+                                    <p:set>
+                                      <p:cBhvr>
+                                        <p:cTn id="6" dur="1" fill="hold">
+                                          <p:stCondLst>
+                                            <p:cond delay="0"/>
+                                          </p:stCondLst>
+                                        </p:cTn>
+                                        <p:tgtEl>
+                                          <p:spTgt spid="3"/>
+                                        </p:tgtEl>
+                                        <p:attrNameLst>
+                                          <p:attrName>style.visibility</p:attrName>
+                                        </p:attrNameLst>
+                                      </p:cBhvr>
+                                      <p:to>
+                                        <p:strVal val="visible"/>
+                                      </p:to>
+                                    </p:set>
+                                  </p:childTnLst>
+                                </p:cTn>
+                              </p:par>
+                            </p:childTnLst>
+                          </p:cTn>
+                        </p:par>
+                      </p:childTnLst>
+                    </p:cTn>
+                  </p:par>
+                  <p:par>
+                    <p:cTn id="7" fill="hold">
+                      <p:stCondLst>
+                        <p:cond delay="indefinite"/>
+                      </p:stCondLst>
+                      <p:childTnLst>
+                        <p:par>
+                          <p:cTn id="8" fill="hold">
+                            <p:stCondLst>
+                              <p:cond delay="0"/>
+                            </p:stCondLst>
+                            <p:childTnLst>
+                              <p:par>
+                                <p:cTn id="9" presetID="10" presetClass="entr" presetSubtype="0" fill="hold" grpId="0" nodeType="clickEffect">
+                                  <p:stCondLst>
+                                    <p:cond delay="0"/>
+                                  </p:stCondLst>
+                                  <p:childTnLst>
+                                    <p:set>
+                                      <p:cBhvr>
+                                        <p:cTn id="10" dur="1" fill="hold">
+                                          <p:stCondLst>
+                                            <p:cond delay="0"/>
+                                          </p:stCondLst>
+                                        </p:cTn>
+                                        <p:tgtEl>
+                                          <p:spTgt spid="5"/>
+                                        </p:tgtEl>
+                                        <p:attrNameLst>
+                                          <p:attrName>style.visibility</p:attrName>
+                                        </p:attrNameLst>
+                                      </p:cBhvr>
+                                      <p:to>
+                                        <p:strVal val="visible"/>
+                                      </p:to>
+                                    </p:set>
+                                    <p:animEffect transition="in" filter="fade">
+                                      <p:cBhvr>
+                                        <p:cTn id="11" dur="500"/>
+                                        <p:tgtEl>
+                                          <p:spTgt spid="5"/>
+                                        </p:tgtEl>
+                                      </p:cBhvr>
+                                    </p:animEffect>
+                                  </p:childTnLst>
+                                </p:cTn>
+                              </p:par>
+                            </p:childTnLst>
+                          </p:cTn>
+                        </p:par>
+                      </p:childTnLst>
+                    </p:cTn>
+                  </p:par>
+                </p:childTnLst>
+              </p:cTn>
+              <p:prevCondLst>
+                <p:cond evt="onPrev" delay="0">
+                  <p:tgtEl>
+                    <p:sldTgt/>
+                  </p:tgtEl>
+                </p:cond>
+              </p:prevCondLst>
+              <p:nextCondLst>
+                <p:cond evt="onNext" delay="0">
+                  <p:tgtEl>
+                    <p:sldTgt/>
+                  </p:tgtEl>
+                </p:cond>
+              </p:nextCondLst>
+            </p:seq>
+          </p:childTnLst>
+        </p:cTn>
+      </p:par>
+    </p:tnLst>
+    <p:bldLst>
+      <p:bldP spid="3" grpId="0"/>
+      <p:bldP spid="5" grpId="0"/>
+    </p:bldLst>
+  </p:timing>
+</p:sld>
+</file>
+
+<file path=ppt/slides/slide25.xml><?xml version="1.0" encoding="utf-8"?>
 <p:sld xmlns:a="http://schemas.openxmlformats.org/drawingml/2006/main" xmlns:r="http://schemas.openxmlformats.org/officeDocument/2006/relationships" xmlns:p="http://schemas.openxmlformats.org/presentationml/2006/main">
   <p:cSld>
     <p:spTree>
@@ -15959,7 +16503,7 @@
 </p:sld>
 </file>
 
-<file path=ppt/slides/slide25.xml><?xml version="1.0" encoding="utf-8"?>
+<file path=ppt/slides/slide26.xml><?xml version="1.0" encoding="utf-8"?>
 <p:sld xmlns:a="http://schemas.openxmlformats.org/drawingml/2006/main" xmlns:r="http://schemas.openxmlformats.org/officeDocument/2006/relationships" xmlns:p="http://schemas.openxmlformats.org/presentationml/2006/main">
   <p:cSld>
     <p:spTree>
@@ -16102,7 +16646,7 @@
 </p:sld>
 </file>
 
-<file path=ppt/slides/slide26.xml><?xml version="1.0" encoding="utf-8"?>
+<file path=ppt/slides/slide27.xml><?xml version="1.0" encoding="utf-8"?>
 <p:sld xmlns:a="http://schemas.openxmlformats.org/drawingml/2006/main" xmlns:r="http://schemas.openxmlformats.org/officeDocument/2006/relationships" xmlns:p="http://schemas.openxmlformats.org/presentationml/2006/main">
   <p:cSld>
     <p:spTree>

</xml_diff>

<commit_message>
added autofac file config example
</commit_message>
<xml_diff>
--- a/DI Course.pptx
+++ b/DI Course.pptx
@@ -5,10 +5,10 @@
     <p:sldMasterId id="2147483650" r:id="rId1"/>
   </p:sldMasterIdLst>
   <p:notesMasterIdLst>
-    <p:notesMasterId r:id="rId28"/>
+    <p:notesMasterId r:id="rId30"/>
   </p:notesMasterIdLst>
   <p:handoutMasterIdLst>
-    <p:handoutMasterId r:id="rId29"/>
+    <p:handoutMasterId r:id="rId31"/>
   </p:handoutMasterIdLst>
   <p:sldIdLst>
     <p:sldId id="256" r:id="rId2"/>
@@ -36,7 +36,9 @@
     <p:sldId id="358" r:id="rId24"/>
     <p:sldId id="360" r:id="rId25"/>
     <p:sldId id="359" r:id="rId26"/>
-    <p:sldId id="295" r:id="rId27"/>
+    <p:sldId id="361" r:id="rId27"/>
+    <p:sldId id="362" r:id="rId28"/>
+    <p:sldId id="295" r:id="rId29"/>
   </p:sldIdLst>
   <p:sldSz cx="18291175" cy="10290175"/>
   <p:notesSz cx="6858000" cy="9144000"/>
@@ -263,7 +265,7 @@
             <a:fld id="{4D0CBB7A-33AF-434C-B8C5-B5F21D294CDF}" type="datetimeFigureOut">
               <a:rPr lang="tr-TR" smtClean="0"/>
               <a:pPr/>
-              <a:t>6.04.2017</a:t>
+              <a:t>9.04.2017</a:t>
             </a:fld>
             <a:endParaRPr lang="tr-TR"/>
           </a:p>
@@ -430,7 +432,7 @@
             <a:fld id="{6C6C1039-E6FF-4F78-9751-FFD9A3AC8099}" type="datetimeFigureOut">
               <a:rPr lang="tr-TR" smtClean="0"/>
               <a:pPr/>
-              <a:t>6.04.2017</a:t>
+              <a:t>9.04.2017</a:t>
             </a:fld>
             <a:endParaRPr lang="tr-TR"/>
           </a:p>
@@ -2304,6 +2306,176 @@
     </p:spTree>
     <p:extLst>
       <p:ext uri="{BB962C8B-B14F-4D97-AF65-F5344CB8AC3E}">
+        <p14:creationId xmlns:p14="http://schemas.microsoft.com/office/powerpoint/2010/main" val="2372407465"/>
+      </p:ext>
+    </p:extLst>
+  </p:cSld>
+  <p:clrMapOvr>
+    <a:masterClrMapping/>
+  </p:clrMapOvr>
+</p:notes>
+</file>
+
+<file path=ppt/notesSlides/notesSlide27.xml><?xml version="1.0" encoding="utf-8"?>
+<p:notes xmlns:a="http://schemas.openxmlformats.org/drawingml/2006/main" xmlns:r="http://schemas.openxmlformats.org/officeDocument/2006/relationships" xmlns:p="http://schemas.openxmlformats.org/presentationml/2006/main">
+  <p:cSld>
+    <p:spTree>
+      <p:nvGrpSpPr>
+        <p:cNvPr id="1" name=""/>
+        <p:cNvGrpSpPr/>
+        <p:nvPr/>
+      </p:nvGrpSpPr>
+      <p:grpSpPr>
+        <a:xfrm>
+          <a:off x="0" y="0"/>
+          <a:ext cx="0" cy="0"/>
+          <a:chOff x="0" y="0"/>
+          <a:chExt cx="0" cy="0"/>
+        </a:xfrm>
+      </p:grpSpPr>
+      <p:sp>
+        <p:nvSpPr>
+          <p:cNvPr id="2" name="Slide Image Placeholder 1"/>
+          <p:cNvSpPr>
+            <a:spLocks noGrp="1" noRot="1" noChangeAspect="1"/>
+          </p:cNvSpPr>
+          <p:nvPr>
+            <p:ph type="sldImg"/>
+          </p:nvPr>
+        </p:nvSpPr>
+        <p:spPr/>
+      </p:sp>
+      <p:sp>
+        <p:nvSpPr>
+          <p:cNvPr id="3" name="Notes Placeholder 2"/>
+          <p:cNvSpPr>
+            <a:spLocks noGrp="1"/>
+          </p:cNvSpPr>
+          <p:nvPr>
+            <p:ph type="body" idx="1"/>
+          </p:nvPr>
+        </p:nvSpPr>
+        <p:spPr/>
+        <p:txBody>
+          <a:bodyPr/>
+          <a:lstStyle/>
+          <a:p>
+            <a:endParaRPr lang="tr-TR" dirty="0"/>
+          </a:p>
+        </p:txBody>
+      </p:sp>
+      <p:sp>
+        <p:nvSpPr>
+          <p:cNvPr id="4" name="Slide Number Placeholder 3"/>
+          <p:cNvSpPr>
+            <a:spLocks noGrp="1"/>
+          </p:cNvSpPr>
+          <p:nvPr>
+            <p:ph type="sldNum" sz="quarter" idx="10"/>
+          </p:nvPr>
+        </p:nvSpPr>
+        <p:spPr/>
+        <p:txBody>
+          <a:bodyPr/>
+          <a:lstStyle/>
+          <a:p>
+            <a:fld id="{802DA432-7CF7-4A2F-BE93-45834DC6981A}" type="slidenum">
+              <a:rPr lang="tr-TR" smtClean="0"/>
+              <a:pPr/>
+              <a:t>27</a:t>
+            </a:fld>
+            <a:endParaRPr lang="tr-TR"/>
+          </a:p>
+        </p:txBody>
+      </p:sp>
+    </p:spTree>
+    <p:extLst>
+      <p:ext uri="{BB962C8B-B14F-4D97-AF65-F5344CB8AC3E}">
+        <p14:creationId xmlns:p14="http://schemas.microsoft.com/office/powerpoint/2010/main" val="2250949911"/>
+      </p:ext>
+    </p:extLst>
+  </p:cSld>
+  <p:clrMapOvr>
+    <a:masterClrMapping/>
+  </p:clrMapOvr>
+</p:notes>
+</file>
+
+<file path=ppt/notesSlides/notesSlide28.xml><?xml version="1.0" encoding="utf-8"?>
+<p:notes xmlns:a="http://schemas.openxmlformats.org/drawingml/2006/main" xmlns:r="http://schemas.openxmlformats.org/officeDocument/2006/relationships" xmlns:p="http://schemas.openxmlformats.org/presentationml/2006/main">
+  <p:cSld>
+    <p:spTree>
+      <p:nvGrpSpPr>
+        <p:cNvPr id="1" name=""/>
+        <p:cNvGrpSpPr/>
+        <p:nvPr/>
+      </p:nvGrpSpPr>
+      <p:grpSpPr>
+        <a:xfrm>
+          <a:off x="0" y="0"/>
+          <a:ext cx="0" cy="0"/>
+          <a:chOff x="0" y="0"/>
+          <a:chExt cx="0" cy="0"/>
+        </a:xfrm>
+      </p:grpSpPr>
+      <p:sp>
+        <p:nvSpPr>
+          <p:cNvPr id="2" name="Slide Image Placeholder 1"/>
+          <p:cNvSpPr>
+            <a:spLocks noGrp="1" noRot="1" noChangeAspect="1"/>
+          </p:cNvSpPr>
+          <p:nvPr>
+            <p:ph type="sldImg"/>
+          </p:nvPr>
+        </p:nvSpPr>
+        <p:spPr/>
+      </p:sp>
+      <p:sp>
+        <p:nvSpPr>
+          <p:cNvPr id="3" name="Notes Placeholder 2"/>
+          <p:cNvSpPr>
+            <a:spLocks noGrp="1"/>
+          </p:cNvSpPr>
+          <p:nvPr>
+            <p:ph type="body" idx="1"/>
+          </p:nvPr>
+        </p:nvSpPr>
+        <p:spPr/>
+        <p:txBody>
+          <a:bodyPr/>
+          <a:lstStyle/>
+          <a:p>
+            <a:endParaRPr lang="tr-TR" dirty="0"/>
+          </a:p>
+        </p:txBody>
+      </p:sp>
+      <p:sp>
+        <p:nvSpPr>
+          <p:cNvPr id="4" name="Slide Number Placeholder 3"/>
+          <p:cNvSpPr>
+            <a:spLocks noGrp="1"/>
+          </p:cNvSpPr>
+          <p:nvPr>
+            <p:ph type="sldNum" sz="quarter" idx="10"/>
+          </p:nvPr>
+        </p:nvSpPr>
+        <p:spPr/>
+        <p:txBody>
+          <a:bodyPr/>
+          <a:lstStyle/>
+          <a:p>
+            <a:fld id="{802DA432-7CF7-4A2F-BE93-45834DC6981A}" type="slidenum">
+              <a:rPr lang="tr-TR" smtClean="0"/>
+              <a:pPr/>
+              <a:t>28</a:t>
+            </a:fld>
+            <a:endParaRPr lang="tr-TR"/>
+          </a:p>
+        </p:txBody>
+      </p:sp>
+    </p:spTree>
+    <p:extLst>
+      <p:ext uri="{BB962C8B-B14F-4D97-AF65-F5344CB8AC3E}">
         <p14:creationId xmlns:p14="http://schemas.microsoft.com/office/powerpoint/2010/main" val="605137192"/>
       </p:ext>
     </p:extLst>
@@ -3091,7 +3263,7 @@
             <a:fld id="{DC9C75F7-98FD-4D05-8C3F-C506B544AE03}" type="datetimeFigureOut">
               <a:rPr lang="tr-TR" smtClean="0"/>
               <a:pPr/>
-              <a:t>6.04.2017</a:t>
+              <a:t>9.04.2017</a:t>
             </a:fld>
             <a:endParaRPr lang="tr-TR"/>
           </a:p>
@@ -3275,7 +3447,7 @@
             <a:fld id="{DC9C75F7-98FD-4D05-8C3F-C506B544AE03}" type="datetimeFigureOut">
               <a:rPr lang="tr-TR" smtClean="0"/>
               <a:pPr/>
-              <a:t>6.04.2017</a:t>
+              <a:t>9.04.2017</a:t>
             </a:fld>
             <a:endParaRPr lang="tr-TR"/>
           </a:p>
@@ -3469,7 +3641,7 @@
             <a:fld id="{DC9C75F7-98FD-4D05-8C3F-C506B544AE03}" type="datetimeFigureOut">
               <a:rPr lang="tr-TR" smtClean="0"/>
               <a:pPr/>
-              <a:t>6.04.2017</a:t>
+              <a:t>9.04.2017</a:t>
             </a:fld>
             <a:endParaRPr lang="tr-TR"/>
           </a:p>
@@ -3653,7 +3825,7 @@
             <a:fld id="{DC9C75F7-98FD-4D05-8C3F-C506B544AE03}" type="datetimeFigureOut">
               <a:rPr lang="tr-TR" smtClean="0"/>
               <a:pPr/>
-              <a:t>6.04.2017</a:t>
+              <a:t>9.04.2017</a:t>
             </a:fld>
             <a:endParaRPr lang="tr-TR"/>
           </a:p>
@@ -3913,7 +4085,7 @@
             <a:fld id="{DC9C75F7-98FD-4D05-8C3F-C506B544AE03}" type="datetimeFigureOut">
               <a:rPr lang="tr-TR" smtClean="0"/>
               <a:pPr/>
-              <a:t>6.04.2017</a:t>
+              <a:t>9.04.2017</a:t>
             </a:fld>
             <a:endParaRPr lang="tr-TR"/>
           </a:p>
@@ -4215,7 +4387,7 @@
             <a:fld id="{DC9C75F7-98FD-4D05-8C3F-C506B544AE03}" type="datetimeFigureOut">
               <a:rPr lang="tr-TR" smtClean="0"/>
               <a:pPr/>
-              <a:t>6.04.2017</a:t>
+              <a:t>9.04.2017</a:t>
             </a:fld>
             <a:endParaRPr lang="tr-TR"/>
           </a:p>
@@ -4651,7 +4823,7 @@
             <a:fld id="{DC9C75F7-98FD-4D05-8C3F-C506B544AE03}" type="datetimeFigureOut">
               <a:rPr lang="tr-TR" smtClean="0"/>
               <a:pPr/>
-              <a:t>6.04.2017</a:t>
+              <a:t>9.04.2017</a:t>
             </a:fld>
             <a:endParaRPr lang="tr-TR"/>
           </a:p>
@@ -4783,7 +4955,7 @@
             <a:fld id="{DC9C75F7-98FD-4D05-8C3F-C506B544AE03}" type="datetimeFigureOut">
               <a:rPr lang="tr-TR" smtClean="0"/>
               <a:pPr/>
-              <a:t>6.04.2017</a:t>
+              <a:t>9.04.2017</a:t>
             </a:fld>
             <a:endParaRPr lang="tr-TR"/>
           </a:p>
@@ -4892,7 +5064,7 @@
             <a:fld id="{DC9C75F7-98FD-4D05-8C3F-C506B544AE03}" type="datetimeFigureOut">
               <a:rPr lang="tr-TR" smtClean="0"/>
               <a:pPr/>
-              <a:t>6.04.2017</a:t>
+              <a:t>9.04.2017</a:t>
             </a:fld>
             <a:endParaRPr lang="tr-TR"/>
           </a:p>
@@ -5183,7 +5355,7 @@
             <a:fld id="{DC9C75F7-98FD-4D05-8C3F-C506B544AE03}" type="datetimeFigureOut">
               <a:rPr lang="tr-TR" smtClean="0"/>
               <a:pPr/>
-              <a:t>6.04.2017</a:t>
+              <a:t>9.04.2017</a:t>
             </a:fld>
             <a:endParaRPr lang="tr-TR"/>
           </a:p>
@@ -5450,7 +5622,7 @@
             <a:fld id="{DC9C75F7-98FD-4D05-8C3F-C506B544AE03}" type="datetimeFigureOut">
               <a:rPr lang="tr-TR" smtClean="0"/>
               <a:pPr/>
-              <a:t>6.04.2017</a:t>
+              <a:t>9.04.2017</a:t>
             </a:fld>
             <a:endParaRPr lang="tr-TR"/>
           </a:p>
@@ -5686,7 +5858,7 @@
             <a:fld id="{DC9C75F7-98FD-4D05-8C3F-C506B544AE03}" type="datetimeFigureOut">
               <a:rPr lang="tr-TR" smtClean="0"/>
               <a:pPr/>
-              <a:t>6.04.2017</a:t>
+              <a:t>9.04.2017</a:t>
             </a:fld>
             <a:endParaRPr lang="tr-TR"/>
           </a:p>
@@ -16000,12 +16172,8 @@
               <a:buChar char="•"/>
             </a:pPr>
             <a:r>
-              <a:rPr lang="sr-Latn-RS" sz="3600" dirty="0"/>
-              <a:t>AUTO-REGISTRATION</a:t>
-            </a:r>
-            <a:r>
               <a:rPr lang="sr-Latn-RS" dirty="0"/>
-              <a:t> </a:t>
+              <a:t>AUTO-REGISTRATION </a:t>
             </a:r>
           </a:p>
         </p:txBody>
@@ -16114,6 +16282,38 @@
           </a:p>
         </p:txBody>
       </p:sp>
+      <p:cxnSp>
+        <p:nvCxnSpPr>
+          <p:cNvPr id="9" name="Straight Connector 8"/>
+          <p:cNvCxnSpPr>
+            <a:cxnSpLocks/>
+          </p:cNvCxnSpPr>
+          <p:nvPr/>
+        </p:nvCxnSpPr>
+        <p:spPr>
+          <a:xfrm>
+            <a:off x="2211387" y="4383087"/>
+            <a:ext cx="3505200" cy="0"/>
+          </a:xfrm>
+          <a:prstGeom prst="line">
+            <a:avLst/>
+          </a:prstGeom>
+        </p:spPr>
+        <p:style>
+          <a:lnRef idx="3">
+            <a:schemeClr val="accent2"/>
+          </a:lnRef>
+          <a:fillRef idx="0">
+            <a:schemeClr val="accent2"/>
+          </a:fillRef>
+          <a:effectRef idx="2">
+            <a:schemeClr val="accent2"/>
+          </a:effectRef>
+          <a:fontRef idx="minor">
+            <a:schemeClr val="tx1"/>
+          </a:fontRef>
+        </p:style>
+      </p:cxnSp>
     </p:spTree>
     <p:extLst>
       <p:ext uri="{BB962C8B-B14F-4D97-AF65-F5344CB8AC3E}">
@@ -16239,6 +16439,41 @@
                                   </p:childTnLst>
                                 </p:cTn>
                               </p:par>
+                              <p:par>
+                                <p:cTn id="12" presetID="16" presetClass="entr" presetSubtype="37" fill="hold" nodeType="withEffect">
+                                  <p:stCondLst>
+                                    <p:cond delay="0"/>
+                                  </p:stCondLst>
+                                  <p:childTnLst>
+                                    <p:set>
+                                      <p:cBhvr>
+                                        <p:cTn id="13" dur="1" fill="hold">
+                                          <p:stCondLst>
+                                            <p:cond delay="0"/>
+                                          </p:stCondLst>
+                                        </p:cTn>
+                                        <p:tgtEl>
+                                          <p:spTgt spid="9"/>
+                                        </p:tgtEl>
+                                        <p:attrNameLst>
+                                          <p:attrName>style.visibility</p:attrName>
+                                        </p:attrNameLst>
+                                      </p:cBhvr>
+                                      <p:to>
+                                        <p:strVal val="visible"/>
+                                      </p:to>
+                                    </p:set>
+                                    <p:animEffect transition="in" filter="barn(outVertical)">
+                                      <p:cBhvr>
+                                        <p:cTn id="14" dur="500"/>
+                                        <p:tgtEl>
+                                          <p:spTgt spid="9"/>
+                                        </p:tgtEl>
+                                      </p:cBhvr>
+                                    </p:animEffect>
+                                  </p:childTnLst>
+                                </p:cTn>
+                              </p:par>
                             </p:childTnLst>
                           </p:cTn>
                         </p:par>
@@ -16439,6 +16674,524 @@
 </file>
 
 <file path=ppt/slides/slide26.xml><?xml version="1.0" encoding="utf-8"?>
+<p:sld xmlns:a="http://schemas.openxmlformats.org/drawingml/2006/main" xmlns:r="http://schemas.openxmlformats.org/officeDocument/2006/relationships" xmlns:p="http://schemas.openxmlformats.org/presentationml/2006/main">
+  <p:cSld>
+    <p:spTree>
+      <p:nvGrpSpPr>
+        <p:cNvPr id="1" name=""/>
+        <p:cNvGrpSpPr/>
+        <p:nvPr/>
+      </p:nvGrpSpPr>
+      <p:grpSpPr>
+        <a:xfrm>
+          <a:off x="0" y="0"/>
+          <a:ext cx="0" cy="0"/>
+          <a:chOff x="0" y="0"/>
+          <a:chExt cx="0" cy="0"/>
+        </a:xfrm>
+      </p:grpSpPr>
+      <p:sp>
+        <p:nvSpPr>
+          <p:cNvPr id="16" name="TextBox 15"/>
+          <p:cNvSpPr txBox="1"/>
+          <p:nvPr/>
+        </p:nvSpPr>
+        <p:spPr>
+          <a:xfrm>
+            <a:off x="4969123" y="854313"/>
+            <a:ext cx="8136904" cy="830997"/>
+          </a:xfrm>
+          <a:prstGeom prst="rect">
+            <a:avLst/>
+          </a:prstGeom>
+          <a:noFill/>
+        </p:spPr>
+        <p:txBody>
+          <a:bodyPr wrap="square" rtlCol="0">
+            <a:spAutoFit/>
+          </a:bodyPr>
+          <a:lstStyle/>
+          <a:p>
+            <a:pPr algn="ctr"/>
+            <a:r>
+              <a:rPr lang="sr-Latn-RS" sz="4800" dirty="0">
+                <a:solidFill>
+                  <a:srgbClr val="545250"/>
+                </a:solidFill>
+                <a:latin typeface="Novecento sans wide Book" pitchFamily="50" charset="-94"/>
+              </a:rPr>
+              <a:t>DI Patterns</a:t>
+            </a:r>
+            <a:endParaRPr lang="en-US" sz="4800" dirty="0">
+              <a:solidFill>
+                <a:srgbClr val="545250"/>
+              </a:solidFill>
+              <a:latin typeface="Novecento sans wide Book" pitchFamily="50" charset="-94"/>
+            </a:endParaRPr>
+          </a:p>
+        </p:txBody>
+      </p:sp>
+      <p:pic>
+        <p:nvPicPr>
+          <p:cNvPr id="8" name="Picture 7"/>
+          <p:cNvPicPr>
+            <a:picLocks noChangeAspect="1"/>
+          </p:cNvPicPr>
+          <p:nvPr/>
+        </p:nvPicPr>
+        <p:blipFill>
+          <a:blip r:embed="rId3">
+            <a:extLst>
+              <a:ext uri="{28A0092B-C50C-407E-A947-70E740481C1C}">
+                <a14:useLocalDpi xmlns:a14="http://schemas.microsoft.com/office/drawing/2010/main" val="0"/>
+              </a:ext>
+            </a:extLst>
+          </a:blip>
+          <a:stretch>
+            <a:fillRect/>
+          </a:stretch>
+        </p:blipFill>
+        <p:spPr>
+          <a:xfrm rot="5400000">
+            <a:off x="9100648" y="-2221597"/>
+            <a:ext cx="1168254" cy="9003175"/>
+          </a:xfrm>
+          <a:prstGeom prst="rect">
+            <a:avLst/>
+          </a:prstGeom>
+        </p:spPr>
+      </p:pic>
+      <p:pic>
+        <p:nvPicPr>
+          <p:cNvPr id="7" name="Picture 6"/>
+          <p:cNvPicPr>
+            <a:picLocks noChangeAspect="1"/>
+          </p:cNvPicPr>
+          <p:nvPr/>
+        </p:nvPicPr>
+        <p:blipFill>
+          <a:blip r:embed="rId4" cstate="print">
+            <a:extLst>
+              <a:ext uri="{28A0092B-C50C-407E-A947-70E740481C1C}">
+                <a14:useLocalDpi xmlns:a14="http://schemas.microsoft.com/office/drawing/2010/main" val="0"/>
+              </a:ext>
+            </a:extLst>
+          </a:blip>
+          <a:stretch>
+            <a:fillRect/>
+          </a:stretch>
+        </p:blipFill>
+        <p:spPr>
+          <a:xfrm>
+            <a:off x="13488987" y="9412287"/>
+            <a:ext cx="4572000" cy="646390"/>
+          </a:xfrm>
+          <a:prstGeom prst="rect">
+            <a:avLst/>
+          </a:prstGeom>
+        </p:spPr>
+      </p:pic>
+      <p:sp>
+        <p:nvSpPr>
+          <p:cNvPr id="10" name="TextBox 9"/>
+          <p:cNvSpPr txBox="1"/>
+          <p:nvPr/>
+        </p:nvSpPr>
+        <p:spPr>
+          <a:xfrm>
+            <a:off x="1677987" y="2571730"/>
+            <a:ext cx="3768339" cy="584775"/>
+          </a:xfrm>
+          <a:prstGeom prst="rect">
+            <a:avLst/>
+          </a:prstGeom>
+          <a:noFill/>
+        </p:spPr>
+        <p:txBody>
+          <a:bodyPr wrap="none" rtlCol="0">
+            <a:spAutoFit/>
+          </a:bodyPr>
+          <a:lstStyle/>
+          <a:p>
+            <a:r>
+              <a:rPr lang="sr-Latn-RS" b="1" dirty="0"/>
+              <a:t>Constructor injection</a:t>
+            </a:r>
+          </a:p>
+        </p:txBody>
+      </p:sp>
+      <p:sp>
+        <p:nvSpPr>
+          <p:cNvPr id="11" name="Rectangle 10"/>
+          <p:cNvSpPr/>
+          <p:nvPr/>
+        </p:nvSpPr>
+        <p:spPr>
+          <a:xfrm>
+            <a:off x="1677987" y="3363075"/>
+            <a:ext cx="14097000" cy="584775"/>
+          </a:xfrm>
+          <a:prstGeom prst="rect">
+            <a:avLst/>
+          </a:prstGeom>
+        </p:spPr>
+        <p:txBody>
+          <a:bodyPr wrap="square">
+            <a:spAutoFit/>
+          </a:bodyPr>
+          <a:lstStyle/>
+          <a:p>
+            <a:r>
+              <a:rPr lang="en-US" i="1" dirty="0"/>
+              <a:t>guarantee that a necessary Dependency is always available </a:t>
+            </a:r>
+            <a:endParaRPr lang="sr-Latn-RS" dirty="0"/>
+          </a:p>
+        </p:txBody>
+      </p:sp>
+      <p:sp>
+        <p:nvSpPr>
+          <p:cNvPr id="13" name="Rectangle 12"/>
+          <p:cNvSpPr/>
+          <p:nvPr/>
+        </p:nvSpPr>
+        <p:spPr>
+          <a:xfrm>
+            <a:off x="1677987" y="4132346"/>
+            <a:ext cx="16306800" cy="584775"/>
+          </a:xfrm>
+          <a:prstGeom prst="rect">
+            <a:avLst/>
+          </a:prstGeom>
+        </p:spPr>
+        <p:txBody>
+          <a:bodyPr wrap="square">
+            <a:spAutoFit/>
+          </a:bodyPr>
+          <a:lstStyle/>
+          <a:p>
+            <a:r>
+              <a:rPr lang="en-US" i="1" dirty="0"/>
+              <a:t>It clearly documents that the class requires the DEPENDENCIES it requests through its constructor </a:t>
+            </a:r>
+            <a:endParaRPr lang="sr-Latn-RS" i="1" dirty="0"/>
+          </a:p>
+        </p:txBody>
+      </p:sp>
+      <p:sp>
+        <p:nvSpPr>
+          <p:cNvPr id="14" name="Rectangle 13"/>
+          <p:cNvSpPr/>
+          <p:nvPr/>
+        </p:nvSpPr>
+        <p:spPr>
+          <a:xfrm>
+            <a:off x="1677987" y="4901617"/>
+            <a:ext cx="16230600" cy="1077218"/>
+          </a:xfrm>
+          <a:prstGeom prst="rect">
+            <a:avLst/>
+          </a:prstGeom>
+        </p:spPr>
+        <p:txBody>
+          <a:bodyPr wrap="square">
+            <a:spAutoFit/>
+          </a:bodyPr>
+          <a:lstStyle/>
+          <a:p>
+            <a:r>
+              <a:rPr lang="en-US" i="1" dirty="0"/>
+              <a:t>constrain the design to a single constructor. Overloaded constructors lead to ambiguity: which constructor should a DI CONTAINER use?</a:t>
+            </a:r>
+            <a:endParaRPr lang="sr-Latn-RS" i="1" dirty="0"/>
+          </a:p>
+        </p:txBody>
+      </p:sp>
+    </p:spTree>
+    <p:extLst>
+      <p:ext uri="{BB962C8B-B14F-4D97-AF65-F5344CB8AC3E}">
+        <p14:creationId xmlns:p14="http://schemas.microsoft.com/office/powerpoint/2010/main" val="343522108"/>
+      </p:ext>
+    </p:extLst>
+  </p:cSld>
+  <p:clrMapOvr>
+    <a:masterClrMapping/>
+  </p:clrMapOvr>
+  <mc:AlternateContent xmlns:mc="http://schemas.openxmlformats.org/markup-compatibility/2006" xmlns:p14="http://schemas.microsoft.com/office/powerpoint/2010/main">
+    <mc:Choice Requires="p14">
+      <p:transition spd="med" p14:dur="700">
+        <p:fade/>
+      </p:transition>
+    </mc:Choice>
+    <mc:Fallback xmlns="">
+      <p:transition spd="med">
+        <p:fade/>
+      </p:transition>
+    </mc:Fallback>
+  </mc:AlternateContent>
+</p:sld>
+</file>
+
+<file path=ppt/slides/slide27.xml><?xml version="1.0" encoding="utf-8"?>
+<p:sld xmlns:a="http://schemas.openxmlformats.org/drawingml/2006/main" xmlns:r="http://schemas.openxmlformats.org/officeDocument/2006/relationships" xmlns:p="http://schemas.openxmlformats.org/presentationml/2006/main">
+  <p:cSld>
+    <p:spTree>
+      <p:nvGrpSpPr>
+        <p:cNvPr id="1" name=""/>
+        <p:cNvGrpSpPr/>
+        <p:nvPr/>
+      </p:nvGrpSpPr>
+      <p:grpSpPr>
+        <a:xfrm>
+          <a:off x="0" y="0"/>
+          <a:ext cx="0" cy="0"/>
+          <a:chOff x="0" y="0"/>
+          <a:chExt cx="0" cy="0"/>
+        </a:xfrm>
+      </p:grpSpPr>
+      <p:sp>
+        <p:nvSpPr>
+          <p:cNvPr id="16" name="TextBox 15"/>
+          <p:cNvSpPr txBox="1"/>
+          <p:nvPr/>
+        </p:nvSpPr>
+        <p:spPr>
+          <a:xfrm>
+            <a:off x="4969123" y="854313"/>
+            <a:ext cx="8136904" cy="830997"/>
+          </a:xfrm>
+          <a:prstGeom prst="rect">
+            <a:avLst/>
+          </a:prstGeom>
+          <a:noFill/>
+        </p:spPr>
+        <p:txBody>
+          <a:bodyPr wrap="square" rtlCol="0">
+            <a:spAutoFit/>
+          </a:bodyPr>
+          <a:lstStyle/>
+          <a:p>
+            <a:pPr algn="ctr"/>
+            <a:r>
+              <a:rPr lang="sr-Latn-RS" sz="4800" dirty="0">
+                <a:solidFill>
+                  <a:srgbClr val="545250"/>
+                </a:solidFill>
+                <a:latin typeface="Novecento sans wide Book" pitchFamily="50" charset="-94"/>
+              </a:rPr>
+              <a:t>DI Patterns</a:t>
+            </a:r>
+            <a:endParaRPr lang="en-US" sz="4800" dirty="0">
+              <a:solidFill>
+                <a:srgbClr val="545250"/>
+              </a:solidFill>
+              <a:latin typeface="Novecento sans wide Book" pitchFamily="50" charset="-94"/>
+            </a:endParaRPr>
+          </a:p>
+        </p:txBody>
+      </p:sp>
+      <p:pic>
+        <p:nvPicPr>
+          <p:cNvPr id="8" name="Picture 7"/>
+          <p:cNvPicPr>
+            <a:picLocks noChangeAspect="1"/>
+          </p:cNvPicPr>
+          <p:nvPr/>
+        </p:nvPicPr>
+        <p:blipFill>
+          <a:blip r:embed="rId3">
+            <a:extLst>
+              <a:ext uri="{28A0092B-C50C-407E-A947-70E740481C1C}">
+                <a14:useLocalDpi xmlns:a14="http://schemas.microsoft.com/office/drawing/2010/main" val="0"/>
+              </a:ext>
+            </a:extLst>
+          </a:blip>
+          <a:stretch>
+            <a:fillRect/>
+          </a:stretch>
+        </p:blipFill>
+        <p:spPr>
+          <a:xfrm rot="5400000">
+            <a:off x="9100648" y="-2221597"/>
+            <a:ext cx="1168254" cy="9003175"/>
+          </a:xfrm>
+          <a:prstGeom prst="rect">
+            <a:avLst/>
+          </a:prstGeom>
+        </p:spPr>
+      </p:pic>
+      <p:pic>
+        <p:nvPicPr>
+          <p:cNvPr id="7" name="Picture 6"/>
+          <p:cNvPicPr>
+            <a:picLocks noChangeAspect="1"/>
+          </p:cNvPicPr>
+          <p:nvPr/>
+        </p:nvPicPr>
+        <p:blipFill>
+          <a:blip r:embed="rId4" cstate="print">
+            <a:extLst>
+              <a:ext uri="{28A0092B-C50C-407E-A947-70E740481C1C}">
+                <a14:useLocalDpi xmlns:a14="http://schemas.microsoft.com/office/drawing/2010/main" val="0"/>
+              </a:ext>
+            </a:extLst>
+          </a:blip>
+          <a:stretch>
+            <a:fillRect/>
+          </a:stretch>
+        </p:blipFill>
+        <p:spPr>
+          <a:xfrm>
+            <a:off x="13488987" y="9412287"/>
+            <a:ext cx="4572000" cy="646390"/>
+          </a:xfrm>
+          <a:prstGeom prst="rect">
+            <a:avLst/>
+          </a:prstGeom>
+        </p:spPr>
+      </p:pic>
+      <p:sp>
+        <p:nvSpPr>
+          <p:cNvPr id="10" name="TextBox 9"/>
+          <p:cNvSpPr txBox="1"/>
+          <p:nvPr/>
+        </p:nvSpPr>
+        <p:spPr>
+          <a:xfrm>
+            <a:off x="1677987" y="2571730"/>
+            <a:ext cx="3254224" cy="584775"/>
+          </a:xfrm>
+          <a:prstGeom prst="rect">
+            <a:avLst/>
+          </a:prstGeom>
+          <a:noFill/>
+        </p:spPr>
+        <p:txBody>
+          <a:bodyPr wrap="none" rtlCol="0">
+            <a:spAutoFit/>
+          </a:bodyPr>
+          <a:lstStyle/>
+          <a:p>
+            <a:r>
+              <a:rPr lang="sr-Latn-RS" b="1" dirty="0"/>
+              <a:t>Property injection</a:t>
+            </a:r>
+          </a:p>
+        </p:txBody>
+      </p:sp>
+      <p:sp>
+        <p:nvSpPr>
+          <p:cNvPr id="11" name="Rectangle 10"/>
+          <p:cNvSpPr/>
+          <p:nvPr/>
+        </p:nvSpPr>
+        <p:spPr>
+          <a:xfrm>
+            <a:off x="1677987" y="3363075"/>
+            <a:ext cx="14097000" cy="584775"/>
+          </a:xfrm>
+          <a:prstGeom prst="rect">
+            <a:avLst/>
+          </a:prstGeom>
+        </p:spPr>
+        <p:txBody>
+          <a:bodyPr wrap="square">
+            <a:spAutoFit/>
+          </a:bodyPr>
+          <a:lstStyle/>
+          <a:p>
+            <a:r>
+              <a:rPr lang="en-US" i="1" dirty="0"/>
+              <a:t>guarantee that a necessary Dependency is always available </a:t>
+            </a:r>
+            <a:endParaRPr lang="sr-Latn-RS" dirty="0"/>
+          </a:p>
+        </p:txBody>
+      </p:sp>
+      <p:sp>
+        <p:nvSpPr>
+          <p:cNvPr id="13" name="Rectangle 12"/>
+          <p:cNvSpPr/>
+          <p:nvPr/>
+        </p:nvSpPr>
+        <p:spPr>
+          <a:xfrm>
+            <a:off x="1677987" y="4132346"/>
+            <a:ext cx="16306800" cy="584775"/>
+          </a:xfrm>
+          <a:prstGeom prst="rect">
+            <a:avLst/>
+          </a:prstGeom>
+        </p:spPr>
+        <p:txBody>
+          <a:bodyPr wrap="square">
+            <a:spAutoFit/>
+          </a:bodyPr>
+          <a:lstStyle/>
+          <a:p>
+            <a:r>
+              <a:rPr lang="en-US" i="1" dirty="0"/>
+              <a:t>It clearly documents that the class requires the DEPENDENCIES it requests through its constructor </a:t>
+            </a:r>
+            <a:endParaRPr lang="sr-Latn-RS" i="1" dirty="0"/>
+          </a:p>
+        </p:txBody>
+      </p:sp>
+      <p:sp>
+        <p:nvSpPr>
+          <p:cNvPr id="14" name="Rectangle 13"/>
+          <p:cNvSpPr/>
+          <p:nvPr/>
+        </p:nvSpPr>
+        <p:spPr>
+          <a:xfrm>
+            <a:off x="1677987" y="4901617"/>
+            <a:ext cx="16230600" cy="1077218"/>
+          </a:xfrm>
+          <a:prstGeom prst="rect">
+            <a:avLst/>
+          </a:prstGeom>
+        </p:spPr>
+        <p:txBody>
+          <a:bodyPr wrap="square">
+            <a:spAutoFit/>
+          </a:bodyPr>
+          <a:lstStyle/>
+          <a:p>
+            <a:r>
+              <a:rPr lang="en-US" i="1" dirty="0"/>
+              <a:t>constrain the design to a single constructor. Overloaded constructors lead to ambiguity: which constructor should a DI CONTAINER use?</a:t>
+            </a:r>
+            <a:endParaRPr lang="sr-Latn-RS" i="1" dirty="0"/>
+          </a:p>
+        </p:txBody>
+      </p:sp>
+    </p:spTree>
+    <p:extLst>
+      <p:ext uri="{BB962C8B-B14F-4D97-AF65-F5344CB8AC3E}">
+        <p14:creationId xmlns:p14="http://schemas.microsoft.com/office/powerpoint/2010/main" val="2192471356"/>
+      </p:ext>
+    </p:extLst>
+  </p:cSld>
+  <p:clrMapOvr>
+    <a:masterClrMapping/>
+  </p:clrMapOvr>
+  <mc:AlternateContent xmlns:mc="http://schemas.openxmlformats.org/markup-compatibility/2006" xmlns:p14="http://schemas.microsoft.com/office/powerpoint/2010/main">
+    <mc:Choice Requires="p14">
+      <p:transition spd="med" p14:dur="700">
+        <p:fade/>
+      </p:transition>
+    </mc:Choice>
+    <mc:Fallback xmlns="">
+      <p:transition spd="med">
+        <p:fade/>
+      </p:transition>
+    </mc:Fallback>
+  </mc:AlternateContent>
+</p:sld>
+</file>
+
+<file path=ppt/slides/slide28.xml><?xml version="1.0" encoding="utf-8"?>
 <p:sld xmlns:a="http://schemas.openxmlformats.org/drawingml/2006/main" xmlns:r="http://schemas.openxmlformats.org/officeDocument/2006/relationships" xmlns:p="http://schemas.openxmlformats.org/presentationml/2006/main">
   <p:cSld>
     <p:spTree>

</xml_diff>

<commit_message>
DI Interception sample added
</commit_message>
<xml_diff>
--- a/DI Course.pptx
+++ b/DI Course.pptx
@@ -5,10 +5,10 @@
     <p:sldMasterId id="2147483650" r:id="rId1"/>
   </p:sldMasterIdLst>
   <p:notesMasterIdLst>
-    <p:notesMasterId r:id="rId30"/>
+    <p:notesMasterId r:id="rId32"/>
   </p:notesMasterIdLst>
   <p:handoutMasterIdLst>
-    <p:handoutMasterId r:id="rId31"/>
+    <p:handoutMasterId r:id="rId33"/>
   </p:handoutMasterIdLst>
   <p:sldIdLst>
     <p:sldId id="256" r:id="rId2"/>
@@ -38,7 +38,9 @@
     <p:sldId id="359" r:id="rId26"/>
     <p:sldId id="361" r:id="rId27"/>
     <p:sldId id="362" r:id="rId28"/>
-    <p:sldId id="295" r:id="rId29"/>
+    <p:sldId id="363" r:id="rId29"/>
+    <p:sldId id="364" r:id="rId30"/>
+    <p:sldId id="295" r:id="rId31"/>
   </p:sldIdLst>
   <p:sldSz cx="18291175" cy="10290175"/>
   <p:notesSz cx="6858000" cy="9144000"/>
@@ -265,7 +267,7 @@
             <a:fld id="{4D0CBB7A-33AF-434C-B8C5-B5F21D294CDF}" type="datetimeFigureOut">
               <a:rPr lang="tr-TR" smtClean="0"/>
               <a:pPr/>
-              <a:t>9.04.2017</a:t>
+              <a:t>10.04.2017</a:t>
             </a:fld>
             <a:endParaRPr lang="tr-TR"/>
           </a:p>
@@ -432,7 +434,7 @@
             <a:fld id="{6C6C1039-E6FF-4F78-9751-FFD9A3AC8099}" type="datetimeFigureOut">
               <a:rPr lang="tr-TR" smtClean="0"/>
               <a:pPr/>
-              <a:t>9.04.2017</a:t>
+              <a:t>10.04.2017</a:t>
             </a:fld>
             <a:endParaRPr lang="tr-TR"/>
           </a:p>
@@ -2476,7 +2478,92 @@
     </p:spTree>
     <p:extLst>
       <p:ext uri="{BB962C8B-B14F-4D97-AF65-F5344CB8AC3E}">
-        <p14:creationId xmlns:p14="http://schemas.microsoft.com/office/powerpoint/2010/main" val="605137192"/>
+        <p14:creationId xmlns:p14="http://schemas.microsoft.com/office/powerpoint/2010/main" val="3645142547"/>
+      </p:ext>
+    </p:extLst>
+  </p:cSld>
+  <p:clrMapOvr>
+    <a:masterClrMapping/>
+  </p:clrMapOvr>
+</p:notes>
+</file>
+
+<file path=ppt/notesSlides/notesSlide29.xml><?xml version="1.0" encoding="utf-8"?>
+<p:notes xmlns:a="http://schemas.openxmlformats.org/drawingml/2006/main" xmlns:r="http://schemas.openxmlformats.org/officeDocument/2006/relationships" xmlns:p="http://schemas.openxmlformats.org/presentationml/2006/main">
+  <p:cSld>
+    <p:spTree>
+      <p:nvGrpSpPr>
+        <p:cNvPr id="1" name=""/>
+        <p:cNvGrpSpPr/>
+        <p:nvPr/>
+      </p:nvGrpSpPr>
+      <p:grpSpPr>
+        <a:xfrm>
+          <a:off x="0" y="0"/>
+          <a:ext cx="0" cy="0"/>
+          <a:chOff x="0" y="0"/>
+          <a:chExt cx="0" cy="0"/>
+        </a:xfrm>
+      </p:grpSpPr>
+      <p:sp>
+        <p:nvSpPr>
+          <p:cNvPr id="2" name="Slide Image Placeholder 1"/>
+          <p:cNvSpPr>
+            <a:spLocks noGrp="1" noRot="1" noChangeAspect="1"/>
+          </p:cNvSpPr>
+          <p:nvPr>
+            <p:ph type="sldImg"/>
+          </p:nvPr>
+        </p:nvSpPr>
+        <p:spPr/>
+      </p:sp>
+      <p:sp>
+        <p:nvSpPr>
+          <p:cNvPr id="3" name="Notes Placeholder 2"/>
+          <p:cNvSpPr>
+            <a:spLocks noGrp="1"/>
+          </p:cNvSpPr>
+          <p:nvPr>
+            <p:ph type="body" idx="1"/>
+          </p:nvPr>
+        </p:nvSpPr>
+        <p:spPr/>
+        <p:txBody>
+          <a:bodyPr/>
+          <a:lstStyle/>
+          <a:p>
+            <a:endParaRPr lang="tr-TR" dirty="0"/>
+          </a:p>
+        </p:txBody>
+      </p:sp>
+      <p:sp>
+        <p:nvSpPr>
+          <p:cNvPr id="4" name="Slide Number Placeholder 3"/>
+          <p:cNvSpPr>
+            <a:spLocks noGrp="1"/>
+          </p:cNvSpPr>
+          <p:nvPr>
+            <p:ph type="sldNum" sz="quarter" idx="10"/>
+          </p:nvPr>
+        </p:nvSpPr>
+        <p:spPr/>
+        <p:txBody>
+          <a:bodyPr/>
+          <a:lstStyle/>
+          <a:p>
+            <a:fld id="{802DA432-7CF7-4A2F-BE93-45834DC6981A}" type="slidenum">
+              <a:rPr lang="tr-TR" smtClean="0"/>
+              <a:pPr/>
+              <a:t>29</a:t>
+            </a:fld>
+            <a:endParaRPr lang="tr-TR"/>
+          </a:p>
+        </p:txBody>
+      </p:sp>
+    </p:spTree>
+    <p:extLst>
+      <p:ext uri="{BB962C8B-B14F-4D97-AF65-F5344CB8AC3E}">
+        <p14:creationId xmlns:p14="http://schemas.microsoft.com/office/powerpoint/2010/main" val="2698104808"/>
       </p:ext>
     </p:extLst>
   </p:cSld>
@@ -2562,6 +2649,91 @@
     <p:extLst>
       <p:ext uri="{BB962C8B-B14F-4D97-AF65-F5344CB8AC3E}">
         <p14:creationId xmlns:p14="http://schemas.microsoft.com/office/powerpoint/2010/main" val="1959512366"/>
+      </p:ext>
+    </p:extLst>
+  </p:cSld>
+  <p:clrMapOvr>
+    <a:masterClrMapping/>
+  </p:clrMapOvr>
+</p:notes>
+</file>
+
+<file path=ppt/notesSlides/notesSlide30.xml><?xml version="1.0" encoding="utf-8"?>
+<p:notes xmlns:a="http://schemas.openxmlformats.org/drawingml/2006/main" xmlns:r="http://schemas.openxmlformats.org/officeDocument/2006/relationships" xmlns:p="http://schemas.openxmlformats.org/presentationml/2006/main">
+  <p:cSld>
+    <p:spTree>
+      <p:nvGrpSpPr>
+        <p:cNvPr id="1" name=""/>
+        <p:cNvGrpSpPr/>
+        <p:nvPr/>
+      </p:nvGrpSpPr>
+      <p:grpSpPr>
+        <a:xfrm>
+          <a:off x="0" y="0"/>
+          <a:ext cx="0" cy="0"/>
+          <a:chOff x="0" y="0"/>
+          <a:chExt cx="0" cy="0"/>
+        </a:xfrm>
+      </p:grpSpPr>
+      <p:sp>
+        <p:nvSpPr>
+          <p:cNvPr id="2" name="Slide Image Placeholder 1"/>
+          <p:cNvSpPr>
+            <a:spLocks noGrp="1" noRot="1" noChangeAspect="1"/>
+          </p:cNvSpPr>
+          <p:nvPr>
+            <p:ph type="sldImg"/>
+          </p:nvPr>
+        </p:nvSpPr>
+        <p:spPr/>
+      </p:sp>
+      <p:sp>
+        <p:nvSpPr>
+          <p:cNvPr id="3" name="Notes Placeholder 2"/>
+          <p:cNvSpPr>
+            <a:spLocks noGrp="1"/>
+          </p:cNvSpPr>
+          <p:nvPr>
+            <p:ph type="body" idx="1"/>
+          </p:nvPr>
+        </p:nvSpPr>
+        <p:spPr/>
+        <p:txBody>
+          <a:bodyPr/>
+          <a:lstStyle/>
+          <a:p>
+            <a:endParaRPr lang="tr-TR" dirty="0"/>
+          </a:p>
+        </p:txBody>
+      </p:sp>
+      <p:sp>
+        <p:nvSpPr>
+          <p:cNvPr id="4" name="Slide Number Placeholder 3"/>
+          <p:cNvSpPr>
+            <a:spLocks noGrp="1"/>
+          </p:cNvSpPr>
+          <p:nvPr>
+            <p:ph type="sldNum" sz="quarter" idx="10"/>
+          </p:nvPr>
+        </p:nvSpPr>
+        <p:spPr/>
+        <p:txBody>
+          <a:bodyPr/>
+          <a:lstStyle/>
+          <a:p>
+            <a:fld id="{802DA432-7CF7-4A2F-BE93-45834DC6981A}" type="slidenum">
+              <a:rPr lang="tr-TR" smtClean="0"/>
+              <a:pPr/>
+              <a:t>30</a:t>
+            </a:fld>
+            <a:endParaRPr lang="tr-TR"/>
+          </a:p>
+        </p:txBody>
+      </p:sp>
+    </p:spTree>
+    <p:extLst>
+      <p:ext uri="{BB962C8B-B14F-4D97-AF65-F5344CB8AC3E}">
+        <p14:creationId xmlns:p14="http://schemas.microsoft.com/office/powerpoint/2010/main" val="605137192"/>
       </p:ext>
     </p:extLst>
   </p:cSld>
@@ -3263,7 +3435,7 @@
             <a:fld id="{DC9C75F7-98FD-4D05-8C3F-C506B544AE03}" type="datetimeFigureOut">
               <a:rPr lang="tr-TR" smtClean="0"/>
               <a:pPr/>
-              <a:t>9.04.2017</a:t>
+              <a:t>10.04.2017</a:t>
             </a:fld>
             <a:endParaRPr lang="tr-TR"/>
           </a:p>
@@ -3447,7 +3619,7 @@
             <a:fld id="{DC9C75F7-98FD-4D05-8C3F-C506B544AE03}" type="datetimeFigureOut">
               <a:rPr lang="tr-TR" smtClean="0"/>
               <a:pPr/>
-              <a:t>9.04.2017</a:t>
+              <a:t>10.04.2017</a:t>
             </a:fld>
             <a:endParaRPr lang="tr-TR"/>
           </a:p>
@@ -3641,7 +3813,7 @@
             <a:fld id="{DC9C75F7-98FD-4D05-8C3F-C506B544AE03}" type="datetimeFigureOut">
               <a:rPr lang="tr-TR" smtClean="0"/>
               <a:pPr/>
-              <a:t>9.04.2017</a:t>
+              <a:t>10.04.2017</a:t>
             </a:fld>
             <a:endParaRPr lang="tr-TR"/>
           </a:p>
@@ -3825,7 +3997,7 @@
             <a:fld id="{DC9C75F7-98FD-4D05-8C3F-C506B544AE03}" type="datetimeFigureOut">
               <a:rPr lang="tr-TR" smtClean="0"/>
               <a:pPr/>
-              <a:t>9.04.2017</a:t>
+              <a:t>10.04.2017</a:t>
             </a:fld>
             <a:endParaRPr lang="tr-TR"/>
           </a:p>
@@ -4085,7 +4257,7 @@
             <a:fld id="{DC9C75F7-98FD-4D05-8C3F-C506B544AE03}" type="datetimeFigureOut">
               <a:rPr lang="tr-TR" smtClean="0"/>
               <a:pPr/>
-              <a:t>9.04.2017</a:t>
+              <a:t>10.04.2017</a:t>
             </a:fld>
             <a:endParaRPr lang="tr-TR"/>
           </a:p>
@@ -4387,7 +4559,7 @@
             <a:fld id="{DC9C75F7-98FD-4D05-8C3F-C506B544AE03}" type="datetimeFigureOut">
               <a:rPr lang="tr-TR" smtClean="0"/>
               <a:pPr/>
-              <a:t>9.04.2017</a:t>
+              <a:t>10.04.2017</a:t>
             </a:fld>
             <a:endParaRPr lang="tr-TR"/>
           </a:p>
@@ -4823,7 +4995,7 @@
             <a:fld id="{DC9C75F7-98FD-4D05-8C3F-C506B544AE03}" type="datetimeFigureOut">
               <a:rPr lang="tr-TR" smtClean="0"/>
               <a:pPr/>
-              <a:t>9.04.2017</a:t>
+              <a:t>10.04.2017</a:t>
             </a:fld>
             <a:endParaRPr lang="tr-TR"/>
           </a:p>
@@ -4955,7 +5127,7 @@
             <a:fld id="{DC9C75F7-98FD-4D05-8C3F-C506B544AE03}" type="datetimeFigureOut">
               <a:rPr lang="tr-TR" smtClean="0"/>
               <a:pPr/>
-              <a:t>9.04.2017</a:t>
+              <a:t>10.04.2017</a:t>
             </a:fld>
             <a:endParaRPr lang="tr-TR"/>
           </a:p>
@@ -5064,7 +5236,7 @@
             <a:fld id="{DC9C75F7-98FD-4D05-8C3F-C506B544AE03}" type="datetimeFigureOut">
               <a:rPr lang="tr-TR" smtClean="0"/>
               <a:pPr/>
-              <a:t>9.04.2017</a:t>
+              <a:t>10.04.2017</a:t>
             </a:fld>
             <a:endParaRPr lang="tr-TR"/>
           </a:p>
@@ -5355,7 +5527,7 @@
             <a:fld id="{DC9C75F7-98FD-4D05-8C3F-C506B544AE03}" type="datetimeFigureOut">
               <a:rPr lang="tr-TR" smtClean="0"/>
               <a:pPr/>
-              <a:t>9.04.2017</a:t>
+              <a:t>10.04.2017</a:t>
             </a:fld>
             <a:endParaRPr lang="tr-TR"/>
           </a:p>
@@ -5622,7 +5794,7 @@
             <a:fld id="{DC9C75F7-98FD-4D05-8C3F-C506B544AE03}" type="datetimeFigureOut">
               <a:rPr lang="tr-TR" smtClean="0"/>
               <a:pPr/>
-              <a:t>9.04.2017</a:t>
+              <a:t>10.04.2017</a:t>
             </a:fld>
             <a:endParaRPr lang="tr-TR"/>
           </a:p>
@@ -5858,7 +6030,7 @@
             <a:fld id="{DC9C75F7-98FD-4D05-8C3F-C506B544AE03}" type="datetimeFigureOut">
               <a:rPr lang="tr-TR" smtClean="0"/>
               <a:pPr/>
-              <a:t>9.04.2017</a:t>
+              <a:t>10.04.2017</a:t>
             </a:fld>
             <a:endParaRPr lang="tr-TR"/>
           </a:p>
@@ -16800,7 +16972,7 @@
         <p:spPr>
           <a:xfrm>
             <a:off x="1677987" y="2571730"/>
-            <a:ext cx="3768339" cy="584775"/>
+            <a:ext cx="4220964" cy="646331"/>
           </a:xfrm>
           <a:prstGeom prst="rect">
             <a:avLst/>
@@ -16814,7 +16986,7 @@
           <a:lstStyle/>
           <a:p>
             <a:r>
-              <a:rPr lang="sr-Latn-RS" b="1" dirty="0"/>
+              <a:rPr lang="sr-Latn-RS" sz="3600" b="1" dirty="0"/>
               <a:t>Constructor injection</a:t>
             </a:r>
           </a:p>
@@ -16929,6 +17101,249 @@
       </p:transition>
     </mc:Fallback>
   </mc:AlternateContent>
+  <p:timing>
+    <p:tnLst>
+      <p:par>
+        <p:cTn id="1" dur="indefinite" restart="never" nodeType="tmRoot">
+          <p:childTnLst>
+            <p:seq concurrent="1" nextAc="seek">
+              <p:cTn id="2" dur="indefinite" nodeType="mainSeq">
+                <p:childTnLst>
+                  <p:par>
+                    <p:cTn id="3" fill="hold">
+                      <p:stCondLst>
+                        <p:cond delay="indefinite"/>
+                        <p:cond evt="onBegin" delay="0">
+                          <p:tn val="2"/>
+                        </p:cond>
+                      </p:stCondLst>
+                      <p:childTnLst>
+                        <p:par>
+                          <p:cTn id="4" fill="hold">
+                            <p:stCondLst>
+                              <p:cond delay="0"/>
+                            </p:stCondLst>
+                            <p:childTnLst>
+                              <p:par>
+                                <p:cTn id="5" presetID="1" presetClass="entr" presetSubtype="0" fill="hold" grpId="0" nodeType="withEffect">
+                                  <p:stCondLst>
+                                    <p:cond delay="0"/>
+                                  </p:stCondLst>
+                                  <p:childTnLst>
+                                    <p:set>
+                                      <p:cBhvr>
+                                        <p:cTn id="6" dur="1" fill="hold">
+                                          <p:stCondLst>
+                                            <p:cond delay="0"/>
+                                          </p:stCondLst>
+                                        </p:cTn>
+                                        <p:tgtEl>
+                                          <p:spTgt spid="10"/>
+                                        </p:tgtEl>
+                                        <p:attrNameLst>
+                                          <p:attrName>style.visibility</p:attrName>
+                                        </p:attrNameLst>
+                                      </p:cBhvr>
+                                      <p:to>
+                                        <p:strVal val="visible"/>
+                                      </p:to>
+                                    </p:set>
+                                  </p:childTnLst>
+                                </p:cTn>
+                              </p:par>
+                            </p:childTnLst>
+                          </p:cTn>
+                        </p:par>
+                      </p:childTnLst>
+                    </p:cTn>
+                  </p:par>
+                  <p:par>
+                    <p:cTn id="7" fill="hold">
+                      <p:stCondLst>
+                        <p:cond delay="indefinite"/>
+                      </p:stCondLst>
+                      <p:childTnLst>
+                        <p:par>
+                          <p:cTn id="8" fill="hold">
+                            <p:stCondLst>
+                              <p:cond delay="0"/>
+                            </p:stCondLst>
+                            <p:childTnLst>
+                              <p:par>
+                                <p:cTn id="9" presetID="10" presetClass="entr" presetSubtype="0" fill="hold" grpId="0" nodeType="clickEffect">
+                                  <p:stCondLst>
+                                    <p:cond delay="0"/>
+                                  </p:stCondLst>
+                                  <p:childTnLst>
+                                    <p:set>
+                                      <p:cBhvr>
+                                        <p:cTn id="10" dur="1" fill="hold">
+                                          <p:stCondLst>
+                                            <p:cond delay="0"/>
+                                          </p:stCondLst>
+                                        </p:cTn>
+                                        <p:tgtEl>
+                                          <p:spTgt spid="11"/>
+                                        </p:tgtEl>
+                                        <p:attrNameLst>
+                                          <p:attrName>style.visibility</p:attrName>
+                                        </p:attrNameLst>
+                                      </p:cBhvr>
+                                      <p:to>
+                                        <p:strVal val="visible"/>
+                                      </p:to>
+                                    </p:set>
+                                    <p:animEffect transition="in" filter="fade">
+                                      <p:cBhvr>
+                                        <p:cTn id="11" dur="500"/>
+                                        <p:tgtEl>
+                                          <p:spTgt spid="11"/>
+                                        </p:tgtEl>
+                                      </p:cBhvr>
+                                    </p:animEffect>
+                                  </p:childTnLst>
+                                </p:cTn>
+                              </p:par>
+                            </p:childTnLst>
+                          </p:cTn>
+                        </p:par>
+                      </p:childTnLst>
+                    </p:cTn>
+                  </p:par>
+                  <p:par>
+                    <p:cTn id="12" fill="hold">
+                      <p:stCondLst>
+                        <p:cond delay="indefinite"/>
+                      </p:stCondLst>
+                      <p:childTnLst>
+                        <p:par>
+                          <p:cTn id="13" fill="hold">
+                            <p:stCondLst>
+                              <p:cond delay="0"/>
+                            </p:stCondLst>
+                            <p:childTnLst>
+                              <p:par>
+                                <p:cTn id="14" presetID="10" presetClass="entr" presetSubtype="0" fill="hold" grpId="0" nodeType="clickEffect">
+                                  <p:stCondLst>
+                                    <p:cond delay="0"/>
+                                  </p:stCondLst>
+                                  <p:childTnLst>
+                                    <p:set>
+                                      <p:cBhvr>
+                                        <p:cTn id="15" dur="1" fill="hold">
+                                          <p:stCondLst>
+                                            <p:cond delay="0"/>
+                                          </p:stCondLst>
+                                        </p:cTn>
+                                        <p:tgtEl>
+                                          <p:spTgt spid="13"/>
+                                        </p:tgtEl>
+                                        <p:attrNameLst>
+                                          <p:attrName>style.visibility</p:attrName>
+                                        </p:attrNameLst>
+                                      </p:cBhvr>
+                                      <p:to>
+                                        <p:strVal val="visible"/>
+                                      </p:to>
+                                    </p:set>
+                                    <p:animEffect transition="in" filter="fade">
+                                      <p:cBhvr>
+                                        <p:cTn id="16" dur="500"/>
+                                        <p:tgtEl>
+                                          <p:spTgt spid="13"/>
+                                        </p:tgtEl>
+                                      </p:cBhvr>
+                                    </p:animEffect>
+                                  </p:childTnLst>
+                                </p:cTn>
+                              </p:par>
+                            </p:childTnLst>
+                          </p:cTn>
+                        </p:par>
+                      </p:childTnLst>
+                    </p:cTn>
+                  </p:par>
+                  <p:par>
+                    <p:cTn id="17" fill="hold">
+                      <p:stCondLst>
+                        <p:cond delay="indefinite"/>
+                      </p:stCondLst>
+                      <p:childTnLst>
+                        <p:par>
+                          <p:cTn id="18" fill="hold">
+                            <p:stCondLst>
+                              <p:cond delay="0"/>
+                            </p:stCondLst>
+                            <p:childTnLst>
+                              <p:par>
+                                <p:cTn id="19" presetID="10" presetClass="entr" presetSubtype="0" fill="hold" grpId="0" nodeType="clickEffect">
+                                  <p:stCondLst>
+                                    <p:cond delay="0"/>
+                                  </p:stCondLst>
+                                  <p:childTnLst>
+                                    <p:set>
+                                      <p:cBhvr>
+                                        <p:cTn id="20" dur="1" fill="hold">
+                                          <p:stCondLst>
+                                            <p:cond delay="0"/>
+                                          </p:stCondLst>
+                                        </p:cTn>
+                                        <p:tgtEl>
+                                          <p:spTgt spid="14"/>
+                                        </p:tgtEl>
+                                        <p:attrNameLst>
+                                          <p:attrName>style.visibility</p:attrName>
+                                        </p:attrNameLst>
+                                      </p:cBhvr>
+                                      <p:to>
+                                        <p:strVal val="visible"/>
+                                      </p:to>
+                                    </p:set>
+                                    <p:animEffect transition="in" filter="fade">
+                                      <p:cBhvr>
+                                        <p:cTn id="21" dur="500"/>
+                                        <p:tgtEl>
+                                          <p:spTgt spid="14"/>
+                                        </p:tgtEl>
+                                      </p:cBhvr>
+                                    </p:animEffect>
+                                  </p:childTnLst>
+                                </p:cTn>
+                              </p:par>
+                            </p:childTnLst>
+                          </p:cTn>
+                        </p:par>
+                      </p:childTnLst>
+                    </p:cTn>
+                  </p:par>
+                </p:childTnLst>
+              </p:cTn>
+              <p:prevCondLst>
+                <p:cond evt="onPrev" delay="0">
+                  <p:tgtEl>
+                    <p:sldTgt/>
+                  </p:tgtEl>
+                </p:cond>
+              </p:prevCondLst>
+              <p:nextCondLst>
+                <p:cond evt="onNext" delay="0">
+                  <p:tgtEl>
+                    <p:sldTgt/>
+                  </p:tgtEl>
+                </p:cond>
+              </p:nextCondLst>
+            </p:seq>
+          </p:childTnLst>
+        </p:cTn>
+      </p:par>
+    </p:tnLst>
+    <p:bldLst>
+      <p:bldP spid="10" grpId="0"/>
+      <p:bldP spid="11" grpId="0"/>
+      <p:bldP spid="13" grpId="0"/>
+      <p:bldP spid="14" grpId="0"/>
+    </p:bldLst>
+  </p:timing>
 </p:sld>
 </file>
 
@@ -17059,7 +17474,7 @@
         <p:spPr>
           <a:xfrm>
             <a:off x="1677987" y="2571730"/>
-            <a:ext cx="3254224" cy="584775"/>
+            <a:ext cx="3641510" cy="646331"/>
           </a:xfrm>
           <a:prstGeom prst="rect">
             <a:avLst/>
@@ -17073,7 +17488,7 @@
           <a:lstStyle/>
           <a:p>
             <a:r>
-              <a:rPr lang="sr-Latn-RS" b="1" dirty="0"/>
+              <a:rPr lang="sr-Latn-RS" sz="3600" b="1" dirty="0"/>
               <a:t>Property injection</a:t>
             </a:r>
           </a:p>
@@ -17102,9 +17517,13 @@
           <a:p>
             <a:r>
               <a:rPr lang="en-US" i="1" dirty="0"/>
-              <a:t>guarantee that a necessary Dependency is always available </a:t>
-            </a:r>
-            <a:endParaRPr lang="sr-Latn-RS" dirty="0"/>
+              <a:t>enable DI as an option in a class when we have a good </a:t>
+            </a:r>
+            <a:r>
+              <a:rPr lang="en-US" b="1" i="1" dirty="0"/>
+              <a:t>Local Default</a:t>
+            </a:r>
+            <a:endParaRPr lang="sr-Latn-RS" b="1" dirty="0"/>
           </a:p>
         </p:txBody>
       </p:sp>
@@ -17116,7 +17535,7 @@
         </p:nvSpPr>
         <p:spPr>
           <a:xfrm>
-            <a:off x="1677987" y="4132346"/>
+            <a:off x="1661728" y="5596283"/>
             <a:ext cx="16306800" cy="584775"/>
           </a:xfrm>
           <a:prstGeom prst="rect">
@@ -17131,9 +17550,8 @@
           <a:p>
             <a:r>
               <a:rPr lang="en-US" i="1" dirty="0"/>
-              <a:t>It clearly documents that the class requires the DEPENDENCIES it requests through its constructor </a:t>
-            </a:r>
-            <a:endParaRPr lang="sr-Latn-RS" i="1" dirty="0"/>
+              <a:t>best used when the DEPENDENCY is optional</a:t>
+            </a:r>
           </a:p>
         </p:txBody>
       </p:sp>
@@ -17145,8 +17563,8 @@
         </p:nvSpPr>
         <p:spPr>
           <a:xfrm>
-            <a:off x="1677987" y="4901617"/>
-            <a:ext cx="16230600" cy="1077218"/>
+            <a:off x="1675381" y="4827012"/>
+            <a:ext cx="16230600" cy="584775"/>
           </a:xfrm>
           <a:prstGeom prst="rect">
             <a:avLst/>
@@ -17159,160 +17577,82 @@
           <a:lstStyle/>
           <a:p>
             <a:r>
-              <a:rPr lang="en-US" i="1" dirty="0"/>
-              <a:t>constrain the design to a single constructor. Overloaded constructors lead to ambiguity: which constructor should a DI CONTAINER use?</a:t>
+              <a:rPr lang="en-US" dirty="0">
+                <a:solidFill>
+                  <a:srgbClr val="C00000"/>
+                </a:solidFill>
+              </a:rPr>
+              <a:t>switch the DEPENDENCY in the middle of the class’s lifetime!</a:t>
             </a:r>
             <a:endParaRPr lang="sr-Latn-RS" i="1" dirty="0"/>
           </a:p>
         </p:txBody>
       </p:sp>
-    </p:spTree>
-    <p:extLst>
-      <p:ext uri="{BB962C8B-B14F-4D97-AF65-F5344CB8AC3E}">
-        <p14:creationId xmlns:p14="http://schemas.microsoft.com/office/powerpoint/2010/main" val="2192471356"/>
-      </p:ext>
-    </p:extLst>
-  </p:cSld>
-  <p:clrMapOvr>
-    <a:masterClrMapping/>
-  </p:clrMapOvr>
-  <mc:AlternateContent xmlns:mc="http://schemas.openxmlformats.org/markup-compatibility/2006" xmlns:p14="http://schemas.microsoft.com/office/powerpoint/2010/main">
-    <mc:Choice Requires="p14">
-      <p:transition spd="med" p14:dur="700">
-        <p:fade/>
-      </p:transition>
-    </mc:Choice>
-    <mc:Fallback xmlns="">
-      <p:transition spd="med">
-        <p:fade/>
-      </p:transition>
-    </mc:Fallback>
-  </mc:AlternateContent>
-</p:sld>
-</file>
-
-<file path=ppt/slides/slide28.xml><?xml version="1.0" encoding="utf-8"?>
-<p:sld xmlns:a="http://schemas.openxmlformats.org/drawingml/2006/main" xmlns:r="http://schemas.openxmlformats.org/officeDocument/2006/relationships" xmlns:p="http://schemas.openxmlformats.org/presentationml/2006/main">
-  <p:cSld>
-    <p:spTree>
-      <p:nvGrpSpPr>
-        <p:cNvPr id="1" name=""/>
-        <p:cNvGrpSpPr/>
-        <p:nvPr/>
-      </p:nvGrpSpPr>
-      <p:grpSpPr>
-        <a:xfrm>
-          <a:off x="0" y="0"/>
-          <a:ext cx="0" cy="0"/>
-          <a:chOff x="0" y="0"/>
-          <a:chExt cx="0" cy="0"/>
-        </a:xfrm>
-      </p:grpSpPr>
-      <p:pic>
-        <p:nvPicPr>
-          <p:cNvPr id="7" name="Picture 6"/>
-          <p:cNvPicPr>
-            <a:picLocks noChangeAspect="1"/>
-          </p:cNvPicPr>
+      <p:sp>
+        <p:nvSpPr>
+          <p:cNvPr id="12" name="Rectangle 11"/>
+          <p:cNvSpPr/>
           <p:nvPr/>
-        </p:nvPicPr>
-        <p:blipFill>
-          <a:blip r:embed="rId3">
-            <a:extLst>
-              <a:ext uri="{28A0092B-C50C-407E-A947-70E740481C1C}">
-                <a14:useLocalDpi xmlns:a14="http://schemas.microsoft.com/office/drawing/2010/main" val="0"/>
-              </a:ext>
-            </a:extLst>
-          </a:blip>
-          <a:stretch>
-            <a:fillRect/>
-          </a:stretch>
-        </p:blipFill>
+        </p:nvSpPr>
         <p:spPr>
-          <a:xfrm rot="5400000">
-            <a:off x="7936677" y="1487905"/>
-            <a:ext cx="2323284" cy="7295336"/>
+          <a:xfrm>
+            <a:off x="1701646" y="4132346"/>
+            <a:ext cx="16306800" cy="584775"/>
           </a:xfrm>
           <a:prstGeom prst="rect">
             <a:avLst/>
           </a:prstGeom>
         </p:spPr>
-      </p:pic>
-      <p:sp>
-        <p:nvSpPr>
-          <p:cNvPr id="16" name="TextBox 15"/>
-          <p:cNvSpPr txBox="1"/>
-          <p:nvPr/>
-        </p:nvSpPr>
-        <p:spPr>
-          <a:xfrm>
-            <a:off x="3754677" y="5528934"/>
-            <a:ext cx="10575486" cy="830997"/>
-          </a:xfrm>
-          <a:prstGeom prst="rect">
-            <a:avLst/>
-          </a:prstGeom>
-          <a:noFill/>
-        </p:spPr>
         <p:txBody>
-          <a:bodyPr wrap="square" rtlCol="0">
+          <a:bodyPr wrap="square">
             <a:spAutoFit/>
           </a:bodyPr>
           <a:lstStyle/>
           <a:p>
-            <a:pPr algn="ctr"/>
-            <a:r>
-              <a:rPr lang="en-US" sz="4800" dirty="0">
-                <a:solidFill>
-                  <a:srgbClr val="545250"/>
-                </a:solidFill>
-                <a:latin typeface="Novecento sans wide Book" pitchFamily="50" charset="-94"/>
-              </a:rPr>
-              <a:t>Thank you for your attention</a:t>
-            </a:r>
-            <a:endParaRPr lang="tr-TR" sz="4800" dirty="0">
-              <a:solidFill>
-                <a:srgbClr val="545250"/>
-              </a:solidFill>
-              <a:latin typeface="Novecento sans wide Book" pitchFamily="50" charset="-94"/>
-            </a:endParaRPr>
+            <a:r>
+              <a:rPr lang="en-US" i="1" dirty="0"/>
+              <a:t>class must expose a public writable property of the DEPENDENCY’s type</a:t>
+            </a:r>
+            <a:endParaRPr lang="sr-Latn-RS" i="1" dirty="0"/>
           </a:p>
         </p:txBody>
       </p:sp>
-      <p:pic>
-        <p:nvPicPr>
-          <p:cNvPr id="6" name="Picture 5"/>
-          <p:cNvPicPr>
-            <a:picLocks noChangeAspect="1"/>
-          </p:cNvPicPr>
+      <p:sp>
+        <p:nvSpPr>
+          <p:cNvPr id="15" name="Rectangle 14"/>
+          <p:cNvSpPr/>
           <p:nvPr/>
-        </p:nvPicPr>
-        <p:blipFill>
-          <a:blip r:embed="rId4" cstate="print">
-            <a:extLst>
-              <a:ext uri="{28A0092B-C50C-407E-A947-70E740481C1C}">
-                <a14:useLocalDpi xmlns:a14="http://schemas.microsoft.com/office/drawing/2010/main" val="0"/>
-              </a:ext>
-            </a:extLst>
-          </a:blip>
-          <a:stretch>
-            <a:fillRect/>
-          </a:stretch>
-        </p:blipFill>
+        </p:nvSpPr>
         <p:spPr>
           <a:xfrm>
-            <a:off x="4116387" y="3416895"/>
-            <a:ext cx="10058400" cy="1422061"/>
+            <a:off x="1643871" y="6365554"/>
+            <a:ext cx="16306800" cy="584775"/>
           </a:xfrm>
           <a:prstGeom prst="rect">
             <a:avLst/>
           </a:prstGeom>
         </p:spPr>
-      </p:pic>
+        <p:txBody>
+          <a:bodyPr wrap="square">
+            <a:spAutoFit/>
+          </a:bodyPr>
+          <a:lstStyle/>
+          <a:p>
+            <a:r>
+              <a:rPr lang="en-US" i="1" dirty="0"/>
+              <a:t>only one among many different ways of applying the </a:t>
+            </a:r>
+            <a:r>
+              <a:rPr lang="en-US" b="1" i="1" dirty="0"/>
+              <a:t>OPEN/CLOSED PRINCIPLE</a:t>
+            </a:r>
+          </a:p>
+        </p:txBody>
+      </p:sp>
     </p:spTree>
     <p:extLst>
       <p:ext uri="{BB962C8B-B14F-4D97-AF65-F5344CB8AC3E}">
-        <p14:creationId xmlns:p14="http://schemas.microsoft.com/office/powerpoint/2010/main" val="1325838218"/>
+        <p14:creationId xmlns:p14="http://schemas.microsoft.com/office/powerpoint/2010/main" val="2192471356"/>
       </p:ext>
     </p:extLst>
   </p:cSld>
@@ -17355,7 +17695,7 @@
                             </p:stCondLst>
                             <p:childTnLst>
                               <p:par>
-                                <p:cTn id="5" presetID="10" presetClass="entr" presetSubtype="0" fill="hold" nodeType="afterEffect">
+                                <p:cTn id="5" presetID="1" presetClass="entr" presetSubtype="0" fill="hold" grpId="0" nodeType="withEffect">
                                   <p:stCondLst>
                                     <p:cond delay="0"/>
                                   </p:stCondLst>
@@ -17368,7 +17708,7 @@
                                           </p:stCondLst>
                                         </p:cTn>
                                         <p:tgtEl>
-                                          <p:spTgt spid="7"/>
+                                          <p:spTgt spid="10"/>
                                         </p:tgtEl>
                                         <p:attrNameLst>
                                           <p:attrName>style.visibility</p:attrName>
@@ -17378,28 +17718,29 @@
                                         <p:strVal val="visible"/>
                                       </p:to>
                                     </p:set>
-                                    <p:animEffect transition="in" filter="fade">
-                                      <p:cBhvr>
-                                        <p:cTn id="7" dur="500"/>
-                                        <p:tgtEl>
-                                          <p:spTgt spid="7"/>
-                                        </p:tgtEl>
-                                      </p:cBhvr>
-                                    </p:animEffect>
                                   </p:childTnLst>
                                 </p:cTn>
                               </p:par>
                             </p:childTnLst>
                           </p:cTn>
                         </p:par>
+                      </p:childTnLst>
+                    </p:cTn>
+                  </p:par>
+                  <p:par>
+                    <p:cTn id="7" fill="hold">
+                      <p:stCondLst>
+                        <p:cond delay="indefinite"/>
+                      </p:stCondLst>
+                      <p:childTnLst>
                         <p:par>
                           <p:cTn id="8" fill="hold">
                             <p:stCondLst>
-                              <p:cond delay="500"/>
+                              <p:cond delay="0"/>
                             </p:stCondLst>
                             <p:childTnLst>
                               <p:par>
-                                <p:cTn id="9" presetID="10" presetClass="entr" presetSubtype="0" fill="hold" grpId="0" nodeType="afterEffect">
+                                <p:cTn id="9" presetID="10" presetClass="entr" presetSubtype="0" fill="hold" grpId="0" nodeType="clickEffect">
                                   <p:stCondLst>
                                     <p:cond delay="0"/>
                                   </p:stCondLst>
@@ -17412,7 +17753,7 @@
                                           </p:stCondLst>
                                         </p:cTn>
                                         <p:tgtEl>
-                                          <p:spTgt spid="16"/>
+                                          <p:spTgt spid="11"/>
                                         </p:tgtEl>
                                         <p:attrNameLst>
                                           <p:attrName>style.visibility</p:attrName>
@@ -17426,7 +17767,219 @@
                                       <p:cBhvr>
                                         <p:cTn id="11" dur="500"/>
                                         <p:tgtEl>
-                                          <p:spTgt spid="16"/>
+                                          <p:spTgt spid="11"/>
+                                        </p:tgtEl>
+                                      </p:cBhvr>
+                                    </p:animEffect>
+                                  </p:childTnLst>
+                                </p:cTn>
+                              </p:par>
+                            </p:childTnLst>
+                          </p:cTn>
+                        </p:par>
+                      </p:childTnLst>
+                    </p:cTn>
+                  </p:par>
+                  <p:par>
+                    <p:cTn id="12" fill="hold">
+                      <p:stCondLst>
+                        <p:cond delay="indefinite"/>
+                      </p:stCondLst>
+                      <p:childTnLst>
+                        <p:par>
+                          <p:cTn id="13" fill="hold">
+                            <p:stCondLst>
+                              <p:cond delay="0"/>
+                            </p:stCondLst>
+                            <p:childTnLst>
+                              <p:par>
+                                <p:cTn id="14" presetID="10" presetClass="entr" presetSubtype="0" fill="hold" grpId="0" nodeType="clickEffect">
+                                  <p:stCondLst>
+                                    <p:cond delay="0"/>
+                                  </p:stCondLst>
+                                  <p:childTnLst>
+                                    <p:set>
+                                      <p:cBhvr>
+                                        <p:cTn id="15" dur="1" fill="hold">
+                                          <p:stCondLst>
+                                            <p:cond delay="0"/>
+                                          </p:stCondLst>
+                                        </p:cTn>
+                                        <p:tgtEl>
+                                          <p:spTgt spid="12"/>
+                                        </p:tgtEl>
+                                        <p:attrNameLst>
+                                          <p:attrName>style.visibility</p:attrName>
+                                        </p:attrNameLst>
+                                      </p:cBhvr>
+                                      <p:to>
+                                        <p:strVal val="visible"/>
+                                      </p:to>
+                                    </p:set>
+                                    <p:animEffect transition="in" filter="fade">
+                                      <p:cBhvr>
+                                        <p:cTn id="16" dur="500"/>
+                                        <p:tgtEl>
+                                          <p:spTgt spid="12"/>
+                                        </p:tgtEl>
+                                      </p:cBhvr>
+                                    </p:animEffect>
+                                  </p:childTnLst>
+                                </p:cTn>
+                              </p:par>
+                            </p:childTnLst>
+                          </p:cTn>
+                        </p:par>
+                      </p:childTnLst>
+                    </p:cTn>
+                  </p:par>
+                  <p:par>
+                    <p:cTn id="17" fill="hold">
+                      <p:stCondLst>
+                        <p:cond delay="indefinite"/>
+                      </p:stCondLst>
+                      <p:childTnLst>
+                        <p:par>
+                          <p:cTn id="18" fill="hold">
+                            <p:stCondLst>
+                              <p:cond delay="0"/>
+                            </p:stCondLst>
+                            <p:childTnLst>
+                              <p:par>
+                                <p:cTn id="19" presetID="10" presetClass="entr" presetSubtype="0" fill="hold" grpId="0" nodeType="clickEffect">
+                                  <p:stCondLst>
+                                    <p:cond delay="0"/>
+                                  </p:stCondLst>
+                                  <p:childTnLst>
+                                    <p:set>
+                                      <p:cBhvr>
+                                        <p:cTn id="20" dur="1" fill="hold">
+                                          <p:stCondLst>
+                                            <p:cond delay="0"/>
+                                          </p:stCondLst>
+                                        </p:cTn>
+                                        <p:tgtEl>
+                                          <p:spTgt spid="14"/>
+                                        </p:tgtEl>
+                                        <p:attrNameLst>
+                                          <p:attrName>style.visibility</p:attrName>
+                                        </p:attrNameLst>
+                                      </p:cBhvr>
+                                      <p:to>
+                                        <p:strVal val="visible"/>
+                                      </p:to>
+                                    </p:set>
+                                    <p:animEffect transition="in" filter="fade">
+                                      <p:cBhvr>
+                                        <p:cTn id="21" dur="500"/>
+                                        <p:tgtEl>
+                                          <p:spTgt spid="14"/>
+                                        </p:tgtEl>
+                                      </p:cBhvr>
+                                    </p:animEffect>
+                                  </p:childTnLst>
+                                </p:cTn>
+                              </p:par>
+                            </p:childTnLst>
+                          </p:cTn>
+                        </p:par>
+                      </p:childTnLst>
+                    </p:cTn>
+                  </p:par>
+                  <p:par>
+                    <p:cTn id="22" fill="hold">
+                      <p:stCondLst>
+                        <p:cond delay="indefinite"/>
+                      </p:stCondLst>
+                      <p:childTnLst>
+                        <p:par>
+                          <p:cTn id="23" fill="hold">
+                            <p:stCondLst>
+                              <p:cond delay="0"/>
+                            </p:stCondLst>
+                            <p:childTnLst>
+                              <p:par>
+                                <p:cTn id="24" presetID="10" presetClass="entr" presetSubtype="0" fill="hold" grpId="0" nodeType="clickEffect">
+                                  <p:stCondLst>
+                                    <p:cond delay="0"/>
+                                  </p:stCondLst>
+                                  <p:childTnLst>
+                                    <p:set>
+                                      <p:cBhvr>
+                                        <p:cTn id="25" dur="1" fill="hold">
+                                          <p:stCondLst>
+                                            <p:cond delay="0"/>
+                                          </p:stCondLst>
+                                        </p:cTn>
+                                        <p:tgtEl>
+                                          <p:spTgt spid="13"/>
+                                        </p:tgtEl>
+                                        <p:attrNameLst>
+                                          <p:attrName>style.visibility</p:attrName>
+                                        </p:attrNameLst>
+                                      </p:cBhvr>
+                                      <p:to>
+                                        <p:strVal val="visible"/>
+                                      </p:to>
+                                    </p:set>
+                                    <p:animEffect transition="in" filter="fade">
+                                      <p:cBhvr>
+                                        <p:cTn id="26" dur="500"/>
+                                        <p:tgtEl>
+                                          <p:spTgt spid="13"/>
+                                        </p:tgtEl>
+                                      </p:cBhvr>
+                                    </p:animEffect>
+                                  </p:childTnLst>
+                                </p:cTn>
+                              </p:par>
+                            </p:childTnLst>
+                          </p:cTn>
+                        </p:par>
+                      </p:childTnLst>
+                    </p:cTn>
+                  </p:par>
+                  <p:par>
+                    <p:cTn id="27" fill="hold">
+                      <p:stCondLst>
+                        <p:cond delay="indefinite"/>
+                      </p:stCondLst>
+                      <p:childTnLst>
+                        <p:par>
+                          <p:cTn id="28" fill="hold">
+                            <p:stCondLst>
+                              <p:cond delay="0"/>
+                            </p:stCondLst>
+                            <p:childTnLst>
+                              <p:par>
+                                <p:cTn id="29" presetID="10" presetClass="entr" presetSubtype="0" fill="hold" grpId="0" nodeType="clickEffect">
+                                  <p:stCondLst>
+                                    <p:cond delay="0"/>
+                                  </p:stCondLst>
+                                  <p:childTnLst>
+                                    <p:set>
+                                      <p:cBhvr>
+                                        <p:cTn id="30" dur="1" fill="hold">
+                                          <p:stCondLst>
+                                            <p:cond delay="0"/>
+                                          </p:stCondLst>
+                                        </p:cTn>
+                                        <p:tgtEl>
+                                          <p:spTgt spid="15"/>
+                                        </p:tgtEl>
+                                        <p:attrNameLst>
+                                          <p:attrName>style.visibility</p:attrName>
+                                        </p:attrNameLst>
+                                      </p:cBhvr>
+                                      <p:to>
+                                        <p:strVal val="visible"/>
+                                      </p:to>
+                                    </p:set>
+                                    <p:animEffect transition="in" filter="fade">
+                                      <p:cBhvr>
+                                        <p:cTn id="31" dur="500"/>
+                                        <p:tgtEl>
+                                          <p:spTgt spid="15"/>
                                         </p:tgtEl>
                                       </p:cBhvr>
                                     </p:animEffect>
@@ -17461,7 +18014,1511 @@
       </p:par>
     </p:tnLst>
     <p:bldLst>
-      <p:bldP spid="16" grpId="0"/>
+      <p:bldP spid="10" grpId="0"/>
+      <p:bldP spid="11" grpId="0"/>
+      <p:bldP spid="13" grpId="0"/>
+      <p:bldP spid="14" grpId="0"/>
+      <p:bldP spid="12" grpId="0"/>
+      <p:bldP spid="15" grpId="0"/>
+    </p:bldLst>
+  </p:timing>
+</p:sld>
+</file>
+
+<file path=ppt/slides/slide28.xml><?xml version="1.0" encoding="utf-8"?>
+<p:sld xmlns:a="http://schemas.openxmlformats.org/drawingml/2006/main" xmlns:r="http://schemas.openxmlformats.org/officeDocument/2006/relationships" xmlns:p="http://schemas.openxmlformats.org/presentationml/2006/main">
+  <p:cSld>
+    <p:spTree>
+      <p:nvGrpSpPr>
+        <p:cNvPr id="1" name=""/>
+        <p:cNvGrpSpPr/>
+        <p:nvPr/>
+      </p:nvGrpSpPr>
+      <p:grpSpPr>
+        <a:xfrm>
+          <a:off x="0" y="0"/>
+          <a:ext cx="0" cy="0"/>
+          <a:chOff x="0" y="0"/>
+          <a:chExt cx="0" cy="0"/>
+        </a:xfrm>
+      </p:grpSpPr>
+      <p:sp>
+        <p:nvSpPr>
+          <p:cNvPr id="16" name="TextBox 15"/>
+          <p:cNvSpPr txBox="1"/>
+          <p:nvPr/>
+        </p:nvSpPr>
+        <p:spPr>
+          <a:xfrm>
+            <a:off x="4969123" y="854313"/>
+            <a:ext cx="8136904" cy="830997"/>
+          </a:xfrm>
+          <a:prstGeom prst="rect">
+            <a:avLst/>
+          </a:prstGeom>
+          <a:noFill/>
+        </p:spPr>
+        <p:txBody>
+          <a:bodyPr wrap="square" rtlCol="0">
+            <a:spAutoFit/>
+          </a:bodyPr>
+          <a:lstStyle/>
+          <a:p>
+            <a:pPr algn="ctr"/>
+            <a:r>
+              <a:rPr lang="sr-Latn-RS" sz="4800" dirty="0">
+                <a:solidFill>
+                  <a:srgbClr val="545250"/>
+                </a:solidFill>
+                <a:latin typeface="Novecento sans wide Book" pitchFamily="50" charset="-94"/>
+              </a:rPr>
+              <a:t>DI Patterns</a:t>
+            </a:r>
+            <a:endParaRPr lang="en-US" sz="4800" dirty="0">
+              <a:solidFill>
+                <a:srgbClr val="545250"/>
+              </a:solidFill>
+              <a:latin typeface="Novecento sans wide Book" pitchFamily="50" charset="-94"/>
+            </a:endParaRPr>
+          </a:p>
+        </p:txBody>
+      </p:sp>
+      <p:pic>
+        <p:nvPicPr>
+          <p:cNvPr id="8" name="Picture 7"/>
+          <p:cNvPicPr>
+            <a:picLocks noChangeAspect="1"/>
+          </p:cNvPicPr>
+          <p:nvPr/>
+        </p:nvPicPr>
+        <p:blipFill>
+          <a:blip r:embed="rId3">
+            <a:extLst>
+              <a:ext uri="{28A0092B-C50C-407E-A947-70E740481C1C}">
+                <a14:useLocalDpi xmlns:a14="http://schemas.microsoft.com/office/drawing/2010/main" val="0"/>
+              </a:ext>
+            </a:extLst>
+          </a:blip>
+          <a:stretch>
+            <a:fillRect/>
+          </a:stretch>
+        </p:blipFill>
+        <p:spPr>
+          <a:xfrm rot="5400000">
+            <a:off x="9100648" y="-2221597"/>
+            <a:ext cx="1168254" cy="9003175"/>
+          </a:xfrm>
+          <a:prstGeom prst="rect">
+            <a:avLst/>
+          </a:prstGeom>
+        </p:spPr>
+      </p:pic>
+      <p:pic>
+        <p:nvPicPr>
+          <p:cNvPr id="7" name="Picture 6"/>
+          <p:cNvPicPr>
+            <a:picLocks noChangeAspect="1"/>
+          </p:cNvPicPr>
+          <p:nvPr/>
+        </p:nvPicPr>
+        <p:blipFill>
+          <a:blip r:embed="rId4" cstate="print">
+            <a:extLst>
+              <a:ext uri="{28A0092B-C50C-407E-A947-70E740481C1C}">
+                <a14:useLocalDpi xmlns:a14="http://schemas.microsoft.com/office/drawing/2010/main" val="0"/>
+              </a:ext>
+            </a:extLst>
+          </a:blip>
+          <a:stretch>
+            <a:fillRect/>
+          </a:stretch>
+        </p:blipFill>
+        <p:spPr>
+          <a:xfrm>
+            <a:off x="13488987" y="9412287"/>
+            <a:ext cx="4572000" cy="646390"/>
+          </a:xfrm>
+          <a:prstGeom prst="rect">
+            <a:avLst/>
+          </a:prstGeom>
+        </p:spPr>
+      </p:pic>
+      <p:sp>
+        <p:nvSpPr>
+          <p:cNvPr id="10" name="TextBox 9"/>
+          <p:cNvSpPr txBox="1"/>
+          <p:nvPr/>
+        </p:nvSpPr>
+        <p:spPr>
+          <a:xfrm>
+            <a:off x="1677987" y="2571730"/>
+            <a:ext cx="3506153" cy="646331"/>
+          </a:xfrm>
+          <a:prstGeom prst="rect">
+            <a:avLst/>
+          </a:prstGeom>
+          <a:noFill/>
+        </p:spPr>
+        <p:txBody>
+          <a:bodyPr wrap="none" rtlCol="0">
+            <a:spAutoFit/>
+          </a:bodyPr>
+          <a:lstStyle/>
+          <a:p>
+            <a:r>
+              <a:rPr lang="en-US" sz="3600" b="1" dirty="0"/>
+              <a:t>Method</a:t>
+            </a:r>
+            <a:r>
+              <a:rPr lang="sr-Latn-RS" sz="3600" b="1" dirty="0"/>
+              <a:t> injection</a:t>
+            </a:r>
+          </a:p>
+        </p:txBody>
+      </p:sp>
+      <p:sp>
+        <p:nvSpPr>
+          <p:cNvPr id="11" name="Rectangle 10"/>
+          <p:cNvSpPr/>
+          <p:nvPr/>
+        </p:nvSpPr>
+        <p:spPr>
+          <a:xfrm>
+            <a:off x="1677987" y="3363075"/>
+            <a:ext cx="16272684" cy="584775"/>
+          </a:xfrm>
+          <a:prstGeom prst="rect">
+            <a:avLst/>
+          </a:prstGeom>
+        </p:spPr>
+        <p:txBody>
+          <a:bodyPr wrap="square">
+            <a:spAutoFit/>
+          </a:bodyPr>
+          <a:lstStyle/>
+          <a:p>
+            <a:r>
+              <a:rPr lang="en-US" i="1" dirty="0"/>
+              <a:t>When a DEPENDENCY can vary with each method call, you can supply it via a method parameter. </a:t>
+            </a:r>
+            <a:endParaRPr lang="sr-Latn-RS" b="1" i="1" dirty="0"/>
+          </a:p>
+        </p:txBody>
+      </p:sp>
+      <p:grpSp>
+        <p:nvGrpSpPr>
+          <p:cNvPr id="25" name="Group 24"/>
+          <p:cNvGrpSpPr/>
+          <p:nvPr/>
+        </p:nvGrpSpPr>
+        <p:grpSpPr>
+          <a:xfrm>
+            <a:off x="4656075" y="4535487"/>
+            <a:ext cx="8763000" cy="3321064"/>
+            <a:chOff x="3506787" y="4338623"/>
+            <a:chExt cx="8763000" cy="3321064"/>
+          </a:xfrm>
+        </p:grpSpPr>
+        <p:sp>
+          <p:nvSpPr>
+            <p:cNvPr id="3" name="Rectangle 2"/>
+            <p:cNvSpPr/>
+            <p:nvPr/>
+          </p:nvSpPr>
+          <p:spPr>
+            <a:xfrm>
+              <a:off x="3506787" y="4478611"/>
+              <a:ext cx="1752600" cy="762000"/>
+            </a:xfrm>
+            <a:prstGeom prst="rect">
+              <a:avLst/>
+            </a:prstGeom>
+          </p:spPr>
+          <p:style>
+            <a:lnRef idx="2">
+              <a:schemeClr val="accent1">
+                <a:shade val="50000"/>
+              </a:schemeClr>
+            </a:lnRef>
+            <a:fillRef idx="1">
+              <a:schemeClr val="accent1"/>
+            </a:fillRef>
+            <a:effectRef idx="0">
+              <a:schemeClr val="accent1"/>
+            </a:effectRef>
+            <a:fontRef idx="minor">
+              <a:schemeClr val="lt1"/>
+            </a:fontRef>
+          </p:style>
+          <p:txBody>
+            <a:bodyPr rtlCol="0" anchor="ctr"/>
+            <a:lstStyle/>
+            <a:p>
+              <a:pPr algn="ctr"/>
+              <a:r>
+                <a:rPr lang="en-US" dirty="0"/>
+                <a:t>Client</a:t>
+              </a:r>
+              <a:endParaRPr lang="sr-Latn-RS" dirty="0"/>
+            </a:p>
+          </p:txBody>
+        </p:sp>
+        <p:sp>
+          <p:nvSpPr>
+            <p:cNvPr id="17" name="Rectangle 16"/>
+            <p:cNvSpPr/>
+            <p:nvPr/>
+          </p:nvSpPr>
+          <p:spPr>
+            <a:xfrm>
+              <a:off x="8231187" y="4478611"/>
+              <a:ext cx="4038600" cy="762000"/>
+            </a:xfrm>
+            <a:prstGeom prst="rect">
+              <a:avLst/>
+            </a:prstGeom>
+          </p:spPr>
+          <p:style>
+            <a:lnRef idx="2">
+              <a:schemeClr val="accent1">
+                <a:shade val="50000"/>
+              </a:schemeClr>
+            </a:lnRef>
+            <a:fillRef idx="1">
+              <a:schemeClr val="accent1"/>
+            </a:fillRef>
+            <a:effectRef idx="0">
+              <a:schemeClr val="accent1"/>
+            </a:effectRef>
+            <a:fontRef idx="minor">
+              <a:schemeClr val="lt1"/>
+            </a:fontRef>
+          </p:style>
+          <p:txBody>
+            <a:bodyPr rtlCol="0" anchor="ctr"/>
+            <a:lstStyle/>
+            <a:p>
+              <a:pPr algn="ctr"/>
+              <a:r>
+                <a:rPr lang="en-US" dirty="0" err="1"/>
+                <a:t>SomeClass</a:t>
+              </a:r>
+              <a:endParaRPr lang="sr-Latn-RS" dirty="0"/>
+            </a:p>
+          </p:txBody>
+        </p:sp>
+        <p:sp>
+          <p:nvSpPr>
+            <p:cNvPr id="18" name="Rectangle 17"/>
+            <p:cNvSpPr/>
+            <p:nvPr/>
+          </p:nvSpPr>
+          <p:spPr>
+            <a:xfrm>
+              <a:off x="8231187" y="5218237"/>
+              <a:ext cx="4038600" cy="762000"/>
+            </a:xfrm>
+            <a:prstGeom prst="rect">
+              <a:avLst/>
+            </a:prstGeom>
+          </p:spPr>
+          <p:style>
+            <a:lnRef idx="2">
+              <a:schemeClr val="accent1">
+                <a:shade val="50000"/>
+              </a:schemeClr>
+            </a:lnRef>
+            <a:fillRef idx="1">
+              <a:schemeClr val="accent1"/>
+            </a:fillRef>
+            <a:effectRef idx="0">
+              <a:schemeClr val="accent1"/>
+            </a:effectRef>
+            <a:fontRef idx="minor">
+              <a:schemeClr val="lt1"/>
+            </a:fontRef>
+          </p:style>
+          <p:txBody>
+            <a:bodyPr rtlCol="0" anchor="ctr"/>
+            <a:lstStyle/>
+            <a:p>
+              <a:pPr algn="ctr"/>
+              <a:r>
+                <a:rPr lang="en-US" sz="3000" dirty="0" err="1"/>
+                <a:t>DoStuff</a:t>
+              </a:r>
+              <a:r>
+                <a:rPr lang="en-US" sz="3000" dirty="0"/>
+                <a:t>(</a:t>
+              </a:r>
+              <a:r>
+                <a:rPr lang="en-US" sz="3000" dirty="0" err="1"/>
+                <a:t>ISomeInterface</a:t>
+              </a:r>
+              <a:r>
+                <a:rPr lang="en-US" sz="3000" dirty="0"/>
+                <a:t>)</a:t>
+              </a:r>
+              <a:endParaRPr lang="sr-Latn-RS" sz="3000" dirty="0"/>
+            </a:p>
+          </p:txBody>
+        </p:sp>
+        <p:cxnSp>
+          <p:nvCxnSpPr>
+            <p:cNvPr id="5" name="Straight Arrow Connector 4"/>
+            <p:cNvCxnSpPr>
+              <a:stCxn id="3" idx="3"/>
+              <a:endCxn id="17" idx="1"/>
+            </p:cNvCxnSpPr>
+            <p:nvPr/>
+          </p:nvCxnSpPr>
+          <p:spPr>
+            <a:xfrm>
+              <a:off x="5259387" y="4859611"/>
+              <a:ext cx="2971800" cy="0"/>
+            </a:xfrm>
+            <a:prstGeom prst="straightConnector1">
+              <a:avLst/>
+            </a:prstGeom>
+            <a:ln w="57150">
+              <a:prstDash val="sysDash"/>
+              <a:tailEnd type="triangle"/>
+            </a:ln>
+          </p:spPr>
+          <p:style>
+            <a:lnRef idx="1">
+              <a:schemeClr val="accent1"/>
+            </a:lnRef>
+            <a:fillRef idx="0">
+              <a:schemeClr val="accent1"/>
+            </a:fillRef>
+            <a:effectRef idx="0">
+              <a:schemeClr val="accent1"/>
+            </a:effectRef>
+            <a:fontRef idx="minor">
+              <a:schemeClr val="tx1"/>
+            </a:fontRef>
+          </p:style>
+        </p:cxnSp>
+        <p:sp>
+          <p:nvSpPr>
+            <p:cNvPr id="6" name="TextBox 5"/>
+            <p:cNvSpPr txBox="1"/>
+            <p:nvPr/>
+          </p:nvSpPr>
+          <p:spPr>
+            <a:xfrm>
+              <a:off x="3887787" y="5980237"/>
+              <a:ext cx="2268826" cy="584775"/>
+            </a:xfrm>
+            <a:prstGeom prst="rect">
+              <a:avLst/>
+            </a:prstGeom>
+            <a:noFill/>
+          </p:spPr>
+          <p:txBody>
+            <a:bodyPr wrap="none" rtlCol="0">
+              <a:spAutoFit/>
+            </a:bodyPr>
+            <a:lstStyle/>
+            <a:p>
+              <a:r>
+                <a:rPr lang="en-US" dirty="0"/>
+                <a:t>Invokes with</a:t>
+              </a:r>
+              <a:endParaRPr lang="sr-Latn-RS" dirty="0"/>
+            </a:p>
+          </p:txBody>
+        </p:sp>
+        <p:sp>
+          <p:nvSpPr>
+            <p:cNvPr id="19" name="Rectangle 18"/>
+            <p:cNvSpPr/>
+            <p:nvPr/>
+          </p:nvSpPr>
+          <p:spPr>
+            <a:xfrm>
+              <a:off x="5868987" y="6897687"/>
+              <a:ext cx="2743200" cy="762000"/>
+            </a:xfrm>
+            <a:prstGeom prst="rect">
+              <a:avLst/>
+            </a:prstGeom>
+            <a:solidFill>
+              <a:schemeClr val="accent1">
+                <a:lumMod val="60000"/>
+                <a:lumOff val="40000"/>
+              </a:schemeClr>
+            </a:solidFill>
+            <a:ln>
+              <a:prstDash val="lgDash"/>
+            </a:ln>
+          </p:spPr>
+          <p:style>
+            <a:lnRef idx="2">
+              <a:schemeClr val="accent1">
+                <a:shade val="50000"/>
+              </a:schemeClr>
+            </a:lnRef>
+            <a:fillRef idx="1">
+              <a:schemeClr val="accent1"/>
+            </a:fillRef>
+            <a:effectRef idx="0">
+              <a:schemeClr val="accent1"/>
+            </a:effectRef>
+            <a:fontRef idx="minor">
+              <a:schemeClr val="lt1"/>
+            </a:fontRef>
+          </p:style>
+          <p:txBody>
+            <a:bodyPr rtlCol="0" anchor="ctr"/>
+            <a:lstStyle/>
+            <a:p>
+              <a:pPr algn="ctr"/>
+              <a:r>
+                <a:rPr lang="en-US" dirty="0" err="1"/>
+                <a:t>ISomeInterface</a:t>
+              </a:r>
+              <a:endParaRPr lang="sr-Latn-RS" dirty="0"/>
+            </a:p>
+          </p:txBody>
+        </p:sp>
+        <p:cxnSp>
+          <p:nvCxnSpPr>
+            <p:cNvPr id="21" name="Connector: Curved 20"/>
+            <p:cNvCxnSpPr>
+              <a:stCxn id="19" idx="3"/>
+              <a:endCxn id="18" idx="2"/>
+            </p:cNvCxnSpPr>
+            <p:nvPr/>
+          </p:nvCxnSpPr>
+          <p:spPr>
+            <a:xfrm flipV="1">
+              <a:off x="8612187" y="5980237"/>
+              <a:ext cx="1638300" cy="1298450"/>
+            </a:xfrm>
+            <a:prstGeom prst="curvedConnector2">
+              <a:avLst/>
+            </a:prstGeom>
+            <a:ln w="57150">
+              <a:prstDash val="dash"/>
+              <a:tailEnd type="triangle"/>
+            </a:ln>
+          </p:spPr>
+          <p:style>
+            <a:lnRef idx="1">
+              <a:schemeClr val="accent1"/>
+            </a:lnRef>
+            <a:fillRef idx="0">
+              <a:schemeClr val="accent1"/>
+            </a:fillRef>
+            <a:effectRef idx="0">
+              <a:schemeClr val="accent1"/>
+            </a:effectRef>
+            <a:fontRef idx="minor">
+              <a:schemeClr val="tx1"/>
+            </a:fontRef>
+          </p:style>
+        </p:cxnSp>
+        <p:cxnSp>
+          <p:nvCxnSpPr>
+            <p:cNvPr id="23" name="Connector: Curved 22"/>
+            <p:cNvCxnSpPr>
+              <a:stCxn id="3" idx="2"/>
+              <a:endCxn id="19" idx="1"/>
+            </p:cNvCxnSpPr>
+            <p:nvPr/>
+          </p:nvCxnSpPr>
+          <p:spPr>
+            <a:xfrm rot="16200000" flipH="1">
+              <a:off x="4106999" y="5516699"/>
+              <a:ext cx="2038076" cy="1485900"/>
+            </a:xfrm>
+            <a:prstGeom prst="curvedConnector2">
+              <a:avLst/>
+            </a:prstGeom>
+            <a:ln w="57150">
+              <a:prstDash val="dash"/>
+              <a:tailEnd type="triangle"/>
+            </a:ln>
+          </p:spPr>
+          <p:style>
+            <a:lnRef idx="1">
+              <a:schemeClr val="accent1"/>
+            </a:lnRef>
+            <a:fillRef idx="0">
+              <a:schemeClr val="accent1"/>
+            </a:fillRef>
+            <a:effectRef idx="0">
+              <a:schemeClr val="accent1"/>
+            </a:effectRef>
+            <a:fontRef idx="minor">
+              <a:schemeClr val="tx1"/>
+            </a:fontRef>
+          </p:style>
+        </p:cxnSp>
+        <p:sp>
+          <p:nvSpPr>
+            <p:cNvPr id="24" name="TextBox 23"/>
+            <p:cNvSpPr txBox="1"/>
+            <p:nvPr/>
+          </p:nvSpPr>
+          <p:spPr>
+            <a:xfrm>
+              <a:off x="6021387" y="4338623"/>
+              <a:ext cx="1435842" cy="584775"/>
+            </a:xfrm>
+            <a:prstGeom prst="rect">
+              <a:avLst/>
+            </a:prstGeom>
+            <a:noFill/>
+          </p:spPr>
+          <p:txBody>
+            <a:bodyPr wrap="none" rtlCol="0">
+              <a:spAutoFit/>
+            </a:bodyPr>
+            <a:lstStyle/>
+            <a:p>
+              <a:r>
+                <a:rPr lang="en-US" dirty="0"/>
+                <a:t>Creates</a:t>
+              </a:r>
+              <a:endParaRPr lang="sr-Latn-RS" dirty="0"/>
+            </a:p>
+          </p:txBody>
+        </p:sp>
+      </p:grpSp>
+      <p:sp>
+        <p:nvSpPr>
+          <p:cNvPr id="26" name="Rectangle 25"/>
+          <p:cNvSpPr/>
+          <p:nvPr/>
+        </p:nvSpPr>
+        <p:spPr>
+          <a:xfrm>
+            <a:off x="1754187" y="8303788"/>
+            <a:ext cx="16272684" cy="1077218"/>
+          </a:xfrm>
+          <a:prstGeom prst="rect">
+            <a:avLst/>
+          </a:prstGeom>
+        </p:spPr>
+        <p:txBody>
+          <a:bodyPr wrap="square">
+            <a:spAutoFit/>
+          </a:bodyPr>
+          <a:lstStyle/>
+          <a:p>
+            <a:r>
+              <a:rPr lang="en-US" i="1" dirty="0"/>
+              <a:t>when the caller wishes to provide the consumer with information about the context in which the operation is being invoked</a:t>
+            </a:r>
+            <a:endParaRPr lang="sr-Latn-RS" b="1" i="1" dirty="0"/>
+          </a:p>
+        </p:txBody>
+      </p:sp>
+    </p:spTree>
+    <p:extLst>
+      <p:ext uri="{BB962C8B-B14F-4D97-AF65-F5344CB8AC3E}">
+        <p14:creationId xmlns:p14="http://schemas.microsoft.com/office/powerpoint/2010/main" val="730185293"/>
+      </p:ext>
+    </p:extLst>
+  </p:cSld>
+  <p:clrMapOvr>
+    <a:masterClrMapping/>
+  </p:clrMapOvr>
+  <mc:AlternateContent xmlns:mc="http://schemas.openxmlformats.org/markup-compatibility/2006" xmlns:p14="http://schemas.microsoft.com/office/powerpoint/2010/main">
+    <mc:Choice Requires="p14">
+      <p:transition spd="med" p14:dur="700">
+        <p:fade/>
+      </p:transition>
+    </mc:Choice>
+    <mc:Fallback xmlns="">
+      <p:transition spd="med">
+        <p:fade/>
+      </p:transition>
+    </mc:Fallback>
+  </mc:AlternateContent>
+  <p:timing>
+    <p:tnLst>
+      <p:par>
+        <p:cTn id="1" dur="indefinite" restart="never" nodeType="tmRoot">
+          <p:childTnLst>
+            <p:seq concurrent="1" nextAc="seek">
+              <p:cTn id="2" dur="indefinite" nodeType="mainSeq">
+                <p:childTnLst>
+                  <p:par>
+                    <p:cTn id="3" fill="hold">
+                      <p:stCondLst>
+                        <p:cond delay="indefinite"/>
+                        <p:cond evt="onBegin" delay="0">
+                          <p:tn val="2"/>
+                        </p:cond>
+                      </p:stCondLst>
+                      <p:childTnLst>
+                        <p:par>
+                          <p:cTn id="4" fill="hold">
+                            <p:stCondLst>
+                              <p:cond delay="0"/>
+                            </p:stCondLst>
+                            <p:childTnLst>
+                              <p:par>
+                                <p:cTn id="5" presetID="1" presetClass="entr" presetSubtype="0" fill="hold" grpId="0" nodeType="withEffect">
+                                  <p:stCondLst>
+                                    <p:cond delay="0"/>
+                                  </p:stCondLst>
+                                  <p:childTnLst>
+                                    <p:set>
+                                      <p:cBhvr>
+                                        <p:cTn id="6" dur="1" fill="hold">
+                                          <p:stCondLst>
+                                            <p:cond delay="0"/>
+                                          </p:stCondLst>
+                                        </p:cTn>
+                                        <p:tgtEl>
+                                          <p:spTgt spid="10"/>
+                                        </p:tgtEl>
+                                        <p:attrNameLst>
+                                          <p:attrName>style.visibility</p:attrName>
+                                        </p:attrNameLst>
+                                      </p:cBhvr>
+                                      <p:to>
+                                        <p:strVal val="visible"/>
+                                      </p:to>
+                                    </p:set>
+                                  </p:childTnLst>
+                                </p:cTn>
+                              </p:par>
+                            </p:childTnLst>
+                          </p:cTn>
+                        </p:par>
+                      </p:childTnLst>
+                    </p:cTn>
+                  </p:par>
+                  <p:par>
+                    <p:cTn id="7" fill="hold">
+                      <p:stCondLst>
+                        <p:cond delay="indefinite"/>
+                      </p:stCondLst>
+                      <p:childTnLst>
+                        <p:par>
+                          <p:cTn id="8" fill="hold">
+                            <p:stCondLst>
+                              <p:cond delay="0"/>
+                            </p:stCondLst>
+                            <p:childTnLst>
+                              <p:par>
+                                <p:cTn id="9" presetID="10" presetClass="entr" presetSubtype="0" fill="hold" grpId="0" nodeType="clickEffect">
+                                  <p:stCondLst>
+                                    <p:cond delay="0"/>
+                                  </p:stCondLst>
+                                  <p:childTnLst>
+                                    <p:set>
+                                      <p:cBhvr>
+                                        <p:cTn id="10" dur="1" fill="hold">
+                                          <p:stCondLst>
+                                            <p:cond delay="0"/>
+                                          </p:stCondLst>
+                                        </p:cTn>
+                                        <p:tgtEl>
+                                          <p:spTgt spid="11"/>
+                                        </p:tgtEl>
+                                        <p:attrNameLst>
+                                          <p:attrName>style.visibility</p:attrName>
+                                        </p:attrNameLst>
+                                      </p:cBhvr>
+                                      <p:to>
+                                        <p:strVal val="visible"/>
+                                      </p:to>
+                                    </p:set>
+                                    <p:animEffect transition="in" filter="fade">
+                                      <p:cBhvr>
+                                        <p:cTn id="11" dur="500"/>
+                                        <p:tgtEl>
+                                          <p:spTgt spid="11"/>
+                                        </p:tgtEl>
+                                      </p:cBhvr>
+                                    </p:animEffect>
+                                  </p:childTnLst>
+                                </p:cTn>
+                              </p:par>
+                            </p:childTnLst>
+                          </p:cTn>
+                        </p:par>
+                      </p:childTnLst>
+                    </p:cTn>
+                  </p:par>
+                  <p:par>
+                    <p:cTn id="12" fill="hold">
+                      <p:stCondLst>
+                        <p:cond delay="indefinite"/>
+                      </p:stCondLst>
+                      <p:childTnLst>
+                        <p:par>
+                          <p:cTn id="13" fill="hold">
+                            <p:stCondLst>
+                              <p:cond delay="0"/>
+                            </p:stCondLst>
+                            <p:childTnLst>
+                              <p:par>
+                                <p:cTn id="14" presetID="42" presetClass="entr" presetSubtype="0" fill="hold" nodeType="clickEffect">
+                                  <p:stCondLst>
+                                    <p:cond delay="0"/>
+                                  </p:stCondLst>
+                                  <p:childTnLst>
+                                    <p:set>
+                                      <p:cBhvr>
+                                        <p:cTn id="15" dur="1" fill="hold">
+                                          <p:stCondLst>
+                                            <p:cond delay="0"/>
+                                          </p:stCondLst>
+                                        </p:cTn>
+                                        <p:tgtEl>
+                                          <p:spTgt spid="25"/>
+                                        </p:tgtEl>
+                                        <p:attrNameLst>
+                                          <p:attrName>style.visibility</p:attrName>
+                                        </p:attrNameLst>
+                                      </p:cBhvr>
+                                      <p:to>
+                                        <p:strVal val="visible"/>
+                                      </p:to>
+                                    </p:set>
+                                    <p:animEffect transition="in" filter="fade">
+                                      <p:cBhvr>
+                                        <p:cTn id="16" dur="1000"/>
+                                        <p:tgtEl>
+                                          <p:spTgt spid="25"/>
+                                        </p:tgtEl>
+                                      </p:cBhvr>
+                                    </p:animEffect>
+                                    <p:anim calcmode="lin" valueType="num">
+                                      <p:cBhvr>
+                                        <p:cTn id="17" dur="1000" fill="hold"/>
+                                        <p:tgtEl>
+                                          <p:spTgt spid="25"/>
+                                        </p:tgtEl>
+                                        <p:attrNameLst>
+                                          <p:attrName>ppt_x</p:attrName>
+                                        </p:attrNameLst>
+                                      </p:cBhvr>
+                                      <p:tavLst>
+                                        <p:tav tm="0">
+                                          <p:val>
+                                            <p:strVal val="#ppt_x"/>
+                                          </p:val>
+                                        </p:tav>
+                                        <p:tav tm="100000">
+                                          <p:val>
+                                            <p:strVal val="#ppt_x"/>
+                                          </p:val>
+                                        </p:tav>
+                                      </p:tavLst>
+                                    </p:anim>
+                                    <p:anim calcmode="lin" valueType="num">
+                                      <p:cBhvr>
+                                        <p:cTn id="18" dur="1000" fill="hold"/>
+                                        <p:tgtEl>
+                                          <p:spTgt spid="25"/>
+                                        </p:tgtEl>
+                                        <p:attrNameLst>
+                                          <p:attrName>ppt_y</p:attrName>
+                                        </p:attrNameLst>
+                                      </p:cBhvr>
+                                      <p:tavLst>
+                                        <p:tav tm="0">
+                                          <p:val>
+                                            <p:strVal val="#ppt_y+.1"/>
+                                          </p:val>
+                                        </p:tav>
+                                        <p:tav tm="100000">
+                                          <p:val>
+                                            <p:strVal val="#ppt_y"/>
+                                          </p:val>
+                                        </p:tav>
+                                      </p:tavLst>
+                                    </p:anim>
+                                  </p:childTnLst>
+                                </p:cTn>
+                              </p:par>
+                            </p:childTnLst>
+                          </p:cTn>
+                        </p:par>
+                      </p:childTnLst>
+                    </p:cTn>
+                  </p:par>
+                  <p:par>
+                    <p:cTn id="19" fill="hold">
+                      <p:stCondLst>
+                        <p:cond delay="indefinite"/>
+                      </p:stCondLst>
+                      <p:childTnLst>
+                        <p:par>
+                          <p:cTn id="20" fill="hold">
+                            <p:stCondLst>
+                              <p:cond delay="0"/>
+                            </p:stCondLst>
+                            <p:childTnLst>
+                              <p:par>
+                                <p:cTn id="21" presetID="10" presetClass="entr" presetSubtype="0" fill="hold" grpId="0" nodeType="clickEffect">
+                                  <p:stCondLst>
+                                    <p:cond delay="0"/>
+                                  </p:stCondLst>
+                                  <p:childTnLst>
+                                    <p:set>
+                                      <p:cBhvr>
+                                        <p:cTn id="22" dur="1" fill="hold">
+                                          <p:stCondLst>
+                                            <p:cond delay="0"/>
+                                          </p:stCondLst>
+                                        </p:cTn>
+                                        <p:tgtEl>
+                                          <p:spTgt spid="26"/>
+                                        </p:tgtEl>
+                                        <p:attrNameLst>
+                                          <p:attrName>style.visibility</p:attrName>
+                                        </p:attrNameLst>
+                                      </p:cBhvr>
+                                      <p:to>
+                                        <p:strVal val="visible"/>
+                                      </p:to>
+                                    </p:set>
+                                    <p:animEffect transition="in" filter="fade">
+                                      <p:cBhvr>
+                                        <p:cTn id="23" dur="500"/>
+                                        <p:tgtEl>
+                                          <p:spTgt spid="26"/>
+                                        </p:tgtEl>
+                                      </p:cBhvr>
+                                    </p:animEffect>
+                                  </p:childTnLst>
+                                </p:cTn>
+                              </p:par>
+                            </p:childTnLst>
+                          </p:cTn>
+                        </p:par>
+                      </p:childTnLst>
+                    </p:cTn>
+                  </p:par>
+                </p:childTnLst>
+              </p:cTn>
+              <p:prevCondLst>
+                <p:cond evt="onPrev" delay="0">
+                  <p:tgtEl>
+                    <p:sldTgt/>
+                  </p:tgtEl>
+                </p:cond>
+              </p:prevCondLst>
+              <p:nextCondLst>
+                <p:cond evt="onNext" delay="0">
+                  <p:tgtEl>
+                    <p:sldTgt/>
+                  </p:tgtEl>
+                </p:cond>
+              </p:nextCondLst>
+            </p:seq>
+          </p:childTnLst>
+        </p:cTn>
+      </p:par>
+    </p:tnLst>
+    <p:bldLst>
+      <p:bldP spid="10" grpId="0"/>
+      <p:bldP spid="11" grpId="0"/>
+      <p:bldP spid="26" grpId="0"/>
+    </p:bldLst>
+  </p:timing>
+</p:sld>
+</file>
+
+<file path=ppt/slides/slide29.xml><?xml version="1.0" encoding="utf-8"?>
+<p:sld xmlns:a="http://schemas.openxmlformats.org/drawingml/2006/main" xmlns:r="http://schemas.openxmlformats.org/officeDocument/2006/relationships" xmlns:p="http://schemas.openxmlformats.org/presentationml/2006/main">
+  <p:cSld>
+    <p:spTree>
+      <p:nvGrpSpPr>
+        <p:cNvPr id="1" name=""/>
+        <p:cNvGrpSpPr/>
+        <p:nvPr/>
+      </p:nvGrpSpPr>
+      <p:grpSpPr>
+        <a:xfrm>
+          <a:off x="0" y="0"/>
+          <a:ext cx="0" cy="0"/>
+          <a:chOff x="0" y="0"/>
+          <a:chExt cx="0" cy="0"/>
+        </a:xfrm>
+      </p:grpSpPr>
+      <p:sp>
+        <p:nvSpPr>
+          <p:cNvPr id="16" name="TextBox 15"/>
+          <p:cNvSpPr txBox="1"/>
+          <p:nvPr/>
+        </p:nvSpPr>
+        <p:spPr>
+          <a:xfrm>
+            <a:off x="4969123" y="854313"/>
+            <a:ext cx="8136904" cy="830997"/>
+          </a:xfrm>
+          <a:prstGeom prst="rect">
+            <a:avLst/>
+          </a:prstGeom>
+          <a:noFill/>
+        </p:spPr>
+        <p:txBody>
+          <a:bodyPr wrap="square" rtlCol="0">
+            <a:spAutoFit/>
+          </a:bodyPr>
+          <a:lstStyle/>
+          <a:p>
+            <a:pPr algn="ctr"/>
+            <a:r>
+              <a:rPr lang="sr-Latn-RS" sz="4800" dirty="0">
+                <a:solidFill>
+                  <a:srgbClr val="545250"/>
+                </a:solidFill>
+                <a:latin typeface="Novecento sans wide Book" pitchFamily="50" charset="-94"/>
+              </a:rPr>
+              <a:t>DI Patterns</a:t>
+            </a:r>
+            <a:endParaRPr lang="en-US" sz="4800" dirty="0">
+              <a:solidFill>
+                <a:srgbClr val="545250"/>
+              </a:solidFill>
+              <a:latin typeface="Novecento sans wide Book" pitchFamily="50" charset="-94"/>
+            </a:endParaRPr>
+          </a:p>
+        </p:txBody>
+      </p:sp>
+      <p:pic>
+        <p:nvPicPr>
+          <p:cNvPr id="8" name="Picture 7"/>
+          <p:cNvPicPr>
+            <a:picLocks noChangeAspect="1"/>
+          </p:cNvPicPr>
+          <p:nvPr/>
+        </p:nvPicPr>
+        <p:blipFill>
+          <a:blip r:embed="rId3">
+            <a:extLst>
+              <a:ext uri="{28A0092B-C50C-407E-A947-70E740481C1C}">
+                <a14:useLocalDpi xmlns:a14="http://schemas.microsoft.com/office/drawing/2010/main" val="0"/>
+              </a:ext>
+            </a:extLst>
+          </a:blip>
+          <a:stretch>
+            <a:fillRect/>
+          </a:stretch>
+        </p:blipFill>
+        <p:spPr>
+          <a:xfrm rot="5400000">
+            <a:off x="9100648" y="-2221597"/>
+            <a:ext cx="1168254" cy="9003175"/>
+          </a:xfrm>
+          <a:prstGeom prst="rect">
+            <a:avLst/>
+          </a:prstGeom>
+        </p:spPr>
+      </p:pic>
+      <p:pic>
+        <p:nvPicPr>
+          <p:cNvPr id="7" name="Picture 6"/>
+          <p:cNvPicPr>
+            <a:picLocks noChangeAspect="1"/>
+          </p:cNvPicPr>
+          <p:nvPr/>
+        </p:nvPicPr>
+        <p:blipFill>
+          <a:blip r:embed="rId4" cstate="print">
+            <a:extLst>
+              <a:ext uri="{28A0092B-C50C-407E-A947-70E740481C1C}">
+                <a14:useLocalDpi xmlns:a14="http://schemas.microsoft.com/office/drawing/2010/main" val="0"/>
+              </a:ext>
+            </a:extLst>
+          </a:blip>
+          <a:stretch>
+            <a:fillRect/>
+          </a:stretch>
+        </p:blipFill>
+        <p:spPr>
+          <a:xfrm>
+            <a:off x="13488987" y="9412287"/>
+            <a:ext cx="4572000" cy="646390"/>
+          </a:xfrm>
+          <a:prstGeom prst="rect">
+            <a:avLst/>
+          </a:prstGeom>
+        </p:spPr>
+      </p:pic>
+      <p:sp>
+        <p:nvSpPr>
+          <p:cNvPr id="10" name="TextBox 9"/>
+          <p:cNvSpPr txBox="1"/>
+          <p:nvPr/>
+        </p:nvSpPr>
+        <p:spPr>
+          <a:xfrm>
+            <a:off x="1677987" y="2571730"/>
+            <a:ext cx="3379771" cy="646331"/>
+          </a:xfrm>
+          <a:prstGeom prst="rect">
+            <a:avLst/>
+          </a:prstGeom>
+          <a:noFill/>
+        </p:spPr>
+        <p:txBody>
+          <a:bodyPr wrap="none" rtlCol="0">
+            <a:spAutoFit/>
+          </a:bodyPr>
+          <a:lstStyle/>
+          <a:p>
+            <a:r>
+              <a:rPr lang="sr-Latn-RS" sz="3600" b="1" dirty="0"/>
+              <a:t>Ambient context</a:t>
+            </a:r>
+          </a:p>
+        </p:txBody>
+      </p:sp>
+      <p:sp>
+        <p:nvSpPr>
+          <p:cNvPr id="11" name="Rectangle 10"/>
+          <p:cNvSpPr/>
+          <p:nvPr/>
+        </p:nvSpPr>
+        <p:spPr>
+          <a:xfrm>
+            <a:off x="1677987" y="3363075"/>
+            <a:ext cx="15925800" cy="1077218"/>
+          </a:xfrm>
+          <a:prstGeom prst="rect">
+            <a:avLst/>
+          </a:prstGeom>
+        </p:spPr>
+        <p:txBody>
+          <a:bodyPr wrap="square">
+            <a:spAutoFit/>
+          </a:bodyPr>
+          <a:lstStyle/>
+          <a:p>
+            <a:r>
+              <a:rPr lang="en-US" i="1" dirty="0"/>
+              <a:t>make a Dependency available to every module without polluting every API with Cross-Cutting Concerns</a:t>
+            </a:r>
+            <a:r>
+              <a:rPr lang="sr-Latn-RS" i="1" dirty="0"/>
+              <a:t> - VIA A STATIC ACCESSOR</a:t>
+            </a:r>
+            <a:endParaRPr lang="sr-Latn-RS" b="1" dirty="0"/>
+          </a:p>
+        </p:txBody>
+      </p:sp>
+      <p:pic>
+        <p:nvPicPr>
+          <p:cNvPr id="2" name="Picture 1"/>
+          <p:cNvPicPr>
+            <a:picLocks noChangeAspect="1"/>
+          </p:cNvPicPr>
+          <p:nvPr/>
+        </p:nvPicPr>
+        <p:blipFill>
+          <a:blip r:embed="rId5"/>
+          <a:stretch>
+            <a:fillRect/>
+          </a:stretch>
+        </p:blipFill>
+        <p:spPr>
+          <a:xfrm>
+            <a:off x="4649787" y="4687887"/>
+            <a:ext cx="7543397" cy="1682584"/>
+          </a:xfrm>
+          <a:prstGeom prst="rect">
+            <a:avLst/>
+          </a:prstGeom>
+        </p:spPr>
+      </p:pic>
+      <p:sp>
+        <p:nvSpPr>
+          <p:cNvPr id="17" name="Rectangle 16"/>
+          <p:cNvSpPr/>
+          <p:nvPr/>
+        </p:nvSpPr>
+        <p:spPr>
+          <a:xfrm>
+            <a:off x="1677987" y="6618065"/>
+            <a:ext cx="15925800" cy="1077218"/>
+          </a:xfrm>
+          <a:prstGeom prst="rect">
+            <a:avLst/>
+          </a:prstGeom>
+        </p:spPr>
+        <p:txBody>
+          <a:bodyPr wrap="square">
+            <a:spAutoFit/>
+          </a:bodyPr>
+          <a:lstStyle/>
+          <a:p>
+            <a:r>
+              <a:rPr lang="en-US" i="1" dirty="0"/>
+              <a:t>the context itself must be an ABSTRACTION and it must be possible to modify the context from the outside</a:t>
+            </a:r>
+            <a:endParaRPr lang="sr-Latn-RS" b="1" i="1" dirty="0"/>
+          </a:p>
+        </p:txBody>
+      </p:sp>
+      <p:sp>
+        <p:nvSpPr>
+          <p:cNvPr id="18" name="Rectangle 17"/>
+          <p:cNvSpPr/>
+          <p:nvPr/>
+        </p:nvSpPr>
+        <p:spPr>
+          <a:xfrm>
+            <a:off x="1677987" y="7695283"/>
+            <a:ext cx="16230600" cy="1077218"/>
+          </a:xfrm>
+          <a:prstGeom prst="rect">
+            <a:avLst/>
+          </a:prstGeom>
+        </p:spPr>
+        <p:txBody>
+          <a:bodyPr wrap="square">
+            <a:spAutoFit/>
+          </a:bodyPr>
+          <a:lstStyle/>
+          <a:p>
+            <a:r>
+              <a:rPr lang="en-US" b="1" i="1" dirty="0"/>
+              <a:t>AMBIENT CONTEXT </a:t>
+            </a:r>
+            <a:r>
+              <a:rPr lang="en-US" i="1" dirty="0"/>
+              <a:t>only provides an instance of a single, strongly-typed DEPENDENCY, whereas a </a:t>
+            </a:r>
+            <a:r>
+              <a:rPr lang="en-US" b="1" i="1" dirty="0"/>
+              <a:t>SERVICE LOCATOR </a:t>
+            </a:r>
+            <a:r>
+              <a:rPr lang="en-US" i="1" dirty="0"/>
+              <a:t>is supposed to provide instances for every DEPENDENCY you might request.</a:t>
+            </a:r>
+          </a:p>
+        </p:txBody>
+      </p:sp>
+    </p:spTree>
+    <p:extLst>
+      <p:ext uri="{BB962C8B-B14F-4D97-AF65-F5344CB8AC3E}">
+        <p14:creationId xmlns:p14="http://schemas.microsoft.com/office/powerpoint/2010/main" val="180725416"/>
+      </p:ext>
+    </p:extLst>
+  </p:cSld>
+  <p:clrMapOvr>
+    <a:masterClrMapping/>
+  </p:clrMapOvr>
+  <mc:AlternateContent xmlns:mc="http://schemas.openxmlformats.org/markup-compatibility/2006" xmlns:p14="http://schemas.microsoft.com/office/powerpoint/2010/main">
+    <mc:Choice Requires="p14">
+      <p:transition spd="med" p14:dur="700">
+        <p:fade/>
+      </p:transition>
+    </mc:Choice>
+    <mc:Fallback xmlns="">
+      <p:transition spd="med">
+        <p:fade/>
+      </p:transition>
+    </mc:Fallback>
+  </mc:AlternateContent>
+  <p:timing>
+    <p:tnLst>
+      <p:par>
+        <p:cTn id="1" dur="indefinite" restart="never" nodeType="tmRoot">
+          <p:childTnLst>
+            <p:seq concurrent="1" nextAc="seek">
+              <p:cTn id="2" dur="indefinite" nodeType="mainSeq">
+                <p:childTnLst>
+                  <p:par>
+                    <p:cTn id="3" fill="hold">
+                      <p:stCondLst>
+                        <p:cond delay="indefinite"/>
+                        <p:cond evt="onBegin" delay="0">
+                          <p:tn val="2"/>
+                        </p:cond>
+                      </p:stCondLst>
+                      <p:childTnLst>
+                        <p:par>
+                          <p:cTn id="4" fill="hold">
+                            <p:stCondLst>
+                              <p:cond delay="0"/>
+                            </p:stCondLst>
+                            <p:childTnLst>
+                              <p:par>
+                                <p:cTn id="5" presetID="1" presetClass="entr" presetSubtype="0" fill="hold" grpId="0" nodeType="withEffect">
+                                  <p:stCondLst>
+                                    <p:cond delay="0"/>
+                                  </p:stCondLst>
+                                  <p:childTnLst>
+                                    <p:set>
+                                      <p:cBhvr>
+                                        <p:cTn id="6" dur="1" fill="hold">
+                                          <p:stCondLst>
+                                            <p:cond delay="0"/>
+                                          </p:stCondLst>
+                                        </p:cTn>
+                                        <p:tgtEl>
+                                          <p:spTgt spid="10"/>
+                                        </p:tgtEl>
+                                        <p:attrNameLst>
+                                          <p:attrName>style.visibility</p:attrName>
+                                        </p:attrNameLst>
+                                      </p:cBhvr>
+                                      <p:to>
+                                        <p:strVal val="visible"/>
+                                      </p:to>
+                                    </p:set>
+                                  </p:childTnLst>
+                                </p:cTn>
+                              </p:par>
+                            </p:childTnLst>
+                          </p:cTn>
+                        </p:par>
+                      </p:childTnLst>
+                    </p:cTn>
+                  </p:par>
+                  <p:par>
+                    <p:cTn id="7" fill="hold">
+                      <p:stCondLst>
+                        <p:cond delay="indefinite"/>
+                      </p:stCondLst>
+                      <p:childTnLst>
+                        <p:par>
+                          <p:cTn id="8" fill="hold">
+                            <p:stCondLst>
+                              <p:cond delay="0"/>
+                            </p:stCondLst>
+                            <p:childTnLst>
+                              <p:par>
+                                <p:cTn id="9" presetID="10" presetClass="entr" presetSubtype="0" fill="hold" grpId="0" nodeType="clickEffect">
+                                  <p:stCondLst>
+                                    <p:cond delay="0"/>
+                                  </p:stCondLst>
+                                  <p:childTnLst>
+                                    <p:set>
+                                      <p:cBhvr>
+                                        <p:cTn id="10" dur="1" fill="hold">
+                                          <p:stCondLst>
+                                            <p:cond delay="0"/>
+                                          </p:stCondLst>
+                                        </p:cTn>
+                                        <p:tgtEl>
+                                          <p:spTgt spid="11"/>
+                                        </p:tgtEl>
+                                        <p:attrNameLst>
+                                          <p:attrName>style.visibility</p:attrName>
+                                        </p:attrNameLst>
+                                      </p:cBhvr>
+                                      <p:to>
+                                        <p:strVal val="visible"/>
+                                      </p:to>
+                                    </p:set>
+                                    <p:animEffect transition="in" filter="fade">
+                                      <p:cBhvr>
+                                        <p:cTn id="11" dur="500"/>
+                                        <p:tgtEl>
+                                          <p:spTgt spid="11"/>
+                                        </p:tgtEl>
+                                      </p:cBhvr>
+                                    </p:animEffect>
+                                  </p:childTnLst>
+                                </p:cTn>
+                              </p:par>
+                            </p:childTnLst>
+                          </p:cTn>
+                        </p:par>
+                      </p:childTnLst>
+                    </p:cTn>
+                  </p:par>
+                  <p:par>
+                    <p:cTn id="12" fill="hold">
+                      <p:stCondLst>
+                        <p:cond delay="indefinite"/>
+                      </p:stCondLst>
+                      <p:childTnLst>
+                        <p:par>
+                          <p:cTn id="13" fill="hold">
+                            <p:stCondLst>
+                              <p:cond delay="0"/>
+                            </p:stCondLst>
+                            <p:childTnLst>
+                              <p:par>
+                                <p:cTn id="14" presetID="10" presetClass="entr" presetSubtype="0" fill="hold" nodeType="clickEffect">
+                                  <p:stCondLst>
+                                    <p:cond delay="0"/>
+                                  </p:stCondLst>
+                                  <p:childTnLst>
+                                    <p:set>
+                                      <p:cBhvr>
+                                        <p:cTn id="15" dur="1" fill="hold">
+                                          <p:stCondLst>
+                                            <p:cond delay="0"/>
+                                          </p:stCondLst>
+                                        </p:cTn>
+                                        <p:tgtEl>
+                                          <p:spTgt spid="2"/>
+                                        </p:tgtEl>
+                                        <p:attrNameLst>
+                                          <p:attrName>style.visibility</p:attrName>
+                                        </p:attrNameLst>
+                                      </p:cBhvr>
+                                      <p:to>
+                                        <p:strVal val="visible"/>
+                                      </p:to>
+                                    </p:set>
+                                    <p:animEffect transition="in" filter="fade">
+                                      <p:cBhvr>
+                                        <p:cTn id="16" dur="500"/>
+                                        <p:tgtEl>
+                                          <p:spTgt spid="2"/>
+                                        </p:tgtEl>
+                                      </p:cBhvr>
+                                    </p:animEffect>
+                                  </p:childTnLst>
+                                </p:cTn>
+                              </p:par>
+                            </p:childTnLst>
+                          </p:cTn>
+                        </p:par>
+                      </p:childTnLst>
+                    </p:cTn>
+                  </p:par>
+                  <p:par>
+                    <p:cTn id="17" fill="hold">
+                      <p:stCondLst>
+                        <p:cond delay="indefinite"/>
+                      </p:stCondLst>
+                      <p:childTnLst>
+                        <p:par>
+                          <p:cTn id="18" fill="hold">
+                            <p:stCondLst>
+                              <p:cond delay="0"/>
+                            </p:stCondLst>
+                            <p:childTnLst>
+                              <p:par>
+                                <p:cTn id="19" presetID="10" presetClass="entr" presetSubtype="0" fill="hold" grpId="0" nodeType="clickEffect">
+                                  <p:stCondLst>
+                                    <p:cond delay="0"/>
+                                  </p:stCondLst>
+                                  <p:childTnLst>
+                                    <p:set>
+                                      <p:cBhvr>
+                                        <p:cTn id="20" dur="1" fill="hold">
+                                          <p:stCondLst>
+                                            <p:cond delay="0"/>
+                                          </p:stCondLst>
+                                        </p:cTn>
+                                        <p:tgtEl>
+                                          <p:spTgt spid="17"/>
+                                        </p:tgtEl>
+                                        <p:attrNameLst>
+                                          <p:attrName>style.visibility</p:attrName>
+                                        </p:attrNameLst>
+                                      </p:cBhvr>
+                                      <p:to>
+                                        <p:strVal val="visible"/>
+                                      </p:to>
+                                    </p:set>
+                                    <p:animEffect transition="in" filter="fade">
+                                      <p:cBhvr>
+                                        <p:cTn id="21" dur="500"/>
+                                        <p:tgtEl>
+                                          <p:spTgt spid="17"/>
+                                        </p:tgtEl>
+                                      </p:cBhvr>
+                                    </p:animEffect>
+                                  </p:childTnLst>
+                                </p:cTn>
+                              </p:par>
+                            </p:childTnLst>
+                          </p:cTn>
+                        </p:par>
+                      </p:childTnLst>
+                    </p:cTn>
+                  </p:par>
+                  <p:par>
+                    <p:cTn id="22" fill="hold">
+                      <p:stCondLst>
+                        <p:cond delay="indefinite"/>
+                      </p:stCondLst>
+                      <p:childTnLst>
+                        <p:par>
+                          <p:cTn id="23" fill="hold">
+                            <p:stCondLst>
+                              <p:cond delay="0"/>
+                            </p:stCondLst>
+                            <p:childTnLst>
+                              <p:par>
+                                <p:cTn id="24" presetID="10" presetClass="entr" presetSubtype="0" fill="hold" grpId="0" nodeType="clickEffect">
+                                  <p:stCondLst>
+                                    <p:cond delay="0"/>
+                                  </p:stCondLst>
+                                  <p:childTnLst>
+                                    <p:set>
+                                      <p:cBhvr>
+                                        <p:cTn id="25" dur="1" fill="hold">
+                                          <p:stCondLst>
+                                            <p:cond delay="0"/>
+                                          </p:stCondLst>
+                                        </p:cTn>
+                                        <p:tgtEl>
+                                          <p:spTgt spid="18"/>
+                                        </p:tgtEl>
+                                        <p:attrNameLst>
+                                          <p:attrName>style.visibility</p:attrName>
+                                        </p:attrNameLst>
+                                      </p:cBhvr>
+                                      <p:to>
+                                        <p:strVal val="visible"/>
+                                      </p:to>
+                                    </p:set>
+                                    <p:animEffect transition="in" filter="fade">
+                                      <p:cBhvr>
+                                        <p:cTn id="26" dur="500"/>
+                                        <p:tgtEl>
+                                          <p:spTgt spid="18"/>
+                                        </p:tgtEl>
+                                      </p:cBhvr>
+                                    </p:animEffect>
+                                  </p:childTnLst>
+                                </p:cTn>
+                              </p:par>
+                            </p:childTnLst>
+                          </p:cTn>
+                        </p:par>
+                      </p:childTnLst>
+                    </p:cTn>
+                  </p:par>
+                </p:childTnLst>
+              </p:cTn>
+              <p:prevCondLst>
+                <p:cond evt="onPrev" delay="0">
+                  <p:tgtEl>
+                    <p:sldTgt/>
+                  </p:tgtEl>
+                </p:cond>
+              </p:prevCondLst>
+              <p:nextCondLst>
+                <p:cond evt="onNext" delay="0">
+                  <p:tgtEl>
+                    <p:sldTgt/>
+                  </p:tgtEl>
+                </p:cond>
+              </p:nextCondLst>
+            </p:seq>
+          </p:childTnLst>
+        </p:cTn>
+      </p:par>
+    </p:tnLst>
+    <p:bldLst>
+      <p:bldP spid="10" grpId="0"/>
+      <p:bldP spid="11" grpId="0"/>
+      <p:bldP spid="17" grpId="0"/>
+      <p:bldP spid="18" grpId="0"/>
     </p:bldLst>
   </p:timing>
 </p:sld>
@@ -18007,6 +20064,282 @@
     <p:bldLst>
       <p:bldP spid="5" grpId="0" animBg="1"/>
       <p:bldP spid="6" grpId="0"/>
+    </p:bldLst>
+  </p:timing>
+</p:sld>
+</file>
+
+<file path=ppt/slides/slide30.xml><?xml version="1.0" encoding="utf-8"?>
+<p:sld xmlns:a="http://schemas.openxmlformats.org/drawingml/2006/main" xmlns:r="http://schemas.openxmlformats.org/officeDocument/2006/relationships" xmlns:p="http://schemas.openxmlformats.org/presentationml/2006/main">
+  <p:cSld>
+    <p:spTree>
+      <p:nvGrpSpPr>
+        <p:cNvPr id="1" name=""/>
+        <p:cNvGrpSpPr/>
+        <p:nvPr/>
+      </p:nvGrpSpPr>
+      <p:grpSpPr>
+        <a:xfrm>
+          <a:off x="0" y="0"/>
+          <a:ext cx="0" cy="0"/>
+          <a:chOff x="0" y="0"/>
+          <a:chExt cx="0" cy="0"/>
+        </a:xfrm>
+      </p:grpSpPr>
+      <p:pic>
+        <p:nvPicPr>
+          <p:cNvPr id="7" name="Picture 6"/>
+          <p:cNvPicPr>
+            <a:picLocks noChangeAspect="1"/>
+          </p:cNvPicPr>
+          <p:nvPr/>
+        </p:nvPicPr>
+        <p:blipFill>
+          <a:blip r:embed="rId3">
+            <a:extLst>
+              <a:ext uri="{28A0092B-C50C-407E-A947-70E740481C1C}">
+                <a14:useLocalDpi xmlns:a14="http://schemas.microsoft.com/office/drawing/2010/main" val="0"/>
+              </a:ext>
+            </a:extLst>
+          </a:blip>
+          <a:stretch>
+            <a:fillRect/>
+          </a:stretch>
+        </p:blipFill>
+        <p:spPr>
+          <a:xfrm rot="5400000">
+            <a:off x="7936677" y="1487905"/>
+            <a:ext cx="2323284" cy="7295336"/>
+          </a:xfrm>
+          <a:prstGeom prst="rect">
+            <a:avLst/>
+          </a:prstGeom>
+        </p:spPr>
+      </p:pic>
+      <p:sp>
+        <p:nvSpPr>
+          <p:cNvPr id="16" name="TextBox 15"/>
+          <p:cNvSpPr txBox="1"/>
+          <p:nvPr/>
+        </p:nvSpPr>
+        <p:spPr>
+          <a:xfrm>
+            <a:off x="3754677" y="5528934"/>
+            <a:ext cx="10575486" cy="830997"/>
+          </a:xfrm>
+          <a:prstGeom prst="rect">
+            <a:avLst/>
+          </a:prstGeom>
+          <a:noFill/>
+        </p:spPr>
+        <p:txBody>
+          <a:bodyPr wrap="square" rtlCol="0">
+            <a:spAutoFit/>
+          </a:bodyPr>
+          <a:lstStyle/>
+          <a:p>
+            <a:pPr algn="ctr"/>
+            <a:r>
+              <a:rPr lang="en-US" sz="4800" dirty="0">
+                <a:solidFill>
+                  <a:srgbClr val="545250"/>
+                </a:solidFill>
+                <a:latin typeface="Novecento sans wide Book" pitchFamily="50" charset="-94"/>
+              </a:rPr>
+              <a:t>Thank you for your attention</a:t>
+            </a:r>
+            <a:endParaRPr lang="tr-TR" sz="4800" dirty="0">
+              <a:solidFill>
+                <a:srgbClr val="545250"/>
+              </a:solidFill>
+              <a:latin typeface="Novecento sans wide Book" pitchFamily="50" charset="-94"/>
+            </a:endParaRPr>
+          </a:p>
+        </p:txBody>
+      </p:sp>
+      <p:pic>
+        <p:nvPicPr>
+          <p:cNvPr id="6" name="Picture 5"/>
+          <p:cNvPicPr>
+            <a:picLocks noChangeAspect="1"/>
+          </p:cNvPicPr>
+          <p:nvPr/>
+        </p:nvPicPr>
+        <p:blipFill>
+          <a:blip r:embed="rId4" cstate="print">
+            <a:extLst>
+              <a:ext uri="{28A0092B-C50C-407E-A947-70E740481C1C}">
+                <a14:useLocalDpi xmlns:a14="http://schemas.microsoft.com/office/drawing/2010/main" val="0"/>
+              </a:ext>
+            </a:extLst>
+          </a:blip>
+          <a:stretch>
+            <a:fillRect/>
+          </a:stretch>
+        </p:blipFill>
+        <p:spPr>
+          <a:xfrm>
+            <a:off x="4116387" y="3416895"/>
+            <a:ext cx="10058400" cy="1422061"/>
+          </a:xfrm>
+          <a:prstGeom prst="rect">
+            <a:avLst/>
+          </a:prstGeom>
+        </p:spPr>
+      </p:pic>
+    </p:spTree>
+    <p:extLst>
+      <p:ext uri="{BB962C8B-B14F-4D97-AF65-F5344CB8AC3E}">
+        <p14:creationId xmlns:p14="http://schemas.microsoft.com/office/powerpoint/2010/main" val="1325838218"/>
+      </p:ext>
+    </p:extLst>
+  </p:cSld>
+  <p:clrMapOvr>
+    <a:masterClrMapping/>
+  </p:clrMapOvr>
+  <mc:AlternateContent xmlns:mc="http://schemas.openxmlformats.org/markup-compatibility/2006" xmlns:p14="http://schemas.microsoft.com/office/powerpoint/2010/main">
+    <mc:Choice Requires="p14">
+      <p:transition spd="med" p14:dur="700">
+        <p:fade/>
+      </p:transition>
+    </mc:Choice>
+    <mc:Fallback xmlns="">
+      <p:transition spd="med">
+        <p:fade/>
+      </p:transition>
+    </mc:Fallback>
+  </mc:AlternateContent>
+  <p:timing>
+    <p:tnLst>
+      <p:par>
+        <p:cTn id="1" dur="indefinite" restart="never" nodeType="tmRoot">
+          <p:childTnLst>
+            <p:seq concurrent="1" nextAc="seek">
+              <p:cTn id="2" dur="indefinite" nodeType="mainSeq">
+                <p:childTnLst>
+                  <p:par>
+                    <p:cTn id="3" fill="hold">
+                      <p:stCondLst>
+                        <p:cond delay="indefinite"/>
+                        <p:cond evt="onBegin" delay="0">
+                          <p:tn val="2"/>
+                        </p:cond>
+                      </p:stCondLst>
+                      <p:childTnLst>
+                        <p:par>
+                          <p:cTn id="4" fill="hold">
+                            <p:stCondLst>
+                              <p:cond delay="0"/>
+                            </p:stCondLst>
+                            <p:childTnLst>
+                              <p:par>
+                                <p:cTn id="5" presetID="10" presetClass="entr" presetSubtype="0" fill="hold" nodeType="afterEffect">
+                                  <p:stCondLst>
+                                    <p:cond delay="0"/>
+                                  </p:stCondLst>
+                                  <p:childTnLst>
+                                    <p:set>
+                                      <p:cBhvr>
+                                        <p:cTn id="6" dur="1" fill="hold">
+                                          <p:stCondLst>
+                                            <p:cond delay="0"/>
+                                          </p:stCondLst>
+                                        </p:cTn>
+                                        <p:tgtEl>
+                                          <p:spTgt spid="7"/>
+                                        </p:tgtEl>
+                                        <p:attrNameLst>
+                                          <p:attrName>style.visibility</p:attrName>
+                                        </p:attrNameLst>
+                                      </p:cBhvr>
+                                      <p:to>
+                                        <p:strVal val="visible"/>
+                                      </p:to>
+                                    </p:set>
+                                    <p:animEffect transition="in" filter="fade">
+                                      <p:cBhvr>
+                                        <p:cTn id="7" dur="500"/>
+                                        <p:tgtEl>
+                                          <p:spTgt spid="7"/>
+                                        </p:tgtEl>
+                                      </p:cBhvr>
+                                    </p:animEffect>
+                                  </p:childTnLst>
+                                </p:cTn>
+                              </p:par>
+                            </p:childTnLst>
+                          </p:cTn>
+                        </p:par>
+                        <p:par>
+                          <p:cTn id="8" fill="hold">
+                            <p:stCondLst>
+                              <p:cond delay="500"/>
+                            </p:stCondLst>
+                            <p:childTnLst>
+                              <p:par>
+                                <p:cTn id="9" presetID="10" presetClass="entr" presetSubtype="0" fill="hold" grpId="0" nodeType="afterEffect">
+                                  <p:stCondLst>
+                                    <p:cond delay="0"/>
+                                  </p:stCondLst>
+                                  <p:childTnLst>
+                                    <p:set>
+                                      <p:cBhvr>
+                                        <p:cTn id="10" dur="1" fill="hold">
+                                          <p:stCondLst>
+                                            <p:cond delay="0"/>
+                                          </p:stCondLst>
+                                        </p:cTn>
+                                        <p:tgtEl>
+                                          <p:spTgt spid="16"/>
+                                        </p:tgtEl>
+                                        <p:attrNameLst>
+                                          <p:attrName>style.visibility</p:attrName>
+                                        </p:attrNameLst>
+                                      </p:cBhvr>
+                                      <p:to>
+                                        <p:strVal val="visible"/>
+                                      </p:to>
+                                    </p:set>
+                                    <p:animEffect transition="in" filter="fade">
+                                      <p:cBhvr>
+                                        <p:cTn id="11" dur="500"/>
+                                        <p:tgtEl>
+                                          <p:spTgt spid="16"/>
+                                        </p:tgtEl>
+                                      </p:cBhvr>
+                                    </p:animEffect>
+                                  </p:childTnLst>
+                                </p:cTn>
+                              </p:par>
+                            </p:childTnLst>
+                          </p:cTn>
+                        </p:par>
+                      </p:childTnLst>
+                    </p:cTn>
+                  </p:par>
+                </p:childTnLst>
+              </p:cTn>
+              <p:prevCondLst>
+                <p:cond evt="onPrev" delay="0">
+                  <p:tgtEl>
+                    <p:sldTgt/>
+                  </p:tgtEl>
+                </p:cond>
+              </p:prevCondLst>
+              <p:nextCondLst>
+                <p:cond evt="onNext" delay="0">
+                  <p:tgtEl>
+                    <p:sldTgt/>
+                  </p:tgtEl>
+                </p:cond>
+              </p:nextCondLst>
+            </p:seq>
+          </p:childTnLst>
+        </p:cTn>
+      </p:par>
+    </p:tnLst>
+    <p:bldLst>
+      <p:bldP spid="16" grpId="0"/>
     </p:bldLst>
   </p:timing>
 </p:sld>

</xml_diff>